<commit_message>
Added non-stochastic model in presentation.
</commit_message>
<xml_diff>
--- a/consumption/presentationFeb2020.pptx
+++ b/consumption/presentationFeb2020.pptx
@@ -17566,7 +17566,7 @@
             <p:spPr/>
             <p:txBody>
               <a:bodyPr>
-                <a:normAutofit fontScale="77500" lnSpcReduction="20000"/>
+                <a:normAutofit fontScale="62500" lnSpcReduction="20000"/>
               </a:bodyPr>
               <a:lstStyle/>
               <a:p>
@@ -18398,6 +18398,117 @@
                   <a:t>.  This would solve a stochastic dynamic optimisation problem – whose solution can often only be obtained through simulations</a:t>
                 </a:r>
               </a:p>
+              <a:p>
+                <a:pPr marL="0" indent="0">
+                  <a:buNone/>
+                </a:pPr>
+                <a:r>
+                  <a:rPr lang="en-GB" dirty="0"/>
+                  <a:t>Notice that we associate consumption both with quality </a:t>
+                </a:r>
+                <a14:m>
+                  <m:oMath xmlns:m="http://schemas.openxmlformats.org/officeDocument/2006/math">
+                    <m:r>
+                      <a:rPr lang="en-GB" i="1">
+                        <a:latin typeface="Cambria Math" panose="02040503050406030204" pitchFamily="18" charset="0"/>
+                      </a:rPr>
+                      <m:t>𝑔</m:t>
+                    </m:r>
+                    <m:d>
+                      <m:dPr>
+                        <m:ctrlPr>
+                          <a:rPr lang="en-GB" i="1">
+                            <a:latin typeface="Cambria Math" panose="02040503050406030204" pitchFamily="18" charset="0"/>
+                          </a:rPr>
+                        </m:ctrlPr>
+                      </m:dPr>
+                      <m:e>
+                        <m:r>
+                          <m:rPr>
+                            <m:sty m:val="p"/>
+                          </m:rPr>
+                          <a:rPr lang="en-GB">
+                            <a:latin typeface="Cambria Math" panose="02040503050406030204" pitchFamily="18" charset="0"/>
+                          </a:rPr>
+                          <m:t>Γ</m:t>
+                        </m:r>
+                      </m:e>
+                    </m:d>
+                  </m:oMath>
+                </a14:m>
+                <a:r>
+                  <a:rPr lang="en-GB" dirty="0"/>
+                  <a:t> and the constraint </a:t>
+                </a:r>
+                <a14:m>
+                  <m:oMath xmlns:m="http://schemas.openxmlformats.org/officeDocument/2006/math">
+                    <m:r>
+                      <a:rPr lang="en-GB" i="1">
+                        <a:latin typeface="Cambria Math" panose="02040503050406030204" pitchFamily="18" charset="0"/>
+                      </a:rPr>
+                      <m:t>𝑝</m:t>
+                    </m:r>
+                    <m:d>
+                      <m:dPr>
+                        <m:ctrlPr>
+                          <a:rPr lang="en-GB" i="1">
+                            <a:latin typeface="Cambria Math" panose="02040503050406030204" pitchFamily="18" charset="0"/>
+                          </a:rPr>
+                        </m:ctrlPr>
+                      </m:dPr>
+                      <m:e>
+                        <m:sSub>
+                          <m:sSubPr>
+                            <m:ctrlPr>
+                              <a:rPr lang="en-GB" i="1">
+                                <a:latin typeface="Cambria Math" panose="02040503050406030204" pitchFamily="18" charset="0"/>
+                              </a:rPr>
+                            </m:ctrlPr>
+                          </m:sSubPr>
+                          <m:e>
+                            <m:r>
+                              <a:rPr lang="en-GB" i="1">
+                                <a:latin typeface="Cambria Math" panose="02040503050406030204" pitchFamily="18" charset="0"/>
+                              </a:rPr>
+                              <m:t>𝐴</m:t>
+                            </m:r>
+                          </m:e>
+                          <m:sub>
+                            <m:r>
+                              <a:rPr lang="en-GB" i="1">
+                                <a:latin typeface="Cambria Math" panose="02040503050406030204" pitchFamily="18" charset="0"/>
+                              </a:rPr>
+                              <m:t>𝑡</m:t>
+                            </m:r>
+                          </m:sub>
+                        </m:sSub>
+                        <m:r>
+                          <a:rPr lang="en-GB" i="1">
+                            <a:latin typeface="Cambria Math" panose="02040503050406030204" pitchFamily="18" charset="0"/>
+                          </a:rPr>
+                          <m:t>,</m:t>
+                        </m:r>
+                        <m:r>
+                          <a:rPr lang="en-GB" i="1">
+                            <a:latin typeface="Cambria Math" panose="02040503050406030204" pitchFamily="18" charset="0"/>
+                          </a:rPr>
+                          <m:t>𝜌</m:t>
+                        </m:r>
+                      </m:e>
+                    </m:d>
+                  </m:oMath>
+                </a14:m>
+                <a:r>
+                  <a:rPr lang="en-GB" dirty="0"/>
+                  <a:t> brought about by ownership of assets </a:t>
+                </a:r>
+              </a:p>
+              <a:p>
+                <a:pPr marL="0" indent="0">
+                  <a:buNone/>
+                </a:pPr>
+                <a:endParaRPr lang="en-GB" dirty="0"/>
+              </a:p>
             </p:txBody>
           </p:sp>
         </mc:Choice>
@@ -18422,7 +18533,7 @@
               <a:blipFill>
                 <a:blip r:embed="rId2"/>
                 <a:stretch>
-                  <a:fillRect l="-386" b="-4673"/>
+                  <a:fillRect l="-77"/>
                 </a:stretch>
               </a:blipFill>
             </p:spPr>
@@ -18537,31 +18648,1068 @@
           </a:p>
         </p:txBody>
       </p:sp>
-      <p:sp>
-        <p:nvSpPr>
-          <p:cNvPr id="3" name="Content Placeholder 2">
-            <a:extLst>
-              <a:ext uri="{FF2B5EF4-FFF2-40B4-BE49-F238E27FC236}">
-                <a16:creationId xmlns:a16="http://schemas.microsoft.com/office/drawing/2014/main" id="{0C17D304-52FB-40B2-8A70-166828E93AA6}"/>
-              </a:ext>
-            </a:extLst>
-          </p:cNvPr>
-          <p:cNvSpPr>
-            <a:spLocks noGrp="1"/>
-          </p:cNvSpPr>
-          <p:nvPr>
-            <p:ph idx="1"/>
-          </p:nvPr>
-        </p:nvSpPr>
-        <p:spPr/>
-        <p:txBody>
-          <a:bodyPr/>
-          <a:lstStyle/>
-          <a:p>
-            <a:endParaRPr lang="en-GB"/>
-          </a:p>
-        </p:txBody>
-      </p:sp>
+      <mc:AlternateContent xmlns:mc="http://schemas.openxmlformats.org/markup-compatibility/2006">
+        <mc:Choice xmlns:a14="http://schemas.microsoft.com/office/drawing/2010/main" Requires="a14">
+          <p:sp>
+            <p:nvSpPr>
+              <p:cNvPr id="3" name="Content Placeholder 2">
+                <a:extLst>
+                  <a:ext uri="{FF2B5EF4-FFF2-40B4-BE49-F238E27FC236}">
+                    <a16:creationId xmlns:a16="http://schemas.microsoft.com/office/drawing/2014/main" id="{0C17D304-52FB-40B2-8A70-166828E93AA6}"/>
+                  </a:ext>
+                </a:extLst>
+              </p:cNvPr>
+              <p:cNvSpPr>
+                <a:spLocks noGrp="1"/>
+              </p:cNvSpPr>
+              <p:nvPr>
+                <p:ph idx="1"/>
+              </p:nvPr>
+            </p:nvSpPr>
+            <p:spPr/>
+            <p:txBody>
+              <a:bodyPr>
+                <a:normAutofit fontScale="92500" lnSpcReduction="20000"/>
+              </a:bodyPr>
+              <a:lstStyle/>
+              <a:p>
+                <a:pPr marL="0" indent="0">
+                  <a:buNone/>
+                </a:pPr>
+                <a14:m>
+                  <m:oMathPara xmlns:m="http://schemas.openxmlformats.org/officeDocument/2006/math">
+                    <m:oMathParaPr>
+                      <m:jc m:val="centerGroup"/>
+                    </m:oMathParaPr>
+                    <m:oMath xmlns:m="http://schemas.openxmlformats.org/officeDocument/2006/math">
+                      <m:sSub>
+                        <m:sSubPr>
+                          <m:ctrlPr>
+                            <a:rPr lang="en-GB" i="1" smtClean="0">
+                              <a:latin typeface="Cambria Math" panose="02040503050406030204" pitchFamily="18" charset="0"/>
+                            </a:rPr>
+                          </m:ctrlPr>
+                        </m:sSubPr>
+                        <m:e>
+                          <m:r>
+                            <a:rPr lang="en-GB" i="1">
+                              <a:latin typeface="Cambria Math" panose="02040503050406030204" pitchFamily="18" charset="0"/>
+                            </a:rPr>
+                            <m:t>𝜂</m:t>
+                          </m:r>
+                        </m:e>
+                        <m:sub>
+                          <m:r>
+                            <a:rPr lang="en-GB" i="1">
+                              <a:latin typeface="Cambria Math" panose="02040503050406030204" pitchFamily="18" charset="0"/>
+                            </a:rPr>
+                            <m:t>𝑡</m:t>
+                          </m:r>
+                        </m:sub>
+                      </m:sSub>
+                      <m:r>
+                        <a:rPr lang="en-GB" i="1">
+                          <a:latin typeface="Cambria Math" panose="02040503050406030204" pitchFamily="18" charset="0"/>
+                        </a:rPr>
+                        <m:t>=</m:t>
+                      </m:r>
+                      <m:r>
+                        <a:rPr lang="en-GB" i="1">
+                          <a:latin typeface="Cambria Math" panose="02040503050406030204" pitchFamily="18" charset="0"/>
+                        </a:rPr>
+                        <m:t>𝜂</m:t>
+                      </m:r>
+                      <m:r>
+                        <a:rPr lang="en-GB" i="1">
+                          <a:latin typeface="Cambria Math" panose="02040503050406030204" pitchFamily="18" charset="0"/>
+                        </a:rPr>
+                        <m:t>(</m:t>
+                      </m:r>
+                      <m:r>
+                        <a:rPr lang="en-GB" i="1">
+                          <a:latin typeface="Cambria Math" panose="02040503050406030204" pitchFamily="18" charset="0"/>
+                        </a:rPr>
+                        <m:t>𝑡</m:t>
+                      </m:r>
+                      <m:r>
+                        <a:rPr lang="en-GB" i="1">
+                          <a:latin typeface="Cambria Math" panose="02040503050406030204" pitchFamily="18" charset="0"/>
+                        </a:rPr>
+                        <m:t>,</m:t>
+                      </m:r>
+                      <m:r>
+                        <a:rPr lang="en-GB" i="1">
+                          <a:latin typeface="Cambria Math" panose="02040503050406030204" pitchFamily="18" charset="0"/>
+                        </a:rPr>
+                        <m:t>𝑇</m:t>
+                      </m:r>
+                      <m:r>
+                        <a:rPr lang="en-GB" i="1">
+                          <a:latin typeface="Cambria Math" panose="02040503050406030204" pitchFamily="18" charset="0"/>
+                        </a:rPr>
+                        <m:t>)</m:t>
+                      </m:r>
+                    </m:oMath>
+                  </m:oMathPara>
+                </a14:m>
+                <a:endParaRPr lang="en-GB" dirty="0"/>
+              </a:p>
+              <a:p>
+                <a:pPr marL="0" indent="0">
+                  <a:buNone/>
+                </a:pPr>
+                <a:endParaRPr lang="en-GB" i="1" dirty="0">
+                  <a:latin typeface="Cambria Math" panose="02040503050406030204" pitchFamily="18" charset="0"/>
+                </a:endParaRPr>
+              </a:p>
+              <a:p>
+                <a:pPr marL="0" indent="0">
+                  <a:buNone/>
+                </a:pPr>
+                <a14:m>
+                  <m:oMathPara xmlns:m="http://schemas.openxmlformats.org/officeDocument/2006/math">
+                    <m:oMathParaPr>
+                      <m:jc m:val="centerGroup"/>
+                    </m:oMathParaPr>
+                    <m:oMath xmlns:m="http://schemas.openxmlformats.org/officeDocument/2006/math">
+                      <m:sSub>
+                        <m:sSubPr>
+                          <m:ctrlPr>
+                            <a:rPr lang="en-GB" i="1">
+                              <a:latin typeface="Cambria Math" panose="02040503050406030204" pitchFamily="18" charset="0"/>
+                            </a:rPr>
+                          </m:ctrlPr>
+                        </m:sSubPr>
+                        <m:e>
+                          <m:r>
+                            <a:rPr lang="en-GB" i="1">
+                              <a:latin typeface="Cambria Math" panose="02040503050406030204" pitchFamily="18" charset="0"/>
+                            </a:rPr>
+                            <m:t>𝐴</m:t>
+                          </m:r>
+                        </m:e>
+                        <m:sub>
+                          <m:r>
+                            <a:rPr lang="en-GB" i="1">
+                              <a:latin typeface="Cambria Math" panose="02040503050406030204" pitchFamily="18" charset="0"/>
+                            </a:rPr>
+                            <m:t>𝑡</m:t>
+                          </m:r>
+                          <m:r>
+                            <a:rPr lang="en-GB" i="1">
+                              <a:latin typeface="Cambria Math" panose="02040503050406030204" pitchFamily="18" charset="0"/>
+                            </a:rPr>
+                            <m:t>+1</m:t>
+                          </m:r>
+                        </m:sub>
+                      </m:sSub>
+                      <m:r>
+                        <a:rPr lang="en-GB" i="1">
+                          <a:latin typeface="Cambria Math" panose="02040503050406030204" pitchFamily="18" charset="0"/>
+                        </a:rPr>
+                        <m:t>=</m:t>
+                      </m:r>
+                      <m:sSub>
+                        <m:sSubPr>
+                          <m:ctrlPr>
+                            <a:rPr lang="en-GB" i="1">
+                              <a:latin typeface="Cambria Math" panose="02040503050406030204" pitchFamily="18" charset="0"/>
+                            </a:rPr>
+                          </m:ctrlPr>
+                        </m:sSubPr>
+                        <m:e>
+                          <m:r>
+                            <a:rPr lang="en-GB" i="1">
+                              <a:latin typeface="Cambria Math" panose="02040503050406030204" pitchFamily="18" charset="0"/>
+                            </a:rPr>
+                            <m:t>𝐴</m:t>
+                          </m:r>
+                        </m:e>
+                        <m:sub>
+                          <m:r>
+                            <a:rPr lang="en-GB" i="1">
+                              <a:latin typeface="Cambria Math" panose="02040503050406030204" pitchFamily="18" charset="0"/>
+                            </a:rPr>
+                            <m:t>𝑡</m:t>
+                          </m:r>
+                        </m:sub>
+                      </m:sSub>
+                      <m:r>
+                        <a:rPr lang="en-GB" i="1">
+                          <a:latin typeface="Cambria Math" panose="02040503050406030204" pitchFamily="18" charset="0"/>
+                        </a:rPr>
+                        <m:t>+(</m:t>
+                      </m:r>
+                      <m:sSub>
+                        <m:sSubPr>
+                          <m:ctrlPr>
+                            <a:rPr lang="en-GB" i="1">
+                              <a:latin typeface="Cambria Math" panose="02040503050406030204" pitchFamily="18" charset="0"/>
+                            </a:rPr>
+                          </m:ctrlPr>
+                        </m:sSubPr>
+                        <m:e>
+                          <m:r>
+                            <a:rPr lang="en-GB" i="1">
+                              <a:latin typeface="Cambria Math" panose="02040503050406030204" pitchFamily="18" charset="0"/>
+                            </a:rPr>
+                            <m:t>𝑖</m:t>
+                          </m:r>
+                        </m:e>
+                        <m:sub>
+                          <m:r>
+                            <a:rPr lang="en-GB" i="1">
+                              <a:latin typeface="Cambria Math" panose="02040503050406030204" pitchFamily="18" charset="0"/>
+                            </a:rPr>
+                            <m:t>𝑡</m:t>
+                          </m:r>
+                          <m:r>
+                            <a:rPr lang="en-GB" i="1">
+                              <a:latin typeface="Cambria Math" panose="02040503050406030204" pitchFamily="18" charset="0"/>
+                            </a:rPr>
+                            <m:t>+1</m:t>
+                          </m:r>
+                        </m:sub>
+                      </m:sSub>
+                      <m:r>
+                        <a:rPr lang="en-GB" i="1">
+                          <a:latin typeface="Cambria Math" panose="02040503050406030204" pitchFamily="18" charset="0"/>
+                        </a:rPr>
+                        <m:t>−</m:t>
+                      </m:r>
+                      <m:sSub>
+                        <m:sSubPr>
+                          <m:ctrlPr>
+                            <a:rPr lang="en-GB" i="1">
+                              <a:latin typeface="Cambria Math" panose="02040503050406030204" pitchFamily="18" charset="0"/>
+                            </a:rPr>
+                          </m:ctrlPr>
+                        </m:sSubPr>
+                        <m:e>
+                          <m:r>
+                            <a:rPr lang="en-GB" i="1">
+                              <a:latin typeface="Cambria Math" panose="02040503050406030204" pitchFamily="18" charset="0"/>
+                            </a:rPr>
+                            <m:t>𝑐</m:t>
+                          </m:r>
+                        </m:e>
+                        <m:sub>
+                          <m:r>
+                            <a:rPr lang="en-GB" i="1">
+                              <a:latin typeface="Cambria Math" panose="02040503050406030204" pitchFamily="18" charset="0"/>
+                            </a:rPr>
+                            <m:t>𝑡</m:t>
+                          </m:r>
+                          <m:r>
+                            <a:rPr lang="en-GB" i="1">
+                              <a:latin typeface="Cambria Math" panose="02040503050406030204" pitchFamily="18" charset="0"/>
+                            </a:rPr>
+                            <m:t>+1</m:t>
+                          </m:r>
+                        </m:sub>
+                      </m:sSub>
+                      <m:r>
+                        <a:rPr lang="en-GB" i="1">
+                          <a:latin typeface="Cambria Math" panose="02040503050406030204" pitchFamily="18" charset="0"/>
+                        </a:rPr>
+                        <m:t>)</m:t>
+                      </m:r>
+                    </m:oMath>
+                  </m:oMathPara>
+                </a14:m>
+                <a:endParaRPr lang="en-GB" dirty="0"/>
+              </a:p>
+              <a:p>
+                <a:pPr marL="0" indent="0">
+                  <a:buNone/>
+                </a:pPr>
+                <a:endParaRPr lang="en-GB" dirty="0"/>
+              </a:p>
+              <a:p>
+                <a:pPr marL="0" indent="0">
+                  <a:buNone/>
+                </a:pPr>
+                <a14:m>
+                  <m:oMathPara xmlns:m="http://schemas.openxmlformats.org/officeDocument/2006/math">
+                    <m:oMathParaPr>
+                      <m:jc m:val="centerGroup"/>
+                    </m:oMathParaPr>
+                    <m:oMath xmlns:m="http://schemas.openxmlformats.org/officeDocument/2006/math">
+                      <m:sSub>
+                        <m:sSubPr>
+                          <m:ctrlPr>
+                            <a:rPr lang="en-GB" i="1">
+                              <a:latin typeface="Cambria Math" panose="02040503050406030204" pitchFamily="18" charset="0"/>
+                            </a:rPr>
+                          </m:ctrlPr>
+                        </m:sSubPr>
+                        <m:e>
+                          <m:r>
+                            <a:rPr lang="en-GB" i="1">
+                              <a:latin typeface="Cambria Math" panose="02040503050406030204" pitchFamily="18" charset="0"/>
+                            </a:rPr>
+                            <m:t>𝑖</m:t>
+                          </m:r>
+                        </m:e>
+                        <m:sub>
+                          <m:r>
+                            <a:rPr lang="en-GB" i="1">
+                              <a:latin typeface="Cambria Math" panose="02040503050406030204" pitchFamily="18" charset="0"/>
+                            </a:rPr>
+                            <m:t>𝑡</m:t>
+                          </m:r>
+                          <m:r>
+                            <a:rPr lang="en-GB" i="1">
+                              <a:latin typeface="Cambria Math" panose="02040503050406030204" pitchFamily="18" charset="0"/>
+                            </a:rPr>
+                            <m:t>+1</m:t>
+                          </m:r>
+                        </m:sub>
+                      </m:sSub>
+                      <m:r>
+                        <a:rPr lang="en-GB" i="1">
+                          <a:latin typeface="Cambria Math" panose="02040503050406030204" pitchFamily="18" charset="0"/>
+                        </a:rPr>
+                        <m:t>=</m:t>
+                      </m:r>
+                      <m:r>
+                        <a:rPr lang="en-GB" i="1">
+                          <a:latin typeface="Cambria Math" panose="02040503050406030204" pitchFamily="18" charset="0"/>
+                        </a:rPr>
+                        <m:t>𝑘</m:t>
+                      </m:r>
+                      <m:sSub>
+                        <m:sSubPr>
+                          <m:ctrlPr>
+                            <a:rPr lang="en-GB" i="1">
+                              <a:latin typeface="Cambria Math" panose="02040503050406030204" pitchFamily="18" charset="0"/>
+                            </a:rPr>
+                          </m:ctrlPr>
+                        </m:sSubPr>
+                        <m:e>
+                          <m:r>
+                            <a:rPr lang="en-GB" i="1">
+                              <a:latin typeface="Cambria Math" panose="02040503050406030204" pitchFamily="18" charset="0"/>
+                            </a:rPr>
+                            <m:t>𝑖</m:t>
+                          </m:r>
+                        </m:e>
+                        <m:sub>
+                          <m:r>
+                            <a:rPr lang="en-GB" i="1">
+                              <a:latin typeface="Cambria Math" panose="02040503050406030204" pitchFamily="18" charset="0"/>
+                            </a:rPr>
+                            <m:t>𝑡</m:t>
+                          </m:r>
+                        </m:sub>
+                      </m:sSub>
+                    </m:oMath>
+                  </m:oMathPara>
+                </a14:m>
+                <a:endParaRPr lang="en-GB" dirty="0"/>
+              </a:p>
+              <a:p>
+                <a:pPr marL="0" indent="0">
+                  <a:buNone/>
+                </a:pPr>
+                <a:endParaRPr lang="en-GB" dirty="0"/>
+              </a:p>
+              <a:p>
+                <a:pPr marL="0" indent="0">
+                  <a:buNone/>
+                </a:pPr>
+                <a14:m>
+                  <m:oMathPara xmlns:m="http://schemas.openxmlformats.org/officeDocument/2006/math">
+                    <m:oMathParaPr>
+                      <m:jc m:val="centerGroup"/>
+                    </m:oMathParaPr>
+                    <m:oMath xmlns:m="http://schemas.openxmlformats.org/officeDocument/2006/math">
+                      <m:sSub>
+                        <m:sSubPr>
+                          <m:ctrlPr>
+                            <a:rPr lang="en-GB" i="1">
+                              <a:latin typeface="Cambria Math" panose="02040503050406030204" pitchFamily="18" charset="0"/>
+                            </a:rPr>
+                          </m:ctrlPr>
+                        </m:sSubPr>
+                        <m:e>
+                          <m:r>
+                            <a:rPr lang="en-GB" i="1">
+                              <a:latin typeface="Cambria Math" panose="02040503050406030204" pitchFamily="18" charset="0"/>
+                            </a:rPr>
+                            <m:t>𝑐</m:t>
+                          </m:r>
+                        </m:e>
+                        <m:sub>
+                          <m:r>
+                            <a:rPr lang="en-GB" i="1">
+                              <a:latin typeface="Cambria Math" panose="02040503050406030204" pitchFamily="18" charset="0"/>
+                            </a:rPr>
+                            <m:t>𝑡</m:t>
+                          </m:r>
+                          <m:r>
+                            <a:rPr lang="en-GB" i="1">
+                              <a:latin typeface="Cambria Math" panose="02040503050406030204" pitchFamily="18" charset="0"/>
+                            </a:rPr>
+                            <m:t>+1</m:t>
+                          </m:r>
+                        </m:sub>
+                      </m:sSub>
+                      <m:r>
+                        <a:rPr lang="en-GB" i="1">
+                          <a:latin typeface="Cambria Math" panose="02040503050406030204" pitchFamily="18" charset="0"/>
+                        </a:rPr>
+                        <m:t>=</m:t>
+                      </m:r>
+                      <m:sSub>
+                        <m:sSubPr>
+                          <m:ctrlPr>
+                            <a:rPr lang="en-GB" i="1">
+                              <a:latin typeface="Cambria Math" panose="02040503050406030204" pitchFamily="18" charset="0"/>
+                            </a:rPr>
+                          </m:ctrlPr>
+                        </m:sSubPr>
+                        <m:e>
+                          <m:d>
+                            <m:dPr>
+                              <m:ctrlPr>
+                                <a:rPr lang="en-GB" b="0" i="1" smtClean="0">
+                                  <a:latin typeface="Cambria Math" panose="02040503050406030204" pitchFamily="18" charset="0"/>
+                                </a:rPr>
+                              </m:ctrlPr>
+                            </m:dPr>
+                            <m:e>
+                              <m:r>
+                                <a:rPr lang="en-GB" b="0" i="1" smtClean="0">
+                                  <a:latin typeface="Cambria Math" panose="02040503050406030204" pitchFamily="18" charset="0"/>
+                                </a:rPr>
+                                <m:t>1+</m:t>
+                              </m:r>
+                              <m:r>
+                                <a:rPr lang="en-GB" b="0" i="1" smtClean="0">
+                                  <a:latin typeface="Cambria Math" panose="02040503050406030204" pitchFamily="18" charset="0"/>
+                                </a:rPr>
+                                <m:t>𝜈</m:t>
+                              </m:r>
+                            </m:e>
+                          </m:d>
+                          <m:r>
+                            <a:rPr lang="en-GB" i="1">
+                              <a:latin typeface="Cambria Math" panose="02040503050406030204" pitchFamily="18" charset="0"/>
+                            </a:rPr>
+                            <m:t>𝜂</m:t>
+                          </m:r>
+                        </m:e>
+                        <m:sub>
+                          <m:r>
+                            <a:rPr lang="en-GB" i="1">
+                              <a:latin typeface="Cambria Math" panose="02040503050406030204" pitchFamily="18" charset="0"/>
+                            </a:rPr>
+                            <m:t>𝑡</m:t>
+                          </m:r>
+                        </m:sub>
+                      </m:sSub>
+                      <m:r>
+                        <a:rPr lang="en-GB" i="1">
+                          <a:latin typeface="Cambria Math" panose="02040503050406030204" pitchFamily="18" charset="0"/>
+                        </a:rPr>
+                        <m:t>𝑝</m:t>
+                      </m:r>
+                      <m:d>
+                        <m:dPr>
+                          <m:ctrlPr>
+                            <a:rPr lang="en-GB" i="1">
+                              <a:latin typeface="Cambria Math" panose="02040503050406030204" pitchFamily="18" charset="0"/>
+                            </a:rPr>
+                          </m:ctrlPr>
+                        </m:dPr>
+                        <m:e>
+                          <m:sSub>
+                            <m:sSubPr>
+                              <m:ctrlPr>
+                                <a:rPr lang="en-GB" i="1">
+                                  <a:latin typeface="Cambria Math" panose="02040503050406030204" pitchFamily="18" charset="0"/>
+                                </a:rPr>
+                              </m:ctrlPr>
+                            </m:sSubPr>
+                            <m:e>
+                              <m:r>
+                                <a:rPr lang="en-GB" i="1">
+                                  <a:latin typeface="Cambria Math" panose="02040503050406030204" pitchFamily="18" charset="0"/>
+                                </a:rPr>
+                                <m:t>𝐴</m:t>
+                              </m:r>
+                            </m:e>
+                            <m:sub>
+                              <m:r>
+                                <a:rPr lang="en-GB" i="1">
+                                  <a:latin typeface="Cambria Math" panose="02040503050406030204" pitchFamily="18" charset="0"/>
+                                </a:rPr>
+                                <m:t>𝑡</m:t>
+                              </m:r>
+                            </m:sub>
+                          </m:sSub>
+                        </m:e>
+                      </m:d>
+                      <m:sSub>
+                        <m:sSubPr>
+                          <m:ctrlPr>
+                            <a:rPr lang="en-GB" b="0" i="1" smtClean="0">
+                              <a:latin typeface="Cambria Math" panose="02040503050406030204" pitchFamily="18" charset="0"/>
+                            </a:rPr>
+                          </m:ctrlPr>
+                        </m:sSubPr>
+                        <m:e>
+                          <m:r>
+                            <m:rPr>
+                              <m:sty m:val="p"/>
+                            </m:rPr>
+                            <a:rPr lang="en-GB" b="0" i="0" smtClean="0">
+                              <a:latin typeface="Cambria Math" panose="02040503050406030204" pitchFamily="18" charset="0"/>
+                            </a:rPr>
+                            <m:t>Ψ</m:t>
+                          </m:r>
+                        </m:e>
+                        <m:sub>
+                          <m:r>
+                            <a:rPr lang="en-GB" b="0" i="1" smtClean="0">
+                              <a:latin typeface="Cambria Math" panose="02040503050406030204" pitchFamily="18" charset="0"/>
+                            </a:rPr>
+                            <m:t>𝑡</m:t>
+                          </m:r>
+                        </m:sub>
+                      </m:sSub>
+                      <m:sSub>
+                        <m:sSubPr>
+                          <m:ctrlPr>
+                            <a:rPr lang="en-GB" b="0" i="1" smtClean="0">
+                              <a:latin typeface="Cambria Math" panose="02040503050406030204" pitchFamily="18" charset="0"/>
+                            </a:rPr>
+                          </m:ctrlPr>
+                        </m:sSubPr>
+                        <m:e>
+                          <m:r>
+                            <a:rPr lang="en-GB" b="0" i="1" smtClean="0">
+                              <a:latin typeface="Cambria Math" panose="02040503050406030204" pitchFamily="18" charset="0"/>
+                            </a:rPr>
+                            <m:t>𝜂</m:t>
+                          </m:r>
+                        </m:e>
+                        <m:sub>
+                          <m:r>
+                            <a:rPr lang="en-GB" b="0" i="1" smtClean="0">
+                              <a:latin typeface="Cambria Math" panose="02040503050406030204" pitchFamily="18" charset="0"/>
+                            </a:rPr>
+                            <m:t>𝑡</m:t>
+                          </m:r>
+                        </m:sub>
+                      </m:sSub>
+                    </m:oMath>
+                  </m:oMathPara>
+                </a14:m>
+                <a:endParaRPr lang="en-GB" dirty="0"/>
+              </a:p>
+              <a:p>
+                <a:pPr marL="0" indent="0">
+                  <a:buNone/>
+                </a:pPr>
+                <a:endParaRPr lang="en-GB" dirty="0"/>
+              </a:p>
+              <a:p>
+                <a:pPr marL="0" indent="0">
+                  <a:buNone/>
+                </a:pPr>
+                <a:r>
+                  <a:rPr lang="en-GB" dirty="0"/>
+                  <a:t>To show the role of </a:t>
+                </a:r>
+                <a14:m>
+                  <m:oMath xmlns:m="http://schemas.openxmlformats.org/officeDocument/2006/math">
+                    <m:r>
+                      <a:rPr lang="en-GB" i="1">
+                        <a:latin typeface="Cambria Math" panose="02040503050406030204" pitchFamily="18" charset="0"/>
+                      </a:rPr>
+                      <m:t>𝑝</m:t>
+                    </m:r>
+                    <m:d>
+                      <m:dPr>
+                        <m:ctrlPr>
+                          <a:rPr lang="en-GB" i="1">
+                            <a:latin typeface="Cambria Math" panose="02040503050406030204" pitchFamily="18" charset="0"/>
+                          </a:rPr>
+                        </m:ctrlPr>
+                      </m:dPr>
+                      <m:e>
+                        <m:sSub>
+                          <m:sSubPr>
+                            <m:ctrlPr>
+                              <a:rPr lang="en-GB" i="1">
+                                <a:latin typeface="Cambria Math" panose="02040503050406030204" pitchFamily="18" charset="0"/>
+                              </a:rPr>
+                            </m:ctrlPr>
+                          </m:sSubPr>
+                          <m:e>
+                            <m:r>
+                              <a:rPr lang="en-GB" i="1">
+                                <a:latin typeface="Cambria Math" panose="02040503050406030204" pitchFamily="18" charset="0"/>
+                              </a:rPr>
+                              <m:t>𝐴</m:t>
+                            </m:r>
+                          </m:e>
+                          <m:sub>
+                            <m:r>
+                              <a:rPr lang="en-GB" i="1">
+                                <a:latin typeface="Cambria Math" panose="02040503050406030204" pitchFamily="18" charset="0"/>
+                              </a:rPr>
+                              <m:t>𝑡</m:t>
+                            </m:r>
+                          </m:sub>
+                        </m:sSub>
+                      </m:e>
+                    </m:d>
+                  </m:oMath>
+                </a14:m>
+                <a:r>
+                  <a:rPr lang="en-GB" dirty="0"/>
+                  <a:t> in a non-stochastic model, consider </a:t>
+                </a:r>
+                <a14:m>
+                  <m:oMath xmlns:m="http://schemas.openxmlformats.org/officeDocument/2006/math">
+                    <m:r>
+                      <a:rPr lang="en-GB" i="1">
+                        <a:latin typeface="Cambria Math" panose="02040503050406030204" pitchFamily="18" charset="0"/>
+                      </a:rPr>
+                      <m:t>𝑝</m:t>
+                    </m:r>
+                    <m:d>
+                      <m:dPr>
+                        <m:ctrlPr>
+                          <a:rPr lang="en-GB" i="1">
+                            <a:latin typeface="Cambria Math" panose="02040503050406030204" pitchFamily="18" charset="0"/>
+                          </a:rPr>
+                        </m:ctrlPr>
+                      </m:dPr>
+                      <m:e>
+                        <m:sSub>
+                          <m:sSubPr>
+                            <m:ctrlPr>
+                              <a:rPr lang="en-GB" i="1">
+                                <a:latin typeface="Cambria Math" panose="02040503050406030204" pitchFamily="18" charset="0"/>
+                              </a:rPr>
+                            </m:ctrlPr>
+                          </m:sSubPr>
+                          <m:e>
+                            <m:r>
+                              <a:rPr lang="en-GB" i="1">
+                                <a:latin typeface="Cambria Math" panose="02040503050406030204" pitchFamily="18" charset="0"/>
+                              </a:rPr>
+                              <m:t>𝐴</m:t>
+                            </m:r>
+                          </m:e>
+                          <m:sub>
+                            <m:r>
+                              <a:rPr lang="en-GB" i="1">
+                                <a:latin typeface="Cambria Math" panose="02040503050406030204" pitchFamily="18" charset="0"/>
+                              </a:rPr>
+                              <m:t>𝑡</m:t>
+                            </m:r>
+                          </m:sub>
+                        </m:sSub>
+                      </m:e>
+                    </m:d>
+                    <m:r>
+                      <a:rPr lang="en-GB" b="0" i="1" smtClean="0">
+                        <a:latin typeface="Cambria Math" panose="02040503050406030204" pitchFamily="18" charset="0"/>
+                      </a:rPr>
+                      <m:t>=</m:t>
+                    </m:r>
+                    <m:r>
+                      <a:rPr lang="en-GB" b="0" i="1" smtClean="0">
+                        <a:latin typeface="Cambria Math" panose="02040503050406030204" pitchFamily="18" charset="0"/>
+                      </a:rPr>
+                      <m:t>𝑚</m:t>
+                    </m:r>
+                    <m:sSup>
+                      <m:sSupPr>
+                        <m:ctrlPr>
+                          <a:rPr lang="en-GB" b="0" i="1" smtClean="0">
+                            <a:latin typeface="Cambria Math" panose="02040503050406030204" pitchFamily="18" charset="0"/>
+                          </a:rPr>
+                        </m:ctrlPr>
+                      </m:sSupPr>
+                      <m:e>
+                        <m:r>
+                          <a:rPr lang="en-GB" b="0" i="1" smtClean="0">
+                            <a:latin typeface="Cambria Math" panose="02040503050406030204" pitchFamily="18" charset="0"/>
+                          </a:rPr>
+                          <m:t>𝐴</m:t>
+                        </m:r>
+                      </m:e>
+                      <m:sup>
+                        <m:r>
+                          <a:rPr lang="en-GB" b="0" i="1" smtClean="0">
+                            <a:latin typeface="Cambria Math" panose="02040503050406030204" pitchFamily="18" charset="0"/>
+                          </a:rPr>
+                          <m:t>𝑎</m:t>
+                        </m:r>
+                      </m:sup>
+                    </m:sSup>
+                  </m:oMath>
+                </a14:m>
+                <a:r>
+                  <a:rPr lang="en-GB" dirty="0"/>
+                  <a:t> and </a:t>
+                </a:r>
+                <a14:m>
+                  <m:oMath xmlns:m="http://schemas.openxmlformats.org/officeDocument/2006/math">
+                    <m:r>
+                      <a:rPr lang="en-GB" b="0" i="1" smtClean="0">
+                        <a:latin typeface="Cambria Math" panose="02040503050406030204" pitchFamily="18" charset="0"/>
+                      </a:rPr>
+                      <m:t>𝑢</m:t>
+                    </m:r>
+                    <m:r>
+                      <a:rPr lang="en-GB" b="0" i="1" smtClean="0">
+                        <a:latin typeface="Cambria Math" panose="02040503050406030204" pitchFamily="18" charset="0"/>
+                      </a:rPr>
+                      <m:t>=</m:t>
+                    </m:r>
+                    <m:r>
+                      <a:rPr lang="en-GB" b="0" i="1" smtClean="0">
+                        <a:latin typeface="Cambria Math" panose="02040503050406030204" pitchFamily="18" charset="0"/>
+                      </a:rPr>
+                      <m:t>𝛼</m:t>
+                    </m:r>
+                    <m:func>
+                      <m:funcPr>
+                        <m:ctrlPr>
+                          <a:rPr lang="en-GB" b="0" i="1" smtClean="0">
+                            <a:latin typeface="Cambria Math" panose="02040503050406030204" pitchFamily="18" charset="0"/>
+                          </a:rPr>
+                        </m:ctrlPr>
+                      </m:funcPr>
+                      <m:fName>
+                        <m:r>
+                          <m:rPr>
+                            <m:sty m:val="p"/>
+                          </m:rPr>
+                          <a:rPr lang="en-GB" b="0" i="0" smtClean="0">
+                            <a:latin typeface="Cambria Math" panose="02040503050406030204" pitchFamily="18" charset="0"/>
+                          </a:rPr>
+                          <m:t>log</m:t>
+                        </m:r>
+                      </m:fName>
+                      <m:e>
+                        <m:d>
+                          <m:dPr>
+                            <m:ctrlPr>
+                              <a:rPr lang="en-GB" b="0" i="1" smtClean="0">
+                                <a:latin typeface="Cambria Math" panose="02040503050406030204" pitchFamily="18" charset="0"/>
+                              </a:rPr>
+                            </m:ctrlPr>
+                          </m:dPr>
+                          <m:e>
+                            <m:sSub>
+                              <m:sSubPr>
+                                <m:ctrlPr>
+                                  <a:rPr lang="en-GB" b="0" i="1" smtClean="0">
+                                    <a:latin typeface="Cambria Math" panose="02040503050406030204" pitchFamily="18" charset="0"/>
+                                  </a:rPr>
+                                </m:ctrlPr>
+                              </m:sSubPr>
+                              <m:e>
+                                <m:r>
+                                  <a:rPr lang="en-GB" b="0" i="1" smtClean="0">
+                                    <a:latin typeface="Cambria Math" panose="02040503050406030204" pitchFamily="18" charset="0"/>
+                                  </a:rPr>
+                                  <m:t>𝐴</m:t>
+                                </m:r>
+                              </m:e>
+                              <m:sub>
+                                <m:r>
+                                  <a:rPr lang="en-GB" b="0" i="1" smtClean="0">
+                                    <a:latin typeface="Cambria Math" panose="02040503050406030204" pitchFamily="18" charset="0"/>
+                                  </a:rPr>
+                                  <m:t>𝑡</m:t>
+                                </m:r>
+                              </m:sub>
+                            </m:sSub>
+                          </m:e>
+                        </m:d>
+                      </m:e>
+                    </m:func>
+                    <m:r>
+                      <a:rPr lang="en-GB" b="0" i="1" smtClean="0">
+                        <a:latin typeface="Cambria Math" panose="02040503050406030204" pitchFamily="18" charset="0"/>
+                      </a:rPr>
+                      <m:t>+</m:t>
+                    </m:r>
+                    <m:r>
+                      <a:rPr lang="en-GB" b="0" i="1" smtClean="0">
+                        <a:latin typeface="Cambria Math" panose="02040503050406030204" pitchFamily="18" charset="0"/>
+                      </a:rPr>
+                      <m:t>𝛽</m:t>
+                    </m:r>
+                    <m:func>
+                      <m:funcPr>
+                        <m:ctrlPr>
+                          <a:rPr lang="en-GB" b="0" i="1" smtClean="0">
+                            <a:latin typeface="Cambria Math" panose="02040503050406030204" pitchFamily="18" charset="0"/>
+                          </a:rPr>
+                        </m:ctrlPr>
+                      </m:funcPr>
+                      <m:fName>
+                        <m:r>
+                          <m:rPr>
+                            <m:sty m:val="p"/>
+                          </m:rPr>
+                          <a:rPr lang="en-GB" b="0" i="0" smtClean="0">
+                            <a:latin typeface="Cambria Math" panose="02040503050406030204" pitchFamily="18" charset="0"/>
+                          </a:rPr>
+                          <m:t>log</m:t>
+                        </m:r>
+                      </m:fName>
+                      <m:e>
+                        <m:d>
+                          <m:dPr>
+                            <m:ctrlPr>
+                              <a:rPr lang="en-GB" b="0" i="1" smtClean="0">
+                                <a:latin typeface="Cambria Math" panose="02040503050406030204" pitchFamily="18" charset="0"/>
+                              </a:rPr>
+                            </m:ctrlPr>
+                          </m:dPr>
+                          <m:e>
+                            <m:sSub>
+                              <m:sSubPr>
+                                <m:ctrlPr>
+                                  <a:rPr lang="en-GB" b="0" i="1" smtClean="0">
+                                    <a:latin typeface="Cambria Math" panose="02040503050406030204" pitchFamily="18" charset="0"/>
+                                  </a:rPr>
+                                </m:ctrlPr>
+                              </m:sSubPr>
+                              <m:e>
+                                <m:r>
+                                  <a:rPr lang="en-GB" b="0" i="1" smtClean="0">
+                                    <a:latin typeface="Cambria Math" panose="02040503050406030204" pitchFamily="18" charset="0"/>
+                                  </a:rPr>
+                                  <m:t>𝑐</m:t>
+                                </m:r>
+                              </m:e>
+                              <m:sub>
+                                <m:r>
+                                  <a:rPr lang="en-GB" b="0" i="1" smtClean="0">
+                                    <a:latin typeface="Cambria Math" panose="02040503050406030204" pitchFamily="18" charset="0"/>
+                                  </a:rPr>
+                                  <m:t>𝑡</m:t>
+                                </m:r>
+                              </m:sub>
+                            </m:sSub>
+                          </m:e>
+                        </m:d>
+                      </m:e>
+                    </m:func>
+                    <m:r>
+                      <a:rPr lang="en-GB" b="0" i="1" smtClean="0">
+                        <a:latin typeface="Cambria Math" panose="02040503050406030204" pitchFamily="18" charset="0"/>
+                      </a:rPr>
+                      <m:t>+</m:t>
+                    </m:r>
+                    <m:d>
+                      <m:dPr>
+                        <m:ctrlPr>
+                          <a:rPr lang="en-GB" b="0" i="1" smtClean="0">
+                            <a:latin typeface="Cambria Math" panose="02040503050406030204" pitchFamily="18" charset="0"/>
+                          </a:rPr>
+                        </m:ctrlPr>
+                      </m:dPr>
+                      <m:e>
+                        <m:r>
+                          <a:rPr lang="en-GB" b="0" i="1" smtClean="0">
+                            <a:latin typeface="Cambria Math" panose="02040503050406030204" pitchFamily="18" charset="0"/>
+                          </a:rPr>
+                          <m:t>1−</m:t>
+                        </m:r>
+                        <m:r>
+                          <a:rPr lang="en-GB" b="0" i="1" smtClean="0">
+                            <a:latin typeface="Cambria Math" panose="02040503050406030204" pitchFamily="18" charset="0"/>
+                          </a:rPr>
+                          <m:t>𝛼</m:t>
+                        </m:r>
+                        <m:r>
+                          <a:rPr lang="en-GB" b="0" i="1" smtClean="0">
+                            <a:latin typeface="Cambria Math" panose="02040503050406030204" pitchFamily="18" charset="0"/>
+                          </a:rPr>
+                          <m:t>−</m:t>
+                        </m:r>
+                        <m:r>
+                          <a:rPr lang="en-GB" b="0" i="1" smtClean="0">
+                            <a:latin typeface="Cambria Math" panose="02040503050406030204" pitchFamily="18" charset="0"/>
+                          </a:rPr>
+                          <m:t>𝛽</m:t>
+                        </m:r>
+                      </m:e>
+                    </m:d>
+                    <m:func>
+                      <m:funcPr>
+                        <m:ctrlPr>
+                          <a:rPr lang="en-GB" b="0" i="1" smtClean="0">
+                            <a:latin typeface="Cambria Math" panose="02040503050406030204" pitchFamily="18" charset="0"/>
+                          </a:rPr>
+                        </m:ctrlPr>
+                      </m:funcPr>
+                      <m:fName>
+                        <m:r>
+                          <m:rPr>
+                            <m:sty m:val="p"/>
+                          </m:rPr>
+                          <a:rPr lang="en-GB" b="0" i="0" smtClean="0">
+                            <a:latin typeface="Cambria Math" panose="02040503050406030204" pitchFamily="18" charset="0"/>
+                          </a:rPr>
+                          <m:t>log</m:t>
+                        </m:r>
+                      </m:fName>
+                      <m:e>
+                        <m:d>
+                          <m:dPr>
+                            <m:ctrlPr>
+                              <a:rPr lang="en-GB" b="0" i="1" smtClean="0">
+                                <a:latin typeface="Cambria Math" panose="02040503050406030204" pitchFamily="18" charset="0"/>
+                              </a:rPr>
+                            </m:ctrlPr>
+                          </m:dPr>
+                          <m:e>
+                            <m:sSub>
+                              <m:sSubPr>
+                                <m:ctrlPr>
+                                  <a:rPr lang="en-GB" b="0" i="1" smtClean="0">
+                                    <a:latin typeface="Cambria Math" panose="02040503050406030204" pitchFamily="18" charset="0"/>
+                                  </a:rPr>
+                                </m:ctrlPr>
+                              </m:sSubPr>
+                              <m:e>
+                                <m:r>
+                                  <a:rPr lang="en-GB" b="0" i="1" smtClean="0">
+                                    <a:latin typeface="Cambria Math" panose="02040503050406030204" pitchFamily="18" charset="0"/>
+                                  </a:rPr>
+                                  <m:t>𝜂</m:t>
+                                </m:r>
+                              </m:e>
+                              <m:sub>
+                                <m:r>
+                                  <a:rPr lang="en-GB" b="0" i="1" smtClean="0">
+                                    <a:latin typeface="Cambria Math" panose="02040503050406030204" pitchFamily="18" charset="0"/>
+                                  </a:rPr>
+                                  <m:t>𝑡</m:t>
+                                </m:r>
+                              </m:sub>
+                            </m:sSub>
+                          </m:e>
+                        </m:d>
+                      </m:e>
+                    </m:func>
+                  </m:oMath>
+                </a14:m>
+                <a:r>
+                  <a:rPr lang="en-GB" dirty="0"/>
+                  <a:t> where a consumer can adjust </a:t>
+                </a:r>
+                <a14:m>
+                  <m:oMath xmlns:m="http://schemas.openxmlformats.org/officeDocument/2006/math">
+                    <m:r>
+                      <a:rPr lang="en-GB" i="1">
+                        <a:latin typeface="Cambria Math" panose="02040503050406030204" pitchFamily="18" charset="0"/>
+                      </a:rPr>
+                      <m:t>𝜈</m:t>
+                    </m:r>
+                  </m:oMath>
+                </a14:m>
+                <a:r>
+                  <a:rPr lang="en-GB" dirty="0"/>
+                  <a:t> while cost per need-unit is </a:t>
+                </a:r>
+                <a14:m>
+                  <m:oMath xmlns:m="http://schemas.openxmlformats.org/officeDocument/2006/math">
+                    <m:sSub>
+                      <m:sSubPr>
+                        <m:ctrlPr>
+                          <a:rPr lang="en-GB" b="0" i="1" smtClean="0">
+                            <a:latin typeface="Cambria Math" panose="02040503050406030204" pitchFamily="18" charset="0"/>
+                          </a:rPr>
+                        </m:ctrlPr>
+                      </m:sSubPr>
+                      <m:e>
+                        <m:r>
+                          <m:rPr>
+                            <m:sty m:val="p"/>
+                          </m:rPr>
+                          <a:rPr lang="en-GB" b="0" i="0" smtClean="0">
+                            <a:latin typeface="Cambria Math" panose="02040503050406030204" pitchFamily="18" charset="0"/>
+                          </a:rPr>
+                          <m:t>Ψ</m:t>
+                        </m:r>
+                      </m:e>
+                      <m:sub>
+                        <m:r>
+                          <a:rPr lang="en-GB" b="0" i="1" smtClean="0">
+                            <a:latin typeface="Cambria Math" panose="02040503050406030204" pitchFamily="18" charset="0"/>
+                          </a:rPr>
+                          <m:t>𝑡</m:t>
+                        </m:r>
+                      </m:sub>
+                    </m:sSub>
+                  </m:oMath>
+                </a14:m>
+                <a:r>
+                  <a:rPr lang="en-GB" dirty="0"/>
+                  <a:t>.</a:t>
+                </a:r>
+              </a:p>
+              <a:p>
+                <a:endParaRPr lang="en-GB" dirty="0"/>
+              </a:p>
+            </p:txBody>
+          </p:sp>
+        </mc:Choice>
+        <mc:Fallback>
+          <p:sp>
+            <p:nvSpPr>
+              <p:cNvPr id="3" name="Content Placeholder 2">
+                <a:extLst>
+                  <a:ext uri="{FF2B5EF4-FFF2-40B4-BE49-F238E27FC236}">
+                    <a16:creationId xmlns:a16="http://schemas.microsoft.com/office/drawing/2014/main" id="{0C17D304-52FB-40B2-8A70-166828E93AA6}"/>
+                  </a:ext>
+                </a:extLst>
+              </p:cNvPr>
+              <p:cNvSpPr>
+                <a:spLocks noGrp="1" noRot="1" noChangeAspect="1" noMove="1" noResize="1" noEditPoints="1" noAdjustHandles="1" noChangeArrowheads="1" noChangeShapeType="1" noTextEdit="1"/>
+              </p:cNvSpPr>
+              <p:nvPr>
+                <p:ph idx="1"/>
+              </p:nvPr>
+            </p:nvSpPr>
+            <p:spPr>
+              <a:blipFill>
+                <a:blip r:embed="rId2"/>
+                <a:stretch>
+                  <a:fillRect l="-696"/>
+                </a:stretch>
+              </a:blipFill>
+            </p:spPr>
+            <p:txBody>
+              <a:bodyPr/>
+              <a:lstStyle/>
+              <a:p>
+                <a:r>
+                  <a:rPr lang="en-GB">
+                    <a:noFill/>
+                  </a:rPr>
+                  <a:t> </a:t>
+                </a:r>
+              </a:p>
+            </p:txBody>
+          </p:sp>
+        </mc:Fallback>
+      </mc:AlternateContent>
       <p:sp>
         <p:nvSpPr>
           <p:cNvPr id="4" name="Slide Number Placeholder 3">

</xml_diff>

<commit_message>
Adding details of non-stochastic model.
</commit_message>
<xml_diff>
--- a/consumption/presentationFeb2020.pptx
+++ b/consumption/presentationFeb2020.pptx
@@ -6,10 +6,10 @@
     <p:sldMasterId id="2147483669" r:id="rId2"/>
   </p:sldMasterIdLst>
   <p:notesMasterIdLst>
-    <p:notesMasterId r:id="rId17"/>
+    <p:notesMasterId r:id="rId19"/>
   </p:notesMasterIdLst>
   <p:handoutMasterIdLst>
-    <p:handoutMasterId r:id="rId18"/>
+    <p:handoutMasterId r:id="rId20"/>
   </p:handoutMasterIdLst>
   <p:sldIdLst>
     <p:sldId id="301" r:id="rId3"/>
@@ -17,50 +17,52 @@
     <p:sldId id="315" r:id="rId5"/>
     <p:sldId id="316" r:id="rId6"/>
     <p:sldId id="317" r:id="rId7"/>
-    <p:sldId id="326" r:id="rId8"/>
-    <p:sldId id="319" r:id="rId9"/>
-    <p:sldId id="327" r:id="rId10"/>
-    <p:sldId id="322" r:id="rId11"/>
-    <p:sldId id="324" r:id="rId12"/>
-    <p:sldId id="328" r:id="rId13"/>
-    <p:sldId id="329" r:id="rId14"/>
-    <p:sldId id="325" r:id="rId15"/>
-    <p:sldId id="320" r:id="rId16"/>
+    <p:sldId id="330" r:id="rId8"/>
+    <p:sldId id="326" r:id="rId9"/>
+    <p:sldId id="319" r:id="rId10"/>
+    <p:sldId id="327" r:id="rId11"/>
+    <p:sldId id="322" r:id="rId12"/>
+    <p:sldId id="324" r:id="rId13"/>
+    <p:sldId id="331" r:id="rId14"/>
+    <p:sldId id="328" r:id="rId15"/>
+    <p:sldId id="329" r:id="rId16"/>
+    <p:sldId id="325" r:id="rId17"/>
+    <p:sldId id="320" r:id="rId18"/>
   </p:sldIdLst>
   <p:sldSz cx="9144000" cy="5143500" type="screen16x9"/>
   <p:notesSz cx="6718300" cy="9867900"/>
   <p:embeddedFontLst>
     <p:embeddedFont>
       <p:font typeface="Calibri" panose="020F0502020204030204" pitchFamily="34" charset="0"/>
-      <p:regular r:id="rId19"/>
-      <p:bold r:id="rId20"/>
-      <p:italic r:id="rId21"/>
-      <p:boldItalic r:id="rId22"/>
+      <p:regular r:id="rId21"/>
+      <p:bold r:id="rId22"/>
+      <p:italic r:id="rId23"/>
+      <p:boldItalic r:id="rId24"/>
     </p:embeddedFont>
     <p:embeddedFont>
       <p:font typeface="Calibri Light" panose="020F0302020204030204" pitchFamily="34" charset="0"/>
-      <p:regular r:id="rId23"/>
-      <p:italic r:id="rId24"/>
+      <p:regular r:id="rId25"/>
+      <p:italic r:id="rId26"/>
     </p:embeddedFont>
     <p:embeddedFont>
       <p:font typeface="Cambria Math" panose="02040503050406030204" pitchFamily="18" charset="0"/>
-      <p:regular r:id="rId25"/>
+      <p:regular r:id="rId27"/>
     </p:embeddedFont>
     <p:embeddedFont>
       <p:font typeface="Effra" panose="020B0604020202020204" charset="0"/>
-      <p:regular r:id="rId26"/>
-      <p:bold r:id="rId27"/>
-      <p:italic r:id="rId28"/>
-      <p:boldItalic r:id="rId29"/>
+      <p:regular r:id="rId28"/>
+      <p:bold r:id="rId29"/>
+      <p:italic r:id="rId30"/>
+      <p:boldItalic r:id="rId31"/>
     </p:embeddedFont>
     <p:embeddedFont>
       <p:font typeface="Effra Bold" panose="020B0604020202020204" charset="0"/>
-      <p:bold r:id="rId30"/>
+      <p:bold r:id="rId32"/>
     </p:embeddedFont>
     <p:embeddedFont>
       <p:font typeface="Effra Light" panose="020B0604020202020204" charset="0"/>
-      <p:regular r:id="rId31"/>
-      <p:italic r:id="rId32"/>
+      <p:regular r:id="rId33"/>
+      <p:italic r:id="rId34"/>
     </p:embeddedFont>
   </p:embeddedFontLst>
   <p:defaultTextStyle>
@@ -7487,7 +7489,7 @@
               <a:pPr>
                 <a:defRPr/>
               </a:pPr>
-              <a:t>2/10/2020</a:t>
+              <a:t>2/11/2020</a:t>
             </a:fld>
             <a:endParaRPr lang="en-US" altLang="en-US"/>
           </a:p>
@@ -7928,7 +7930,7 @@
               <a:pPr>
                 <a:defRPr/>
               </a:pPr>
-              <a:t>2/10/2020</a:t>
+              <a:t>2/11/2020</a:t>
             </a:fld>
             <a:endParaRPr lang="en-US" altLang="en-US"/>
           </a:p>
@@ -8159,7 +8161,7 @@
               <a:pPr>
                 <a:defRPr/>
               </a:pPr>
-              <a:t>2/10/2020</a:t>
+              <a:t>2/11/2020</a:t>
             </a:fld>
             <a:endParaRPr lang="en-US" altLang="en-US"/>
           </a:p>
@@ -8358,7 +8360,7 @@
               <a:pPr>
                 <a:defRPr/>
               </a:pPr>
-              <a:t>2/10/2020</a:t>
+              <a:t>2/11/2020</a:t>
             </a:fld>
             <a:endParaRPr lang="en-US"/>
           </a:p>
@@ -8633,7 +8635,7 @@
               <a:pPr>
                 <a:defRPr/>
               </a:pPr>
-              <a:t>2/10/2020</a:t>
+              <a:t>2/11/2020</a:t>
             </a:fld>
             <a:endParaRPr lang="en-US"/>
           </a:p>
@@ -8893,7 +8895,7 @@
               <a:pPr>
                 <a:defRPr/>
               </a:pPr>
-              <a:t>2/10/2020</a:t>
+              <a:t>2/11/2020</a:t>
             </a:fld>
             <a:endParaRPr lang="en-US" altLang="en-US"/>
           </a:p>
@@ -9288,7 +9290,7 @@
               <a:pPr>
                 <a:defRPr/>
               </a:pPr>
-              <a:t>2/10/2020</a:t>
+              <a:t>2/11/2020</a:t>
             </a:fld>
             <a:endParaRPr lang="en-US"/>
           </a:p>
@@ -9436,7 +9438,7 @@
               <a:pPr>
                 <a:defRPr/>
               </a:pPr>
-              <a:t>2/10/2020</a:t>
+              <a:t>2/11/2020</a:t>
             </a:fld>
             <a:endParaRPr lang="en-US"/>
           </a:p>
@@ -9562,7 +9564,7 @@
               <a:pPr>
                 <a:defRPr/>
               </a:pPr>
-              <a:t>2/10/2020</a:t>
+              <a:t>2/11/2020</a:t>
             </a:fld>
             <a:endParaRPr lang="en-US"/>
           </a:p>
@@ -9868,7 +9870,7 @@
               <a:pPr>
                 <a:defRPr/>
               </a:pPr>
-              <a:t>2/10/2020</a:t>
+              <a:t>2/11/2020</a:t>
             </a:fld>
             <a:endParaRPr lang="en-US"/>
           </a:p>
@@ -10152,7 +10154,7 @@
               <a:pPr>
                 <a:defRPr/>
               </a:pPr>
-              <a:t>2/10/2020</a:t>
+              <a:t>2/11/2020</a:t>
             </a:fld>
             <a:endParaRPr lang="en-US"/>
           </a:p>
@@ -11590,7 +11592,7 @@
               <a:pPr>
                 <a:defRPr/>
               </a:pPr>
-              <a:t>2/10/2020</a:t>
+              <a:t>2/11/2020</a:t>
             </a:fld>
             <a:endParaRPr lang="en-US"/>
           </a:p>
@@ -11799,7 +11801,7 @@
               <a:pPr>
                 <a:defRPr/>
               </a:pPr>
-              <a:t>2/10/2020</a:t>
+              <a:t>2/11/2020</a:t>
             </a:fld>
             <a:endParaRPr lang="en-US"/>
           </a:p>
@@ -16200,7 +16202,7 @@
               <a:pPr>
                 <a:defRPr/>
               </a:pPr>
-              <a:t>2/10/2020</a:t>
+              <a:t>2/11/2020</a:t>
             </a:fld>
             <a:endParaRPr lang="en-US"/>
           </a:p>
@@ -17035,6 +17037,165 @@
           <p:cNvPr id="2" name="Title 1">
             <a:extLst>
               <a:ext uri="{FF2B5EF4-FFF2-40B4-BE49-F238E27FC236}">
+                <a16:creationId xmlns:a16="http://schemas.microsoft.com/office/drawing/2014/main" id="{9A9C3CDF-42EB-4159-85AF-04E406FD511F}"/>
+              </a:ext>
+            </a:extLst>
+          </p:cNvPr>
+          <p:cNvSpPr>
+            <a:spLocks noGrp="1"/>
+          </p:cNvSpPr>
+          <p:nvPr>
+            <p:ph type="title"/>
+          </p:nvPr>
+        </p:nvSpPr>
+        <p:spPr/>
+        <p:txBody>
+          <a:bodyPr/>
+          <a:lstStyle/>
+          <a:p>
+            <a:r>
+              <a:rPr lang="en-GB" dirty="0"/>
+              <a:t>Where does status fit in?</a:t>
+            </a:r>
+          </a:p>
+        </p:txBody>
+      </p:sp>
+      <p:sp>
+        <p:nvSpPr>
+          <p:cNvPr id="3" name="Content Placeholder 2">
+            <a:extLst>
+              <a:ext uri="{FF2B5EF4-FFF2-40B4-BE49-F238E27FC236}">
+                <a16:creationId xmlns:a16="http://schemas.microsoft.com/office/drawing/2014/main" id="{12ACA305-4662-4E70-8B58-1DE02FD84E67}"/>
+              </a:ext>
+            </a:extLst>
+          </p:cNvPr>
+          <p:cNvSpPr>
+            <a:spLocks noGrp="1"/>
+          </p:cNvSpPr>
+          <p:nvPr>
+            <p:ph idx="1"/>
+          </p:nvPr>
+        </p:nvSpPr>
+        <p:spPr/>
+        <p:txBody>
+          <a:bodyPr>
+            <a:normAutofit fontScale="92500" lnSpcReduction="20000"/>
+          </a:bodyPr>
+          <a:lstStyle/>
+          <a:p>
+            <a:r>
+              <a:rPr lang="en-GB" dirty="0"/>
+              <a:t>Consider a PhD student, a professional boxer and a banker – all have different considerations of wealth and status</a:t>
+            </a:r>
+          </a:p>
+          <a:p>
+            <a:r>
+              <a:rPr lang="en-GB" dirty="0"/>
+              <a:t>Higher status for all of them would mean different things but their financial decisions would be determined by the same notion of wealth – let’s call it material status</a:t>
+            </a:r>
+          </a:p>
+          <a:p>
+            <a:r>
+              <a:rPr lang="en-GB" dirty="0"/>
+              <a:t>The real probability of the ownership of the same material status varies significantly across the three professionals</a:t>
+            </a:r>
+          </a:p>
+          <a:p>
+            <a:r>
+              <a:rPr lang="en-GB" dirty="0"/>
+              <a:t>Status is a subjective perception of the real probability of wealth transition </a:t>
+            </a:r>
+          </a:p>
+          <a:p>
+            <a:r>
+              <a:rPr lang="en-GB" dirty="0"/>
+              <a:t>A utility function that formalises the preferences of the three professionals, would allow them to assign different weights to the probability of wealth gain in the real world </a:t>
+            </a:r>
+          </a:p>
+          <a:p>
+            <a:r>
+              <a:rPr lang="en-GB" dirty="0"/>
+              <a:t>Usually one needs to make the subjective probabilities coherent for analysis</a:t>
+            </a:r>
+          </a:p>
+          <a:p>
+            <a:endParaRPr lang="en-GB" dirty="0"/>
+          </a:p>
+        </p:txBody>
+      </p:sp>
+      <p:sp>
+        <p:nvSpPr>
+          <p:cNvPr id="4" name="Slide Number Placeholder 3">
+            <a:extLst>
+              <a:ext uri="{FF2B5EF4-FFF2-40B4-BE49-F238E27FC236}">
+                <a16:creationId xmlns:a16="http://schemas.microsoft.com/office/drawing/2014/main" id="{7A99688F-80A2-4F60-A3D1-E064E4DB8076}"/>
+              </a:ext>
+            </a:extLst>
+          </p:cNvPr>
+          <p:cNvSpPr>
+            <a:spLocks noGrp="1"/>
+          </p:cNvSpPr>
+          <p:nvPr>
+            <p:ph type="sldNum" sz="quarter" idx="12"/>
+          </p:nvPr>
+        </p:nvSpPr>
+        <p:spPr/>
+        <p:txBody>
+          <a:bodyPr/>
+          <a:lstStyle/>
+          <a:p>
+            <a:pPr>
+              <a:defRPr/>
+            </a:pPr>
+            <a:fld id="{8E35B453-7314-4BBD-9303-11C6BECC4B0D}" type="slidenum">
+              <a:rPr lang="en-GB" altLang="en-US" smtClean="0"/>
+              <a:pPr>
+                <a:defRPr/>
+              </a:pPr>
+              <a:t>10</a:t>
+            </a:fld>
+            <a:endParaRPr lang="en-GB" altLang="en-US" dirty="0"/>
+          </a:p>
+        </p:txBody>
+      </p:sp>
+    </p:spTree>
+    <p:extLst>
+      <p:ext uri="{BB962C8B-B14F-4D97-AF65-F5344CB8AC3E}">
+        <p14:creationId xmlns:p14="http://schemas.microsoft.com/office/powerpoint/2010/main" val="2674083863"/>
+      </p:ext>
+    </p:extLst>
+  </p:cSld>
+  <p:clrMapOvr>
+    <a:masterClrMapping/>
+  </p:clrMapOvr>
+  <p:transition>
+    <p:fade/>
+  </p:transition>
+</p:sld>
+</file>
+
+<file path=ppt/slides/slide11.xml><?xml version="1.0" encoding="utf-8"?>
+<p:sld xmlns:a="http://schemas.openxmlformats.org/drawingml/2006/main" xmlns:r="http://schemas.openxmlformats.org/officeDocument/2006/relationships" xmlns:p="http://schemas.openxmlformats.org/presentationml/2006/main">
+  <p:cSld>
+    <p:spTree>
+      <p:nvGrpSpPr>
+        <p:cNvPr id="1" name=""/>
+        <p:cNvGrpSpPr/>
+        <p:nvPr/>
+      </p:nvGrpSpPr>
+      <p:grpSpPr>
+        <a:xfrm>
+          <a:off x="0" y="0"/>
+          <a:ext cx="0" cy="0"/>
+          <a:chOff x="0" y="0"/>
+          <a:chExt cx="0" cy="0"/>
+        </a:xfrm>
+      </p:grpSpPr>
+      <p:sp>
+        <p:nvSpPr>
+          <p:cNvPr id="2" name="Title 1">
+            <a:extLst>
+              <a:ext uri="{FF2B5EF4-FFF2-40B4-BE49-F238E27FC236}">
                 <a16:creationId xmlns:a16="http://schemas.microsoft.com/office/drawing/2014/main" id="{34E1DDED-AC9A-4208-A7A3-ED93E965CB62}"/>
               </a:ext>
             </a:extLst>
@@ -17138,7 +17299,7 @@
               <a:p>
                 <a:r>
                   <a:rPr lang="en-GB" dirty="0"/>
-                  <a:t>Consider also that the consumer needs grow and contract in her lifetime described by a function </a:t>
+                  <a:t>For life-cycle assumption, consider function </a:t>
                 </a:r>
                 <a14:m>
                   <m:oMath xmlns:m="http://schemas.openxmlformats.org/officeDocument/2006/math">
@@ -17208,6 +17369,20 @@
                         <a:latin typeface="Cambria Math" panose="02040503050406030204" pitchFamily="18" charset="0"/>
                       </a:rPr>
                       <m:t>)</m:t>
+                    </m:r>
+                  </m:oMath>
+                </a14:m>
+                <a:r>
+                  <a:rPr lang="en-GB" dirty="0"/>
+                  <a:t> describing how needs of the consumer evolve in her lifetime </a:t>
+                </a:r>
+                <a14:m>
+                  <m:oMath xmlns:m="http://schemas.openxmlformats.org/officeDocument/2006/math">
+                    <m:r>
+                      <a:rPr lang="en-GB" i="1">
+                        <a:latin typeface="Cambria Math" panose="02040503050406030204" pitchFamily="18" charset="0"/>
+                      </a:rPr>
+                      <m:t>𝑇</m:t>
                     </m:r>
                   </m:oMath>
                 </a14:m>
@@ -17313,21 +17488,7 @@
               <a:p>
                 <a:r>
                   <a:rPr lang="en-GB" dirty="0"/>
-                  <a:t>In the short-run, </a:t>
-                </a:r>
-                <a14:m>
-                  <m:oMath xmlns:m="http://schemas.openxmlformats.org/officeDocument/2006/math">
-                    <m:r>
-                      <a:rPr lang="en-GB" b="0" i="1" smtClean="0">
-                        <a:latin typeface="Cambria Math" panose="02040503050406030204" pitchFamily="18" charset="0"/>
-                      </a:rPr>
-                      <m:t>𝜌</m:t>
-                    </m:r>
-                  </m:oMath>
-                </a14:m>
-                <a:r>
-                  <a:rPr lang="en-GB" dirty="0"/>
-                  <a:t> does not change - so the consumer only views the evolution of </a:t>
+                  <a:t>Consider also the minimum needs per head </a:t>
                 </a:r>
                 <a14:m>
                   <m:oMath xmlns:m="http://schemas.openxmlformats.org/officeDocument/2006/math">
@@ -17341,10 +17502,13 @@
                       </m:sSubPr>
                       <m:e>
                         <m:r>
-                          <a:rPr lang="en-GB" i="1">
+                          <m:rPr>
+                            <m:sty m:val="p"/>
+                          </m:rPr>
+                          <a:rPr lang="en-GB" b="0" i="0" smtClean="0">
                             <a:latin typeface="Cambria Math" panose="02040503050406030204" pitchFamily="18" charset="0"/>
                           </a:rPr>
-                          <m:t>𝐴</m:t>
+                          <m:t>Ψ</m:t>
                         </m:r>
                       </m:e>
                       <m:sub>
@@ -17358,15 +17522,12 @@
                     </m:sSub>
                   </m:oMath>
                 </a14:m>
-                <a:r>
-                  <a:rPr lang="en-GB" dirty="0"/>
-                  <a:t> in her lifetime</a:t>
-                </a:r>
+                <a:endParaRPr lang="en-GB" dirty="0"/>
               </a:p>
               <a:p>
                 <a:r>
                   <a:rPr lang="en-GB" dirty="0"/>
-                  <a:t>Consider two risks - first associated with the rise in income (call it </a:t>
+                  <a:t>Consider two risks - first the exogenous risk associated with the rise in income (call it </a:t>
                 </a:r>
                 <a14:m>
                   <m:oMath xmlns:m="http://schemas.openxmlformats.org/officeDocument/2006/math">
@@ -17403,8 +17564,42 @@
               <a:p>
                 <a:r>
                   <a:rPr lang="en-GB" dirty="0"/>
-                  <a:t>The two risks (rather than one) allow the consumer to deviate from the direction where income is smoothened (i.e. more risk results in more saving)</a:t>
+                  <a:t>Savings require a long time commitment depending on </a:t>
                 </a:r>
+                <a14:m>
+                  <m:oMath xmlns:m="http://schemas.openxmlformats.org/officeDocument/2006/math">
+                    <m:r>
+                      <a:rPr lang="en-GB" i="1">
+                        <a:latin typeface="Cambria Math" panose="02040503050406030204" pitchFamily="18" charset="0"/>
+                      </a:rPr>
+                      <m:t>𝜎</m:t>
+                    </m:r>
+                  </m:oMath>
+                </a14:m>
+                <a:r>
+                  <a:rPr lang="en-GB" dirty="0"/>
+                  <a:t> but consumption is influenced by other risks that determine </a:t>
+                </a:r>
+                <a14:m>
+                  <m:oMath xmlns:m="http://schemas.openxmlformats.org/officeDocument/2006/math">
+                    <m:r>
+                      <m:rPr>
+                        <m:sty m:val="p"/>
+                      </m:rPr>
+                      <a:rPr lang="en-GB">
+                        <a:latin typeface="Cambria Math" panose="02040503050406030204" pitchFamily="18" charset="0"/>
+                      </a:rPr>
+                      <m:t>Γ</m:t>
+                    </m:r>
+                  </m:oMath>
+                </a14:m>
+                <a:r>
+                  <a:rPr lang="en-GB" dirty="0"/>
+                  <a:t> (e.g. perceptions of wealth)</a:t>
+                </a:r>
+              </a:p>
+              <a:p>
+                <a:endParaRPr lang="en-GB" dirty="0"/>
               </a:p>
             </p:txBody>
           </p:sp>
@@ -17430,7 +17625,7 @@
               <a:blipFill>
                 <a:blip r:embed="rId2"/>
                 <a:stretch>
-                  <a:fillRect l="-541" t="-3178" r="-927"/>
+                  <a:fillRect l="-541" t="-3178" r="-1005"/>
                 </a:stretch>
               </a:blipFill>
             </p:spPr>
@@ -17478,7 +17673,7 @@
               <a:pPr>
                 <a:defRPr/>
               </a:pPr>
-              <a:t>10</a:t>
+              <a:t>11</a:t>
             </a:fld>
             <a:endParaRPr lang="en-GB" altLang="en-US" dirty="0"/>
           </a:p>
@@ -17500,7 +17695,263 @@
 </p:sld>
 </file>
 
-<file path=ppt/slides/slide11.xml><?xml version="1.0" encoding="utf-8"?>
+<file path=ppt/slides/slide12.xml><?xml version="1.0" encoding="utf-8"?>
+<p:sld xmlns:a="http://schemas.openxmlformats.org/drawingml/2006/main" xmlns:r="http://schemas.openxmlformats.org/officeDocument/2006/relationships" xmlns:p="http://schemas.openxmlformats.org/presentationml/2006/main">
+  <p:cSld>
+    <p:spTree>
+      <p:nvGrpSpPr>
+        <p:cNvPr id="1" name=""/>
+        <p:cNvGrpSpPr/>
+        <p:nvPr/>
+      </p:nvGrpSpPr>
+      <p:grpSpPr>
+        <a:xfrm>
+          <a:off x="0" y="0"/>
+          <a:ext cx="0" cy="0"/>
+          <a:chOff x="0" y="0"/>
+          <a:chExt cx="0" cy="0"/>
+        </a:xfrm>
+      </p:grpSpPr>
+      <p:sp>
+        <p:nvSpPr>
+          <p:cNvPr id="2" name="Title 1">
+            <a:extLst>
+              <a:ext uri="{FF2B5EF4-FFF2-40B4-BE49-F238E27FC236}">
+                <a16:creationId xmlns:a16="http://schemas.microsoft.com/office/drawing/2014/main" id="{9BE406E6-1B5C-4DE5-B6D1-6F9670F60C3B}"/>
+              </a:ext>
+            </a:extLst>
+          </p:cNvPr>
+          <p:cNvSpPr>
+            <a:spLocks noGrp="1"/>
+          </p:cNvSpPr>
+          <p:nvPr>
+            <p:ph type="title"/>
+          </p:nvPr>
+        </p:nvSpPr>
+        <p:spPr/>
+        <p:txBody>
+          <a:bodyPr/>
+          <a:lstStyle/>
+          <a:p>
+            <a:r>
+              <a:rPr lang="en-GB" dirty="0"/>
+              <a:t>Do we need Subjective Probability</a:t>
+            </a:r>
+          </a:p>
+        </p:txBody>
+      </p:sp>
+      <mc:AlternateContent xmlns:mc="http://schemas.openxmlformats.org/markup-compatibility/2006">
+        <mc:Choice xmlns:a14="http://schemas.microsoft.com/office/drawing/2010/main" Requires="a14">
+          <p:sp>
+            <p:nvSpPr>
+              <p:cNvPr id="3" name="Content Placeholder 2">
+                <a:extLst>
+                  <a:ext uri="{FF2B5EF4-FFF2-40B4-BE49-F238E27FC236}">
+                    <a16:creationId xmlns:a16="http://schemas.microsoft.com/office/drawing/2014/main" id="{0850E727-D68A-415F-9A9C-4798B149EEB7}"/>
+                  </a:ext>
+                </a:extLst>
+              </p:cNvPr>
+              <p:cNvSpPr>
+                <a:spLocks noGrp="1"/>
+              </p:cNvSpPr>
+              <p:nvPr>
+                <p:ph idx="1"/>
+              </p:nvPr>
+            </p:nvSpPr>
+            <p:spPr/>
+            <p:txBody>
+              <a:bodyPr/>
+              <a:lstStyle/>
+              <a:p>
+                <a:r>
+                  <a:rPr lang="en-GB" dirty="0"/>
+                  <a:t>The two risks (rather than one) allow the consumer to deviate from the direction where income is smoothened (i.e. where more risk results in more saving and less </a:t>
+                </a:r>
+                <a14:m>
+                  <m:oMath xmlns:m="http://schemas.openxmlformats.org/officeDocument/2006/math">
+                    <m:sSub>
+                      <m:sSubPr>
+                        <m:ctrlPr>
+                          <a:rPr lang="en-GB" i="1">
+                            <a:latin typeface="Cambria Math" panose="02040503050406030204" pitchFamily="18" charset="0"/>
+                          </a:rPr>
+                        </m:ctrlPr>
+                      </m:sSubPr>
+                      <m:e>
+                        <m:r>
+                          <a:rPr lang="en-GB" i="1">
+                            <a:latin typeface="Cambria Math" panose="02040503050406030204" pitchFamily="18" charset="0"/>
+                          </a:rPr>
+                          <m:t>𝑐</m:t>
+                        </m:r>
+                      </m:e>
+                      <m:sub>
+                        <m:r>
+                          <a:rPr lang="en-GB" i="1">
+                            <a:latin typeface="Cambria Math" panose="02040503050406030204" pitchFamily="18" charset="0"/>
+                          </a:rPr>
+                          <m:t>𝑡</m:t>
+                        </m:r>
+                      </m:sub>
+                    </m:sSub>
+                  </m:oMath>
+                </a14:m>
+                <a:r>
+                  <a:rPr lang="en-GB" dirty="0"/>
+                  <a:t> )</a:t>
+                </a:r>
+              </a:p>
+              <a:p>
+                <a:r>
+                  <a:rPr lang="en-GB" dirty="0"/>
+                  <a:t>In the short-run, </a:t>
+                </a:r>
+                <a14:m>
+                  <m:oMath xmlns:m="http://schemas.openxmlformats.org/officeDocument/2006/math">
+                    <m:r>
+                      <a:rPr lang="en-GB" i="1">
+                        <a:latin typeface="Cambria Math" panose="02040503050406030204" pitchFamily="18" charset="0"/>
+                      </a:rPr>
+                      <m:t>𝜌</m:t>
+                    </m:r>
+                  </m:oMath>
+                </a14:m>
+                <a:r>
+                  <a:rPr lang="en-GB" dirty="0"/>
+                  <a:t> does not change - so the consumer controls only views the evolution of </a:t>
+                </a:r>
+                <a14:m>
+                  <m:oMath xmlns:m="http://schemas.openxmlformats.org/officeDocument/2006/math">
+                    <m:sSub>
+                      <m:sSubPr>
+                        <m:ctrlPr>
+                          <a:rPr lang="en-GB" i="1">
+                            <a:latin typeface="Cambria Math" panose="02040503050406030204" pitchFamily="18" charset="0"/>
+                          </a:rPr>
+                        </m:ctrlPr>
+                      </m:sSubPr>
+                      <m:e>
+                        <m:r>
+                          <a:rPr lang="en-GB" i="1">
+                            <a:latin typeface="Cambria Math" panose="02040503050406030204" pitchFamily="18" charset="0"/>
+                          </a:rPr>
+                          <m:t>𝐴</m:t>
+                        </m:r>
+                      </m:e>
+                      <m:sub>
+                        <m:r>
+                          <a:rPr lang="en-GB" i="1">
+                            <a:latin typeface="Cambria Math" panose="02040503050406030204" pitchFamily="18" charset="0"/>
+                          </a:rPr>
+                          <m:t>𝑡</m:t>
+                        </m:r>
+                      </m:sub>
+                    </m:sSub>
+                  </m:oMath>
+                </a14:m>
+                <a:r>
+                  <a:rPr lang="en-GB" dirty="0"/>
+                  <a:t> in her lifetime – which is not influenced by subjective probability as much as consumption is.</a:t>
+                </a:r>
+              </a:p>
+              <a:p>
+                <a:endParaRPr lang="en-GB" dirty="0"/>
+              </a:p>
+            </p:txBody>
+          </p:sp>
+        </mc:Choice>
+        <mc:Fallback>
+          <p:sp>
+            <p:nvSpPr>
+              <p:cNvPr id="3" name="Content Placeholder 2">
+                <a:extLst>
+                  <a:ext uri="{FF2B5EF4-FFF2-40B4-BE49-F238E27FC236}">
+                    <a16:creationId xmlns:a16="http://schemas.microsoft.com/office/drawing/2014/main" id="{0850E727-D68A-415F-9A9C-4798B149EEB7}"/>
+                  </a:ext>
+                </a:extLst>
+              </p:cNvPr>
+              <p:cNvSpPr>
+                <a:spLocks noGrp="1" noRot="1" noChangeAspect="1" noMove="1" noResize="1" noEditPoints="1" noAdjustHandles="1" noChangeArrowheads="1" noChangeShapeType="1" noTextEdit="1"/>
+              </p:cNvSpPr>
+              <p:nvPr>
+                <p:ph idx="1"/>
+              </p:nvPr>
+            </p:nvSpPr>
+            <p:spPr>
+              <a:blipFill>
+                <a:blip r:embed="rId2"/>
+                <a:stretch>
+                  <a:fillRect l="-773" t="-2243"/>
+                </a:stretch>
+              </a:blipFill>
+            </p:spPr>
+            <p:txBody>
+              <a:bodyPr/>
+              <a:lstStyle/>
+              <a:p>
+                <a:r>
+                  <a:rPr lang="en-GB">
+                    <a:noFill/>
+                  </a:rPr>
+                  <a:t> </a:t>
+                </a:r>
+              </a:p>
+            </p:txBody>
+          </p:sp>
+        </mc:Fallback>
+      </mc:AlternateContent>
+      <p:sp>
+        <p:nvSpPr>
+          <p:cNvPr id="4" name="Slide Number Placeholder 3">
+            <a:extLst>
+              <a:ext uri="{FF2B5EF4-FFF2-40B4-BE49-F238E27FC236}">
+                <a16:creationId xmlns:a16="http://schemas.microsoft.com/office/drawing/2014/main" id="{D4A2C9EA-D936-4463-8F10-86522BD8218B}"/>
+              </a:ext>
+            </a:extLst>
+          </p:cNvPr>
+          <p:cNvSpPr>
+            <a:spLocks noGrp="1"/>
+          </p:cNvSpPr>
+          <p:nvPr>
+            <p:ph type="sldNum" sz="quarter" idx="12"/>
+          </p:nvPr>
+        </p:nvSpPr>
+        <p:spPr/>
+        <p:txBody>
+          <a:bodyPr/>
+          <a:lstStyle/>
+          <a:p>
+            <a:pPr>
+              <a:defRPr/>
+            </a:pPr>
+            <a:fld id="{8E35B453-7314-4BBD-9303-11C6BECC4B0D}" type="slidenum">
+              <a:rPr lang="en-GB" altLang="en-US" smtClean="0"/>
+              <a:pPr>
+                <a:defRPr/>
+              </a:pPr>
+              <a:t>12</a:t>
+            </a:fld>
+            <a:endParaRPr lang="en-GB" altLang="en-US" dirty="0"/>
+          </a:p>
+        </p:txBody>
+      </p:sp>
+    </p:spTree>
+    <p:extLst>
+      <p:ext uri="{BB962C8B-B14F-4D97-AF65-F5344CB8AC3E}">
+        <p14:creationId xmlns:p14="http://schemas.microsoft.com/office/powerpoint/2010/main" val="3976541131"/>
+      </p:ext>
+    </p:extLst>
+  </p:cSld>
+  <p:clrMapOvr>
+    <a:masterClrMapping/>
+  </p:clrMapOvr>
+  <p:transition>
+    <p:fade/>
+  </p:transition>
+</p:sld>
+</file>
+
+<file path=ppt/slides/slide13.xml><?xml version="1.0" encoding="utf-8"?>
 <p:sld xmlns:a="http://schemas.openxmlformats.org/drawingml/2006/main" xmlns:r="http://schemas.openxmlformats.org/officeDocument/2006/relationships" xmlns:p="http://schemas.openxmlformats.org/presentationml/2006/main">
   <p:cSld>
     <p:spTree>
@@ -18020,60 +18471,34 @@
                           </m:r>
                         </m:sub>
                       </m:sSub>
-                      <m:r>
-                        <a:rPr lang="en-GB" b="0" i="1" smtClean="0">
-                          <a:latin typeface="Cambria Math" panose="02040503050406030204" pitchFamily="18" charset="0"/>
-                        </a:rPr>
-                        <m:t>𝑝</m:t>
-                      </m:r>
-                      <m:d>
-                        <m:dPr>
+                      <m:sSub>
+                        <m:sSubPr>
                           <m:ctrlPr>
                             <a:rPr lang="en-GB" b="0" i="1" smtClean="0">
                               <a:latin typeface="Cambria Math" panose="02040503050406030204" pitchFamily="18" charset="0"/>
                             </a:rPr>
                           </m:ctrlPr>
-                        </m:dPr>
+                        </m:sSubPr>
                         <m:e>
-                          <m:sSub>
-                            <m:sSubPr>
-                              <m:ctrlPr>
-                                <a:rPr lang="en-GB" b="0" i="1" smtClean="0">
-                                  <a:latin typeface="Cambria Math" panose="02040503050406030204" pitchFamily="18" charset="0"/>
-                                </a:rPr>
-                              </m:ctrlPr>
-                            </m:sSubPr>
-                            <m:e>
-                              <m:r>
-                                <a:rPr lang="en-GB" b="0" i="1" smtClean="0">
-                                  <a:latin typeface="Cambria Math" panose="02040503050406030204" pitchFamily="18" charset="0"/>
-                                </a:rPr>
-                                <m:t>𝐴</m:t>
-                              </m:r>
-                            </m:e>
-                            <m:sub>
-                              <m:r>
-                                <a:rPr lang="en-GB" b="0" i="1" smtClean="0">
-                                  <a:latin typeface="Cambria Math" panose="02040503050406030204" pitchFamily="18" charset="0"/>
-                                </a:rPr>
-                                <m:t>𝑡</m:t>
-                              </m:r>
-                            </m:sub>
-                          </m:sSub>
+                          <m:r>
+                            <m:rPr>
+                              <m:sty m:val="p"/>
+                            </m:rPr>
+                            <a:rPr lang="en-GB" b="0" i="0" smtClean="0">
+                              <a:latin typeface="Cambria Math" panose="02040503050406030204" pitchFamily="18" charset="0"/>
+                            </a:rPr>
+                            <m:t>Ψ</m:t>
+                          </m:r>
+                        </m:e>
+                        <m:sub>
                           <m:r>
                             <a:rPr lang="en-GB" b="0" i="1" smtClean="0">
                               <a:latin typeface="Cambria Math" panose="02040503050406030204" pitchFamily="18" charset="0"/>
                             </a:rPr>
-                            <m:t>,</m:t>
+                            <m:t>𝑡</m:t>
                           </m:r>
-                          <m:r>
-                            <a:rPr lang="en-GB" b="0" i="1" smtClean="0">
-                              <a:latin typeface="Cambria Math" panose="02040503050406030204" pitchFamily="18" charset="0"/>
-                            </a:rPr>
-                            <m:t>𝜌</m:t>
-                          </m:r>
-                        </m:e>
-                      </m:d>
+                        </m:sub>
+                      </m:sSub>
                       <m:r>
                         <a:rPr lang="en-GB" b="0" i="1" smtClean="0">
                           <a:latin typeface="Cambria Math" panose="02040503050406030204" pitchFamily="18" charset="0"/>
@@ -18170,6 +18595,37 @@
                         <a:rPr lang="en-GB" b="0" i="1" smtClean="0">
                           <a:latin typeface="Cambria Math" panose="02040503050406030204" pitchFamily="18" charset="0"/>
                         </a:rPr>
+                        <m:t>,</m:t>
+                      </m:r>
+                      <m:sSub>
+                        <m:sSubPr>
+                          <m:ctrlPr>
+                            <a:rPr lang="en-GB" b="0" i="1" smtClean="0">
+                              <a:latin typeface="Cambria Math" panose="02040503050406030204" pitchFamily="18" charset="0"/>
+                            </a:rPr>
+                          </m:ctrlPr>
+                        </m:sSubPr>
+                        <m:e>
+                          <m:r>
+                            <a:rPr lang="en-GB" b="0" i="1" smtClean="0">
+                              <a:latin typeface="Cambria Math" panose="02040503050406030204" pitchFamily="18" charset="0"/>
+                            </a:rPr>
+                            <m:t>𝐴</m:t>
+                          </m:r>
+                        </m:e>
+                        <m:sub>
+                          <m:r>
+                            <a:rPr lang="en-GB" b="0" i="1" smtClean="0">
+                              <a:latin typeface="Cambria Math" panose="02040503050406030204" pitchFamily="18" charset="0"/>
+                            </a:rPr>
+                            <m:t>𝑡</m:t>
+                          </m:r>
+                        </m:sub>
+                      </m:sSub>
+                      <m:r>
+                        <a:rPr lang="en-GB" b="0" i="1" smtClean="0">
+                          <a:latin typeface="Cambria Math" panose="02040503050406030204" pitchFamily="18" charset="0"/>
+                        </a:rPr>
                         <m:t>)</m:t>
                       </m:r>
                     </m:oMath>
@@ -18262,31 +18718,12 @@
                           </a:rPr>
                           <m:t>,</m:t>
                         </m:r>
-                        <m:sSub>
-                          <m:sSubPr>
-                            <m:ctrlPr>
-                              <a:rPr lang="en-GB" b="0" i="1" smtClean="0">
-                                <a:latin typeface="Cambria Math" panose="02040503050406030204" pitchFamily="18" charset="0"/>
-                              </a:rPr>
-                            </m:ctrlPr>
-                          </m:sSubPr>
-                          <m:e>
-                            <m:r>
-                              <a:rPr lang="en-GB" b="0" i="1" smtClean="0">
-                                <a:latin typeface="Cambria Math" panose="02040503050406030204" pitchFamily="18" charset="0"/>
-                              </a:rPr>
-                              <m:t>𝑐</m:t>
-                            </m:r>
-                          </m:e>
-                          <m:sub>
-                            <m:r>
-                              <a:rPr lang="en-GB" b="0" i="1" smtClean="0">
-                                <a:latin typeface="Cambria Math" panose="02040503050406030204" pitchFamily="18" charset="0"/>
-                              </a:rPr>
-                              <m:t>𝑖</m:t>
-                            </m:r>
-                          </m:sub>
-                        </m:sSub>
+                        <m:r>
+                          <a:rPr lang="en-GB" b="0" i="1" smtClean="0">
+                            <a:latin typeface="Cambria Math" panose="02040503050406030204" pitchFamily="18" charset="0"/>
+                          </a:rPr>
+                          <m:t>𝜌</m:t>
+                        </m:r>
                         <m:r>
                           <a:rPr lang="en-GB" b="0" i="1" smtClean="0">
                             <a:latin typeface="Cambria Math" panose="02040503050406030204" pitchFamily="18" charset="0"/>
@@ -18306,7 +18743,7 @@
                               <a:rPr lang="en-GB" b="0" i="1" smtClean="0">
                                 <a:latin typeface="Cambria Math" panose="02040503050406030204" pitchFamily="18" charset="0"/>
                               </a:rPr>
-                              <m:t>𝜂</m:t>
+                              <m:t>𝜈</m:t>
                             </m:r>
                           </m:e>
                           <m:sub>
@@ -18365,13 +18802,10 @@
                       <m:t>,</m:t>
                     </m:r>
                     <m:r>
-                      <m:rPr>
-                        <m:sty m:val="p"/>
-                      </m:rPr>
-                      <a:rPr lang="en-GB" b="0" i="0" smtClean="0">
+                      <a:rPr lang="en-GB" b="0" i="1" smtClean="0">
                         <a:latin typeface="Cambria Math" panose="02040503050406030204" pitchFamily="18" charset="0"/>
                       </a:rPr>
-                      <m:t>c</m:t>
+                      <m:t>𝜌</m:t>
                     </m:r>
                     <m:r>
                       <a:rPr lang="en-GB" b="0" i="0" smtClean="0">
@@ -18383,7 +18817,7 @@
                       <a:rPr lang="en-GB" b="0" i="1" smtClean="0">
                         <a:latin typeface="Cambria Math" panose="02040503050406030204" pitchFamily="18" charset="0"/>
                       </a:rPr>
-                      <m:t>𝜂</m:t>
+                      <m:t>𝜈</m:t>
                     </m:r>
                     <m:r>
                       <a:rPr lang="en-GB" b="0" i="1" smtClean="0">
@@ -18395,7 +18829,7 @@
                 </a14:m>
                 <a:r>
                   <a:rPr lang="en-GB" dirty="0"/>
-                  <a:t>.  This would solve a stochastic dynamic optimisation problem – whose solution can often only be obtained through simulations</a:t>
+                  <a:t>.  This would solve a stochastic dynamic optimisation problem – whose solution can often be obtained only through simulations</a:t>
                 </a:r>
               </a:p>
               <a:p>
@@ -18436,72 +18870,7 @@
                     </m:d>
                   </m:oMath>
                 </a14:m>
-                <a:r>
-                  <a:rPr lang="en-GB" dirty="0"/>
-                  <a:t> and the constraint </a:t>
-                </a:r>
-                <a14:m>
-                  <m:oMath xmlns:m="http://schemas.openxmlformats.org/officeDocument/2006/math">
-                    <m:r>
-                      <a:rPr lang="en-GB" i="1">
-                        <a:latin typeface="Cambria Math" panose="02040503050406030204" pitchFamily="18" charset="0"/>
-                      </a:rPr>
-                      <m:t>𝑝</m:t>
-                    </m:r>
-                    <m:d>
-                      <m:dPr>
-                        <m:ctrlPr>
-                          <a:rPr lang="en-GB" i="1">
-                            <a:latin typeface="Cambria Math" panose="02040503050406030204" pitchFamily="18" charset="0"/>
-                          </a:rPr>
-                        </m:ctrlPr>
-                      </m:dPr>
-                      <m:e>
-                        <m:sSub>
-                          <m:sSubPr>
-                            <m:ctrlPr>
-                              <a:rPr lang="en-GB" i="1">
-                                <a:latin typeface="Cambria Math" panose="02040503050406030204" pitchFamily="18" charset="0"/>
-                              </a:rPr>
-                            </m:ctrlPr>
-                          </m:sSubPr>
-                          <m:e>
-                            <m:r>
-                              <a:rPr lang="en-GB" i="1">
-                                <a:latin typeface="Cambria Math" panose="02040503050406030204" pitchFamily="18" charset="0"/>
-                              </a:rPr>
-                              <m:t>𝐴</m:t>
-                            </m:r>
-                          </m:e>
-                          <m:sub>
-                            <m:r>
-                              <a:rPr lang="en-GB" i="1">
-                                <a:latin typeface="Cambria Math" panose="02040503050406030204" pitchFamily="18" charset="0"/>
-                              </a:rPr>
-                              <m:t>𝑡</m:t>
-                            </m:r>
-                          </m:sub>
-                        </m:sSub>
-                        <m:r>
-                          <a:rPr lang="en-GB" i="1">
-                            <a:latin typeface="Cambria Math" panose="02040503050406030204" pitchFamily="18" charset="0"/>
-                          </a:rPr>
-                          <m:t>,</m:t>
-                        </m:r>
-                        <m:r>
-                          <a:rPr lang="en-GB" i="1">
-                            <a:latin typeface="Cambria Math" panose="02040503050406030204" pitchFamily="18" charset="0"/>
-                          </a:rPr>
-                          <m:t>𝜌</m:t>
-                        </m:r>
-                      </m:e>
-                    </m:d>
-                  </m:oMath>
-                </a14:m>
-                <a:r>
-                  <a:rPr lang="en-GB" dirty="0"/>
-                  <a:t> brought about by ownership of assets </a:t>
-                </a:r>
+                <a:endParaRPr lang="en-GB" dirty="0"/>
               </a:p>
               <a:p>
                 <a:pPr marL="0" indent="0">
@@ -18581,7 +18950,7 @@
               <a:pPr>
                 <a:defRPr/>
               </a:pPr>
-              <a:t>11</a:t>
+              <a:t>13</a:t>
             </a:fld>
             <a:endParaRPr lang="en-GB" altLang="en-US" dirty="0"/>
           </a:p>
@@ -18603,7 +18972,7 @@
 </p:sld>
 </file>
 
-<file path=ppt/slides/slide12.xml><?xml version="1.0" encoding="utf-8"?>
+<file path=ppt/slides/slide14.xml><?xml version="1.0" encoding="utf-8"?>
 <p:sld xmlns:a="http://schemas.openxmlformats.org/drawingml/2006/main" xmlns:r="http://schemas.openxmlformats.org/officeDocument/2006/relationships" xmlns:p="http://schemas.openxmlformats.org/presentationml/2006/main">
   <p:cSld>
     <p:spTree>
@@ -18643,7 +19012,7 @@
           <a:p>
             <a:r>
               <a:rPr lang="en-GB" dirty="0"/>
-              <a:t>Solution for a non-stochastic formulation</a:t>
+              <a:t>A simpler non-stochastic formulation</a:t>
             </a:r>
           </a:p>
         </p:txBody>
@@ -18669,7 +19038,7 @@
             <p:spPr/>
             <p:txBody>
               <a:bodyPr>
-                <a:normAutofit fontScale="92500" lnSpcReduction="20000"/>
+                <a:normAutofit fontScale="85000" lnSpcReduction="20000"/>
               </a:bodyPr>
               <a:lstStyle/>
               <a:p>
@@ -19085,12 +19454,37 @@
                                 </a:rPr>
                                 <m:t>1+</m:t>
                               </m:r>
-                              <m:r>
-                                <a:rPr lang="en-GB" b="0" i="1" smtClean="0">
-                                  <a:latin typeface="Cambria Math" panose="02040503050406030204" pitchFamily="18" charset="0"/>
-                                </a:rPr>
-                                <m:t>𝜈</m:t>
-                              </m:r>
+                              <m:sSub>
+                                <m:sSubPr>
+                                  <m:ctrlPr>
+                                    <a:rPr lang="en-GB" b="0" i="1" smtClean="0">
+                                      <a:latin typeface="Cambria Math" panose="02040503050406030204" pitchFamily="18" charset="0"/>
+                                    </a:rPr>
+                                  </m:ctrlPr>
+                                </m:sSubPr>
+                                <m:e>
+                                  <m:r>
+                                    <a:rPr lang="en-GB" b="0" i="1" smtClean="0">
+                                      <a:latin typeface="Cambria Math" panose="02040503050406030204" pitchFamily="18" charset="0"/>
+                                    </a:rPr>
+                                    <m:t>𝜈</m:t>
+                                  </m:r>
+                                </m:e>
+                                <m:sub>
+                                  <m:r>
+                                    <a:rPr lang="en-GB" b="0" i="1" smtClean="0">
+                                      <a:latin typeface="Cambria Math" panose="02040503050406030204" pitchFamily="18" charset="0"/>
+                                    </a:rPr>
+                                    <m:t>𝑡</m:t>
+                                  </m:r>
+                                  <m:r>
+                                    <a:rPr lang="en-GB" b="0" i="1" smtClean="0">
+                                      <a:latin typeface="Cambria Math" panose="02040503050406030204" pitchFamily="18" charset="0"/>
+                                    </a:rPr>
+                                    <m:t>+1</m:t>
+                                  </m:r>
+                                </m:sub>
+                              </m:sSub>
                             </m:e>
                           </m:d>
                           <m:r>
@@ -19109,48 +19503,6 @@
                           </m:r>
                         </m:sub>
                       </m:sSub>
-                      <m:r>
-                        <a:rPr lang="en-GB" i="1">
-                          <a:latin typeface="Cambria Math" panose="02040503050406030204" pitchFamily="18" charset="0"/>
-                        </a:rPr>
-                        <m:t>𝑝</m:t>
-                      </m:r>
-                      <m:d>
-                        <m:dPr>
-                          <m:ctrlPr>
-                            <a:rPr lang="en-GB" i="1">
-                              <a:latin typeface="Cambria Math" panose="02040503050406030204" pitchFamily="18" charset="0"/>
-                            </a:rPr>
-                          </m:ctrlPr>
-                        </m:dPr>
-                        <m:e>
-                          <m:sSub>
-                            <m:sSubPr>
-                              <m:ctrlPr>
-                                <a:rPr lang="en-GB" i="1">
-                                  <a:latin typeface="Cambria Math" panose="02040503050406030204" pitchFamily="18" charset="0"/>
-                                </a:rPr>
-                              </m:ctrlPr>
-                            </m:sSubPr>
-                            <m:e>
-                              <m:r>
-                                <a:rPr lang="en-GB" i="1">
-                                  <a:latin typeface="Cambria Math" panose="02040503050406030204" pitchFamily="18" charset="0"/>
-                                </a:rPr>
-                                <m:t>𝐴</m:t>
-                              </m:r>
-                            </m:e>
-                            <m:sub>
-                              <m:r>
-                                <a:rPr lang="en-GB" i="1">
-                                  <a:latin typeface="Cambria Math" panose="02040503050406030204" pitchFamily="18" charset="0"/>
-                                </a:rPr>
-                                <m:t>𝑡</m:t>
-                              </m:r>
-                            </m:sub>
-                          </m:sSub>
-                        </m:e>
-                      </m:d>
                       <m:sSub>
                         <m:sSubPr>
                           <m:ctrlPr>
@@ -19204,6 +19556,66 @@
                           </m:r>
                         </m:sub>
                       </m:sSub>
+                      <m:r>
+                        <a:rPr lang="en-GB" b="0" i="1" smtClean="0">
+                          <a:latin typeface="Cambria Math" panose="02040503050406030204" pitchFamily="18" charset="0"/>
+                        </a:rPr>
+                        <m:t>+</m:t>
+                      </m:r>
+                      <m:r>
+                        <a:rPr lang="en-GB" i="1">
+                          <a:latin typeface="Cambria Math" panose="02040503050406030204" pitchFamily="18" charset="0"/>
+                        </a:rPr>
+                        <m:t>𝑝</m:t>
+                      </m:r>
+                      <m:d>
+                        <m:dPr>
+                          <m:ctrlPr>
+                            <a:rPr lang="en-GB" i="1">
+                              <a:latin typeface="Cambria Math" panose="02040503050406030204" pitchFamily="18" charset="0"/>
+                            </a:rPr>
+                          </m:ctrlPr>
+                        </m:dPr>
+                        <m:e>
+                          <m:sSub>
+                            <m:sSubPr>
+                              <m:ctrlPr>
+                                <a:rPr lang="en-GB" i="1">
+                                  <a:latin typeface="Cambria Math" panose="02040503050406030204" pitchFamily="18" charset="0"/>
+                                </a:rPr>
+                              </m:ctrlPr>
+                            </m:sSubPr>
+                            <m:e>
+                              <m:r>
+                                <a:rPr lang="en-GB" i="1">
+                                  <a:latin typeface="Cambria Math" panose="02040503050406030204" pitchFamily="18" charset="0"/>
+                                </a:rPr>
+                                <m:t>𝐴</m:t>
+                              </m:r>
+                            </m:e>
+                            <m:sub>
+                              <m:r>
+                                <a:rPr lang="en-GB" i="1">
+                                  <a:latin typeface="Cambria Math" panose="02040503050406030204" pitchFamily="18" charset="0"/>
+                                </a:rPr>
+                                <m:t>𝑡</m:t>
+                              </m:r>
+                            </m:sub>
+                          </m:sSub>
+                          <m:r>
+                            <a:rPr lang="en-GB" b="0" i="1" smtClean="0">
+                              <a:latin typeface="Cambria Math" panose="02040503050406030204" pitchFamily="18" charset="0"/>
+                            </a:rPr>
+                            <m:t>,</m:t>
+                          </m:r>
+                          <m:r>
+                            <a:rPr lang="en-GB" b="0" i="1" smtClean="0">
+                              <a:latin typeface="Cambria Math" panose="02040503050406030204" pitchFamily="18" charset="0"/>
+                            </a:rPr>
+                            <m:t>𝜌</m:t>
+                          </m:r>
+                        </m:e>
+                      </m:d>
                     </m:oMath>
                   </m:oMathPara>
                 </a14:m>
@@ -19492,7 +19904,7 @@
                                   <a:rPr lang="en-GB" b="0" i="1" smtClean="0">
                                     <a:latin typeface="Cambria Math" panose="02040503050406030204" pitchFamily="18" charset="0"/>
                                   </a:rPr>
-                                  <m:t>𝑐</m:t>
+                                  <m:t>𝜈</m:t>
                                 </m:r>
                               </m:e>
                               <m:sub>
@@ -19578,31 +19990,12 @@
                             </m:ctrlPr>
                           </m:dPr>
                           <m:e>
-                            <m:sSub>
-                              <m:sSubPr>
-                                <m:ctrlPr>
-                                  <a:rPr lang="en-GB" b="0" i="1" smtClean="0">
-                                    <a:latin typeface="Cambria Math" panose="02040503050406030204" pitchFamily="18" charset="0"/>
-                                  </a:rPr>
-                                </m:ctrlPr>
-                              </m:sSubPr>
-                              <m:e>
-                                <m:r>
-                                  <a:rPr lang="en-GB" b="0" i="1" smtClean="0">
-                                    <a:latin typeface="Cambria Math" panose="02040503050406030204" pitchFamily="18" charset="0"/>
-                                  </a:rPr>
-                                  <m:t>𝜂</m:t>
-                                </m:r>
-                              </m:e>
-                              <m:sub>
-                                <m:r>
-                                  <a:rPr lang="en-GB" b="0" i="1" smtClean="0">
-                                    <a:latin typeface="Cambria Math" panose="02040503050406030204" pitchFamily="18" charset="0"/>
-                                  </a:rPr>
-                                  <m:t>𝑡</m:t>
-                                </m:r>
-                              </m:sub>
-                            </m:sSub>
+                            <m:r>
+                              <a:rPr lang="en-GB" b="0" i="1" smtClean="0">
+                                <a:latin typeface="Cambria Math" panose="02040503050406030204" pitchFamily="18" charset="0"/>
+                              </a:rPr>
+                              <m:t>𝜌</m:t>
+                            </m:r>
                           </m:e>
                         </m:d>
                       </m:e>
@@ -19665,6 +20058,77 @@
                 </a:r>
               </a:p>
               <a:p>
+                <a:pPr marL="0" indent="0">
+                  <a:buNone/>
+                </a:pPr>
+                <a:r>
+                  <a:rPr lang="en-GB" dirty="0"/>
+                  <a:t>and the constraint </a:t>
+                </a:r>
+                <a14:m>
+                  <m:oMath xmlns:m="http://schemas.openxmlformats.org/officeDocument/2006/math">
+                    <m:r>
+                      <a:rPr lang="en-GB" i="1">
+                        <a:latin typeface="Cambria Math" panose="02040503050406030204" pitchFamily="18" charset="0"/>
+                      </a:rPr>
+                      <m:t>𝑝</m:t>
+                    </m:r>
+                    <m:d>
+                      <m:dPr>
+                        <m:ctrlPr>
+                          <a:rPr lang="en-GB" i="1">
+                            <a:latin typeface="Cambria Math" panose="02040503050406030204" pitchFamily="18" charset="0"/>
+                          </a:rPr>
+                        </m:ctrlPr>
+                      </m:dPr>
+                      <m:e>
+                        <m:sSub>
+                          <m:sSubPr>
+                            <m:ctrlPr>
+                              <a:rPr lang="en-GB" i="1">
+                                <a:latin typeface="Cambria Math" panose="02040503050406030204" pitchFamily="18" charset="0"/>
+                              </a:rPr>
+                            </m:ctrlPr>
+                          </m:sSubPr>
+                          <m:e>
+                            <m:r>
+                              <a:rPr lang="en-GB" i="1">
+                                <a:latin typeface="Cambria Math" panose="02040503050406030204" pitchFamily="18" charset="0"/>
+                              </a:rPr>
+                              <m:t>𝐴</m:t>
+                            </m:r>
+                          </m:e>
+                          <m:sub>
+                            <m:r>
+                              <a:rPr lang="en-GB" i="1">
+                                <a:latin typeface="Cambria Math" panose="02040503050406030204" pitchFamily="18" charset="0"/>
+                              </a:rPr>
+                              <m:t>𝑡</m:t>
+                            </m:r>
+                          </m:sub>
+                        </m:sSub>
+                        <m:r>
+                          <a:rPr lang="en-GB" i="1">
+                            <a:latin typeface="Cambria Math" panose="02040503050406030204" pitchFamily="18" charset="0"/>
+                          </a:rPr>
+                          <m:t>,</m:t>
+                        </m:r>
+                        <m:r>
+                          <a:rPr lang="en-GB" i="1">
+                            <a:latin typeface="Cambria Math" panose="02040503050406030204" pitchFamily="18" charset="0"/>
+                          </a:rPr>
+                          <m:t>𝜌</m:t>
+                        </m:r>
+                      </m:e>
+                    </m:d>
+                  </m:oMath>
+                </a14:m>
+                <a:r>
+                  <a:rPr lang="en-GB" dirty="0"/>
+                  <a:t> brought about by ownership of assets.</a:t>
+                </a:r>
+              </a:p>
+              <a:p>
                 <a:endParaRPr lang="en-GB" dirty="0"/>
               </a:p>
             </p:txBody>
@@ -19691,7 +20155,7 @@
               <a:blipFill>
                 <a:blip r:embed="rId2"/>
                 <a:stretch>
-                  <a:fillRect l="-696"/>
+                  <a:fillRect l="-618" b="-2243"/>
                 </a:stretch>
               </a:blipFill>
             </p:spPr>
@@ -19739,7 +20203,7 @@
               <a:pPr>
                 <a:defRPr/>
               </a:pPr>
-              <a:t>12</a:t>
+              <a:t>14</a:t>
             </a:fld>
             <a:endParaRPr lang="en-GB" altLang="en-US" dirty="0"/>
           </a:p>
@@ -19761,7 +20225,7 @@
 </p:sld>
 </file>
 
-<file path=ppt/slides/slide13.xml><?xml version="1.0" encoding="utf-8"?>
+<file path=ppt/slides/slide15.xml><?xml version="1.0" encoding="utf-8"?>
 <p:sld xmlns:a="http://schemas.openxmlformats.org/drawingml/2006/main" xmlns:r="http://schemas.openxmlformats.org/officeDocument/2006/relationships" xmlns:p="http://schemas.openxmlformats.org/presentationml/2006/main">
   <p:cSld>
     <p:spTree>
@@ -19801,7 +20265,7 @@
           <a:p>
             <a:r>
               <a:rPr lang="en-GB" dirty="0"/>
-              <a:t>How close is this with reality?</a:t>
+              <a:t>Empirical Issues</a:t>
             </a:r>
           </a:p>
         </p:txBody>
@@ -19829,19 +20293,20 @@
           <a:p>
             <a:r>
               <a:rPr lang="en-GB" dirty="0"/>
-              <a:t>Credit plays a significant role in the current setting (directly to consumers or through governments in the LDCs) – thus requiring us to consider interest rates</a:t>
+              <a:t>It is easy to determine in the empirical data – which characteristics can be passed down to generations</a:t>
             </a:r>
           </a:p>
           <a:p>
             <a:r>
               <a:rPr lang="en-GB" dirty="0"/>
-              <a:t>Credit can also be seen as a means to bring discipline in the </a:t>
-            </a:r>
-            <a:r>
-              <a:rPr lang="en-GB"/>
-              <a:t>consumer behaviour</a:t>
-            </a:r>
-            <a:endParaRPr lang="en-GB" dirty="0"/>
+              <a:t>Quality is defined with total costs on commodity (many interpretations of quality exist in the literature)</a:t>
+            </a:r>
+          </a:p>
+          <a:p>
+            <a:r>
+              <a:rPr lang="en-GB" dirty="0"/>
+              <a:t>Credit plays a significant role in the current setting (directly to consumers or through governments in the LDCs) – thus requiring us to consider interest rates in the evolution of assets</a:t>
+            </a:r>
           </a:p>
           <a:p>
             <a:endParaRPr lang="en-GB" dirty="0"/>
@@ -19880,7 +20345,7 @@
               <a:pPr>
                 <a:defRPr/>
               </a:pPr>
-              <a:t>13</a:t>
+              <a:t>15</a:t>
             </a:fld>
             <a:endParaRPr lang="en-GB" altLang="en-US" dirty="0"/>
           </a:p>
@@ -19902,7 +20367,7 @@
 </p:sld>
 </file>
 
-<file path=ppt/slides/slide14.xml><?xml version="1.0" encoding="utf-8"?>
+<file path=ppt/slides/slide16.xml><?xml version="1.0" encoding="utf-8"?>
 <p:sld xmlns:a="http://schemas.openxmlformats.org/drawingml/2006/main" xmlns:r="http://schemas.openxmlformats.org/officeDocument/2006/relationships" xmlns:p="http://schemas.openxmlformats.org/presentationml/2006/main">
   <p:cSld>
     <p:spTree>
@@ -19981,6 +20446,12 @@
               <a:t>, Clarendon Press 1993</a:t>
             </a:r>
           </a:p>
+          <a:p>
+            <a:r>
+              <a:rPr lang="en-GB" dirty="0"/>
+              <a:t>N J Ireland, “On limiting the market for status signals,” Journal of Public Economics, 1994</a:t>
+            </a:r>
+          </a:p>
         </p:txBody>
       </p:sp>
       <p:sp>
@@ -20012,7 +20483,7 @@
               <a:pPr>
                 <a:defRPr/>
               </a:pPr>
-              <a:t>14</a:t>
+              <a:t>16</a:t>
             </a:fld>
             <a:endParaRPr lang="en-GB" altLang="en-US" dirty="0"/>
           </a:p>
@@ -20108,15 +20579,6 @@
               <a:rPr lang="en-GB" dirty="0"/>
               <a:t>Veblen argued that signalling of status is innate in societies.</a:t>
             </a:r>
-          </a:p>
-          <a:p>
-            <a:r>
-              <a:rPr lang="en-GB" dirty="0"/>
-              <a:t>Frederic Hirsch and Robert Frank have argued for status needs to be considered in consumption</a:t>
-            </a:r>
-          </a:p>
-          <a:p>
-            <a:endParaRPr lang="en-GB" dirty="0"/>
           </a:p>
           <a:p>
             <a:pPr marL="0" indent="0">
@@ -20213,14 +20675,14 @@
           <a:p>
             <a:r>
               <a:rPr lang="en-GB" dirty="0"/>
-              <a:t>The public discourse regards it as something that only serves the rich (recent description of Ecclestone’s home is a great example). Is that true?</a:t>
+              <a:t>The public discourse often represents it as something that only serves the rich (consider the recent description of Ecclestone’s home). How true is this?</a:t>
             </a:r>
           </a:p>
           <a:p>
             <a:pPr lvl="1"/>
             <a:r>
               <a:rPr lang="en-GB" dirty="0"/>
-              <a:t>Do the rich wealthy really status consumption (more than the non-rich)?</a:t>
+              <a:t>Do the rich wealthy really need status-related consumption (more than the non-rich)?</a:t>
             </a:r>
           </a:p>
           <a:p>
@@ -20316,14 +20778,19 @@
             <p:ph type="title"/>
           </p:nvPr>
         </p:nvSpPr>
-        <p:spPr/>
+        <p:spPr>
+          <a:xfrm>
+            <a:off x="625238" y="389033"/>
+            <a:ext cx="7886700" cy="993775"/>
+          </a:xfrm>
+        </p:spPr>
         <p:txBody>
           <a:bodyPr/>
           <a:lstStyle/>
           <a:p>
             <a:r>
               <a:rPr lang="en-GB" dirty="0"/>
-              <a:t>Assumptions for a status demand model</a:t>
+              <a:t>Assumptions in a model for status demand </a:t>
             </a:r>
           </a:p>
         </p:txBody>
@@ -20357,13 +20824,29 @@
           <a:p>
             <a:r>
               <a:rPr lang="en-GB" dirty="0"/>
-              <a:t>A1. There is a rational benefit to be had from status consumption (otherwise consumers would stay away from it in the long-run)</a:t>
-            </a:r>
-          </a:p>
-          <a:p>
+              <a:t>A1. </a:t>
+            </a:r>
+            <a:r>
+              <a:rPr lang="en-GB" i="1" dirty="0"/>
+              <a:t>Rational Benefit </a:t>
+            </a:r>
             <a:r>
               <a:rPr lang="en-GB" dirty="0"/>
-              <a:t>A2. Status-related consumption that is not considered “wealth” (most of the non-durable status-related consumption) cannot be inherited and thus cannot be passed across generations</a:t>
+              <a:t>-  There is a rational benefit to be had from status consumption (otherwise consumers would stay away from it in the long-run)</a:t>
+            </a:r>
+          </a:p>
+          <a:p>
+            <a:r>
+              <a:rPr lang="en-GB" dirty="0"/>
+              <a:t>A2. </a:t>
+            </a:r>
+            <a:r>
+              <a:rPr lang="en-GB" i="1" dirty="0"/>
+              <a:t>Long-term Assets </a:t>
+            </a:r>
+            <a:r>
+              <a:rPr lang="en-GB" dirty="0"/>
+              <a:t>Status-related consumption that is not considered “wealth” (i.e. most of non-durable status-related consumption) cannot be inherited (bequeathed) and thus cannot survive over generations</a:t>
             </a:r>
           </a:p>
           <a:p>
@@ -20462,7 +20945,7 @@
           <a:p>
             <a:r>
               <a:rPr lang="en-GB" dirty="0"/>
-              <a:t>The representative consumer</a:t>
+              <a:t>Choices for the representative consumer</a:t>
             </a:r>
           </a:p>
         </p:txBody>
@@ -20486,28 +20969,19 @@
         <p:spPr/>
         <p:txBody>
           <a:bodyPr>
-            <a:normAutofit lnSpcReduction="10000"/>
+            <a:normAutofit/>
           </a:bodyPr>
           <a:lstStyle/>
           <a:p>
-            <a:endParaRPr lang="en-GB" dirty="0"/>
-          </a:p>
-          <a:p>
             <a:r>
               <a:rPr lang="en-GB" dirty="0"/>
-              <a:t>A1 ensures that all consumers benefit from non-durable consumption</a:t>
+              <a:t>A1 ensures that all consumers benefit from expensive non-durable consumption</a:t>
             </a:r>
           </a:p>
           <a:p>
             <a:r>
               <a:rPr lang="en-GB" dirty="0"/>
-              <a:t>A2 separates long-term consumption from short-term consumption</a:t>
-            </a:r>
-          </a:p>
-          <a:p>
-            <a:r>
-              <a:rPr lang="en-GB" dirty="0"/>
-              <a:t>It is easy to determine in the empirical data – which characteristics can be passed down to generations</a:t>
+              <a:t>A2 separates consumption for long-term from short-term consumption</a:t>
             </a:r>
           </a:p>
           <a:p>
@@ -20519,7 +20993,7 @@
           <a:p>
             <a:r>
               <a:rPr lang="en-GB" dirty="0"/>
-              <a:t>Claim 2: Assets are more expensive but a certain provider of status</a:t>
+              <a:t>Claim 2: Assets are more expensive but a more certain provider of status</a:t>
             </a:r>
           </a:p>
           <a:p>
@@ -20606,6 +21080,163 @@
           <p:cNvPr id="2" name="Title 1">
             <a:extLst>
               <a:ext uri="{FF2B5EF4-FFF2-40B4-BE49-F238E27FC236}">
+                <a16:creationId xmlns:a16="http://schemas.microsoft.com/office/drawing/2014/main" id="{7A231F04-3175-4B5A-BF0C-80182312FA4A}"/>
+              </a:ext>
+            </a:extLst>
+          </p:cNvPr>
+          <p:cNvSpPr>
+            <a:spLocks noGrp="1"/>
+          </p:cNvSpPr>
+          <p:nvPr>
+            <p:ph type="title"/>
+          </p:nvPr>
+        </p:nvSpPr>
+        <p:spPr/>
+        <p:txBody>
+          <a:bodyPr/>
+          <a:lstStyle/>
+          <a:p>
+            <a:r>
+              <a:rPr lang="en-GB" dirty="0"/>
+              <a:t>Status as Utility</a:t>
+            </a:r>
+          </a:p>
+        </p:txBody>
+      </p:sp>
+      <p:sp>
+        <p:nvSpPr>
+          <p:cNvPr id="3" name="Content Placeholder 2">
+            <a:extLst>
+              <a:ext uri="{FF2B5EF4-FFF2-40B4-BE49-F238E27FC236}">
+                <a16:creationId xmlns:a16="http://schemas.microsoft.com/office/drawing/2014/main" id="{02F26935-3F15-42BA-B561-43D6954D1AEB}"/>
+              </a:ext>
+            </a:extLst>
+          </p:cNvPr>
+          <p:cNvSpPr>
+            <a:spLocks noGrp="1"/>
+          </p:cNvSpPr>
+          <p:nvPr>
+            <p:ph idx="1"/>
+          </p:nvPr>
+        </p:nvSpPr>
+        <p:spPr/>
+        <p:txBody>
+          <a:bodyPr>
+            <a:normAutofit/>
+          </a:bodyPr>
+          <a:lstStyle/>
+          <a:p>
+            <a:r>
+              <a:rPr lang="en-GB" dirty="0" err="1"/>
+              <a:t>Corneo</a:t>
+            </a:r>
+            <a:r>
+              <a:rPr lang="en-GB" dirty="0"/>
+              <a:t> et al consider a game-theoretic ranking model – where consumers participate with income and status goods</a:t>
+            </a:r>
+          </a:p>
+          <a:p>
+            <a:r>
+              <a:rPr lang="en-GB" dirty="0"/>
+              <a:t>The literature often focuses on additional utility derived from visible consumption (see Ireland model) – this also gets around empirical issues</a:t>
+            </a:r>
+          </a:p>
+          <a:p>
+            <a:r>
+              <a:rPr lang="en-GB" dirty="0"/>
+              <a:t>We consider status a combination of wealth (education, occupation, and long-term assets) and purchased quality</a:t>
+            </a:r>
+          </a:p>
+          <a:p>
+            <a:r>
+              <a:rPr lang="en-GB" dirty="0"/>
+              <a:t>Can status be subjective?</a:t>
+            </a:r>
+          </a:p>
+          <a:p>
+            <a:r>
+              <a:rPr lang="en-GB" dirty="0"/>
+              <a:t>Is status the cause or effect of status consumption?</a:t>
+            </a:r>
+          </a:p>
+          <a:p>
+            <a:endParaRPr lang="en-GB" dirty="0"/>
+          </a:p>
+        </p:txBody>
+      </p:sp>
+      <p:sp>
+        <p:nvSpPr>
+          <p:cNvPr id="4" name="Slide Number Placeholder 3">
+            <a:extLst>
+              <a:ext uri="{FF2B5EF4-FFF2-40B4-BE49-F238E27FC236}">
+                <a16:creationId xmlns:a16="http://schemas.microsoft.com/office/drawing/2014/main" id="{C54EB51B-7E50-4913-99B2-28938EA79579}"/>
+              </a:ext>
+            </a:extLst>
+          </p:cNvPr>
+          <p:cNvSpPr>
+            <a:spLocks noGrp="1"/>
+          </p:cNvSpPr>
+          <p:nvPr>
+            <p:ph type="sldNum" sz="quarter" idx="12"/>
+          </p:nvPr>
+        </p:nvSpPr>
+        <p:spPr/>
+        <p:txBody>
+          <a:bodyPr/>
+          <a:lstStyle/>
+          <a:p>
+            <a:pPr>
+              <a:defRPr/>
+            </a:pPr>
+            <a:fld id="{8E35B453-7314-4BBD-9303-11C6BECC4B0D}" type="slidenum">
+              <a:rPr lang="en-GB" altLang="en-US" smtClean="0"/>
+              <a:pPr>
+                <a:defRPr/>
+              </a:pPr>
+              <a:t>6</a:t>
+            </a:fld>
+            <a:endParaRPr lang="en-GB" altLang="en-US" dirty="0"/>
+          </a:p>
+        </p:txBody>
+      </p:sp>
+    </p:spTree>
+    <p:extLst>
+      <p:ext uri="{BB962C8B-B14F-4D97-AF65-F5344CB8AC3E}">
+        <p14:creationId xmlns:p14="http://schemas.microsoft.com/office/powerpoint/2010/main" val="1636049205"/>
+      </p:ext>
+    </p:extLst>
+  </p:cSld>
+  <p:clrMapOvr>
+    <a:masterClrMapping/>
+  </p:clrMapOvr>
+  <p:transition>
+    <p:fade/>
+  </p:transition>
+</p:sld>
+</file>
+
+<file path=ppt/slides/slide7.xml><?xml version="1.0" encoding="utf-8"?>
+<p:sld xmlns:a="http://schemas.openxmlformats.org/drawingml/2006/main" xmlns:r="http://schemas.openxmlformats.org/officeDocument/2006/relationships" xmlns:p="http://schemas.openxmlformats.org/presentationml/2006/main">
+  <p:cSld>
+    <p:spTree>
+      <p:nvGrpSpPr>
+        <p:cNvPr id="1" name=""/>
+        <p:cNvGrpSpPr/>
+        <p:nvPr/>
+      </p:nvGrpSpPr>
+      <p:grpSpPr>
+        <a:xfrm>
+          <a:off x="0" y="0"/>
+          <a:ext cx="0" cy="0"/>
+          <a:chOff x="0" y="0"/>
+          <a:chExt cx="0" cy="0"/>
+        </a:xfrm>
+      </p:grpSpPr>
+      <p:sp>
+        <p:nvSpPr>
+          <p:cNvPr id="2" name="Title 1">
+            <a:extLst>
+              <a:ext uri="{FF2B5EF4-FFF2-40B4-BE49-F238E27FC236}">
                 <a16:creationId xmlns:a16="http://schemas.microsoft.com/office/drawing/2014/main" id="{0CE45CA5-3ABC-4586-940F-3BA2D19EAA45}"/>
               </a:ext>
             </a:extLst>
@@ -20656,6 +21287,18 @@
             </a:r>
           </a:p>
           <a:p>
+            <a:r>
+              <a:rPr lang="en-GB" dirty="0"/>
+              <a:t>There is ample evidence of endowment effect in the literature on consumer research </a:t>
+            </a:r>
+          </a:p>
+          <a:p>
+            <a:r>
+              <a:rPr lang="en-GB" dirty="0"/>
+              <a:t>The behavioural economics literature often explains the effect of wealth on consumer choice with theories of framing and loss aversion</a:t>
+            </a:r>
+          </a:p>
+          <a:p>
             <a:endParaRPr lang="en-GB" dirty="0"/>
           </a:p>
         </p:txBody>
@@ -20689,7 +21332,7 @@
               <a:pPr>
                 <a:defRPr/>
               </a:pPr>
-              <a:t>6</a:t>
+              <a:t>7</a:t>
             </a:fld>
             <a:endParaRPr lang="en-GB" altLang="en-US" dirty="0"/>
           </a:p>
@@ -20711,7 +21354,7 @@
 </p:sld>
 </file>
 
-<file path=ppt/slides/slide7.xml><?xml version="1.0" encoding="utf-8"?>
+<file path=ppt/slides/slide8.xml><?xml version="1.0" encoding="utf-8"?>
 <p:sld xmlns:a="http://schemas.openxmlformats.org/drawingml/2006/main" xmlns:r="http://schemas.openxmlformats.org/officeDocument/2006/relationships" xmlns:p="http://schemas.openxmlformats.org/presentationml/2006/main">
   <p:cSld>
     <p:spTree>
@@ -20751,7 +21394,7 @@
           <a:p>
             <a:r>
               <a:rPr lang="en-GB" dirty="0"/>
-              <a:t>Enter the Intertemporal substitution</a:t>
+              <a:t>Intertemporal substitution</a:t>
             </a:r>
           </a:p>
         </p:txBody>
@@ -20775,7 +21418,7 @@
         <p:spPr/>
         <p:txBody>
           <a:bodyPr>
-            <a:normAutofit fontScale="92500" lnSpcReduction="20000"/>
+            <a:normAutofit fontScale="70000" lnSpcReduction="20000"/>
           </a:bodyPr>
           <a:lstStyle/>
           <a:p>
@@ -20791,7 +21434,7 @@
             </a:pPr>
             <a:r>
               <a:rPr lang="en-GB" dirty="0"/>
-              <a:t>The poor would need confidence (or credit) that the income and savings would rise to asset price</a:t>
+              <a:t>The poor would need confidence (or credit) that the income and savings would rise to the price of the desired asset</a:t>
             </a:r>
           </a:p>
           <a:p>
@@ -20801,7 +21444,7 @@
             </a:pPr>
             <a:r>
               <a:rPr lang="en-GB" dirty="0"/>
-              <a:t>The rich would need confidence that their wealth would be unaffected by the asset purchase</a:t>
+              <a:t>The rich would need confidence that their wealth would be unaffected by a successive asset purchase</a:t>
             </a:r>
           </a:p>
           <a:p>
@@ -20814,7 +21457,13 @@
           <a:p>
             <a:r>
               <a:rPr lang="en-GB" dirty="0"/>
-              <a:t>The confidence however is subject to how the consumers perceive the respective risks. Thus against the usual direction:</a:t>
+              <a:t>The permanent income approach relies on smoothening of income. Those with volatile incomes tend to limit (lower permanent income). But PIH only looks at monetary risks – while status encompasses other risks</a:t>
+            </a:r>
+          </a:p>
+          <a:p>
+            <a:r>
+              <a:rPr lang="en-GB" dirty="0"/>
+              <a:t>Consumer confidence is thus subject to how the consumers perceive the respective risks. While  PIH may be generally true, it is possible that consumers go against the usual direction:</a:t>
             </a:r>
           </a:p>
           <a:p>
@@ -20838,13 +21487,13 @@
           <a:p>
             <a:r>
               <a:rPr lang="en-GB" dirty="0"/>
-              <a:t>A probabilistic model should allow the behaviours in both directions</a:t>
+              <a:t>A probabilistic model for status – which allows the consumer to overspend on short-term quality - should allow the behaviours in both directions</a:t>
             </a:r>
           </a:p>
           <a:p>
             <a:r>
               <a:rPr lang="en-GB" dirty="0"/>
-              <a:t>How does this fit into the intertemporal substitution problem?</a:t>
+              <a:t>Can this fit into the intertemporal substitution framework?</a:t>
             </a:r>
           </a:p>
           <a:p>
@@ -20881,7 +21530,7 @@
               <a:pPr>
                 <a:defRPr/>
               </a:pPr>
-              <a:t>7</a:t>
+              <a:t>8</a:t>
             </a:fld>
             <a:endParaRPr lang="en-GB" altLang="en-US" dirty="0"/>
           </a:p>
@@ -20903,7 +21552,7 @@
 </p:sld>
 </file>
 
-<file path=ppt/slides/slide8.xml><?xml version="1.0" encoding="utf-8"?>
+<file path=ppt/slides/slide9.xml><?xml version="1.0" encoding="utf-8"?>
 <p:sld xmlns:a="http://schemas.openxmlformats.org/drawingml/2006/main" xmlns:r="http://schemas.openxmlformats.org/officeDocument/2006/relationships" xmlns:p="http://schemas.openxmlformats.org/presentationml/2006/main">
   <p:cSld>
     <p:spTree>
@@ -20971,28 +21620,21 @@
           <a:p>
             <a:r>
               <a:rPr lang="en-GB" dirty="0"/>
-              <a:t>Recall that Intertemporal substitution problem is one where consumer can either choose to consume now or accumulate in the future</a:t>
+              <a:t>Recall that Intertemporal substitution setting is one where the consumer can either choose to consume now or accumulate in the future</a:t>
             </a:r>
           </a:p>
           <a:p>
             <a:pPr lvl="1"/>
             <a:r>
               <a:rPr lang="en-GB" dirty="0"/>
-              <a:t>The first applications of the technique were performed with the data on savings, interest rate and consumption. The framework (Euler Equations) allows us to test assertions such as the life-cycle assumption, Permanent Income or random-walk hypothesis (see Deaton)</a:t>
+              <a:t>The framework is often applied on data from savings, interest rate and consumption. The Euler Equations used in the model allow for testing assumptions such as the life-cycle, Permanent Income or random-walk hypothesis (see Deaton)</a:t>
             </a:r>
           </a:p>
           <a:p>
             <a:pPr lvl="1"/>
             <a:r>
               <a:rPr lang="en-GB" dirty="0"/>
-              <a:t>The “wealth” in such models is the monetary wealth (as in PIH)</a:t>
-            </a:r>
-          </a:p>
-          <a:p>
-            <a:pPr lvl="1"/>
-            <a:r>
-              <a:rPr lang="en-GB" dirty="0"/>
-              <a:t>We seek a model with the effects of non-monetary wealth as well</a:t>
+              <a:t>We seek the intertemporal model with the effects of non-monetary wealth</a:t>
             </a:r>
           </a:p>
           <a:p>
@@ -21029,7 +21671,7 @@
               <a:pPr>
                 <a:defRPr/>
               </a:pPr>
-              <a:t>8</a:t>
+              <a:t>9</a:t>
             </a:fld>
             <a:endParaRPr lang="en-GB" altLang="en-US" dirty="0"/>
           </a:p>
@@ -21039,165 +21681,6 @@
     <p:extLst>
       <p:ext uri="{BB962C8B-B14F-4D97-AF65-F5344CB8AC3E}">
         <p14:creationId xmlns:p14="http://schemas.microsoft.com/office/powerpoint/2010/main" val="3116225782"/>
-      </p:ext>
-    </p:extLst>
-  </p:cSld>
-  <p:clrMapOvr>
-    <a:masterClrMapping/>
-  </p:clrMapOvr>
-  <p:transition>
-    <p:fade/>
-  </p:transition>
-</p:sld>
-</file>
-
-<file path=ppt/slides/slide9.xml><?xml version="1.0" encoding="utf-8"?>
-<p:sld xmlns:a="http://schemas.openxmlformats.org/drawingml/2006/main" xmlns:r="http://schemas.openxmlformats.org/officeDocument/2006/relationships" xmlns:p="http://schemas.openxmlformats.org/presentationml/2006/main">
-  <p:cSld>
-    <p:spTree>
-      <p:nvGrpSpPr>
-        <p:cNvPr id="1" name=""/>
-        <p:cNvGrpSpPr/>
-        <p:nvPr/>
-      </p:nvGrpSpPr>
-      <p:grpSpPr>
-        <a:xfrm>
-          <a:off x="0" y="0"/>
-          <a:ext cx="0" cy="0"/>
-          <a:chOff x="0" y="0"/>
-          <a:chExt cx="0" cy="0"/>
-        </a:xfrm>
-      </p:grpSpPr>
-      <p:sp>
-        <p:nvSpPr>
-          <p:cNvPr id="2" name="Title 1">
-            <a:extLst>
-              <a:ext uri="{FF2B5EF4-FFF2-40B4-BE49-F238E27FC236}">
-                <a16:creationId xmlns:a16="http://schemas.microsoft.com/office/drawing/2014/main" id="{9A9C3CDF-42EB-4159-85AF-04E406FD511F}"/>
-              </a:ext>
-            </a:extLst>
-          </p:cNvPr>
-          <p:cNvSpPr>
-            <a:spLocks noGrp="1"/>
-          </p:cNvSpPr>
-          <p:nvPr>
-            <p:ph type="title"/>
-          </p:nvPr>
-        </p:nvSpPr>
-        <p:spPr/>
-        <p:txBody>
-          <a:bodyPr/>
-          <a:lstStyle/>
-          <a:p>
-            <a:r>
-              <a:rPr lang="en-GB" dirty="0"/>
-              <a:t>Where does status fit in?</a:t>
-            </a:r>
-          </a:p>
-        </p:txBody>
-      </p:sp>
-      <p:sp>
-        <p:nvSpPr>
-          <p:cNvPr id="3" name="Content Placeholder 2">
-            <a:extLst>
-              <a:ext uri="{FF2B5EF4-FFF2-40B4-BE49-F238E27FC236}">
-                <a16:creationId xmlns:a16="http://schemas.microsoft.com/office/drawing/2014/main" id="{12ACA305-4662-4E70-8B58-1DE02FD84E67}"/>
-              </a:ext>
-            </a:extLst>
-          </p:cNvPr>
-          <p:cNvSpPr>
-            <a:spLocks noGrp="1"/>
-          </p:cNvSpPr>
-          <p:nvPr>
-            <p:ph idx="1"/>
-          </p:nvPr>
-        </p:nvSpPr>
-        <p:spPr/>
-        <p:txBody>
-          <a:bodyPr>
-            <a:normAutofit fontScale="92500" lnSpcReduction="20000"/>
-          </a:bodyPr>
-          <a:lstStyle/>
-          <a:p>
-            <a:r>
-              <a:rPr lang="en-GB" dirty="0"/>
-              <a:t>Consider a PhD student, a professional boxer and a banker – all have different considerations of wealth and status</a:t>
-            </a:r>
-          </a:p>
-          <a:p>
-            <a:r>
-              <a:rPr lang="en-GB" dirty="0"/>
-              <a:t>Higher status for all of them would mean different things but their financial decisions would be determined by the same notion of wealth – let’s call it material status</a:t>
-            </a:r>
-          </a:p>
-          <a:p>
-            <a:r>
-              <a:rPr lang="en-GB" dirty="0"/>
-              <a:t>The real probability of the ownership of the same material status varies significantly across the three professionals</a:t>
-            </a:r>
-          </a:p>
-          <a:p>
-            <a:r>
-              <a:rPr lang="en-GB" dirty="0"/>
-              <a:t>Status is a subjective perception of the real probability of wealth transition </a:t>
-            </a:r>
-          </a:p>
-          <a:p>
-            <a:r>
-              <a:rPr lang="en-GB" dirty="0"/>
-              <a:t>A utility function that formalises the preferences of the three professionals, would allow them to assign different weights to the probability of wealth gain in the real world </a:t>
-            </a:r>
-          </a:p>
-          <a:p>
-            <a:r>
-              <a:rPr lang="en-GB" dirty="0"/>
-              <a:t>Usually one needs to make the subjective probabilities coherent for analysis</a:t>
-            </a:r>
-          </a:p>
-          <a:p>
-            <a:endParaRPr lang="en-GB" dirty="0"/>
-          </a:p>
-        </p:txBody>
-      </p:sp>
-      <p:sp>
-        <p:nvSpPr>
-          <p:cNvPr id="4" name="Slide Number Placeholder 3">
-            <a:extLst>
-              <a:ext uri="{FF2B5EF4-FFF2-40B4-BE49-F238E27FC236}">
-                <a16:creationId xmlns:a16="http://schemas.microsoft.com/office/drawing/2014/main" id="{7A99688F-80A2-4F60-A3D1-E064E4DB8076}"/>
-              </a:ext>
-            </a:extLst>
-          </p:cNvPr>
-          <p:cNvSpPr>
-            <a:spLocks noGrp="1"/>
-          </p:cNvSpPr>
-          <p:nvPr>
-            <p:ph type="sldNum" sz="quarter" idx="12"/>
-          </p:nvPr>
-        </p:nvSpPr>
-        <p:spPr/>
-        <p:txBody>
-          <a:bodyPr/>
-          <a:lstStyle/>
-          <a:p>
-            <a:pPr>
-              <a:defRPr/>
-            </a:pPr>
-            <a:fld id="{8E35B453-7314-4BBD-9303-11C6BECC4B0D}" type="slidenum">
-              <a:rPr lang="en-GB" altLang="en-US" smtClean="0"/>
-              <a:pPr>
-                <a:defRPr/>
-              </a:pPr>
-              <a:t>9</a:t>
-            </a:fld>
-            <a:endParaRPr lang="en-GB" altLang="en-US" dirty="0"/>
-          </a:p>
-        </p:txBody>
-      </p:sp>
-    </p:spTree>
-    <p:extLst>
-      <p:ext uri="{BB962C8B-B14F-4D97-AF65-F5344CB8AC3E}">
-        <p14:creationId xmlns:p14="http://schemas.microsoft.com/office/powerpoint/2010/main" val="2674083863"/>
       </p:ext>
     </p:extLst>
   </p:cSld>

</xml_diff>

<commit_message>
Modifying slides with discounting rates intro.
</commit_message>
<xml_diff>
--- a/consumption/presentationFeb2020.pptx
+++ b/consumption/presentationFeb2020.pptx
@@ -6,63 +6,64 @@
     <p:sldMasterId id="2147483669" r:id="rId2"/>
   </p:sldMasterIdLst>
   <p:notesMasterIdLst>
-    <p:notesMasterId r:id="rId19"/>
+    <p:notesMasterId r:id="rId20"/>
   </p:notesMasterIdLst>
   <p:handoutMasterIdLst>
-    <p:handoutMasterId r:id="rId20"/>
+    <p:handoutMasterId r:id="rId21"/>
   </p:handoutMasterIdLst>
   <p:sldIdLst>
     <p:sldId id="301" r:id="rId3"/>
     <p:sldId id="302" r:id="rId4"/>
-    <p:sldId id="315" r:id="rId5"/>
-    <p:sldId id="316" r:id="rId6"/>
-    <p:sldId id="317" r:id="rId7"/>
-    <p:sldId id="330" r:id="rId8"/>
-    <p:sldId id="326" r:id="rId9"/>
-    <p:sldId id="319" r:id="rId10"/>
-    <p:sldId id="327" r:id="rId11"/>
-    <p:sldId id="322" r:id="rId12"/>
-    <p:sldId id="324" r:id="rId13"/>
-    <p:sldId id="331" r:id="rId14"/>
-    <p:sldId id="328" r:id="rId15"/>
-    <p:sldId id="329" r:id="rId16"/>
-    <p:sldId id="325" r:id="rId17"/>
-    <p:sldId id="320" r:id="rId18"/>
+    <p:sldId id="332" r:id="rId5"/>
+    <p:sldId id="315" r:id="rId6"/>
+    <p:sldId id="316" r:id="rId7"/>
+    <p:sldId id="317" r:id="rId8"/>
+    <p:sldId id="330" r:id="rId9"/>
+    <p:sldId id="326" r:id="rId10"/>
+    <p:sldId id="322" r:id="rId11"/>
+    <p:sldId id="319" r:id="rId12"/>
+    <p:sldId id="327" r:id="rId13"/>
+    <p:sldId id="324" r:id="rId14"/>
+    <p:sldId id="331" r:id="rId15"/>
+    <p:sldId id="328" r:id="rId16"/>
+    <p:sldId id="329" r:id="rId17"/>
+    <p:sldId id="325" r:id="rId18"/>
+    <p:sldId id="320" r:id="rId19"/>
   </p:sldIdLst>
   <p:sldSz cx="9144000" cy="5143500" type="screen16x9"/>
   <p:notesSz cx="6718300" cy="9867900"/>
   <p:embeddedFontLst>
     <p:embeddedFont>
       <p:font typeface="Calibri" panose="020F0502020204030204" pitchFamily="34" charset="0"/>
-      <p:regular r:id="rId21"/>
-      <p:bold r:id="rId22"/>
-      <p:italic r:id="rId23"/>
-      <p:boldItalic r:id="rId24"/>
+      <p:regular r:id="rId22"/>
+      <p:bold r:id="rId23"/>
+      <p:italic r:id="rId24"/>
+      <p:boldItalic r:id="rId25"/>
     </p:embeddedFont>
     <p:embeddedFont>
       <p:font typeface="Calibri Light" panose="020F0302020204030204" pitchFamily="34" charset="0"/>
-      <p:regular r:id="rId25"/>
-      <p:italic r:id="rId26"/>
+      <p:regular r:id="rId26"/>
+      <p:italic r:id="rId27"/>
     </p:embeddedFont>
     <p:embeddedFont>
       <p:font typeface="Cambria Math" panose="02040503050406030204" pitchFamily="18" charset="0"/>
-      <p:regular r:id="rId27"/>
+      <p:regular r:id="rId28"/>
     </p:embeddedFont>
     <p:embeddedFont>
       <p:font typeface="Effra" panose="020B0604020202020204" charset="0"/>
-      <p:regular r:id="rId28"/>
-      <p:bold r:id="rId29"/>
-      <p:italic r:id="rId30"/>
-      <p:boldItalic r:id="rId31"/>
+      <p:regular r:id="rId29"/>
+      <p:bold r:id="rId30"/>
+      <p:italic r:id="rId31"/>
+      <p:boldItalic r:id="rId32"/>
     </p:embeddedFont>
     <p:embeddedFont>
       <p:font typeface="Effra Bold" panose="020B0604020202020204" charset="0"/>
-      <p:bold r:id="rId32"/>
+      <p:bold r:id="rId33"/>
     </p:embeddedFont>
     <p:embeddedFont>
       <p:font typeface="Effra Light" panose="020B0604020202020204" charset="0"/>
-      <p:regular r:id="rId33"/>
-      <p:italic r:id="rId34"/>
+      <p:regular r:id="rId34"/>
+      <p:italic r:id="rId35"/>
     </p:embeddedFont>
   </p:embeddedFontLst>
   <p:defaultTextStyle>
@@ -7489,7 +7490,7 @@
               <a:pPr>
                 <a:defRPr/>
               </a:pPr>
-              <a:t>2/11/2020</a:t>
+              <a:t>2/12/2020</a:t>
             </a:fld>
             <a:endParaRPr lang="en-US" altLang="en-US"/>
           </a:p>
@@ -7930,7 +7931,7 @@
               <a:pPr>
                 <a:defRPr/>
               </a:pPr>
-              <a:t>2/11/2020</a:t>
+              <a:t>2/12/2020</a:t>
             </a:fld>
             <a:endParaRPr lang="en-US" altLang="en-US"/>
           </a:p>
@@ -8161,7 +8162,7 @@
               <a:pPr>
                 <a:defRPr/>
               </a:pPr>
-              <a:t>2/11/2020</a:t>
+              <a:t>2/12/2020</a:t>
             </a:fld>
             <a:endParaRPr lang="en-US" altLang="en-US"/>
           </a:p>
@@ -8360,7 +8361,7 @@
               <a:pPr>
                 <a:defRPr/>
               </a:pPr>
-              <a:t>2/11/2020</a:t>
+              <a:t>2/12/2020</a:t>
             </a:fld>
             <a:endParaRPr lang="en-US"/>
           </a:p>
@@ -8635,7 +8636,7 @@
               <a:pPr>
                 <a:defRPr/>
               </a:pPr>
-              <a:t>2/11/2020</a:t>
+              <a:t>2/12/2020</a:t>
             </a:fld>
             <a:endParaRPr lang="en-US"/>
           </a:p>
@@ -8895,7 +8896,7 @@
               <a:pPr>
                 <a:defRPr/>
               </a:pPr>
-              <a:t>2/11/2020</a:t>
+              <a:t>2/12/2020</a:t>
             </a:fld>
             <a:endParaRPr lang="en-US" altLang="en-US"/>
           </a:p>
@@ -9290,7 +9291,7 @@
               <a:pPr>
                 <a:defRPr/>
               </a:pPr>
-              <a:t>2/11/2020</a:t>
+              <a:t>2/12/2020</a:t>
             </a:fld>
             <a:endParaRPr lang="en-US"/>
           </a:p>
@@ -9438,7 +9439,7 @@
               <a:pPr>
                 <a:defRPr/>
               </a:pPr>
-              <a:t>2/11/2020</a:t>
+              <a:t>2/12/2020</a:t>
             </a:fld>
             <a:endParaRPr lang="en-US"/>
           </a:p>
@@ -9564,7 +9565,7 @@
               <a:pPr>
                 <a:defRPr/>
               </a:pPr>
-              <a:t>2/11/2020</a:t>
+              <a:t>2/12/2020</a:t>
             </a:fld>
             <a:endParaRPr lang="en-US"/>
           </a:p>
@@ -9870,7 +9871,7 @@
               <a:pPr>
                 <a:defRPr/>
               </a:pPr>
-              <a:t>2/11/2020</a:t>
+              <a:t>2/12/2020</a:t>
             </a:fld>
             <a:endParaRPr lang="en-US"/>
           </a:p>
@@ -10154,7 +10155,7 @@
               <a:pPr>
                 <a:defRPr/>
               </a:pPr>
-              <a:t>2/11/2020</a:t>
+              <a:t>2/12/2020</a:t>
             </a:fld>
             <a:endParaRPr lang="en-US"/>
           </a:p>
@@ -11592,7 +11593,7 @@
               <a:pPr>
                 <a:defRPr/>
               </a:pPr>
-              <a:t>2/11/2020</a:t>
+              <a:t>2/12/2020</a:t>
             </a:fld>
             <a:endParaRPr lang="en-US"/>
           </a:p>
@@ -11801,7 +11802,7 @@
               <a:pPr>
                 <a:defRPr/>
               </a:pPr>
-              <a:t>2/11/2020</a:t>
+              <a:t>2/12/2020</a:t>
             </a:fld>
             <a:endParaRPr lang="en-US"/>
           </a:p>
@@ -16202,7 +16203,7 @@
               <a:pPr>
                 <a:defRPr/>
               </a:pPr>
-              <a:t>2/11/2020</a:t>
+              <a:t>2/12/2020</a:t>
             </a:fld>
             <a:endParaRPr lang="en-US"/>
           </a:p>
@@ -17037,7 +17038,7 @@
           <p:cNvPr id="2" name="Title 1">
             <a:extLst>
               <a:ext uri="{FF2B5EF4-FFF2-40B4-BE49-F238E27FC236}">
-                <a16:creationId xmlns:a16="http://schemas.microsoft.com/office/drawing/2014/main" id="{9A9C3CDF-42EB-4159-85AF-04E406FD511F}"/>
+                <a16:creationId xmlns:a16="http://schemas.microsoft.com/office/drawing/2014/main" id="{F4EA49FF-94AB-43BE-955A-70AC549908A8}"/>
               </a:ext>
             </a:extLst>
           </p:cNvPr>
@@ -17055,7 +17056,7 @@
           <a:p>
             <a:r>
               <a:rPr lang="en-GB" dirty="0"/>
-              <a:t>Where does status fit in?</a:t>
+              <a:t>Intertemporal substitution</a:t>
             </a:r>
           </a:p>
         </p:txBody>
@@ -17065,7 +17066,7 @@
           <p:cNvPr id="3" name="Content Placeholder 2">
             <a:extLst>
               <a:ext uri="{FF2B5EF4-FFF2-40B4-BE49-F238E27FC236}">
-                <a16:creationId xmlns:a16="http://schemas.microsoft.com/office/drawing/2014/main" id="{12ACA305-4662-4E70-8B58-1DE02FD84E67}"/>
+                <a16:creationId xmlns:a16="http://schemas.microsoft.com/office/drawing/2014/main" id="{0FEC4E67-8473-48DA-B844-1CF82984ECA1}"/>
               </a:ext>
             </a:extLst>
           </p:cNvPr>
@@ -17076,50 +17077,68 @@
             <p:ph idx="1"/>
           </p:nvPr>
         </p:nvSpPr>
-        <p:spPr/>
+        <p:spPr>
+          <a:xfrm>
+            <a:off x="533400" y="1047750"/>
+            <a:ext cx="7886700" cy="3660775"/>
+          </a:xfrm>
+        </p:spPr>
         <p:txBody>
           <a:bodyPr>
-            <a:normAutofit fontScale="92500" lnSpcReduction="20000"/>
+            <a:normAutofit fontScale="92500"/>
           </a:bodyPr>
           <a:lstStyle/>
           <a:p>
             <a:r>
               <a:rPr lang="en-GB" dirty="0"/>
-              <a:t>Consider a PhD student, a professional boxer and a banker – all have different considerations of wealth and status</a:t>
+              <a:t>PIH relies on smoothening of income i.e. those with volatile incomes tend to limit (lower permanent income). </a:t>
             </a:r>
           </a:p>
           <a:p>
             <a:r>
               <a:rPr lang="en-GB" dirty="0"/>
-              <a:t>Higher status for all of them would mean different things but their financial decisions would be determined by the same notion of wealth – let’s call it material status</a:t>
-            </a:r>
-          </a:p>
-          <a:p>
+              <a:t>However, PIH looks only at monetary risks – while status encompasses other risks. Consumer confidence is subject to other risks – so while PIH may generally be true, it is possible that consumers go against the usual direction</a:t>
+            </a:r>
+          </a:p>
+          <a:p>
+            <a:pPr lvl="1"/>
             <a:r>
               <a:rPr lang="en-GB" dirty="0"/>
-              <a:t>The real probability of the ownership of the same material status varies significantly across the three professionals</a:t>
-            </a:r>
-          </a:p>
-          <a:p>
+              <a:t>Sb with less income stability may believe in a possibility (unrealistic) of a windfall </a:t>
+            </a:r>
+          </a:p>
+          <a:p>
+            <a:pPr lvl="1"/>
             <a:r>
               <a:rPr lang="en-GB" dirty="0"/>
-              <a:t>Status is a subjective perception of the real probability of wealth transition </a:t>
+              <a:t>Sb with high income stability may be fearful of a downturn (unrealistic)</a:t>
             </a:r>
           </a:p>
           <a:p>
             <a:r>
               <a:rPr lang="en-GB" dirty="0"/>
-              <a:t>A utility function that formalises the preferences of the three professionals, would allow them to assign different weights to the probability of wealth gain in the real world </a:t>
+              <a:t>A probabilistic model for status – which allows the consumer to overspend on short-term quality - should allow the behaviours in both directions</a:t>
             </a:r>
           </a:p>
           <a:p>
             <a:r>
               <a:rPr lang="en-GB" dirty="0"/>
-              <a:t>Usually one needs to make the subjective probabilities coherent for analysis</a:t>
-            </a:r>
-          </a:p>
-          <a:p>
-            <a:endParaRPr lang="en-GB" dirty="0"/>
+              <a:t>Questions: </a:t>
+            </a:r>
+          </a:p>
+          <a:p>
+            <a:pPr lvl="1"/>
+            <a:r>
+              <a:rPr lang="en-GB" dirty="0"/>
+              <a:t>Can this fit into the intertemporal substitution framework? </a:t>
+            </a:r>
+          </a:p>
+          <a:p>
+            <a:pPr lvl="1"/>
+            <a:r>
+              <a:rPr lang="en-GB" dirty="0"/>
+              <a:t>How can one model the effects of non-monetary wealth?</a:t>
+            </a:r>
           </a:p>
         </p:txBody>
       </p:sp>
@@ -17128,7 +17147,7 @@
           <p:cNvPr id="4" name="Slide Number Placeholder 3">
             <a:extLst>
               <a:ext uri="{FF2B5EF4-FFF2-40B4-BE49-F238E27FC236}">
-                <a16:creationId xmlns:a16="http://schemas.microsoft.com/office/drawing/2014/main" id="{7A99688F-80A2-4F60-A3D1-E064E4DB8076}"/>
+                <a16:creationId xmlns:a16="http://schemas.microsoft.com/office/drawing/2014/main" id="{0011EE81-FFB1-444B-B700-32CA442F0549}"/>
               </a:ext>
             </a:extLst>
           </p:cNvPr>
@@ -17161,7 +17180,7 @@
     </p:spTree>
     <p:extLst>
       <p:ext uri="{BB962C8B-B14F-4D97-AF65-F5344CB8AC3E}">
-        <p14:creationId xmlns:p14="http://schemas.microsoft.com/office/powerpoint/2010/main" val="2674083863"/>
+        <p14:creationId xmlns:p14="http://schemas.microsoft.com/office/powerpoint/2010/main" val="3951174204"/>
       </p:ext>
     </p:extLst>
   </p:cSld>
@@ -17175,6 +17194,2211 @@
 </file>
 
 <file path=ppt/slides/slide11.xml><?xml version="1.0" encoding="utf-8"?>
+<p:sld xmlns:a="http://schemas.openxmlformats.org/drawingml/2006/main" xmlns:r="http://schemas.openxmlformats.org/officeDocument/2006/relationships" xmlns:p="http://schemas.openxmlformats.org/presentationml/2006/main">
+  <p:cSld>
+    <p:spTree>
+      <p:nvGrpSpPr>
+        <p:cNvPr id="1" name=""/>
+        <p:cNvGrpSpPr/>
+        <p:nvPr/>
+      </p:nvGrpSpPr>
+      <p:grpSpPr>
+        <a:xfrm>
+          <a:off x="0" y="0"/>
+          <a:ext cx="0" cy="0"/>
+          <a:chOff x="0" y="0"/>
+          <a:chExt cx="0" cy="0"/>
+        </a:xfrm>
+      </p:grpSpPr>
+      <p:sp>
+        <p:nvSpPr>
+          <p:cNvPr id="2" name="Title 1">
+            <a:extLst>
+              <a:ext uri="{FF2B5EF4-FFF2-40B4-BE49-F238E27FC236}">
+                <a16:creationId xmlns:a16="http://schemas.microsoft.com/office/drawing/2014/main" id="{B238D6EA-A658-4479-A37B-FE625FD139E9}"/>
+              </a:ext>
+            </a:extLst>
+          </p:cNvPr>
+          <p:cNvSpPr>
+            <a:spLocks noGrp="1"/>
+          </p:cNvSpPr>
+          <p:nvPr>
+            <p:ph type="title"/>
+          </p:nvPr>
+        </p:nvSpPr>
+        <p:spPr/>
+        <p:txBody>
+          <a:bodyPr/>
+          <a:lstStyle/>
+          <a:p>
+            <a:r>
+              <a:rPr lang="en-GB" dirty="0"/>
+              <a:t>Intertemporal substitution and discounting</a:t>
+            </a:r>
+          </a:p>
+        </p:txBody>
+      </p:sp>
+      <p:sp>
+        <p:nvSpPr>
+          <p:cNvPr id="3" name="Content Placeholder 2">
+            <a:extLst>
+              <a:ext uri="{FF2B5EF4-FFF2-40B4-BE49-F238E27FC236}">
+                <a16:creationId xmlns:a16="http://schemas.microsoft.com/office/drawing/2014/main" id="{DDC6CB51-E049-4B31-96C0-5896D9AB9B7E}"/>
+              </a:ext>
+            </a:extLst>
+          </p:cNvPr>
+          <p:cNvSpPr>
+            <a:spLocks noGrp="1"/>
+          </p:cNvSpPr>
+          <p:nvPr>
+            <p:ph idx="1"/>
+          </p:nvPr>
+        </p:nvSpPr>
+        <p:spPr>
+          <a:xfrm>
+            <a:off x="628650" y="1370013"/>
+            <a:ext cx="3867150" cy="3262312"/>
+          </a:xfrm>
+        </p:spPr>
+        <p:txBody>
+          <a:bodyPr>
+            <a:normAutofit fontScale="77500" lnSpcReduction="20000"/>
+          </a:bodyPr>
+          <a:lstStyle/>
+          <a:p>
+            <a:r>
+              <a:rPr lang="en-GB" dirty="0"/>
+              <a:t>Recall that Intertemporal substitution setting is one where the consumer can either choose to consume now or accumulate in the future</a:t>
+            </a:r>
+          </a:p>
+          <a:p>
+            <a:r>
+              <a:rPr lang="en-GB" dirty="0"/>
+              <a:t>The framework is often applied on data from savings, interest rate and consumption. The Euler Equations used in the model can be used to test hypotheses such as the random walk or PIH (see Deaton[1])</a:t>
+            </a:r>
+          </a:p>
+          <a:p>
+            <a:r>
+              <a:rPr lang="en-GB" dirty="0"/>
+              <a:t>The diagram shows how the players in our game would evaluate their subjective net worth based on evaluation of a prospect - which is the doubling of wealth (more generally the target wealth or asset level)</a:t>
+            </a:r>
+          </a:p>
+          <a:p>
+            <a:endParaRPr lang="en-GB" dirty="0"/>
+          </a:p>
+          <a:p>
+            <a:endParaRPr lang="en-GB" dirty="0"/>
+          </a:p>
+        </p:txBody>
+      </p:sp>
+      <p:sp>
+        <p:nvSpPr>
+          <p:cNvPr id="4" name="Slide Number Placeholder 3">
+            <a:extLst>
+              <a:ext uri="{FF2B5EF4-FFF2-40B4-BE49-F238E27FC236}">
+                <a16:creationId xmlns:a16="http://schemas.microsoft.com/office/drawing/2014/main" id="{BCC62E85-D1E5-48B1-967D-204D65DC685B}"/>
+              </a:ext>
+            </a:extLst>
+          </p:cNvPr>
+          <p:cNvSpPr>
+            <a:spLocks noGrp="1"/>
+          </p:cNvSpPr>
+          <p:nvPr>
+            <p:ph type="sldNum" sz="quarter" idx="12"/>
+          </p:nvPr>
+        </p:nvSpPr>
+        <p:spPr/>
+        <p:txBody>
+          <a:bodyPr/>
+          <a:lstStyle/>
+          <a:p>
+            <a:pPr>
+              <a:defRPr/>
+            </a:pPr>
+            <a:fld id="{8E35B453-7314-4BBD-9303-11C6BECC4B0D}" type="slidenum">
+              <a:rPr lang="en-GB" altLang="en-US" smtClean="0"/>
+              <a:pPr>
+                <a:defRPr/>
+              </a:pPr>
+              <a:t>11</a:t>
+            </a:fld>
+            <a:endParaRPr lang="en-GB" altLang="en-US" dirty="0"/>
+          </a:p>
+        </p:txBody>
+      </p:sp>
+      <mc:AlternateContent xmlns:mc="http://schemas.openxmlformats.org/markup-compatibility/2006">
+        <mc:Choice xmlns:a14="http://schemas.microsoft.com/office/drawing/2010/main" Requires="a14">
+          <p:sp>
+            <p:nvSpPr>
+              <p:cNvPr id="5" name="Oval 4">
+                <a:extLst>
+                  <a:ext uri="{FF2B5EF4-FFF2-40B4-BE49-F238E27FC236}">
+                    <a16:creationId xmlns:a16="http://schemas.microsoft.com/office/drawing/2014/main" id="{F32F1FC3-12E3-49B5-8A65-7432224DD232}"/>
+                  </a:ext>
+                </a:extLst>
+              </p:cNvPr>
+              <p:cNvSpPr/>
+              <p:nvPr/>
+            </p:nvSpPr>
+            <p:spPr>
+              <a:xfrm>
+                <a:off x="5335563" y="2922102"/>
+                <a:ext cx="335650" cy="345217"/>
+              </a:xfrm>
+              <a:prstGeom prst="ellipse">
+                <a:avLst/>
+              </a:prstGeom>
+            </p:spPr>
+            <p:style>
+              <a:lnRef idx="2">
+                <a:schemeClr val="dk1"/>
+              </a:lnRef>
+              <a:fillRef idx="1">
+                <a:schemeClr val="lt1"/>
+              </a:fillRef>
+              <a:effectRef idx="0">
+                <a:schemeClr val="dk1"/>
+              </a:effectRef>
+              <a:fontRef idx="minor">
+                <a:schemeClr val="dk1"/>
+              </a:fontRef>
+            </p:style>
+            <p:txBody>
+              <a:bodyPr rtlCol="0" anchor="ctr"/>
+              <a:lstStyle/>
+              <a:p>
+                <a:pPr algn="ctr"/>
+                <a14:m>
+                  <m:oMathPara xmlns:m="http://schemas.openxmlformats.org/officeDocument/2006/math">
+                    <m:oMathParaPr>
+                      <m:jc m:val="centerGroup"/>
+                    </m:oMathParaPr>
+                    <m:oMath xmlns:m="http://schemas.openxmlformats.org/officeDocument/2006/math">
+                      <m:f>
+                        <m:fPr>
+                          <m:ctrlPr>
+                            <a:rPr lang="en-GB" sz="1200" i="1">
+                              <a:latin typeface="Cambria Math" panose="02040503050406030204" pitchFamily="18" charset="0"/>
+                            </a:rPr>
+                          </m:ctrlPr>
+                        </m:fPr>
+                        <m:num>
+                          <m:r>
+                            <a:rPr lang="en-GB" sz="1200" i="1">
+                              <a:latin typeface="Cambria Math" panose="02040503050406030204" pitchFamily="18" charset="0"/>
+                            </a:rPr>
+                            <m:t>𝐴</m:t>
+                          </m:r>
+                        </m:num>
+                        <m:den>
+                          <m:r>
+                            <a:rPr lang="en-GB" sz="1200" i="1">
+                              <a:latin typeface="Cambria Math" panose="02040503050406030204" pitchFamily="18" charset="0"/>
+                            </a:rPr>
+                            <m:t>2</m:t>
+                          </m:r>
+                        </m:den>
+                      </m:f>
+                    </m:oMath>
+                  </m:oMathPara>
+                </a14:m>
+                <a:endParaRPr lang="en-GB" sz="1200" dirty="0"/>
+              </a:p>
+            </p:txBody>
+          </p:sp>
+        </mc:Choice>
+        <mc:Fallback>
+          <p:sp>
+            <p:nvSpPr>
+              <p:cNvPr id="5" name="Oval 4">
+                <a:extLst>
+                  <a:ext uri="{FF2B5EF4-FFF2-40B4-BE49-F238E27FC236}">
+                    <a16:creationId xmlns:a16="http://schemas.microsoft.com/office/drawing/2014/main" id="{F32F1FC3-12E3-49B5-8A65-7432224DD232}"/>
+                  </a:ext>
+                </a:extLst>
+              </p:cNvPr>
+              <p:cNvSpPr>
+                <a:spLocks noRot="1" noChangeAspect="1" noMove="1" noResize="1" noEditPoints="1" noAdjustHandles="1" noChangeArrowheads="1" noChangeShapeType="1" noTextEdit="1"/>
+              </p:cNvSpPr>
+              <p:nvPr/>
+            </p:nvSpPr>
+            <p:spPr>
+              <a:xfrm>
+                <a:off x="5335563" y="2922102"/>
+                <a:ext cx="335650" cy="345217"/>
+              </a:xfrm>
+              <a:prstGeom prst="ellipse">
+                <a:avLst/>
+              </a:prstGeom>
+              <a:blipFill>
+                <a:blip r:embed="rId2"/>
+                <a:stretch>
+                  <a:fillRect b="-13559"/>
+                </a:stretch>
+              </a:blipFill>
+            </p:spPr>
+            <p:txBody>
+              <a:bodyPr/>
+              <a:lstStyle/>
+              <a:p>
+                <a:r>
+                  <a:rPr lang="en-GB">
+                    <a:noFill/>
+                  </a:rPr>
+                  <a:t> </a:t>
+                </a:r>
+              </a:p>
+            </p:txBody>
+          </p:sp>
+        </mc:Fallback>
+      </mc:AlternateContent>
+      <mc:AlternateContent xmlns:mc="http://schemas.openxmlformats.org/markup-compatibility/2006">
+        <mc:Choice xmlns:a14="http://schemas.microsoft.com/office/drawing/2010/main" Requires="a14">
+          <p:sp>
+            <p:nvSpPr>
+              <p:cNvPr id="7" name="Oval 6">
+                <a:extLst>
+                  <a:ext uri="{FF2B5EF4-FFF2-40B4-BE49-F238E27FC236}">
+                    <a16:creationId xmlns:a16="http://schemas.microsoft.com/office/drawing/2014/main" id="{9E0D4DBE-5773-4BA8-9570-4B8614449730}"/>
+                  </a:ext>
+                </a:extLst>
+              </p:cNvPr>
+              <p:cNvSpPr/>
+              <p:nvPr/>
+            </p:nvSpPr>
+            <p:spPr>
+              <a:xfrm>
+                <a:off x="6705600" y="1959252"/>
+                <a:ext cx="228600" cy="228600"/>
+              </a:xfrm>
+              <a:prstGeom prst="ellipse">
+                <a:avLst/>
+              </a:prstGeom>
+            </p:spPr>
+            <p:style>
+              <a:lnRef idx="2">
+                <a:schemeClr val="dk1"/>
+              </a:lnRef>
+              <a:fillRef idx="1">
+                <a:schemeClr val="lt1"/>
+              </a:fillRef>
+              <a:effectRef idx="0">
+                <a:schemeClr val="dk1"/>
+              </a:effectRef>
+              <a:fontRef idx="minor">
+                <a:schemeClr val="dk1"/>
+              </a:fontRef>
+            </p:style>
+            <p:txBody>
+              <a:bodyPr rtlCol="0" anchor="ctr"/>
+              <a:lstStyle/>
+              <a:p>
+                <a:pPr algn="ctr"/>
+                <a14:m>
+                  <m:oMathPara xmlns:m="http://schemas.openxmlformats.org/officeDocument/2006/math">
+                    <m:oMathParaPr>
+                      <m:jc m:val="centerGroup"/>
+                    </m:oMathParaPr>
+                    <m:oMath xmlns:m="http://schemas.openxmlformats.org/officeDocument/2006/math">
+                      <m:r>
+                        <a:rPr lang="en-GB" sz="1100" i="1">
+                          <a:latin typeface="Cambria Math" panose="02040503050406030204" pitchFamily="18" charset="0"/>
+                        </a:rPr>
+                        <m:t>𝐴</m:t>
+                      </m:r>
+                    </m:oMath>
+                  </m:oMathPara>
+                </a14:m>
+                <a:endParaRPr lang="en-GB" sz="1100" dirty="0"/>
+              </a:p>
+            </p:txBody>
+          </p:sp>
+        </mc:Choice>
+        <mc:Fallback>
+          <p:sp>
+            <p:nvSpPr>
+              <p:cNvPr id="7" name="Oval 6">
+                <a:extLst>
+                  <a:ext uri="{FF2B5EF4-FFF2-40B4-BE49-F238E27FC236}">
+                    <a16:creationId xmlns:a16="http://schemas.microsoft.com/office/drawing/2014/main" id="{9E0D4DBE-5773-4BA8-9570-4B8614449730}"/>
+                  </a:ext>
+                </a:extLst>
+              </p:cNvPr>
+              <p:cNvSpPr>
+                <a:spLocks noRot="1" noChangeAspect="1" noMove="1" noResize="1" noEditPoints="1" noAdjustHandles="1" noChangeArrowheads="1" noChangeShapeType="1" noTextEdit="1"/>
+              </p:cNvSpPr>
+              <p:nvPr/>
+            </p:nvSpPr>
+            <p:spPr>
+              <a:xfrm>
+                <a:off x="6705600" y="1959252"/>
+                <a:ext cx="228600" cy="228600"/>
+              </a:xfrm>
+              <a:prstGeom prst="ellipse">
+                <a:avLst/>
+              </a:prstGeom>
+              <a:blipFill>
+                <a:blip r:embed="rId3"/>
+                <a:stretch>
+                  <a:fillRect/>
+                </a:stretch>
+              </a:blipFill>
+            </p:spPr>
+            <p:txBody>
+              <a:bodyPr/>
+              <a:lstStyle/>
+              <a:p>
+                <a:r>
+                  <a:rPr lang="en-GB">
+                    <a:noFill/>
+                  </a:rPr>
+                  <a:t> </a:t>
+                </a:r>
+              </a:p>
+            </p:txBody>
+          </p:sp>
+        </mc:Fallback>
+      </mc:AlternateContent>
+      <mc:AlternateContent xmlns:mc="http://schemas.openxmlformats.org/markup-compatibility/2006">
+        <mc:Choice xmlns:a14="http://schemas.microsoft.com/office/drawing/2010/main" Requires="a14">
+          <p:sp>
+            <p:nvSpPr>
+              <p:cNvPr id="8" name="Oval 7">
+                <a:extLst>
+                  <a:ext uri="{FF2B5EF4-FFF2-40B4-BE49-F238E27FC236}">
+                    <a16:creationId xmlns:a16="http://schemas.microsoft.com/office/drawing/2014/main" id="{B9F857EC-8018-4699-856A-EFCEED9088CB}"/>
+                  </a:ext>
+                </a:extLst>
+              </p:cNvPr>
+              <p:cNvSpPr/>
+              <p:nvPr/>
+            </p:nvSpPr>
+            <p:spPr>
+              <a:xfrm>
+                <a:off x="6707875" y="2922103"/>
+                <a:ext cx="228600" cy="228600"/>
+              </a:xfrm>
+              <a:prstGeom prst="ellipse">
+                <a:avLst/>
+              </a:prstGeom>
+            </p:spPr>
+            <p:style>
+              <a:lnRef idx="2">
+                <a:schemeClr val="dk1"/>
+              </a:lnRef>
+              <a:fillRef idx="1">
+                <a:schemeClr val="lt1"/>
+              </a:fillRef>
+              <a:effectRef idx="0">
+                <a:schemeClr val="dk1"/>
+              </a:effectRef>
+              <a:fontRef idx="minor">
+                <a:schemeClr val="dk1"/>
+              </a:fontRef>
+            </p:style>
+            <p:txBody>
+              <a:bodyPr rtlCol="0" anchor="ctr"/>
+              <a:lstStyle/>
+              <a:p>
+                <a:pPr algn="ctr"/>
+                <a14:m>
+                  <m:oMathPara xmlns:m="http://schemas.openxmlformats.org/officeDocument/2006/math">
+                    <m:oMathParaPr>
+                      <m:jc m:val="centerGroup"/>
+                    </m:oMathParaPr>
+                    <m:oMath xmlns:m="http://schemas.openxmlformats.org/officeDocument/2006/math">
+                      <m:r>
+                        <a:rPr lang="en-GB" sz="1100" i="1">
+                          <a:latin typeface="Cambria Math" panose="02040503050406030204" pitchFamily="18" charset="0"/>
+                        </a:rPr>
+                        <m:t>𝐴</m:t>
+                      </m:r>
+                    </m:oMath>
+                  </m:oMathPara>
+                </a14:m>
+                <a:endParaRPr lang="en-GB" sz="1100" dirty="0"/>
+              </a:p>
+            </p:txBody>
+          </p:sp>
+        </mc:Choice>
+        <mc:Fallback>
+          <p:sp>
+            <p:nvSpPr>
+              <p:cNvPr id="8" name="Oval 7">
+                <a:extLst>
+                  <a:ext uri="{FF2B5EF4-FFF2-40B4-BE49-F238E27FC236}">
+                    <a16:creationId xmlns:a16="http://schemas.microsoft.com/office/drawing/2014/main" id="{B9F857EC-8018-4699-856A-EFCEED9088CB}"/>
+                  </a:ext>
+                </a:extLst>
+              </p:cNvPr>
+              <p:cNvSpPr>
+                <a:spLocks noRot="1" noChangeAspect="1" noMove="1" noResize="1" noEditPoints="1" noAdjustHandles="1" noChangeArrowheads="1" noChangeShapeType="1" noTextEdit="1"/>
+              </p:cNvSpPr>
+              <p:nvPr/>
+            </p:nvSpPr>
+            <p:spPr>
+              <a:xfrm>
+                <a:off x="6707875" y="2922103"/>
+                <a:ext cx="228600" cy="228600"/>
+              </a:xfrm>
+              <a:prstGeom prst="ellipse">
+                <a:avLst/>
+              </a:prstGeom>
+              <a:blipFill>
+                <a:blip r:embed="rId3"/>
+                <a:stretch>
+                  <a:fillRect/>
+                </a:stretch>
+              </a:blipFill>
+            </p:spPr>
+            <p:txBody>
+              <a:bodyPr/>
+              <a:lstStyle/>
+              <a:p>
+                <a:r>
+                  <a:rPr lang="en-GB">
+                    <a:noFill/>
+                  </a:rPr>
+                  <a:t> </a:t>
+                </a:r>
+              </a:p>
+            </p:txBody>
+          </p:sp>
+        </mc:Fallback>
+      </mc:AlternateContent>
+      <mc:AlternateContent xmlns:mc="http://schemas.openxmlformats.org/markup-compatibility/2006">
+        <mc:Choice xmlns:a14="http://schemas.microsoft.com/office/drawing/2010/main" Requires="a14">
+          <p:sp>
+            <p:nvSpPr>
+              <p:cNvPr id="9" name="Oval 8">
+                <a:extLst>
+                  <a:ext uri="{FF2B5EF4-FFF2-40B4-BE49-F238E27FC236}">
+                    <a16:creationId xmlns:a16="http://schemas.microsoft.com/office/drawing/2014/main" id="{3FD6E31D-88CE-46E1-A478-5B032BEEC39D}"/>
+                  </a:ext>
+                </a:extLst>
+              </p:cNvPr>
+              <p:cNvSpPr/>
+              <p:nvPr/>
+            </p:nvSpPr>
+            <p:spPr>
+              <a:xfrm>
+                <a:off x="5972885" y="2417554"/>
+                <a:ext cx="228601" cy="243366"/>
+              </a:xfrm>
+              <a:prstGeom prst="ellipse">
+                <a:avLst/>
+              </a:prstGeom>
+            </p:spPr>
+            <p:style>
+              <a:lnRef idx="2">
+                <a:schemeClr val="dk1"/>
+              </a:lnRef>
+              <a:fillRef idx="1">
+                <a:schemeClr val="lt1"/>
+              </a:fillRef>
+              <a:effectRef idx="0">
+                <a:schemeClr val="dk1"/>
+              </a:effectRef>
+              <a:fontRef idx="minor">
+                <a:schemeClr val="dk1"/>
+              </a:fontRef>
+            </p:style>
+            <p:txBody>
+              <a:bodyPr rtlCol="0" anchor="ctr"/>
+              <a:lstStyle/>
+              <a:p>
+                <a:pPr algn="ctr"/>
+                <a14:m>
+                  <m:oMathPara xmlns:m="http://schemas.openxmlformats.org/officeDocument/2006/math">
+                    <m:oMathParaPr>
+                      <m:jc m:val="centerGroup"/>
+                    </m:oMathParaPr>
+                    <m:oMath xmlns:m="http://schemas.openxmlformats.org/officeDocument/2006/math">
+                      <m:r>
+                        <a:rPr lang="en-GB" sz="1100" b="0" i="1" smtClean="0">
+                          <a:latin typeface="Cambria Math" panose="02040503050406030204" pitchFamily="18" charset="0"/>
+                        </a:rPr>
+                        <m:t>𝐴</m:t>
+                      </m:r>
+                    </m:oMath>
+                  </m:oMathPara>
+                </a14:m>
+                <a:endParaRPr lang="en-GB" sz="1100" dirty="0"/>
+              </a:p>
+            </p:txBody>
+          </p:sp>
+        </mc:Choice>
+        <mc:Fallback>
+          <p:sp>
+            <p:nvSpPr>
+              <p:cNvPr id="9" name="Oval 8">
+                <a:extLst>
+                  <a:ext uri="{FF2B5EF4-FFF2-40B4-BE49-F238E27FC236}">
+                    <a16:creationId xmlns:a16="http://schemas.microsoft.com/office/drawing/2014/main" id="{3FD6E31D-88CE-46E1-A478-5B032BEEC39D}"/>
+                  </a:ext>
+                </a:extLst>
+              </p:cNvPr>
+              <p:cNvSpPr>
+                <a:spLocks noRot="1" noChangeAspect="1" noMove="1" noResize="1" noEditPoints="1" noAdjustHandles="1" noChangeArrowheads="1" noChangeShapeType="1" noTextEdit="1"/>
+              </p:cNvSpPr>
+              <p:nvPr/>
+            </p:nvSpPr>
+            <p:spPr>
+              <a:xfrm>
+                <a:off x="5972885" y="2417554"/>
+                <a:ext cx="228601" cy="243366"/>
+              </a:xfrm>
+              <a:prstGeom prst="ellipse">
+                <a:avLst/>
+              </a:prstGeom>
+              <a:blipFill>
+                <a:blip r:embed="rId4"/>
+                <a:stretch>
+                  <a:fillRect/>
+                </a:stretch>
+              </a:blipFill>
+            </p:spPr>
+            <p:txBody>
+              <a:bodyPr/>
+              <a:lstStyle/>
+              <a:p>
+                <a:r>
+                  <a:rPr lang="en-GB">
+                    <a:noFill/>
+                  </a:rPr>
+                  <a:t> </a:t>
+                </a:r>
+              </a:p>
+            </p:txBody>
+          </p:sp>
+        </mc:Fallback>
+      </mc:AlternateContent>
+      <mc:AlternateContent xmlns:mc="http://schemas.openxmlformats.org/markup-compatibility/2006">
+        <mc:Choice xmlns:a14="http://schemas.microsoft.com/office/drawing/2010/main" Requires="a14">
+          <p:sp>
+            <p:nvSpPr>
+              <p:cNvPr id="11" name="Oval 10">
+                <a:extLst>
+                  <a:ext uri="{FF2B5EF4-FFF2-40B4-BE49-F238E27FC236}">
+                    <a16:creationId xmlns:a16="http://schemas.microsoft.com/office/drawing/2014/main" id="{A27F8E45-5AE5-442F-AD24-539BFE5B054E}"/>
+                  </a:ext>
+                </a:extLst>
+              </p:cNvPr>
+              <p:cNvSpPr/>
+              <p:nvPr/>
+            </p:nvSpPr>
+            <p:spPr>
+              <a:xfrm>
+                <a:off x="7577493" y="1559956"/>
+                <a:ext cx="228600" cy="228600"/>
+              </a:xfrm>
+              <a:prstGeom prst="ellipse">
+                <a:avLst/>
+              </a:prstGeom>
+            </p:spPr>
+            <p:style>
+              <a:lnRef idx="2">
+                <a:schemeClr val="dk1"/>
+              </a:lnRef>
+              <a:fillRef idx="1">
+                <a:schemeClr val="lt1"/>
+              </a:fillRef>
+              <a:effectRef idx="0">
+                <a:schemeClr val="dk1"/>
+              </a:effectRef>
+              <a:fontRef idx="minor">
+                <a:schemeClr val="dk1"/>
+              </a:fontRef>
+            </p:style>
+            <p:txBody>
+              <a:bodyPr rtlCol="0" anchor="ctr"/>
+              <a:lstStyle/>
+              <a:p>
+                <a:pPr algn="ctr"/>
+                <a14:m>
+                  <m:oMathPara xmlns:m="http://schemas.openxmlformats.org/officeDocument/2006/math">
+                    <m:oMathParaPr>
+                      <m:jc m:val="centerGroup"/>
+                    </m:oMathParaPr>
+                    <m:oMath xmlns:m="http://schemas.openxmlformats.org/officeDocument/2006/math">
+                      <m:r>
+                        <a:rPr lang="en-GB" sz="1100" i="1">
+                          <a:latin typeface="Cambria Math" panose="02040503050406030204" pitchFamily="18" charset="0"/>
+                        </a:rPr>
+                        <m:t>𝐴</m:t>
+                      </m:r>
+                    </m:oMath>
+                  </m:oMathPara>
+                </a14:m>
+                <a:endParaRPr lang="en-GB" sz="1100" dirty="0"/>
+              </a:p>
+            </p:txBody>
+          </p:sp>
+        </mc:Choice>
+        <mc:Fallback>
+          <p:sp>
+            <p:nvSpPr>
+              <p:cNvPr id="11" name="Oval 10">
+                <a:extLst>
+                  <a:ext uri="{FF2B5EF4-FFF2-40B4-BE49-F238E27FC236}">
+                    <a16:creationId xmlns:a16="http://schemas.microsoft.com/office/drawing/2014/main" id="{A27F8E45-5AE5-442F-AD24-539BFE5B054E}"/>
+                  </a:ext>
+                </a:extLst>
+              </p:cNvPr>
+              <p:cNvSpPr>
+                <a:spLocks noRot="1" noChangeAspect="1" noMove="1" noResize="1" noEditPoints="1" noAdjustHandles="1" noChangeArrowheads="1" noChangeShapeType="1" noTextEdit="1"/>
+              </p:cNvSpPr>
+              <p:nvPr/>
+            </p:nvSpPr>
+            <p:spPr>
+              <a:xfrm>
+                <a:off x="7577493" y="1559956"/>
+                <a:ext cx="228600" cy="228600"/>
+              </a:xfrm>
+              <a:prstGeom prst="ellipse">
+                <a:avLst/>
+              </a:prstGeom>
+              <a:blipFill>
+                <a:blip r:embed="rId5"/>
+                <a:stretch>
+                  <a:fillRect/>
+                </a:stretch>
+              </a:blipFill>
+            </p:spPr>
+            <p:txBody>
+              <a:bodyPr/>
+              <a:lstStyle/>
+              <a:p>
+                <a:r>
+                  <a:rPr lang="en-GB">
+                    <a:noFill/>
+                  </a:rPr>
+                  <a:t> </a:t>
+                </a:r>
+              </a:p>
+            </p:txBody>
+          </p:sp>
+        </mc:Fallback>
+      </mc:AlternateContent>
+      <mc:AlternateContent xmlns:mc="http://schemas.openxmlformats.org/markup-compatibility/2006">
+        <mc:Choice xmlns:a14="http://schemas.microsoft.com/office/drawing/2010/main" Requires="a14">
+          <p:sp>
+            <p:nvSpPr>
+              <p:cNvPr id="12" name="Oval 11">
+                <a:extLst>
+                  <a:ext uri="{FF2B5EF4-FFF2-40B4-BE49-F238E27FC236}">
+                    <a16:creationId xmlns:a16="http://schemas.microsoft.com/office/drawing/2014/main" id="{E0F1A8A8-6420-422D-9750-BA77249CB273}"/>
+                  </a:ext>
+                </a:extLst>
+              </p:cNvPr>
+              <p:cNvSpPr/>
+              <p:nvPr/>
+            </p:nvSpPr>
+            <p:spPr>
+              <a:xfrm>
+                <a:off x="7577493" y="2417555"/>
+                <a:ext cx="228600" cy="228600"/>
+              </a:xfrm>
+              <a:prstGeom prst="ellipse">
+                <a:avLst/>
+              </a:prstGeom>
+            </p:spPr>
+            <p:style>
+              <a:lnRef idx="2">
+                <a:schemeClr val="dk1"/>
+              </a:lnRef>
+              <a:fillRef idx="1">
+                <a:schemeClr val="lt1"/>
+              </a:fillRef>
+              <a:effectRef idx="0">
+                <a:schemeClr val="dk1"/>
+              </a:effectRef>
+              <a:fontRef idx="minor">
+                <a:schemeClr val="dk1"/>
+              </a:fontRef>
+            </p:style>
+            <p:txBody>
+              <a:bodyPr rtlCol="0" anchor="ctr"/>
+              <a:lstStyle/>
+              <a:p>
+                <a:pPr algn="ctr"/>
+                <a14:m>
+                  <m:oMathPara xmlns:m="http://schemas.openxmlformats.org/officeDocument/2006/math">
+                    <m:oMathParaPr>
+                      <m:jc m:val="centerGroup"/>
+                    </m:oMathParaPr>
+                    <m:oMath xmlns:m="http://schemas.openxmlformats.org/officeDocument/2006/math">
+                      <m:r>
+                        <a:rPr lang="en-GB" sz="1100" i="1">
+                          <a:latin typeface="Cambria Math" panose="02040503050406030204" pitchFamily="18" charset="0"/>
+                        </a:rPr>
+                        <m:t>𝐴</m:t>
+                      </m:r>
+                    </m:oMath>
+                  </m:oMathPara>
+                </a14:m>
+                <a:endParaRPr lang="en-GB" sz="1100" dirty="0"/>
+              </a:p>
+            </p:txBody>
+          </p:sp>
+        </mc:Choice>
+        <mc:Fallback>
+          <p:sp>
+            <p:nvSpPr>
+              <p:cNvPr id="12" name="Oval 11">
+                <a:extLst>
+                  <a:ext uri="{FF2B5EF4-FFF2-40B4-BE49-F238E27FC236}">
+                    <a16:creationId xmlns:a16="http://schemas.microsoft.com/office/drawing/2014/main" id="{E0F1A8A8-6420-422D-9750-BA77249CB273}"/>
+                  </a:ext>
+                </a:extLst>
+              </p:cNvPr>
+              <p:cNvSpPr>
+                <a:spLocks noRot="1" noChangeAspect="1" noMove="1" noResize="1" noEditPoints="1" noAdjustHandles="1" noChangeArrowheads="1" noChangeShapeType="1" noTextEdit="1"/>
+              </p:cNvSpPr>
+              <p:nvPr/>
+            </p:nvSpPr>
+            <p:spPr>
+              <a:xfrm>
+                <a:off x="7577493" y="2417555"/>
+                <a:ext cx="228600" cy="228600"/>
+              </a:xfrm>
+              <a:prstGeom prst="ellipse">
+                <a:avLst/>
+              </a:prstGeom>
+              <a:blipFill>
+                <a:blip r:embed="rId5"/>
+                <a:stretch>
+                  <a:fillRect/>
+                </a:stretch>
+              </a:blipFill>
+            </p:spPr>
+            <p:txBody>
+              <a:bodyPr/>
+              <a:lstStyle/>
+              <a:p>
+                <a:r>
+                  <a:rPr lang="en-GB">
+                    <a:noFill/>
+                  </a:rPr>
+                  <a:t> </a:t>
+                </a:r>
+              </a:p>
+            </p:txBody>
+          </p:sp>
+        </mc:Fallback>
+      </mc:AlternateContent>
+      <mc:AlternateContent xmlns:mc="http://schemas.openxmlformats.org/markup-compatibility/2006">
+        <mc:Choice xmlns:a14="http://schemas.microsoft.com/office/drawing/2010/main" Requires="a14">
+          <p:sp>
+            <p:nvSpPr>
+              <p:cNvPr id="13" name="Oval 12">
+                <a:extLst>
+                  <a:ext uri="{FF2B5EF4-FFF2-40B4-BE49-F238E27FC236}">
+                    <a16:creationId xmlns:a16="http://schemas.microsoft.com/office/drawing/2014/main" id="{7727B433-85C1-4416-8980-384D0A4F0E96}"/>
+                  </a:ext>
+                </a:extLst>
+              </p:cNvPr>
+              <p:cNvSpPr/>
+              <p:nvPr/>
+            </p:nvSpPr>
+            <p:spPr>
+              <a:xfrm>
+                <a:off x="7576213" y="3400550"/>
+                <a:ext cx="228600" cy="228600"/>
+              </a:xfrm>
+              <a:prstGeom prst="ellipse">
+                <a:avLst/>
+              </a:prstGeom>
+            </p:spPr>
+            <p:style>
+              <a:lnRef idx="2">
+                <a:schemeClr val="dk1"/>
+              </a:lnRef>
+              <a:fillRef idx="1">
+                <a:schemeClr val="lt1"/>
+              </a:fillRef>
+              <a:effectRef idx="0">
+                <a:schemeClr val="dk1"/>
+              </a:effectRef>
+              <a:fontRef idx="minor">
+                <a:schemeClr val="dk1"/>
+              </a:fontRef>
+            </p:style>
+            <p:txBody>
+              <a:bodyPr rtlCol="0" anchor="ctr"/>
+              <a:lstStyle/>
+              <a:p>
+                <a:pPr algn="ctr"/>
+                <a14:m>
+                  <m:oMathPara xmlns:m="http://schemas.openxmlformats.org/officeDocument/2006/math">
+                    <m:oMathParaPr>
+                      <m:jc m:val="centerGroup"/>
+                    </m:oMathParaPr>
+                    <m:oMath xmlns:m="http://schemas.openxmlformats.org/officeDocument/2006/math">
+                      <m:r>
+                        <a:rPr lang="en-GB" sz="1100" i="1">
+                          <a:latin typeface="Cambria Math" panose="02040503050406030204" pitchFamily="18" charset="0"/>
+                        </a:rPr>
+                        <m:t>𝐴</m:t>
+                      </m:r>
+                    </m:oMath>
+                  </m:oMathPara>
+                </a14:m>
+                <a:endParaRPr lang="en-GB" sz="1100" dirty="0"/>
+              </a:p>
+            </p:txBody>
+          </p:sp>
+        </mc:Choice>
+        <mc:Fallback>
+          <p:sp>
+            <p:nvSpPr>
+              <p:cNvPr id="13" name="Oval 12">
+                <a:extLst>
+                  <a:ext uri="{FF2B5EF4-FFF2-40B4-BE49-F238E27FC236}">
+                    <a16:creationId xmlns:a16="http://schemas.microsoft.com/office/drawing/2014/main" id="{7727B433-85C1-4416-8980-384D0A4F0E96}"/>
+                  </a:ext>
+                </a:extLst>
+              </p:cNvPr>
+              <p:cNvSpPr>
+                <a:spLocks noRot="1" noChangeAspect="1" noMove="1" noResize="1" noEditPoints="1" noAdjustHandles="1" noChangeArrowheads="1" noChangeShapeType="1" noTextEdit="1"/>
+              </p:cNvSpPr>
+              <p:nvPr/>
+            </p:nvSpPr>
+            <p:spPr>
+              <a:xfrm>
+                <a:off x="7576213" y="3400550"/>
+                <a:ext cx="228600" cy="228600"/>
+              </a:xfrm>
+              <a:prstGeom prst="ellipse">
+                <a:avLst/>
+              </a:prstGeom>
+              <a:blipFill>
+                <a:blip r:embed="rId6"/>
+                <a:stretch>
+                  <a:fillRect/>
+                </a:stretch>
+              </a:blipFill>
+            </p:spPr>
+            <p:txBody>
+              <a:bodyPr/>
+              <a:lstStyle/>
+              <a:p>
+                <a:r>
+                  <a:rPr lang="en-GB">
+                    <a:noFill/>
+                  </a:rPr>
+                  <a:t> </a:t>
+                </a:r>
+              </a:p>
+            </p:txBody>
+          </p:sp>
+        </mc:Fallback>
+      </mc:AlternateContent>
+      <p:cxnSp>
+        <p:nvCxnSpPr>
+          <p:cNvPr id="16" name="Straight Arrow Connector 15">
+            <a:extLst>
+              <a:ext uri="{FF2B5EF4-FFF2-40B4-BE49-F238E27FC236}">
+                <a16:creationId xmlns:a16="http://schemas.microsoft.com/office/drawing/2014/main" id="{BCCA8AA6-4BA4-4501-8778-650BEE2B77DA}"/>
+              </a:ext>
+            </a:extLst>
+          </p:cNvPr>
+          <p:cNvCxnSpPr>
+            <a:cxnSpLocks/>
+            <a:stCxn id="5" idx="7"/>
+            <a:endCxn id="9" idx="3"/>
+          </p:cNvCxnSpPr>
+          <p:nvPr/>
+        </p:nvCxnSpPr>
+        <p:spPr>
+          <a:xfrm flipV="1">
+            <a:off x="5622058" y="2625280"/>
+            <a:ext cx="384305" cy="347378"/>
+          </a:xfrm>
+          <a:prstGeom prst="straightConnector1">
+            <a:avLst/>
+          </a:prstGeom>
+          <a:ln>
+            <a:tailEnd type="triangle"/>
+          </a:ln>
+        </p:spPr>
+        <p:style>
+          <a:lnRef idx="1">
+            <a:schemeClr val="accent1"/>
+          </a:lnRef>
+          <a:fillRef idx="0">
+            <a:schemeClr val="accent1"/>
+          </a:fillRef>
+          <a:effectRef idx="0">
+            <a:schemeClr val="accent1"/>
+          </a:effectRef>
+          <a:fontRef idx="minor">
+            <a:schemeClr val="tx1"/>
+          </a:fontRef>
+        </p:style>
+      </p:cxnSp>
+      <p:cxnSp>
+        <p:nvCxnSpPr>
+          <p:cNvPr id="21" name="Straight Arrow Connector 20">
+            <a:extLst>
+              <a:ext uri="{FF2B5EF4-FFF2-40B4-BE49-F238E27FC236}">
+                <a16:creationId xmlns:a16="http://schemas.microsoft.com/office/drawing/2014/main" id="{B63AA4F7-0B3B-4DED-9F84-818F2EF52ACE}"/>
+              </a:ext>
+            </a:extLst>
+          </p:cNvPr>
+          <p:cNvCxnSpPr>
+            <a:cxnSpLocks/>
+            <a:stCxn id="9" idx="7"/>
+            <a:endCxn id="7" idx="3"/>
+          </p:cNvCxnSpPr>
+          <p:nvPr/>
+        </p:nvCxnSpPr>
+        <p:spPr>
+          <a:xfrm flipV="1">
+            <a:off x="6168008" y="2154374"/>
+            <a:ext cx="571070" cy="298820"/>
+          </a:xfrm>
+          <a:prstGeom prst="straightConnector1">
+            <a:avLst/>
+          </a:prstGeom>
+          <a:ln>
+            <a:tailEnd type="triangle"/>
+          </a:ln>
+        </p:spPr>
+        <p:style>
+          <a:lnRef idx="1">
+            <a:schemeClr val="accent1"/>
+          </a:lnRef>
+          <a:fillRef idx="0">
+            <a:schemeClr val="accent1"/>
+          </a:fillRef>
+          <a:effectRef idx="0">
+            <a:schemeClr val="accent1"/>
+          </a:effectRef>
+          <a:fontRef idx="minor">
+            <a:schemeClr val="tx1"/>
+          </a:fontRef>
+        </p:style>
+      </p:cxnSp>
+      <p:cxnSp>
+        <p:nvCxnSpPr>
+          <p:cNvPr id="22" name="Straight Arrow Connector 21">
+            <a:extLst>
+              <a:ext uri="{FF2B5EF4-FFF2-40B4-BE49-F238E27FC236}">
+                <a16:creationId xmlns:a16="http://schemas.microsoft.com/office/drawing/2014/main" id="{A0CA272F-875E-4868-B8DD-AED5172932F3}"/>
+              </a:ext>
+            </a:extLst>
+          </p:cNvPr>
+          <p:cNvCxnSpPr>
+            <a:cxnSpLocks/>
+            <a:endCxn id="11" idx="2"/>
+          </p:cNvCxnSpPr>
+          <p:nvPr/>
+        </p:nvCxnSpPr>
+        <p:spPr>
+          <a:xfrm flipV="1">
+            <a:off x="6931569" y="1674256"/>
+            <a:ext cx="645924" cy="344358"/>
+          </a:xfrm>
+          <a:prstGeom prst="straightConnector1">
+            <a:avLst/>
+          </a:prstGeom>
+          <a:ln>
+            <a:tailEnd type="triangle"/>
+          </a:ln>
+        </p:spPr>
+        <p:style>
+          <a:lnRef idx="1">
+            <a:schemeClr val="accent1"/>
+          </a:lnRef>
+          <a:fillRef idx="0">
+            <a:schemeClr val="accent1"/>
+          </a:fillRef>
+          <a:effectRef idx="0">
+            <a:schemeClr val="accent1"/>
+          </a:effectRef>
+          <a:fontRef idx="minor">
+            <a:schemeClr val="tx1"/>
+          </a:fontRef>
+        </p:style>
+      </p:cxnSp>
+      <p:cxnSp>
+        <p:nvCxnSpPr>
+          <p:cNvPr id="23" name="Straight Arrow Connector 22">
+            <a:extLst>
+              <a:ext uri="{FF2B5EF4-FFF2-40B4-BE49-F238E27FC236}">
+                <a16:creationId xmlns:a16="http://schemas.microsoft.com/office/drawing/2014/main" id="{12580060-B82D-485E-8425-E3D59B5283F3}"/>
+              </a:ext>
+            </a:extLst>
+          </p:cNvPr>
+          <p:cNvCxnSpPr>
+            <a:cxnSpLocks/>
+            <a:stCxn id="5" idx="5"/>
+          </p:cNvCxnSpPr>
+          <p:nvPr/>
+        </p:nvCxnSpPr>
+        <p:spPr>
+          <a:xfrm>
+            <a:off x="5622058" y="3216763"/>
+            <a:ext cx="350828" cy="243366"/>
+          </a:xfrm>
+          <a:prstGeom prst="straightConnector1">
+            <a:avLst/>
+          </a:prstGeom>
+          <a:ln>
+            <a:tailEnd type="triangle"/>
+          </a:ln>
+        </p:spPr>
+        <p:style>
+          <a:lnRef idx="1">
+            <a:schemeClr val="accent1"/>
+          </a:lnRef>
+          <a:fillRef idx="0">
+            <a:schemeClr val="accent1"/>
+          </a:fillRef>
+          <a:effectRef idx="0">
+            <a:schemeClr val="accent1"/>
+          </a:effectRef>
+          <a:fontRef idx="minor">
+            <a:schemeClr val="tx1"/>
+          </a:fontRef>
+        </p:style>
+      </p:cxnSp>
+      <p:cxnSp>
+        <p:nvCxnSpPr>
+          <p:cNvPr id="29" name="Straight Arrow Connector 28">
+            <a:extLst>
+              <a:ext uri="{FF2B5EF4-FFF2-40B4-BE49-F238E27FC236}">
+                <a16:creationId xmlns:a16="http://schemas.microsoft.com/office/drawing/2014/main" id="{F209AB14-3A01-4206-824C-C54479C5FB75}"/>
+              </a:ext>
+            </a:extLst>
+          </p:cNvPr>
+          <p:cNvCxnSpPr>
+            <a:cxnSpLocks/>
+            <a:endCxn id="8" idx="1"/>
+          </p:cNvCxnSpPr>
+          <p:nvPr/>
+        </p:nvCxnSpPr>
+        <p:spPr>
+          <a:xfrm>
+            <a:off x="6167371" y="2610364"/>
+            <a:ext cx="573982" cy="345217"/>
+          </a:xfrm>
+          <a:prstGeom prst="straightConnector1">
+            <a:avLst/>
+          </a:prstGeom>
+          <a:ln>
+            <a:tailEnd type="triangle"/>
+          </a:ln>
+        </p:spPr>
+        <p:style>
+          <a:lnRef idx="1">
+            <a:schemeClr val="accent1"/>
+          </a:lnRef>
+          <a:fillRef idx="0">
+            <a:schemeClr val="accent1"/>
+          </a:fillRef>
+          <a:effectRef idx="0">
+            <a:schemeClr val="accent1"/>
+          </a:effectRef>
+          <a:fontRef idx="minor">
+            <a:schemeClr val="tx1"/>
+          </a:fontRef>
+        </p:style>
+      </p:cxnSp>
+      <p:cxnSp>
+        <p:nvCxnSpPr>
+          <p:cNvPr id="30" name="Straight Arrow Connector 29">
+            <a:extLst>
+              <a:ext uri="{FF2B5EF4-FFF2-40B4-BE49-F238E27FC236}">
+                <a16:creationId xmlns:a16="http://schemas.microsoft.com/office/drawing/2014/main" id="{2A69C001-A34A-4A6E-B14E-A029AECC4393}"/>
+              </a:ext>
+            </a:extLst>
+          </p:cNvPr>
+          <p:cNvCxnSpPr>
+            <a:cxnSpLocks/>
+            <a:endCxn id="12" idx="3"/>
+          </p:cNvCxnSpPr>
+          <p:nvPr/>
+        </p:nvCxnSpPr>
+        <p:spPr>
+          <a:xfrm flipV="1">
+            <a:off x="6891380" y="2612677"/>
+            <a:ext cx="719591" cy="354304"/>
+          </a:xfrm>
+          <a:prstGeom prst="straightConnector1">
+            <a:avLst/>
+          </a:prstGeom>
+          <a:ln>
+            <a:tailEnd type="triangle"/>
+          </a:ln>
+        </p:spPr>
+        <p:style>
+          <a:lnRef idx="1">
+            <a:schemeClr val="accent1"/>
+          </a:lnRef>
+          <a:fillRef idx="0">
+            <a:schemeClr val="accent1"/>
+          </a:fillRef>
+          <a:effectRef idx="0">
+            <a:schemeClr val="accent1"/>
+          </a:effectRef>
+          <a:fontRef idx="minor">
+            <a:schemeClr val="tx1"/>
+          </a:fontRef>
+        </p:style>
+      </p:cxnSp>
+      <p:cxnSp>
+        <p:nvCxnSpPr>
+          <p:cNvPr id="31" name="Straight Arrow Connector 30">
+            <a:extLst>
+              <a:ext uri="{FF2B5EF4-FFF2-40B4-BE49-F238E27FC236}">
+                <a16:creationId xmlns:a16="http://schemas.microsoft.com/office/drawing/2014/main" id="{BAF56587-B524-4332-A4A5-E5A49B0A8474}"/>
+              </a:ext>
+            </a:extLst>
+          </p:cNvPr>
+          <p:cNvCxnSpPr>
+            <a:cxnSpLocks/>
+            <a:stCxn id="8" idx="5"/>
+            <a:endCxn id="13" idx="1"/>
+          </p:cNvCxnSpPr>
+          <p:nvPr/>
+        </p:nvCxnSpPr>
+        <p:spPr>
+          <a:xfrm>
+            <a:off x="6902997" y="3117225"/>
+            <a:ext cx="706694" cy="316803"/>
+          </a:xfrm>
+          <a:prstGeom prst="straightConnector1">
+            <a:avLst/>
+          </a:prstGeom>
+          <a:ln>
+            <a:tailEnd type="triangle"/>
+          </a:ln>
+        </p:spPr>
+        <p:style>
+          <a:lnRef idx="1">
+            <a:schemeClr val="accent1"/>
+          </a:lnRef>
+          <a:fillRef idx="0">
+            <a:schemeClr val="accent1"/>
+          </a:fillRef>
+          <a:effectRef idx="0">
+            <a:schemeClr val="accent1"/>
+          </a:effectRef>
+          <a:fontRef idx="minor">
+            <a:schemeClr val="tx1"/>
+          </a:fontRef>
+        </p:style>
+      </p:cxnSp>
+      <p:cxnSp>
+        <p:nvCxnSpPr>
+          <p:cNvPr id="32" name="Straight Arrow Connector 31">
+            <a:extLst>
+              <a:ext uri="{FF2B5EF4-FFF2-40B4-BE49-F238E27FC236}">
+                <a16:creationId xmlns:a16="http://schemas.microsoft.com/office/drawing/2014/main" id="{EA820DAB-DD97-41CA-AC55-438429BE20D1}"/>
+              </a:ext>
+            </a:extLst>
+          </p:cNvPr>
+          <p:cNvCxnSpPr>
+            <a:cxnSpLocks/>
+          </p:cNvCxnSpPr>
+          <p:nvPr/>
+        </p:nvCxnSpPr>
+        <p:spPr>
+          <a:xfrm>
+            <a:off x="6193918" y="3592792"/>
+            <a:ext cx="545160" cy="377963"/>
+          </a:xfrm>
+          <a:prstGeom prst="straightConnector1">
+            <a:avLst/>
+          </a:prstGeom>
+          <a:ln>
+            <a:tailEnd type="triangle"/>
+          </a:ln>
+        </p:spPr>
+        <p:style>
+          <a:lnRef idx="1">
+            <a:schemeClr val="accent1"/>
+          </a:lnRef>
+          <a:fillRef idx="0">
+            <a:schemeClr val="accent1"/>
+          </a:fillRef>
+          <a:effectRef idx="0">
+            <a:schemeClr val="accent1"/>
+          </a:effectRef>
+          <a:fontRef idx="minor">
+            <a:schemeClr val="tx1"/>
+          </a:fontRef>
+        </p:style>
+      </p:cxnSp>
+      <p:cxnSp>
+        <p:nvCxnSpPr>
+          <p:cNvPr id="39" name="Straight Arrow Connector 38">
+            <a:extLst>
+              <a:ext uri="{FF2B5EF4-FFF2-40B4-BE49-F238E27FC236}">
+                <a16:creationId xmlns:a16="http://schemas.microsoft.com/office/drawing/2014/main" id="{B4E96346-412B-4C1E-BE4B-C568612D2959}"/>
+              </a:ext>
+            </a:extLst>
+          </p:cNvPr>
+          <p:cNvCxnSpPr>
+            <a:cxnSpLocks/>
+            <a:endCxn id="13" idx="3"/>
+          </p:cNvCxnSpPr>
+          <p:nvPr/>
+        </p:nvCxnSpPr>
+        <p:spPr>
+          <a:xfrm flipV="1">
+            <a:off x="6931569" y="3595672"/>
+            <a:ext cx="678122" cy="412858"/>
+          </a:xfrm>
+          <a:prstGeom prst="straightConnector1">
+            <a:avLst/>
+          </a:prstGeom>
+          <a:ln>
+            <a:tailEnd type="triangle"/>
+          </a:ln>
+        </p:spPr>
+        <p:style>
+          <a:lnRef idx="1">
+            <a:schemeClr val="accent1"/>
+          </a:lnRef>
+          <a:fillRef idx="0">
+            <a:schemeClr val="accent1"/>
+          </a:fillRef>
+          <a:effectRef idx="0">
+            <a:schemeClr val="accent1"/>
+          </a:effectRef>
+          <a:fontRef idx="minor">
+            <a:schemeClr val="tx1"/>
+          </a:fontRef>
+        </p:style>
+      </p:cxnSp>
+      <p:cxnSp>
+        <p:nvCxnSpPr>
+          <p:cNvPr id="40" name="Straight Arrow Connector 39">
+            <a:extLst>
+              <a:ext uri="{FF2B5EF4-FFF2-40B4-BE49-F238E27FC236}">
+                <a16:creationId xmlns:a16="http://schemas.microsoft.com/office/drawing/2014/main" id="{1C4D11B2-4A92-42D5-8EBA-7BABC56E1A76}"/>
+              </a:ext>
+            </a:extLst>
+          </p:cNvPr>
+          <p:cNvCxnSpPr>
+            <a:cxnSpLocks/>
+            <a:stCxn id="7" idx="5"/>
+            <a:endCxn id="12" idx="2"/>
+          </p:cNvCxnSpPr>
+          <p:nvPr/>
+        </p:nvCxnSpPr>
+        <p:spPr>
+          <a:xfrm>
+            <a:off x="6900722" y="2154374"/>
+            <a:ext cx="676771" cy="377481"/>
+          </a:xfrm>
+          <a:prstGeom prst="straightConnector1">
+            <a:avLst/>
+          </a:prstGeom>
+          <a:ln>
+            <a:tailEnd type="triangle"/>
+          </a:ln>
+        </p:spPr>
+        <p:style>
+          <a:lnRef idx="1">
+            <a:schemeClr val="accent1"/>
+          </a:lnRef>
+          <a:fillRef idx="0">
+            <a:schemeClr val="accent1"/>
+          </a:fillRef>
+          <a:effectRef idx="0">
+            <a:schemeClr val="accent1"/>
+          </a:effectRef>
+          <a:fontRef idx="minor">
+            <a:schemeClr val="tx1"/>
+          </a:fontRef>
+        </p:style>
+      </p:cxnSp>
+      <p:cxnSp>
+        <p:nvCxnSpPr>
+          <p:cNvPr id="41" name="Straight Arrow Connector 40">
+            <a:extLst>
+              <a:ext uri="{FF2B5EF4-FFF2-40B4-BE49-F238E27FC236}">
+                <a16:creationId xmlns:a16="http://schemas.microsoft.com/office/drawing/2014/main" id="{A0AD64BE-B135-4F2D-9F29-80593710D3E0}"/>
+              </a:ext>
+            </a:extLst>
+          </p:cNvPr>
+          <p:cNvCxnSpPr>
+            <a:cxnSpLocks/>
+            <a:endCxn id="8" idx="3"/>
+          </p:cNvCxnSpPr>
+          <p:nvPr/>
+        </p:nvCxnSpPr>
+        <p:spPr>
+          <a:xfrm flipV="1">
+            <a:off x="6172094" y="3117225"/>
+            <a:ext cx="569259" cy="326918"/>
+          </a:xfrm>
+          <a:prstGeom prst="straightConnector1">
+            <a:avLst/>
+          </a:prstGeom>
+          <a:ln>
+            <a:tailEnd type="triangle"/>
+          </a:ln>
+        </p:spPr>
+        <p:style>
+          <a:lnRef idx="1">
+            <a:schemeClr val="accent1"/>
+          </a:lnRef>
+          <a:fillRef idx="0">
+            <a:schemeClr val="accent1"/>
+          </a:fillRef>
+          <a:effectRef idx="0">
+            <a:schemeClr val="accent1"/>
+          </a:effectRef>
+          <a:fontRef idx="minor">
+            <a:schemeClr val="tx1"/>
+          </a:fontRef>
+        </p:style>
+      </p:cxnSp>
+      <p:cxnSp>
+        <p:nvCxnSpPr>
+          <p:cNvPr id="42" name="Straight Arrow Connector 41">
+            <a:extLst>
+              <a:ext uri="{FF2B5EF4-FFF2-40B4-BE49-F238E27FC236}">
+                <a16:creationId xmlns:a16="http://schemas.microsoft.com/office/drawing/2014/main" id="{63070D51-BD73-4B83-9352-431D2DBBD27F}"/>
+              </a:ext>
+            </a:extLst>
+          </p:cNvPr>
+          <p:cNvCxnSpPr>
+            <a:cxnSpLocks/>
+          </p:cNvCxnSpPr>
+          <p:nvPr/>
+        </p:nvCxnSpPr>
+        <p:spPr>
+          <a:xfrm>
+            <a:off x="6900722" y="4132399"/>
+            <a:ext cx="676771" cy="429957"/>
+          </a:xfrm>
+          <a:prstGeom prst="straightConnector1">
+            <a:avLst/>
+          </a:prstGeom>
+          <a:ln>
+            <a:tailEnd type="triangle"/>
+          </a:ln>
+        </p:spPr>
+        <p:style>
+          <a:lnRef idx="1">
+            <a:schemeClr val="accent1"/>
+          </a:lnRef>
+          <a:fillRef idx="0">
+            <a:schemeClr val="accent1"/>
+          </a:fillRef>
+          <a:effectRef idx="0">
+            <a:schemeClr val="accent1"/>
+          </a:effectRef>
+          <a:fontRef idx="minor">
+            <a:schemeClr val="tx1"/>
+          </a:fontRef>
+        </p:style>
+      </p:cxnSp>
+      <mc:AlternateContent xmlns:mc="http://schemas.openxmlformats.org/markup-compatibility/2006">
+        <mc:Choice xmlns:a14="http://schemas.microsoft.com/office/drawing/2010/main" Requires="a14">
+          <p:sp>
+            <p:nvSpPr>
+              <p:cNvPr id="62" name="Oval 61">
+                <a:extLst>
+                  <a:ext uri="{FF2B5EF4-FFF2-40B4-BE49-F238E27FC236}">
+                    <a16:creationId xmlns:a16="http://schemas.microsoft.com/office/drawing/2014/main" id="{C829B0E9-D7C8-48CD-AAD3-64485BF979AE}"/>
+                  </a:ext>
+                </a:extLst>
+              </p:cNvPr>
+              <p:cNvSpPr/>
+              <p:nvPr/>
+            </p:nvSpPr>
+            <p:spPr>
+              <a:xfrm>
+                <a:off x="5945271" y="3352315"/>
+                <a:ext cx="335650" cy="345217"/>
+              </a:xfrm>
+              <a:prstGeom prst="ellipse">
+                <a:avLst/>
+              </a:prstGeom>
+            </p:spPr>
+            <p:style>
+              <a:lnRef idx="2">
+                <a:schemeClr val="dk1"/>
+              </a:lnRef>
+              <a:fillRef idx="1">
+                <a:schemeClr val="lt1"/>
+              </a:fillRef>
+              <a:effectRef idx="0">
+                <a:schemeClr val="dk1"/>
+              </a:effectRef>
+              <a:fontRef idx="minor">
+                <a:schemeClr val="dk1"/>
+              </a:fontRef>
+            </p:style>
+            <p:txBody>
+              <a:bodyPr rtlCol="0" anchor="ctr"/>
+              <a:lstStyle/>
+              <a:p>
+                <a:pPr algn="ctr"/>
+                <a14:m>
+                  <m:oMathPara xmlns:m="http://schemas.openxmlformats.org/officeDocument/2006/math">
+                    <m:oMathParaPr>
+                      <m:jc m:val="centerGroup"/>
+                    </m:oMathParaPr>
+                    <m:oMath xmlns:m="http://schemas.openxmlformats.org/officeDocument/2006/math">
+                      <m:f>
+                        <m:fPr>
+                          <m:ctrlPr>
+                            <a:rPr lang="en-GB" sz="1200" i="1">
+                              <a:latin typeface="Cambria Math" panose="02040503050406030204" pitchFamily="18" charset="0"/>
+                            </a:rPr>
+                          </m:ctrlPr>
+                        </m:fPr>
+                        <m:num>
+                          <m:r>
+                            <a:rPr lang="en-GB" sz="1200" i="1">
+                              <a:latin typeface="Cambria Math" panose="02040503050406030204" pitchFamily="18" charset="0"/>
+                            </a:rPr>
+                            <m:t>𝐴</m:t>
+                          </m:r>
+                        </m:num>
+                        <m:den>
+                          <m:r>
+                            <a:rPr lang="en-GB" sz="1200" i="1">
+                              <a:latin typeface="Cambria Math" panose="02040503050406030204" pitchFamily="18" charset="0"/>
+                            </a:rPr>
+                            <m:t>2</m:t>
+                          </m:r>
+                        </m:den>
+                      </m:f>
+                    </m:oMath>
+                  </m:oMathPara>
+                </a14:m>
+                <a:endParaRPr lang="en-GB" sz="1200" dirty="0"/>
+              </a:p>
+            </p:txBody>
+          </p:sp>
+        </mc:Choice>
+        <mc:Fallback>
+          <p:sp>
+            <p:nvSpPr>
+              <p:cNvPr id="62" name="Oval 61">
+                <a:extLst>
+                  <a:ext uri="{FF2B5EF4-FFF2-40B4-BE49-F238E27FC236}">
+                    <a16:creationId xmlns:a16="http://schemas.microsoft.com/office/drawing/2014/main" id="{C829B0E9-D7C8-48CD-AAD3-64485BF979AE}"/>
+                  </a:ext>
+                </a:extLst>
+              </p:cNvPr>
+              <p:cNvSpPr>
+                <a:spLocks noRot="1" noChangeAspect="1" noMove="1" noResize="1" noEditPoints="1" noAdjustHandles="1" noChangeArrowheads="1" noChangeShapeType="1" noTextEdit="1"/>
+              </p:cNvSpPr>
+              <p:nvPr/>
+            </p:nvSpPr>
+            <p:spPr>
+              <a:xfrm>
+                <a:off x="5945271" y="3352315"/>
+                <a:ext cx="335650" cy="345217"/>
+              </a:xfrm>
+              <a:prstGeom prst="ellipse">
+                <a:avLst/>
+              </a:prstGeom>
+              <a:blipFill>
+                <a:blip r:embed="rId7"/>
+                <a:stretch>
+                  <a:fillRect t="-1695" b="-11864"/>
+                </a:stretch>
+              </a:blipFill>
+            </p:spPr>
+            <p:txBody>
+              <a:bodyPr/>
+              <a:lstStyle/>
+              <a:p>
+                <a:r>
+                  <a:rPr lang="en-GB">
+                    <a:noFill/>
+                  </a:rPr>
+                  <a:t> </a:t>
+                </a:r>
+              </a:p>
+            </p:txBody>
+          </p:sp>
+        </mc:Fallback>
+      </mc:AlternateContent>
+      <mc:AlternateContent xmlns:mc="http://schemas.openxmlformats.org/markup-compatibility/2006">
+        <mc:Choice xmlns:a14="http://schemas.microsoft.com/office/drawing/2010/main" Requires="a14">
+          <p:sp>
+            <p:nvSpPr>
+              <p:cNvPr id="63" name="Oval 62">
+                <a:extLst>
+                  <a:ext uri="{FF2B5EF4-FFF2-40B4-BE49-F238E27FC236}">
+                    <a16:creationId xmlns:a16="http://schemas.microsoft.com/office/drawing/2014/main" id="{0DEB735C-FA2A-4BC3-A91B-4A2F5103D607}"/>
+                  </a:ext>
+                </a:extLst>
+              </p:cNvPr>
+              <p:cNvSpPr/>
+              <p:nvPr/>
+            </p:nvSpPr>
+            <p:spPr>
+              <a:xfrm>
+                <a:off x="6667499" y="3901623"/>
+                <a:ext cx="335650" cy="345217"/>
+              </a:xfrm>
+              <a:prstGeom prst="ellipse">
+                <a:avLst/>
+              </a:prstGeom>
+            </p:spPr>
+            <p:style>
+              <a:lnRef idx="2">
+                <a:schemeClr val="dk1"/>
+              </a:lnRef>
+              <a:fillRef idx="1">
+                <a:schemeClr val="lt1"/>
+              </a:fillRef>
+              <a:effectRef idx="0">
+                <a:schemeClr val="dk1"/>
+              </a:effectRef>
+              <a:fontRef idx="minor">
+                <a:schemeClr val="dk1"/>
+              </a:fontRef>
+            </p:style>
+            <p:txBody>
+              <a:bodyPr rtlCol="0" anchor="ctr"/>
+              <a:lstStyle/>
+              <a:p>
+                <a:pPr algn="ctr"/>
+                <a14:m>
+                  <m:oMathPara xmlns:m="http://schemas.openxmlformats.org/officeDocument/2006/math">
+                    <m:oMathParaPr>
+                      <m:jc m:val="centerGroup"/>
+                    </m:oMathParaPr>
+                    <m:oMath xmlns:m="http://schemas.openxmlformats.org/officeDocument/2006/math">
+                      <m:f>
+                        <m:fPr>
+                          <m:ctrlPr>
+                            <a:rPr lang="en-GB" sz="1200" i="1">
+                              <a:latin typeface="Cambria Math" panose="02040503050406030204" pitchFamily="18" charset="0"/>
+                            </a:rPr>
+                          </m:ctrlPr>
+                        </m:fPr>
+                        <m:num>
+                          <m:r>
+                            <a:rPr lang="en-GB" sz="1200" i="1">
+                              <a:latin typeface="Cambria Math" panose="02040503050406030204" pitchFamily="18" charset="0"/>
+                            </a:rPr>
+                            <m:t>𝐴</m:t>
+                          </m:r>
+                        </m:num>
+                        <m:den>
+                          <m:r>
+                            <a:rPr lang="en-GB" sz="1200" i="1">
+                              <a:latin typeface="Cambria Math" panose="02040503050406030204" pitchFamily="18" charset="0"/>
+                            </a:rPr>
+                            <m:t>2</m:t>
+                          </m:r>
+                        </m:den>
+                      </m:f>
+                    </m:oMath>
+                  </m:oMathPara>
+                </a14:m>
+                <a:endParaRPr lang="en-GB" sz="1200" dirty="0"/>
+              </a:p>
+            </p:txBody>
+          </p:sp>
+        </mc:Choice>
+        <mc:Fallback>
+          <p:sp>
+            <p:nvSpPr>
+              <p:cNvPr id="63" name="Oval 62">
+                <a:extLst>
+                  <a:ext uri="{FF2B5EF4-FFF2-40B4-BE49-F238E27FC236}">
+                    <a16:creationId xmlns:a16="http://schemas.microsoft.com/office/drawing/2014/main" id="{0DEB735C-FA2A-4BC3-A91B-4A2F5103D607}"/>
+                  </a:ext>
+                </a:extLst>
+              </p:cNvPr>
+              <p:cNvSpPr>
+                <a:spLocks noRot="1" noChangeAspect="1" noMove="1" noResize="1" noEditPoints="1" noAdjustHandles="1" noChangeArrowheads="1" noChangeShapeType="1" noTextEdit="1"/>
+              </p:cNvSpPr>
+              <p:nvPr/>
+            </p:nvSpPr>
+            <p:spPr>
+              <a:xfrm>
+                <a:off x="6667499" y="3901623"/>
+                <a:ext cx="335650" cy="345217"/>
+              </a:xfrm>
+              <a:prstGeom prst="ellipse">
+                <a:avLst/>
+              </a:prstGeom>
+              <a:blipFill>
+                <a:blip r:embed="rId8"/>
+                <a:stretch>
+                  <a:fillRect b="-11864"/>
+                </a:stretch>
+              </a:blipFill>
+            </p:spPr>
+            <p:txBody>
+              <a:bodyPr/>
+              <a:lstStyle/>
+              <a:p>
+                <a:r>
+                  <a:rPr lang="en-GB">
+                    <a:noFill/>
+                  </a:rPr>
+                  <a:t> </a:t>
+                </a:r>
+              </a:p>
+            </p:txBody>
+          </p:sp>
+        </mc:Fallback>
+      </mc:AlternateContent>
+      <mc:AlternateContent xmlns:mc="http://schemas.openxmlformats.org/markup-compatibility/2006">
+        <mc:Choice xmlns:a14="http://schemas.microsoft.com/office/drawing/2010/main" Requires="a14">
+          <p:sp>
+            <p:nvSpPr>
+              <p:cNvPr id="64" name="Oval 63">
+                <a:extLst>
+                  <a:ext uri="{FF2B5EF4-FFF2-40B4-BE49-F238E27FC236}">
+                    <a16:creationId xmlns:a16="http://schemas.microsoft.com/office/drawing/2014/main" id="{BCE608E5-ADF7-4597-BC57-ACE7EBBBF8D3}"/>
+                  </a:ext>
+                </a:extLst>
+              </p:cNvPr>
+              <p:cNvSpPr/>
+              <p:nvPr/>
+            </p:nvSpPr>
+            <p:spPr>
+              <a:xfrm>
+                <a:off x="7559649" y="4393804"/>
+                <a:ext cx="335650" cy="345217"/>
+              </a:xfrm>
+              <a:prstGeom prst="ellipse">
+                <a:avLst/>
+              </a:prstGeom>
+            </p:spPr>
+            <p:style>
+              <a:lnRef idx="2">
+                <a:schemeClr val="dk1"/>
+              </a:lnRef>
+              <a:fillRef idx="1">
+                <a:schemeClr val="lt1"/>
+              </a:fillRef>
+              <a:effectRef idx="0">
+                <a:schemeClr val="dk1"/>
+              </a:effectRef>
+              <a:fontRef idx="minor">
+                <a:schemeClr val="dk1"/>
+              </a:fontRef>
+            </p:style>
+            <p:txBody>
+              <a:bodyPr rtlCol="0" anchor="ctr"/>
+              <a:lstStyle/>
+              <a:p>
+                <a:pPr algn="ctr"/>
+                <a14:m>
+                  <m:oMathPara xmlns:m="http://schemas.openxmlformats.org/officeDocument/2006/math">
+                    <m:oMathParaPr>
+                      <m:jc m:val="centerGroup"/>
+                    </m:oMathParaPr>
+                    <m:oMath xmlns:m="http://schemas.openxmlformats.org/officeDocument/2006/math">
+                      <m:f>
+                        <m:fPr>
+                          <m:ctrlPr>
+                            <a:rPr lang="en-GB" sz="1200" i="1">
+                              <a:latin typeface="Cambria Math" panose="02040503050406030204" pitchFamily="18" charset="0"/>
+                            </a:rPr>
+                          </m:ctrlPr>
+                        </m:fPr>
+                        <m:num>
+                          <m:r>
+                            <a:rPr lang="en-GB" sz="1200" i="1">
+                              <a:latin typeface="Cambria Math" panose="02040503050406030204" pitchFamily="18" charset="0"/>
+                            </a:rPr>
+                            <m:t>𝐴</m:t>
+                          </m:r>
+                        </m:num>
+                        <m:den>
+                          <m:r>
+                            <a:rPr lang="en-GB" sz="1200" i="1">
+                              <a:latin typeface="Cambria Math" panose="02040503050406030204" pitchFamily="18" charset="0"/>
+                            </a:rPr>
+                            <m:t>2</m:t>
+                          </m:r>
+                        </m:den>
+                      </m:f>
+                    </m:oMath>
+                  </m:oMathPara>
+                </a14:m>
+                <a:endParaRPr lang="en-GB" sz="1200" dirty="0"/>
+              </a:p>
+            </p:txBody>
+          </p:sp>
+        </mc:Choice>
+        <mc:Fallback>
+          <p:sp>
+            <p:nvSpPr>
+              <p:cNvPr id="64" name="Oval 63">
+                <a:extLst>
+                  <a:ext uri="{FF2B5EF4-FFF2-40B4-BE49-F238E27FC236}">
+                    <a16:creationId xmlns:a16="http://schemas.microsoft.com/office/drawing/2014/main" id="{BCE608E5-ADF7-4597-BC57-ACE7EBBBF8D3}"/>
+                  </a:ext>
+                </a:extLst>
+              </p:cNvPr>
+              <p:cNvSpPr>
+                <a:spLocks noRot="1" noChangeAspect="1" noMove="1" noResize="1" noEditPoints="1" noAdjustHandles="1" noChangeArrowheads="1" noChangeShapeType="1" noTextEdit="1"/>
+              </p:cNvSpPr>
+              <p:nvPr/>
+            </p:nvSpPr>
+            <p:spPr>
+              <a:xfrm>
+                <a:off x="7559649" y="4393804"/>
+                <a:ext cx="335650" cy="345217"/>
+              </a:xfrm>
+              <a:prstGeom prst="ellipse">
+                <a:avLst/>
+              </a:prstGeom>
+              <a:blipFill>
+                <a:blip r:embed="rId9"/>
+                <a:stretch>
+                  <a:fillRect t="-1724" b="-13793"/>
+                </a:stretch>
+              </a:blipFill>
+            </p:spPr>
+            <p:txBody>
+              <a:bodyPr/>
+              <a:lstStyle/>
+              <a:p>
+                <a:r>
+                  <a:rPr lang="en-GB">
+                    <a:noFill/>
+                  </a:rPr>
+                  <a:t> </a:t>
+                </a:r>
+              </a:p>
+            </p:txBody>
+          </p:sp>
+        </mc:Fallback>
+      </mc:AlternateContent>
+      <mc:AlternateContent xmlns:mc="http://schemas.openxmlformats.org/markup-compatibility/2006">
+        <mc:Choice xmlns:a14="http://schemas.microsoft.com/office/drawing/2010/main" Requires="a14">
+          <p:sp>
+            <p:nvSpPr>
+              <p:cNvPr id="66" name="TextBox 65">
+                <a:extLst>
+                  <a:ext uri="{FF2B5EF4-FFF2-40B4-BE49-F238E27FC236}">
+                    <a16:creationId xmlns:a16="http://schemas.microsoft.com/office/drawing/2014/main" id="{5D27E1BC-2855-45E2-A4A1-2DA43FC180DA}"/>
+                  </a:ext>
+                </a:extLst>
+              </p:cNvPr>
+              <p:cNvSpPr txBox="1"/>
+              <p:nvPr/>
+            </p:nvSpPr>
+            <p:spPr>
+              <a:xfrm>
+                <a:off x="5036995" y="1282403"/>
+                <a:ext cx="582915" cy="246221"/>
+              </a:xfrm>
+              <a:prstGeom prst="rect">
+                <a:avLst/>
+              </a:prstGeom>
+              <a:noFill/>
+            </p:spPr>
+            <p:txBody>
+              <a:bodyPr wrap="none" rtlCol="0">
+                <a:spAutoFit/>
+              </a:bodyPr>
+              <a:lstStyle/>
+              <a:p>
+                <a14:m>
+                  <m:oMathPara xmlns:m="http://schemas.openxmlformats.org/officeDocument/2006/math">
+                    <m:oMathParaPr>
+                      <m:jc m:val="centerGroup"/>
+                    </m:oMathParaPr>
+                    <m:oMath xmlns:m="http://schemas.openxmlformats.org/officeDocument/2006/math">
+                      <m:r>
+                        <a:rPr lang="en-GB" sz="1000" b="0" i="1" smtClean="0">
+                          <a:latin typeface="Cambria Math" panose="02040503050406030204" pitchFamily="18" charset="0"/>
+                        </a:rPr>
+                        <m:t>𝑡</m:t>
+                      </m:r>
+                      <m:r>
+                        <a:rPr lang="en-GB" sz="1000" b="0" i="1" smtClean="0">
+                          <a:latin typeface="Cambria Math" panose="02040503050406030204" pitchFamily="18" charset="0"/>
+                        </a:rPr>
+                        <m:t>=20</m:t>
+                      </m:r>
+                    </m:oMath>
+                  </m:oMathPara>
+                </a14:m>
+                <a:endParaRPr lang="en-GB" sz="1000" dirty="0"/>
+              </a:p>
+            </p:txBody>
+          </p:sp>
+        </mc:Choice>
+        <mc:Fallback>
+          <p:sp>
+            <p:nvSpPr>
+              <p:cNvPr id="66" name="TextBox 65">
+                <a:extLst>
+                  <a:ext uri="{FF2B5EF4-FFF2-40B4-BE49-F238E27FC236}">
+                    <a16:creationId xmlns:a16="http://schemas.microsoft.com/office/drawing/2014/main" id="{5D27E1BC-2855-45E2-A4A1-2DA43FC180DA}"/>
+                  </a:ext>
+                </a:extLst>
+              </p:cNvPr>
+              <p:cNvSpPr txBox="1">
+                <a:spLocks noRot="1" noChangeAspect="1" noMove="1" noResize="1" noEditPoints="1" noAdjustHandles="1" noChangeArrowheads="1" noChangeShapeType="1" noTextEdit="1"/>
+              </p:cNvSpPr>
+              <p:nvPr/>
+            </p:nvSpPr>
+            <p:spPr>
+              <a:xfrm>
+                <a:off x="5036995" y="1282403"/>
+                <a:ext cx="582915" cy="246221"/>
+              </a:xfrm>
+              <a:prstGeom prst="rect">
+                <a:avLst/>
+              </a:prstGeom>
+              <a:blipFill>
+                <a:blip r:embed="rId10"/>
+                <a:stretch>
+                  <a:fillRect/>
+                </a:stretch>
+              </a:blipFill>
+            </p:spPr>
+            <p:txBody>
+              <a:bodyPr/>
+              <a:lstStyle/>
+              <a:p>
+                <a:r>
+                  <a:rPr lang="en-GB">
+                    <a:noFill/>
+                  </a:rPr>
+                  <a:t> </a:t>
+                </a:r>
+              </a:p>
+            </p:txBody>
+          </p:sp>
+        </mc:Fallback>
+      </mc:AlternateContent>
+      <mc:AlternateContent xmlns:mc="http://schemas.openxmlformats.org/markup-compatibility/2006">
+        <mc:Choice xmlns:a14="http://schemas.microsoft.com/office/drawing/2010/main" Requires="a14">
+          <p:sp>
+            <p:nvSpPr>
+              <p:cNvPr id="67" name="TextBox 66">
+                <a:extLst>
+                  <a:ext uri="{FF2B5EF4-FFF2-40B4-BE49-F238E27FC236}">
+                    <a16:creationId xmlns:a16="http://schemas.microsoft.com/office/drawing/2014/main" id="{520BCA36-EEF6-4188-B4F0-886144201624}"/>
+                  </a:ext>
+                </a:extLst>
+              </p:cNvPr>
+              <p:cNvSpPr txBox="1"/>
+              <p:nvPr/>
+            </p:nvSpPr>
+            <p:spPr>
+              <a:xfrm>
+                <a:off x="5714905" y="1283311"/>
+                <a:ext cx="582916" cy="246221"/>
+              </a:xfrm>
+              <a:prstGeom prst="rect">
+                <a:avLst/>
+              </a:prstGeom>
+              <a:noFill/>
+            </p:spPr>
+            <p:txBody>
+              <a:bodyPr wrap="none" rtlCol="0">
+                <a:spAutoFit/>
+              </a:bodyPr>
+              <a:lstStyle/>
+              <a:p>
+                <a14:m>
+                  <m:oMathPara xmlns:m="http://schemas.openxmlformats.org/officeDocument/2006/math">
+                    <m:oMathParaPr>
+                      <m:jc m:val="centerGroup"/>
+                    </m:oMathParaPr>
+                    <m:oMath xmlns:m="http://schemas.openxmlformats.org/officeDocument/2006/math">
+                      <m:r>
+                        <a:rPr lang="en-GB" sz="1000" b="0" i="1" smtClean="0">
+                          <a:latin typeface="Cambria Math" panose="02040503050406030204" pitchFamily="18" charset="0"/>
+                        </a:rPr>
+                        <m:t>𝑡</m:t>
+                      </m:r>
+                      <m:r>
+                        <a:rPr lang="en-GB" sz="1000" b="0" i="1" smtClean="0">
+                          <a:latin typeface="Cambria Math" panose="02040503050406030204" pitchFamily="18" charset="0"/>
+                        </a:rPr>
+                        <m:t>=25</m:t>
+                      </m:r>
+                    </m:oMath>
+                  </m:oMathPara>
+                </a14:m>
+                <a:endParaRPr lang="en-GB" sz="1000" dirty="0"/>
+              </a:p>
+            </p:txBody>
+          </p:sp>
+        </mc:Choice>
+        <mc:Fallback>
+          <p:sp>
+            <p:nvSpPr>
+              <p:cNvPr id="67" name="TextBox 66">
+                <a:extLst>
+                  <a:ext uri="{FF2B5EF4-FFF2-40B4-BE49-F238E27FC236}">
+                    <a16:creationId xmlns:a16="http://schemas.microsoft.com/office/drawing/2014/main" id="{520BCA36-EEF6-4188-B4F0-886144201624}"/>
+                  </a:ext>
+                </a:extLst>
+              </p:cNvPr>
+              <p:cNvSpPr txBox="1">
+                <a:spLocks noRot="1" noChangeAspect="1" noMove="1" noResize="1" noEditPoints="1" noAdjustHandles="1" noChangeArrowheads="1" noChangeShapeType="1" noTextEdit="1"/>
+              </p:cNvSpPr>
+              <p:nvPr/>
+            </p:nvSpPr>
+            <p:spPr>
+              <a:xfrm>
+                <a:off x="5714905" y="1283311"/>
+                <a:ext cx="582916" cy="246221"/>
+              </a:xfrm>
+              <a:prstGeom prst="rect">
+                <a:avLst/>
+              </a:prstGeom>
+              <a:blipFill>
+                <a:blip r:embed="rId11"/>
+                <a:stretch>
+                  <a:fillRect/>
+                </a:stretch>
+              </a:blipFill>
+            </p:spPr>
+            <p:txBody>
+              <a:bodyPr/>
+              <a:lstStyle/>
+              <a:p>
+                <a:r>
+                  <a:rPr lang="en-GB">
+                    <a:noFill/>
+                  </a:rPr>
+                  <a:t> </a:t>
+                </a:r>
+              </a:p>
+            </p:txBody>
+          </p:sp>
+        </mc:Fallback>
+      </mc:AlternateContent>
+      <mc:AlternateContent xmlns:mc="http://schemas.openxmlformats.org/markup-compatibility/2006">
+        <mc:Choice xmlns:a14="http://schemas.microsoft.com/office/drawing/2010/main" Requires="a14">
+          <p:sp>
+            <p:nvSpPr>
+              <p:cNvPr id="68" name="TextBox 67">
+                <a:extLst>
+                  <a:ext uri="{FF2B5EF4-FFF2-40B4-BE49-F238E27FC236}">
+                    <a16:creationId xmlns:a16="http://schemas.microsoft.com/office/drawing/2014/main" id="{A344E8FD-FC63-4A62-95C9-8B9F5CB98466}"/>
+                  </a:ext>
+                </a:extLst>
+              </p:cNvPr>
+              <p:cNvSpPr txBox="1"/>
+              <p:nvPr/>
+            </p:nvSpPr>
+            <p:spPr>
+              <a:xfrm>
+                <a:off x="6543866" y="1282403"/>
+                <a:ext cx="582915" cy="246221"/>
+              </a:xfrm>
+              <a:prstGeom prst="rect">
+                <a:avLst/>
+              </a:prstGeom>
+              <a:noFill/>
+            </p:spPr>
+            <p:txBody>
+              <a:bodyPr wrap="none" rtlCol="0">
+                <a:spAutoFit/>
+              </a:bodyPr>
+              <a:lstStyle/>
+              <a:p>
+                <a14:m>
+                  <m:oMathPara xmlns:m="http://schemas.openxmlformats.org/officeDocument/2006/math">
+                    <m:oMathParaPr>
+                      <m:jc m:val="centerGroup"/>
+                    </m:oMathParaPr>
+                    <m:oMath xmlns:m="http://schemas.openxmlformats.org/officeDocument/2006/math">
+                      <m:r>
+                        <a:rPr lang="en-GB" sz="1000" b="0" i="1" smtClean="0">
+                          <a:latin typeface="Cambria Math" panose="02040503050406030204" pitchFamily="18" charset="0"/>
+                        </a:rPr>
+                        <m:t>𝑡</m:t>
+                      </m:r>
+                      <m:r>
+                        <a:rPr lang="en-GB" sz="1000" b="0" i="1" smtClean="0">
+                          <a:latin typeface="Cambria Math" panose="02040503050406030204" pitchFamily="18" charset="0"/>
+                        </a:rPr>
+                        <m:t>=35</m:t>
+                      </m:r>
+                    </m:oMath>
+                  </m:oMathPara>
+                </a14:m>
+                <a:endParaRPr lang="en-GB" sz="1000" dirty="0"/>
+              </a:p>
+            </p:txBody>
+          </p:sp>
+        </mc:Choice>
+        <mc:Fallback>
+          <p:sp>
+            <p:nvSpPr>
+              <p:cNvPr id="68" name="TextBox 67">
+                <a:extLst>
+                  <a:ext uri="{FF2B5EF4-FFF2-40B4-BE49-F238E27FC236}">
+                    <a16:creationId xmlns:a16="http://schemas.microsoft.com/office/drawing/2014/main" id="{A344E8FD-FC63-4A62-95C9-8B9F5CB98466}"/>
+                  </a:ext>
+                </a:extLst>
+              </p:cNvPr>
+              <p:cNvSpPr txBox="1">
+                <a:spLocks noRot="1" noChangeAspect="1" noMove="1" noResize="1" noEditPoints="1" noAdjustHandles="1" noChangeArrowheads="1" noChangeShapeType="1" noTextEdit="1"/>
+              </p:cNvSpPr>
+              <p:nvPr/>
+            </p:nvSpPr>
+            <p:spPr>
+              <a:xfrm>
+                <a:off x="6543866" y="1282403"/>
+                <a:ext cx="582915" cy="246221"/>
+              </a:xfrm>
+              <a:prstGeom prst="rect">
+                <a:avLst/>
+              </a:prstGeom>
+              <a:blipFill>
+                <a:blip r:embed="rId12"/>
+                <a:stretch>
+                  <a:fillRect/>
+                </a:stretch>
+              </a:blipFill>
+            </p:spPr>
+            <p:txBody>
+              <a:bodyPr/>
+              <a:lstStyle/>
+              <a:p>
+                <a:r>
+                  <a:rPr lang="en-GB">
+                    <a:noFill/>
+                  </a:rPr>
+                  <a:t> </a:t>
+                </a:r>
+              </a:p>
+            </p:txBody>
+          </p:sp>
+        </mc:Fallback>
+      </mc:AlternateContent>
+      <mc:AlternateContent xmlns:mc="http://schemas.openxmlformats.org/markup-compatibility/2006">
+        <mc:Choice xmlns:a14="http://schemas.microsoft.com/office/drawing/2010/main" Requires="a14">
+          <p:sp>
+            <p:nvSpPr>
+              <p:cNvPr id="69" name="TextBox 68">
+                <a:extLst>
+                  <a:ext uri="{FF2B5EF4-FFF2-40B4-BE49-F238E27FC236}">
+                    <a16:creationId xmlns:a16="http://schemas.microsoft.com/office/drawing/2014/main" id="{FCF5ADD1-E4F0-4BBE-BBAE-D39466501EF9}"/>
+                  </a:ext>
+                </a:extLst>
+              </p:cNvPr>
+              <p:cNvSpPr txBox="1"/>
+              <p:nvPr/>
+            </p:nvSpPr>
+            <p:spPr>
+              <a:xfrm>
+                <a:off x="7318233" y="1286372"/>
+                <a:ext cx="582916" cy="246221"/>
+              </a:xfrm>
+              <a:prstGeom prst="rect">
+                <a:avLst/>
+              </a:prstGeom>
+              <a:noFill/>
+            </p:spPr>
+            <p:txBody>
+              <a:bodyPr wrap="none" rtlCol="0">
+                <a:spAutoFit/>
+              </a:bodyPr>
+              <a:lstStyle/>
+              <a:p>
+                <a14:m>
+                  <m:oMathPara xmlns:m="http://schemas.openxmlformats.org/officeDocument/2006/math">
+                    <m:oMathParaPr>
+                      <m:jc m:val="centerGroup"/>
+                    </m:oMathParaPr>
+                    <m:oMath xmlns:m="http://schemas.openxmlformats.org/officeDocument/2006/math">
+                      <m:r>
+                        <a:rPr lang="en-GB" sz="1000" b="0" i="1" smtClean="0">
+                          <a:latin typeface="Cambria Math" panose="02040503050406030204" pitchFamily="18" charset="0"/>
+                        </a:rPr>
+                        <m:t>𝑡</m:t>
+                      </m:r>
+                      <m:r>
+                        <a:rPr lang="en-GB" sz="1000" b="0" i="1" smtClean="0">
+                          <a:latin typeface="Cambria Math" panose="02040503050406030204" pitchFamily="18" charset="0"/>
+                        </a:rPr>
+                        <m:t>=65</m:t>
+                      </m:r>
+                    </m:oMath>
+                  </m:oMathPara>
+                </a14:m>
+                <a:endParaRPr lang="en-GB" sz="1000" dirty="0"/>
+              </a:p>
+            </p:txBody>
+          </p:sp>
+        </mc:Choice>
+        <mc:Fallback>
+          <p:sp>
+            <p:nvSpPr>
+              <p:cNvPr id="69" name="TextBox 68">
+                <a:extLst>
+                  <a:ext uri="{FF2B5EF4-FFF2-40B4-BE49-F238E27FC236}">
+                    <a16:creationId xmlns:a16="http://schemas.microsoft.com/office/drawing/2014/main" id="{FCF5ADD1-E4F0-4BBE-BBAE-D39466501EF9}"/>
+                  </a:ext>
+                </a:extLst>
+              </p:cNvPr>
+              <p:cNvSpPr txBox="1">
+                <a:spLocks noRot="1" noChangeAspect="1" noMove="1" noResize="1" noEditPoints="1" noAdjustHandles="1" noChangeArrowheads="1" noChangeShapeType="1" noTextEdit="1"/>
+              </p:cNvSpPr>
+              <p:nvPr/>
+            </p:nvSpPr>
+            <p:spPr>
+              <a:xfrm>
+                <a:off x="7318233" y="1286372"/>
+                <a:ext cx="582916" cy="246221"/>
+              </a:xfrm>
+              <a:prstGeom prst="rect">
+                <a:avLst/>
+              </a:prstGeom>
+              <a:blipFill>
+                <a:blip r:embed="rId13"/>
+                <a:stretch>
+                  <a:fillRect/>
+                </a:stretch>
+              </a:blipFill>
+            </p:spPr>
+            <p:txBody>
+              <a:bodyPr/>
+              <a:lstStyle/>
+              <a:p>
+                <a:r>
+                  <a:rPr lang="en-GB">
+                    <a:noFill/>
+                  </a:rPr>
+                  <a:t> </a:t>
+                </a:r>
+              </a:p>
+            </p:txBody>
+          </p:sp>
+        </mc:Fallback>
+      </mc:AlternateContent>
+    </p:spTree>
+    <p:extLst>
+      <p:ext uri="{BB962C8B-B14F-4D97-AF65-F5344CB8AC3E}">
+        <p14:creationId xmlns:p14="http://schemas.microsoft.com/office/powerpoint/2010/main" val="3282679911"/>
+      </p:ext>
+    </p:extLst>
+  </p:cSld>
+  <p:clrMapOvr>
+    <a:masterClrMapping/>
+  </p:clrMapOvr>
+  <p:transition>
+    <p:fade/>
+  </p:transition>
+</p:sld>
+</file>
+
+<file path=ppt/slides/slide12.xml><?xml version="1.0" encoding="utf-8"?>
 <p:sld xmlns:a="http://schemas.openxmlformats.org/drawingml/2006/main" xmlns:r="http://schemas.openxmlformats.org/officeDocument/2006/relationships" xmlns:p="http://schemas.openxmlformats.org/presentationml/2006/main">
   <p:cSld>
     <p:spTree>
@@ -17214,7 +19438,7 @@
           <a:p>
             <a:r>
               <a:rPr lang="en-GB" dirty="0"/>
-              <a:t>Intertemporal Substitution</a:t>
+              <a:t>Towards a model</a:t>
             </a:r>
           </a:p>
         </p:txBody>
@@ -17240,7 +19464,7 @@
             <p:spPr/>
             <p:txBody>
               <a:bodyPr>
-                <a:normAutofit fontScale="92500" lnSpcReduction="20000"/>
+                <a:normAutofit fontScale="77500" lnSpcReduction="20000"/>
               </a:bodyPr>
               <a:lstStyle/>
               <a:p>
@@ -17293,13 +19517,13 @@
                 </a14:m>
                 <a:r>
                   <a:rPr lang="en-GB" dirty="0"/>
-                  <a:t> (education, occupation, class etc.) that may influence consumer decision</a:t>
+                  <a:t> (education, occupation, class etc.) that may influence consumer decision (through discounting or otherwise)</a:t>
                 </a:r>
               </a:p>
               <a:p>
                 <a:r>
                   <a:rPr lang="en-GB" dirty="0"/>
-                  <a:t>For life-cycle assumption, consider function </a:t>
+                  <a:t>To bring the life-cycle factors, consider a function </a:t>
                 </a:r>
                 <a14:m>
                   <m:oMath xmlns:m="http://schemas.openxmlformats.org/officeDocument/2006/math">
@@ -17374,7 +19598,7 @@
                 </a14:m>
                 <a:r>
                   <a:rPr lang="en-GB" dirty="0"/>
-                  <a:t> describing how needs of the consumer evolve in her lifetime </a:t>
+                  <a:t> representing the needs of the consumer over her lifetime </a:t>
                 </a:r>
                 <a14:m>
                   <m:oMath xmlns:m="http://schemas.openxmlformats.org/officeDocument/2006/math">
@@ -17391,7 +19615,124 @@
               <a:p>
                 <a:r>
                   <a:rPr lang="en-GB" dirty="0"/>
-                  <a:t>The intertemporal problem would consider the consumption </a:t>
+                  <a:t>Consider the cost of minimum needs per head </a:t>
+                </a:r>
+                <a14:m>
+                  <m:oMath xmlns:m="http://schemas.openxmlformats.org/officeDocument/2006/math">
+                    <m:sSub>
+                      <m:sSubPr>
+                        <m:ctrlPr>
+                          <a:rPr lang="en-GB" i="1">
+                            <a:latin typeface="Cambria Math" panose="02040503050406030204" pitchFamily="18" charset="0"/>
+                          </a:rPr>
+                        </m:ctrlPr>
+                      </m:sSubPr>
+                      <m:e>
+                        <m:r>
+                          <m:rPr>
+                            <m:sty m:val="p"/>
+                          </m:rPr>
+                          <a:rPr lang="en-GB">
+                            <a:latin typeface="Cambria Math" panose="02040503050406030204" pitchFamily="18" charset="0"/>
+                          </a:rPr>
+                          <m:t>Ψ</m:t>
+                        </m:r>
+                      </m:e>
+                      <m:sub>
+                        <m:r>
+                          <a:rPr lang="en-GB" i="1">
+                            <a:latin typeface="Cambria Math" panose="02040503050406030204" pitchFamily="18" charset="0"/>
+                          </a:rPr>
+                          <m:t>𝑡</m:t>
+                        </m:r>
+                      </m:sub>
+                    </m:sSub>
+                  </m:oMath>
+                </a14:m>
+                <a:r>
+                  <a:rPr lang="en-GB" dirty="0"/>
+                  <a:t> so that the cost of needs fulfilment is </a:t>
+                </a:r>
+                <a14:m>
+                  <m:oMath xmlns:m="http://schemas.openxmlformats.org/officeDocument/2006/math">
+                    <m:sSub>
+                      <m:sSubPr>
+                        <m:ctrlPr>
+                          <a:rPr lang="en-GB" i="1">
+                            <a:latin typeface="Cambria Math" panose="02040503050406030204" pitchFamily="18" charset="0"/>
+                          </a:rPr>
+                        </m:ctrlPr>
+                      </m:sSubPr>
+                      <m:e>
+                        <m:r>
+                          <m:rPr>
+                            <m:sty m:val="p"/>
+                          </m:rPr>
+                          <a:rPr lang="en-GB">
+                            <a:latin typeface="Cambria Math" panose="02040503050406030204" pitchFamily="18" charset="0"/>
+                          </a:rPr>
+                          <m:t>Ψ</m:t>
+                        </m:r>
+                      </m:e>
+                      <m:sub>
+                        <m:r>
+                          <a:rPr lang="en-GB" i="1">
+                            <a:latin typeface="Cambria Math" panose="02040503050406030204" pitchFamily="18" charset="0"/>
+                          </a:rPr>
+                          <m:t>𝑡</m:t>
+                        </m:r>
+                      </m:sub>
+                    </m:sSub>
+                    <m:sSub>
+                      <m:sSubPr>
+                        <m:ctrlPr>
+                          <a:rPr lang="en-GB" b="0" i="1" smtClean="0">
+                            <a:latin typeface="Cambria Math" panose="02040503050406030204" pitchFamily="18" charset="0"/>
+                          </a:rPr>
+                        </m:ctrlPr>
+                      </m:sSubPr>
+                      <m:e>
+                        <m:r>
+                          <a:rPr lang="en-GB" b="0" i="1" smtClean="0">
+                            <a:latin typeface="Cambria Math" panose="02040503050406030204" pitchFamily="18" charset="0"/>
+                          </a:rPr>
+                          <m:t>𝜂</m:t>
+                        </m:r>
+                      </m:e>
+                      <m:sub>
+                        <m:r>
+                          <a:rPr lang="en-GB" b="0" i="1" smtClean="0">
+                            <a:latin typeface="Cambria Math" panose="02040503050406030204" pitchFamily="18" charset="0"/>
+                          </a:rPr>
+                          <m:t>𝑡</m:t>
+                        </m:r>
+                      </m:sub>
+                    </m:sSub>
+                  </m:oMath>
+                </a14:m>
+                <a:r>
+                  <a:rPr lang="en-GB" dirty="0"/>
+                  <a:t> in period </a:t>
+                </a:r>
+                <a14:m>
+                  <m:oMath xmlns:m="http://schemas.openxmlformats.org/officeDocument/2006/math">
+                    <m:r>
+                      <a:rPr lang="en-GB" b="0" i="1" smtClean="0">
+                        <a:latin typeface="Cambria Math" panose="02040503050406030204" pitchFamily="18" charset="0"/>
+                      </a:rPr>
+                      <m:t>𝑡</m:t>
+                    </m:r>
+                  </m:oMath>
+                </a14:m>
+                <a:r>
+                  <a:rPr lang="en-GB" dirty="0"/>
+                  <a:t> </a:t>
+                </a:r>
+              </a:p>
+              <a:p>
+                <a:r>
+                  <a:rPr lang="en-GB" dirty="0"/>
+                  <a:t>The intertemporal choice is between consumption </a:t>
                 </a:r>
                 <a14:m>
                   <m:oMath xmlns:m="http://schemas.openxmlformats.org/officeDocument/2006/math">
@@ -17438,7 +19779,40 @@
                 </a14:m>
                 <a:r>
                   <a:rPr lang="en-GB" dirty="0"/>
-                  <a:t> by the consumer – a decision exercised with the knowledge of </a:t>
+                  <a:t> and savings a portion of income </a:t>
+                </a:r>
+                <a14:m>
+                  <m:oMath xmlns:m="http://schemas.openxmlformats.org/officeDocument/2006/math">
+                    <m:sSub>
+                      <m:sSubPr>
+                        <m:ctrlPr>
+                          <a:rPr lang="en-GB" b="0" i="1" smtClean="0">
+                            <a:latin typeface="Cambria Math" panose="02040503050406030204" pitchFamily="18" charset="0"/>
+                          </a:rPr>
+                        </m:ctrlPr>
+                      </m:sSubPr>
+                      <m:e>
+                        <m:r>
+                          <a:rPr lang="en-GB" b="0" i="1" smtClean="0">
+                            <a:latin typeface="Cambria Math" panose="02040503050406030204" pitchFamily="18" charset="0"/>
+                          </a:rPr>
+                          <m:t>𝑖</m:t>
+                        </m:r>
+                      </m:e>
+                      <m:sub>
+                        <m:r>
+                          <a:rPr lang="en-GB" b="0" i="1" smtClean="0">
+                            <a:latin typeface="Cambria Math" panose="02040503050406030204" pitchFamily="18" charset="0"/>
+                          </a:rPr>
+                          <m:t>𝑡</m:t>
+                        </m:r>
+                      </m:sub>
+                    </m:sSub>
+                  </m:oMath>
+                </a14:m>
+                <a:r>
+                  <a:rPr lang="en-GB" dirty="0"/>
+                  <a:t> towards asset account </a:t>
                 </a:r>
                 <a14:m>
                   <m:oMath xmlns:m="http://schemas.openxmlformats.org/officeDocument/2006/math">
@@ -17452,10 +19826,13 @@
                       </m:sSubPr>
                       <m:e>
                         <m:r>
-                          <a:rPr lang="en-GB" i="1">
+                          <m:rPr>
+                            <m:sty m:val="p"/>
+                          </m:rPr>
+                          <a:rPr lang="en-GB" b="0" i="0" smtClean="0">
                             <a:latin typeface="Cambria Math" panose="02040503050406030204" pitchFamily="18" charset="0"/>
                           </a:rPr>
-                          <m:t>𝐴</m:t>
+                          <m:t>A</m:t>
                         </m:r>
                       </m:e>
                       <m:sub>
@@ -17471,31 +19848,20 @@
                 </a14:m>
                 <a:r>
                   <a:rPr lang="en-GB" dirty="0"/>
-                  <a:t> and </a:t>
+                  <a:t> </a:t>
                 </a:r>
-                <a14:m>
-                  <m:oMath xmlns:m="http://schemas.openxmlformats.org/officeDocument/2006/math">
-                    <m:r>
-                      <a:rPr lang="en-GB" i="1">
-                        <a:latin typeface="Cambria Math" panose="02040503050406030204" pitchFamily="18" charset="0"/>
-                      </a:rPr>
-                      <m:t>𝜌</m:t>
-                    </m:r>
-                  </m:oMath>
-                </a14:m>
-                <a:endParaRPr lang="en-GB" dirty="0"/>
               </a:p>
               <a:p>
                 <a:r>
                   <a:rPr lang="en-GB" dirty="0"/>
-                  <a:t>Consider also the minimum needs per head </a:t>
+                  <a:t>Consider two risks - first the exogenous risk associated with the rise in income </a:t>
                 </a:r>
                 <a14:m>
                   <m:oMath xmlns:m="http://schemas.openxmlformats.org/officeDocument/2006/math">
                     <m:sSub>
                       <m:sSubPr>
                         <m:ctrlPr>
-                          <a:rPr lang="en-GB" b="0" i="1" smtClean="0">
+                          <a:rPr lang="en-GB" i="1">
                             <a:latin typeface="Cambria Math" panose="02040503050406030204" pitchFamily="18" charset="0"/>
                           </a:rPr>
                         </m:ctrlPr>
@@ -17508,12 +19874,12 @@
                           <a:rPr lang="en-GB" b="0" i="0" smtClean="0">
                             <a:latin typeface="Cambria Math" panose="02040503050406030204" pitchFamily="18" charset="0"/>
                           </a:rPr>
-                          <m:t>Ψ</m:t>
+                          <m:t>i</m:t>
                         </m:r>
                       </m:e>
                       <m:sub>
                         <m:r>
-                          <a:rPr lang="en-GB" b="0" i="1" smtClean="0">
+                          <a:rPr lang="en-GB" i="1">
                             <a:latin typeface="Cambria Math" panose="02040503050406030204" pitchFamily="18" charset="0"/>
                           </a:rPr>
                           <m:t>𝑡</m:t>
@@ -17522,12 +19888,9 @@
                     </m:sSub>
                   </m:oMath>
                 </a14:m>
-                <a:endParaRPr lang="en-GB" dirty="0"/>
-              </a:p>
-              <a:p>
                 <a:r>
                   <a:rPr lang="en-GB" dirty="0"/>
-                  <a:t>Consider two risks - first the exogenous risk associated with the rise in income (call it </a:t>
+                  <a:t> (call it </a:t>
                 </a:r>
                 <a14:m>
                   <m:oMath xmlns:m="http://schemas.openxmlformats.org/officeDocument/2006/math">
@@ -17558,13 +19921,13 @@
                 </a14:m>
                 <a:r>
                   <a:rPr lang="en-GB" dirty="0"/>
-                  <a:t>)</a:t>
+                  <a:t>) for wealth</a:t>
                 </a:r>
               </a:p>
               <a:p>
                 <a:r>
                   <a:rPr lang="en-GB" dirty="0"/>
-                  <a:t>Savings require a long time commitment depending on </a:t>
+                  <a:t>Remember that savings require a long time commitment depending on </a:t>
                 </a:r>
                 <a14:m>
                   <m:oMath xmlns:m="http://schemas.openxmlformats.org/officeDocument/2006/math">
@@ -17625,7 +19988,7 @@
               <a:blipFill>
                 <a:blip r:embed="rId2"/>
                 <a:stretch>
-                  <a:fillRect l="-541" t="-3178" r="-1005"/>
+                  <a:fillRect l="-309" t="-2430" r="-155"/>
                 </a:stretch>
               </a:blipFill>
             </p:spPr>
@@ -17673,7 +20036,7 @@
               <a:pPr>
                 <a:defRPr/>
               </a:pPr>
-              <a:t>11</a:t>
+              <a:t>12</a:t>
             </a:fld>
             <a:endParaRPr lang="en-GB" altLang="en-US" dirty="0"/>
           </a:p>
@@ -17695,7 +20058,7 @@
 </p:sld>
 </file>
 
-<file path=ppt/slides/slide12.xml><?xml version="1.0" encoding="utf-8"?>
+<file path=ppt/slides/slide13.xml><?xml version="1.0" encoding="utf-8"?>
 <p:sld xmlns:a="http://schemas.openxmlformats.org/drawingml/2006/main" xmlns:r="http://schemas.openxmlformats.org/officeDocument/2006/relationships" xmlns:p="http://schemas.openxmlformats.org/presentationml/2006/main">
   <p:cSld>
     <p:spTree>
@@ -17735,7 +20098,7 @@
           <a:p>
             <a:r>
               <a:rPr lang="en-GB" dirty="0"/>
-              <a:t>Do we need Subjective Probability</a:t>
+              <a:t>The role of two uncertainties</a:t>
             </a:r>
           </a:p>
         </p:txBody>
@@ -17760,7 +20123,9 @@
             </p:nvSpPr>
             <p:spPr/>
             <p:txBody>
-              <a:bodyPr/>
+              <a:bodyPr>
+                <a:normAutofit/>
+              </a:bodyPr>
               <a:lstStyle/>
               <a:p>
                 <a:r>
@@ -17818,7 +20183,7 @@
                 </a14:m>
                 <a:r>
                   <a:rPr lang="en-GB" dirty="0"/>
-                  <a:t> does not change - so the consumer controls only views the evolution of </a:t>
+                  <a:t> does not change - so the consumer controls only the evolution of </a:t>
                 </a:r>
                 <a14:m>
                   <m:oMath xmlns:m="http://schemas.openxmlformats.org/officeDocument/2006/math">
@@ -17851,7 +20216,7 @@
                 </a14:m>
                 <a:r>
                   <a:rPr lang="en-GB" dirty="0"/>
-                  <a:t> in her lifetime – which is not influenced by subjective probability as much as consumption is.</a:t>
+                  <a:t> in her lifetime – which is not influenced by subjective probability as much as consumption is. Note that this relies on the use of a stochastic (risk-based) approach</a:t>
                 </a:r>
               </a:p>
               <a:p>
@@ -17929,7 +20294,7 @@
               <a:pPr>
                 <a:defRPr/>
               </a:pPr>
-              <a:t>12</a:t>
+              <a:t>13</a:t>
             </a:fld>
             <a:endParaRPr lang="en-GB" altLang="en-US" dirty="0"/>
           </a:p>
@@ -17951,7 +20316,7 @@
 </p:sld>
 </file>
 
-<file path=ppt/slides/slide13.xml><?xml version="1.0" encoding="utf-8"?>
+<file path=ppt/slides/slide14.xml><?xml version="1.0" encoding="utf-8"?>
 <p:sld xmlns:a="http://schemas.openxmlformats.org/drawingml/2006/main" xmlns:r="http://schemas.openxmlformats.org/officeDocument/2006/relationships" xmlns:p="http://schemas.openxmlformats.org/presentationml/2006/main">
   <p:cSld>
     <p:spTree>
@@ -18017,7 +20382,7 @@
             <p:spPr/>
             <p:txBody>
               <a:bodyPr>
-                <a:normAutofit fontScale="62500" lnSpcReduction="20000"/>
+                <a:normAutofit fontScale="55000" lnSpcReduction="20000"/>
               </a:bodyPr>
               <a:lstStyle/>
               <a:p>
@@ -18640,12 +21005,170 @@
                 <a:endParaRPr lang="en-GB" dirty="0"/>
               </a:p>
               <a:p>
-                <a:pPr marL="0" indent="0">
-                  <a:buNone/>
-                </a:pPr>
                 <a:r>
                   <a:rPr lang="en-GB" dirty="0"/>
-                  <a:t>A consumer would solve the </a:t>
+                  <a:t>Income follows a stochastic process with uncertainty </a:t>
+                </a:r>
+                <a14:m>
+                  <m:oMath xmlns:m="http://schemas.openxmlformats.org/officeDocument/2006/math">
+                    <m:r>
+                      <a:rPr lang="en-GB" i="1">
+                        <a:latin typeface="Cambria Math" panose="02040503050406030204" pitchFamily="18" charset="0"/>
+                      </a:rPr>
+                      <m:t>𝜎</m:t>
+                    </m:r>
+                  </m:oMath>
+                </a14:m>
+                <a:r>
+                  <a:rPr lang="en-GB" dirty="0"/>
+                  <a:t> – but the consumer sets quality </a:t>
+                </a:r>
+                <a14:m>
+                  <m:oMath xmlns:m="http://schemas.openxmlformats.org/officeDocument/2006/math">
+                    <m:r>
+                      <a:rPr lang="en-GB" i="1">
+                        <a:latin typeface="Cambria Math" panose="02040503050406030204" pitchFamily="18" charset="0"/>
+                      </a:rPr>
+                      <m:t>𝜈</m:t>
+                    </m:r>
+                    <m:r>
+                      <a:rPr lang="en-GB" i="1">
+                        <a:latin typeface="Cambria Math" panose="02040503050406030204" pitchFamily="18" charset="0"/>
+                      </a:rPr>
+                      <m:t> </m:t>
+                    </m:r>
+                  </m:oMath>
+                </a14:m>
+                <a:r>
+                  <a:rPr lang="en-GB" dirty="0"/>
+                  <a:t>based on </a:t>
+                </a:r>
+                <a14:m>
+                  <m:oMath xmlns:m="http://schemas.openxmlformats.org/officeDocument/2006/math">
+                    <m:r>
+                      <m:rPr>
+                        <m:sty m:val="p"/>
+                      </m:rPr>
+                      <a:rPr lang="en-GB" b="0" i="0" smtClean="0">
+                        <a:latin typeface="Cambria Math" panose="02040503050406030204" pitchFamily="18" charset="0"/>
+                      </a:rPr>
+                      <m:t>Γ</m:t>
+                    </m:r>
+                  </m:oMath>
+                </a14:m>
+                <a:r>
+                  <a:rPr lang="en-GB" dirty="0"/>
+                  <a:t> – returning different discounting factors based on </a:t>
+                </a:r>
+                <a14:m>
+                  <m:oMath xmlns:m="http://schemas.openxmlformats.org/officeDocument/2006/math">
+                    <m:r>
+                      <a:rPr lang="en-GB" b="0" i="1" smtClean="0">
+                        <a:latin typeface="Cambria Math" panose="02040503050406030204" pitchFamily="18" charset="0"/>
+                      </a:rPr>
+                      <m:t>𝜌</m:t>
+                    </m:r>
+                    <m:r>
+                      <a:rPr lang="en-GB" b="0" i="1" smtClean="0">
+                        <a:latin typeface="Cambria Math" panose="02040503050406030204" pitchFamily="18" charset="0"/>
+                      </a:rPr>
+                      <m:t>,</m:t>
+                    </m:r>
+                    <m:sSub>
+                      <m:sSubPr>
+                        <m:ctrlPr>
+                          <a:rPr lang="en-GB" b="0" i="1" smtClean="0">
+                            <a:latin typeface="Cambria Math" panose="02040503050406030204" pitchFamily="18" charset="0"/>
+                          </a:rPr>
+                        </m:ctrlPr>
+                      </m:sSubPr>
+                      <m:e>
+                        <m:r>
+                          <a:rPr lang="en-GB" b="0" i="1" smtClean="0">
+                            <a:latin typeface="Cambria Math" panose="02040503050406030204" pitchFamily="18" charset="0"/>
+                          </a:rPr>
+                          <m:t>𝐴</m:t>
+                        </m:r>
+                      </m:e>
+                      <m:sub>
+                        <m:r>
+                          <a:rPr lang="en-GB" b="0" i="1" smtClean="0">
+                            <a:latin typeface="Cambria Math" panose="02040503050406030204" pitchFamily="18" charset="0"/>
+                          </a:rPr>
+                          <m:t>𝑡</m:t>
+                        </m:r>
+                      </m:sub>
+                    </m:sSub>
+                  </m:oMath>
+                </a14:m>
+                <a:endParaRPr lang="en-GB" dirty="0"/>
+              </a:p>
+              <a:p>
+                <a:r>
+                  <a:rPr lang="en-GB" dirty="0"/>
+                  <a:t>Given a utility function </a:t>
+                </a:r>
+                <a14:m>
+                  <m:oMath xmlns:m="http://schemas.openxmlformats.org/officeDocument/2006/math">
+                    <m:r>
+                      <m:rPr>
+                        <m:sty m:val="p"/>
+                      </m:rPr>
+                      <a:rPr lang="en-GB">
+                        <a:latin typeface="Cambria Math" panose="02040503050406030204" pitchFamily="18" charset="0"/>
+                      </a:rPr>
+                      <m:t>u</m:t>
+                    </m:r>
+                    <m:r>
+                      <a:rPr lang="en-GB">
+                        <a:latin typeface="Cambria Math" panose="02040503050406030204" pitchFamily="18" charset="0"/>
+                      </a:rPr>
+                      <m:t>(</m:t>
+                    </m:r>
+                    <m:r>
+                      <m:rPr>
+                        <m:sty m:val="p"/>
+                      </m:rPr>
+                      <a:rPr lang="en-GB">
+                        <a:latin typeface="Cambria Math" panose="02040503050406030204" pitchFamily="18" charset="0"/>
+                      </a:rPr>
+                      <m:t>A</m:t>
+                    </m:r>
+                    <m:r>
+                      <a:rPr lang="en-GB">
+                        <a:latin typeface="Cambria Math" panose="02040503050406030204" pitchFamily="18" charset="0"/>
+                      </a:rPr>
+                      <m:t>,</m:t>
+                    </m:r>
+                    <m:r>
+                      <a:rPr lang="en-GB" i="1">
+                        <a:latin typeface="Cambria Math" panose="02040503050406030204" pitchFamily="18" charset="0"/>
+                      </a:rPr>
+                      <m:t>𝜌</m:t>
+                    </m:r>
+                    <m:r>
+                      <a:rPr lang="en-GB">
+                        <a:latin typeface="Cambria Math" panose="02040503050406030204" pitchFamily="18" charset="0"/>
+                      </a:rPr>
+                      <m:t>,</m:t>
+                    </m:r>
+                    <m:r>
+                      <a:rPr lang="en-GB" i="1">
+                        <a:latin typeface="Cambria Math" panose="02040503050406030204" pitchFamily="18" charset="0"/>
+                      </a:rPr>
+                      <m:t>𝜈</m:t>
+                    </m:r>
+                    <m:r>
+                      <a:rPr lang="en-GB" i="1">
+                        <a:latin typeface="Cambria Math" panose="02040503050406030204" pitchFamily="18" charset="0"/>
+                      </a:rPr>
+                      <m:t>)</m:t>
+                    </m:r>
+                  </m:oMath>
+                </a14:m>
+                <a:r>
+                  <a:rPr lang="en-GB" dirty="0"/>
+                  <a:t>, a consumer would solve the </a:t>
                 </a:r>
                 <a14:m>
                   <m:oMath xmlns:m="http://schemas.openxmlformats.org/officeDocument/2006/math">
@@ -18767,75 +21290,10 @@
                 </a14:m>
                 <a:r>
                   <a:rPr lang="en-GB" dirty="0"/>
-                  <a:t> - given a utility function </a:t>
-                </a:r>
-                <a14:m>
-                  <m:oMath xmlns:m="http://schemas.openxmlformats.org/officeDocument/2006/math">
-                    <m:r>
-                      <m:rPr>
-                        <m:sty m:val="p"/>
-                      </m:rPr>
-                      <a:rPr lang="en-GB" b="0" i="0" smtClean="0">
-                        <a:latin typeface="Cambria Math" panose="02040503050406030204" pitchFamily="18" charset="0"/>
-                      </a:rPr>
-                      <m:t>u</m:t>
-                    </m:r>
-                    <m:r>
-                      <a:rPr lang="en-GB" b="0" i="0" smtClean="0">
-                        <a:latin typeface="Cambria Math" panose="02040503050406030204" pitchFamily="18" charset="0"/>
-                      </a:rPr>
-                      <m:t>(</m:t>
-                    </m:r>
-                    <m:r>
-                      <m:rPr>
-                        <m:sty m:val="p"/>
-                      </m:rPr>
-                      <a:rPr lang="en-GB" b="0" i="0" smtClean="0">
-                        <a:latin typeface="Cambria Math" panose="02040503050406030204" pitchFamily="18" charset="0"/>
-                      </a:rPr>
-                      <m:t>A</m:t>
-                    </m:r>
-                    <m:r>
-                      <a:rPr lang="en-GB" b="0" i="0" smtClean="0">
-                        <a:latin typeface="Cambria Math" panose="02040503050406030204" pitchFamily="18" charset="0"/>
-                      </a:rPr>
-                      <m:t>,</m:t>
-                    </m:r>
-                    <m:r>
-                      <a:rPr lang="en-GB" b="0" i="1" smtClean="0">
-                        <a:latin typeface="Cambria Math" panose="02040503050406030204" pitchFamily="18" charset="0"/>
-                      </a:rPr>
-                      <m:t>𝜌</m:t>
-                    </m:r>
-                    <m:r>
-                      <a:rPr lang="en-GB" b="0" i="0" smtClean="0">
-                        <a:latin typeface="Cambria Math" panose="02040503050406030204" pitchFamily="18" charset="0"/>
-                      </a:rPr>
-                      <m:t>,</m:t>
-                    </m:r>
-                    <m:r>
-                      <a:rPr lang="en-GB" b="0" i="1" smtClean="0">
-                        <a:latin typeface="Cambria Math" panose="02040503050406030204" pitchFamily="18" charset="0"/>
-                      </a:rPr>
-                      <m:t>𝜈</m:t>
-                    </m:r>
-                    <m:r>
-                      <a:rPr lang="en-GB" b="0" i="1" smtClean="0">
-                        <a:latin typeface="Cambria Math" panose="02040503050406030204" pitchFamily="18" charset="0"/>
-                      </a:rPr>
-                      <m:t>)</m:t>
-                    </m:r>
-                  </m:oMath>
-                </a14:m>
-                <a:r>
-                  <a:rPr lang="en-GB" dirty="0"/>
-                  <a:t>.  This would solve a stochastic dynamic optimisation problem – whose solution can often be obtained only through simulations</a:t>
+                  <a:t>.  This would result in a stochastic dynamic optimisation problem – which is often solved through simulations. Log-linear approaches are discouraged.</a:t>
                 </a:r>
               </a:p>
               <a:p>
-                <a:pPr marL="0" indent="0">
-                  <a:buNone/>
-                </a:pPr>
                 <a:r>
                   <a:rPr lang="en-GB" dirty="0"/>
                   <a:t>Notice that we associate consumption both with quality </a:t>
@@ -18870,7 +21328,10 @@
                     </m:d>
                   </m:oMath>
                 </a14:m>
-                <a:endParaRPr lang="en-GB" dirty="0"/>
+                <a:r>
+                  <a:rPr lang="en-GB" dirty="0"/>
+                  <a:t> and needs/</a:t>
+                </a:r>
               </a:p>
               <a:p>
                 <a:pPr marL="0" indent="0">
@@ -18902,7 +21363,7 @@
               <a:blipFill>
                 <a:blip r:embed="rId2"/>
                 <a:stretch>
-                  <a:fillRect l="-77"/>
+                  <a:fillRect r="-232"/>
                 </a:stretch>
               </a:blipFill>
             </p:spPr>
@@ -18950,7 +21411,7 @@
               <a:pPr>
                 <a:defRPr/>
               </a:pPr>
-              <a:t>13</a:t>
+              <a:t>14</a:t>
             </a:fld>
             <a:endParaRPr lang="en-GB" altLang="en-US" dirty="0"/>
           </a:p>
@@ -18972,7 +21433,7 @@
 </p:sld>
 </file>
 
-<file path=ppt/slides/slide14.xml><?xml version="1.0" encoding="utf-8"?>
+<file path=ppt/slides/slide15.xml><?xml version="1.0" encoding="utf-8"?>
 <p:sld xmlns:a="http://schemas.openxmlformats.org/drawingml/2006/main" xmlns:r="http://schemas.openxmlformats.org/officeDocument/2006/relationships" xmlns:p="http://schemas.openxmlformats.org/presentationml/2006/main">
   <p:cSld>
     <p:spTree>
@@ -20054,16 +22515,7 @@
                 </a14:m>
                 <a:r>
                   <a:rPr lang="en-GB" dirty="0"/>
-                  <a:t>.</a:t>
-                </a:r>
-              </a:p>
-              <a:p>
-                <a:pPr marL="0" indent="0">
-                  <a:buNone/>
-                </a:pPr>
-                <a:r>
-                  <a:rPr lang="en-GB" dirty="0"/>
-                  <a:t>and the constraint </a:t>
+                  <a:t> and the constraint </a:t>
                 </a:r>
                 <a14:m>
                   <m:oMath xmlns:m="http://schemas.openxmlformats.org/officeDocument/2006/math">
@@ -20125,7 +22577,21 @@
                 </a14:m>
                 <a:r>
                   <a:rPr lang="en-GB" dirty="0"/>
-                  <a:t> brought about by ownership of assets.</a:t>
+                  <a:t> is brought about by ownership of assets. This non-stochastic replaces </a:t>
+                </a:r>
+                <a14:m>
+                  <m:oMath xmlns:m="http://schemas.openxmlformats.org/officeDocument/2006/math">
+                    <m:r>
+                      <a:rPr lang="en-GB" i="1">
+                        <a:latin typeface="Cambria Math" panose="02040503050406030204" pitchFamily="18" charset="0"/>
+                      </a:rPr>
+                      <m:t>𝜌</m:t>
+                    </m:r>
+                  </m:oMath>
+                </a14:m>
+                <a:r>
+                  <a:rPr lang="en-GB" dirty="0"/>
+                  <a:t>-discounting with cost.</a:t>
                 </a:r>
               </a:p>
               <a:p>
@@ -20155,7 +22621,7 @@
               <a:blipFill>
                 <a:blip r:embed="rId2"/>
                 <a:stretch>
-                  <a:fillRect l="-618" b="-2243"/>
+                  <a:fillRect l="-618"/>
                 </a:stretch>
               </a:blipFill>
             </p:spPr>
@@ -20203,7 +22669,7 @@
               <a:pPr>
                 <a:defRPr/>
               </a:pPr>
-              <a:t>14</a:t>
+              <a:t>15</a:t>
             </a:fld>
             <a:endParaRPr lang="en-GB" altLang="en-US" dirty="0"/>
           </a:p>
@@ -20225,7 +22691,7 @@
 </p:sld>
 </file>
 
-<file path=ppt/slides/slide15.xml><?xml version="1.0" encoding="utf-8"?>
+<file path=ppt/slides/slide16.xml><?xml version="1.0" encoding="utf-8"?>
 <p:sld xmlns:a="http://schemas.openxmlformats.org/drawingml/2006/main" xmlns:r="http://schemas.openxmlformats.org/officeDocument/2006/relationships" xmlns:p="http://schemas.openxmlformats.org/presentationml/2006/main">
   <p:cSld>
     <p:spTree>
@@ -20265,7 +22731,7 @@
           <a:p>
             <a:r>
               <a:rPr lang="en-GB" dirty="0"/>
-              <a:t>Empirical Issues</a:t>
+              <a:t>Empirical Concerns</a:t>
             </a:r>
           </a:p>
         </p:txBody>
@@ -20293,7 +22759,7 @@
           <a:p>
             <a:r>
               <a:rPr lang="en-GB" dirty="0"/>
-              <a:t>It is easy to determine in the empirical data – which characteristics can be passed down to generations</a:t>
+              <a:t>It is easy to determine which characteristics can be passed down to generations in the empirical data</a:t>
             </a:r>
           </a:p>
           <a:p>
@@ -20345,7 +22811,7 @@
               <a:pPr>
                 <a:defRPr/>
               </a:pPr>
-              <a:t>15</a:t>
+              <a:t>16</a:t>
             </a:fld>
             <a:endParaRPr lang="en-GB" altLang="en-US" dirty="0"/>
           </a:p>
@@ -20367,7 +22833,7 @@
 </p:sld>
 </file>
 
-<file path=ppt/slides/slide16.xml><?xml version="1.0" encoding="utf-8"?>
+<file path=ppt/slides/slide17.xml><?xml version="1.0" encoding="utf-8"?>
 <p:sld xmlns:a="http://schemas.openxmlformats.org/drawingml/2006/main" xmlns:r="http://schemas.openxmlformats.org/officeDocument/2006/relationships" xmlns:p="http://schemas.openxmlformats.org/presentationml/2006/main">
   <p:cSld>
     <p:spTree>
@@ -20433,6 +22899,10 @@
           <a:bodyPr/>
           <a:lstStyle/>
           <a:p>
+            <a:pPr marL="457200" indent="-457200">
+              <a:buFont typeface="+mj-lt"/>
+              <a:buAutoNum type="arabicPeriod"/>
+            </a:pPr>
             <a:r>
               <a:rPr lang="en-GB" dirty="0"/>
               <a:t>A Deaton, </a:t>
@@ -20447,10 +22917,77 @@
             </a:r>
           </a:p>
           <a:p>
+            <a:pPr marL="457200" indent="-457200">
+              <a:buFont typeface="+mj-lt"/>
+              <a:buAutoNum type="arabicPeriod"/>
+            </a:pPr>
             <a:r>
               <a:rPr lang="en-GB" dirty="0"/>
-              <a:t>N J Ireland, “On limiting the market for status signals,” Journal of Public Economics, 1994</a:t>
-            </a:r>
+              <a:t>N J Ireland, “On limiting the market for status signals,” </a:t>
+            </a:r>
+            <a:r>
+              <a:rPr lang="en-GB" i="1" dirty="0"/>
+              <a:t>Journal of Public Economics</a:t>
+            </a:r>
+            <a:r>
+              <a:rPr lang="en-GB" dirty="0"/>
+              <a:t>, 1994</a:t>
+            </a:r>
+          </a:p>
+          <a:p>
+            <a:pPr marL="457200" indent="-457200" fontAlgn="ctr">
+              <a:buFont typeface="+mj-lt"/>
+              <a:buAutoNum type="arabicPeriod"/>
+            </a:pPr>
+            <a:r>
+              <a:rPr lang="en-GB" dirty="0"/>
+              <a:t>L </a:t>
+            </a:r>
+            <a:r>
+              <a:rPr lang="en-GB" dirty="0" err="1"/>
+              <a:t>Doyal</a:t>
+            </a:r>
+            <a:r>
+              <a:rPr lang="en-GB" dirty="0"/>
+              <a:t> and I Gough, </a:t>
+            </a:r>
+            <a:r>
+              <a:rPr lang="en-GB" i="1" dirty="0"/>
+              <a:t>A Theory of Human Need, </a:t>
+            </a:r>
+            <a:r>
+              <a:rPr lang="en-GB" dirty="0"/>
+              <a:t>Palgrave London 1991</a:t>
+            </a:r>
+          </a:p>
+          <a:p>
+            <a:pPr marL="457200" indent="-457200" fontAlgn="ctr">
+              <a:buFont typeface="+mj-lt"/>
+              <a:buAutoNum type="arabicPeriod"/>
+            </a:pPr>
+            <a:r>
+              <a:rPr lang="en-GB" dirty="0"/>
+              <a:t>G Loewenstein and D </a:t>
+            </a:r>
+            <a:r>
+              <a:rPr lang="en-GB" dirty="0" err="1"/>
+              <a:t>Prelec</a:t>
+            </a:r>
+            <a:r>
+              <a:rPr lang="en-GB" dirty="0"/>
+              <a:t>, “Anomalies in Intertemporal Choice: Evidence and an Interpretation”, </a:t>
+            </a:r>
+            <a:r>
+              <a:rPr lang="en-GB" i="1" dirty="0"/>
+              <a:t>The Quarterly Journal of Economics</a:t>
+            </a:r>
+            <a:r>
+              <a:rPr lang="en-GB" dirty="0"/>
+              <a:t>, 107 (2) (May, 1992), pp. 573-597</a:t>
+            </a:r>
+          </a:p>
+          <a:p>
+            <a:endParaRPr lang="en-GB" dirty="0"/>
           </a:p>
         </p:txBody>
       </p:sp>
@@ -20483,7 +23020,7 @@
               <a:pPr>
                 <a:defRPr/>
               </a:pPr>
-              <a:t>16</a:t>
+              <a:t>17</a:t>
             </a:fld>
             <a:endParaRPr lang="en-GB" altLang="en-US" dirty="0"/>
           </a:p>
@@ -20629,6 +23166,146 @@
           <p:cNvPr id="2" name="Title 1">
             <a:extLst>
               <a:ext uri="{FF2B5EF4-FFF2-40B4-BE49-F238E27FC236}">
+                <a16:creationId xmlns:a16="http://schemas.microsoft.com/office/drawing/2014/main" id="{0C807D39-567F-47A4-9152-FB5354A26436}"/>
+              </a:ext>
+            </a:extLst>
+          </p:cNvPr>
+          <p:cNvSpPr>
+            <a:spLocks noGrp="1"/>
+          </p:cNvSpPr>
+          <p:nvPr>
+            <p:ph type="title"/>
+          </p:nvPr>
+        </p:nvSpPr>
+        <p:spPr/>
+        <p:txBody>
+          <a:bodyPr/>
+          <a:lstStyle/>
+          <a:p>
+            <a:r>
+              <a:rPr lang="en-GB" dirty="0"/>
+              <a:t>What are “needs”?</a:t>
+            </a:r>
+          </a:p>
+        </p:txBody>
+      </p:sp>
+      <p:sp>
+        <p:nvSpPr>
+          <p:cNvPr id="3" name="Content Placeholder 2">
+            <a:extLst>
+              <a:ext uri="{FF2B5EF4-FFF2-40B4-BE49-F238E27FC236}">
+                <a16:creationId xmlns:a16="http://schemas.microsoft.com/office/drawing/2014/main" id="{FA1E554A-079D-44D9-8B97-FA9E72A5FFB9}"/>
+              </a:ext>
+            </a:extLst>
+          </p:cNvPr>
+          <p:cNvSpPr>
+            <a:spLocks noGrp="1"/>
+          </p:cNvSpPr>
+          <p:nvPr>
+            <p:ph idx="1"/>
+          </p:nvPr>
+        </p:nvSpPr>
+        <p:spPr/>
+        <p:txBody>
+          <a:bodyPr/>
+          <a:lstStyle/>
+          <a:p>
+            <a:r>
+              <a:rPr lang="en-GB" dirty="0"/>
+              <a:t>On one hand we have the view supported by Townsend that treats “needs” purely as subjective preferences</a:t>
+            </a:r>
+          </a:p>
+          <a:p>
+            <a:r>
+              <a:rPr lang="en-GB" dirty="0"/>
+              <a:t>On the other extreme, there is the view that “needs” should be decided by a benign central committee</a:t>
+            </a:r>
+          </a:p>
+          <a:p>
+            <a:r>
+              <a:rPr lang="en-GB" dirty="0" err="1"/>
+              <a:t>Doyal</a:t>
+            </a:r>
+            <a:r>
+              <a:rPr lang="en-GB" dirty="0"/>
+              <a:t> and Gough[3] define needs in terms of health and autonomy – deriving societal preconditions for them in a general theory</a:t>
+            </a:r>
+          </a:p>
+        </p:txBody>
+      </p:sp>
+      <p:sp>
+        <p:nvSpPr>
+          <p:cNvPr id="4" name="Slide Number Placeholder 3">
+            <a:extLst>
+              <a:ext uri="{FF2B5EF4-FFF2-40B4-BE49-F238E27FC236}">
+                <a16:creationId xmlns:a16="http://schemas.microsoft.com/office/drawing/2014/main" id="{50066A6D-8A7E-48EA-90F8-26BD6819350B}"/>
+              </a:ext>
+            </a:extLst>
+          </p:cNvPr>
+          <p:cNvSpPr>
+            <a:spLocks noGrp="1"/>
+          </p:cNvSpPr>
+          <p:nvPr>
+            <p:ph type="sldNum" sz="quarter" idx="12"/>
+          </p:nvPr>
+        </p:nvSpPr>
+        <p:spPr/>
+        <p:txBody>
+          <a:bodyPr/>
+          <a:lstStyle/>
+          <a:p>
+            <a:pPr>
+              <a:defRPr/>
+            </a:pPr>
+            <a:fld id="{8E35B453-7314-4BBD-9303-11C6BECC4B0D}" type="slidenum">
+              <a:rPr lang="en-GB" altLang="en-US" smtClean="0"/>
+              <a:pPr>
+                <a:defRPr/>
+              </a:pPr>
+              <a:t>3</a:t>
+            </a:fld>
+            <a:endParaRPr lang="en-GB" altLang="en-US" dirty="0"/>
+          </a:p>
+        </p:txBody>
+      </p:sp>
+    </p:spTree>
+    <p:extLst>
+      <p:ext uri="{BB962C8B-B14F-4D97-AF65-F5344CB8AC3E}">
+        <p14:creationId xmlns:p14="http://schemas.microsoft.com/office/powerpoint/2010/main" val="2562248813"/>
+      </p:ext>
+    </p:extLst>
+  </p:cSld>
+  <p:clrMapOvr>
+    <a:masterClrMapping/>
+  </p:clrMapOvr>
+  <p:transition>
+    <p:fade/>
+  </p:transition>
+</p:sld>
+</file>
+
+<file path=ppt/slides/slide4.xml><?xml version="1.0" encoding="utf-8"?>
+<p:sld xmlns:a="http://schemas.openxmlformats.org/drawingml/2006/main" xmlns:r="http://schemas.openxmlformats.org/officeDocument/2006/relationships" xmlns:p="http://schemas.openxmlformats.org/presentationml/2006/main">
+  <p:cSld>
+    <p:spTree>
+      <p:nvGrpSpPr>
+        <p:cNvPr id="1" name=""/>
+        <p:cNvGrpSpPr/>
+        <p:nvPr/>
+      </p:nvGrpSpPr>
+      <p:grpSpPr>
+        <a:xfrm>
+          <a:off x="0" y="0"/>
+          <a:ext cx="0" cy="0"/>
+          <a:chOff x="0" y="0"/>
+          <a:chExt cx="0" cy="0"/>
+        </a:xfrm>
+      </p:grpSpPr>
+      <p:sp>
+        <p:nvSpPr>
+          <p:cNvPr id="2" name="Title 1">
+            <a:extLst>
+              <a:ext uri="{FF2B5EF4-FFF2-40B4-BE49-F238E27FC236}">
                 <a16:creationId xmlns:a16="http://schemas.microsoft.com/office/drawing/2014/main" id="{14DC5EE8-DF91-4A2F-B735-EEFB35034214}"/>
               </a:ext>
             </a:extLst>
@@ -20723,7 +23400,7 @@
               <a:pPr>
                 <a:defRPr/>
               </a:pPr>
-              <a:t>3</a:t>
+              <a:t>4</a:t>
             </a:fld>
             <a:endParaRPr lang="en-GB" altLang="en-US" dirty="0"/>
           </a:p>
@@ -20745,7 +23422,7 @@
 </p:sld>
 </file>
 
-<file path=ppt/slides/slide4.xml><?xml version="1.0" encoding="utf-8"?>
+<file path=ppt/slides/slide5.xml><?xml version="1.0" encoding="utf-8"?>
 <p:sld xmlns:a="http://schemas.openxmlformats.org/drawingml/2006/main" xmlns:r="http://schemas.openxmlformats.org/officeDocument/2006/relationships" xmlns:p="http://schemas.openxmlformats.org/presentationml/2006/main">
   <p:cSld>
     <p:spTree>
@@ -20790,7 +23467,7 @@
           <a:p>
             <a:r>
               <a:rPr lang="en-GB" dirty="0"/>
-              <a:t>Assumptions in a model for status demand </a:t>
+              <a:t>Key Assumptions</a:t>
             </a:r>
           </a:p>
         </p:txBody>
@@ -20832,7 +23509,7 @@
             </a:r>
             <a:r>
               <a:rPr lang="en-GB" dirty="0"/>
-              <a:t>-  There is a rational benefit to be had from status consumption (otherwise consumers would stay away from it in the long-run)</a:t>
+              <a:t>-  There is a rational benefit to be had from status consumption (otherwise consumers would stay away from it in the long-run). The consumer preferences for status are not errors in judgment. </a:t>
             </a:r>
           </a:p>
           <a:p>
@@ -20842,11 +23519,11 @@
             </a:r>
             <a:r>
               <a:rPr lang="en-GB" i="1" dirty="0"/>
-              <a:t>Long-term Assets </a:t>
+              <a:t>Assets can be held for long - </a:t>
             </a:r>
             <a:r>
               <a:rPr lang="en-GB" dirty="0"/>
-              <a:t>Status-related consumption that is not considered “wealth” (i.e. most of non-durable status-related consumption) cannot be inherited (bequeathed) and thus cannot survive over generations</a:t>
+              <a:t>Status-related consumption that is not considered “wealth” (i.e. most of non-durable status-related consumption) cannot be inherited (bequeathed) but all else can</a:t>
             </a:r>
           </a:p>
           <a:p>
@@ -20883,7 +23560,7 @@
               <a:pPr>
                 <a:defRPr/>
               </a:pPr>
-              <a:t>4</a:t>
+              <a:t>5</a:t>
             </a:fld>
             <a:endParaRPr lang="en-GB" altLang="en-US" dirty="0"/>
           </a:p>
@@ -20905,7 +23582,7 @@
 </p:sld>
 </file>
 
-<file path=ppt/slides/slide5.xml><?xml version="1.0" encoding="utf-8"?>
+<file path=ppt/slides/slide6.xml><?xml version="1.0" encoding="utf-8"?>
 <p:sld xmlns:a="http://schemas.openxmlformats.org/drawingml/2006/main" xmlns:r="http://schemas.openxmlformats.org/officeDocument/2006/relationships" xmlns:p="http://schemas.openxmlformats.org/presentationml/2006/main">
   <p:cSld>
     <p:spTree>
@@ -20945,7 +23622,7 @@
           <a:p>
             <a:r>
               <a:rPr lang="en-GB" dirty="0"/>
-              <a:t>Choices for the representative consumer</a:t>
+              <a:t>Model for Consumer Demand</a:t>
             </a:r>
           </a:p>
         </p:txBody>
@@ -20969,7 +23646,7 @@
         <p:spPr/>
         <p:txBody>
           <a:bodyPr>
-            <a:normAutofit/>
+            <a:normAutofit lnSpcReduction="10000"/>
           </a:bodyPr>
           <a:lstStyle/>
           <a:p>
@@ -20981,19 +23658,40 @@
           <a:p>
             <a:r>
               <a:rPr lang="en-GB" dirty="0"/>
-              <a:t>A2 separates consumption for long-term from short-term consumption</a:t>
-            </a:r>
-          </a:p>
-          <a:p>
+              <a:t>A2 separates long-term consumption from short-term consumption while considering the differences in start wealth of consumers</a:t>
+            </a:r>
+          </a:p>
+          <a:p>
+            <a:r>
+              <a:rPr lang="en-GB" dirty="0"/>
+              <a:t>Three claims about status follow:</a:t>
+            </a:r>
+          </a:p>
+          <a:p>
+            <a:pPr lvl="1"/>
             <a:r>
               <a:rPr lang="en-GB" dirty="0"/>
               <a:t>Claim 1: Status can come from either quality in non-durable consumption or wealth (which is durable consumption plus other long-term characteristics)</a:t>
             </a:r>
           </a:p>
           <a:p>
+            <a:pPr lvl="1"/>
             <a:r>
               <a:rPr lang="en-GB" dirty="0"/>
               <a:t>Claim 2: Assets are more expensive but a more certain provider of status</a:t>
+            </a:r>
+          </a:p>
+          <a:p>
+            <a:pPr lvl="1"/>
+            <a:r>
+              <a:rPr lang="en-GB" dirty="0"/>
+              <a:t>Claim 3: Fulfilment of minimum needs carries no status-advantage</a:t>
+            </a:r>
+          </a:p>
+          <a:p>
+            <a:r>
+              <a:rPr lang="en-GB" dirty="0"/>
+              <a:t>Question: Would wealth or assets influence status consumption?</a:t>
             </a:r>
           </a:p>
           <a:p>
@@ -21036,7 +23734,7 @@
               <a:pPr>
                 <a:defRPr/>
               </a:pPr>
-              <a:t>5</a:t>
+              <a:t>6</a:t>
             </a:fld>
             <a:endParaRPr lang="en-GB" altLang="en-US" dirty="0"/>
           </a:p>
@@ -21058,7 +23756,7 @@
 </p:sld>
 </file>
 
-<file path=ppt/slides/slide6.xml><?xml version="1.0" encoding="utf-8"?>
+<file path=ppt/slides/slide7.xml><?xml version="1.0" encoding="utf-8"?>
 <p:sld xmlns:a="http://schemas.openxmlformats.org/drawingml/2006/main" xmlns:r="http://schemas.openxmlformats.org/officeDocument/2006/relationships" xmlns:p="http://schemas.openxmlformats.org/presentationml/2006/main">
   <p:cSld>
     <p:spTree>
@@ -21122,41 +23820,50 @@
         <p:spPr/>
         <p:txBody>
           <a:bodyPr>
-            <a:normAutofit/>
+            <a:normAutofit lnSpcReduction="10000"/>
           </a:bodyPr>
           <a:lstStyle/>
           <a:p>
             <a:r>
+              <a:rPr lang="en-GB" dirty="0"/>
+              <a:t>Endowment effects and status-quo effects have been known to exist for a long time. Questions:</a:t>
+            </a:r>
+          </a:p>
+          <a:p>
+            <a:pPr lvl="1"/>
+            <a:r>
+              <a:rPr lang="en-GB" dirty="0"/>
+              <a:t>How does include them in a model for demand?</a:t>
+            </a:r>
+          </a:p>
+          <a:p>
+            <a:pPr lvl="1"/>
+            <a:r>
+              <a:rPr lang="en-GB" dirty="0"/>
+              <a:t>Can status be subjective?</a:t>
+            </a:r>
+          </a:p>
+          <a:p>
+            <a:pPr lvl="1"/>
+            <a:r>
+              <a:rPr lang="en-GB" dirty="0"/>
+              <a:t>Is status the cause or effect of status-related consumption? </a:t>
+            </a:r>
+          </a:p>
+          <a:p>
+            <a:r>
               <a:rPr lang="en-GB" dirty="0" err="1"/>
               <a:t>Corneo</a:t>
             </a:r>
             <a:r>
               <a:rPr lang="en-GB" dirty="0"/>
-              <a:t> et al consider a game-theoretic ranking model – where consumers participate with income and status goods</a:t>
-            </a:r>
-          </a:p>
-          <a:p>
-            <a:r>
-              <a:rPr lang="en-GB" dirty="0"/>
-              <a:t>The literature often focuses on additional utility derived from visible consumption (see Ireland model) – this also gets around empirical issues</a:t>
+              <a:t> et al consider a game-theoretic ranking model – where consumers participate with income and status goods. The literature on status consumption focuses on additional utility derived from visible consumption (see Ireland[2] model) </a:t>
             </a:r>
           </a:p>
           <a:p>
             <a:r>
               <a:rPr lang="en-GB" dirty="0"/>
               <a:t>We consider status a combination of wealth (education, occupation, and long-term assets) and purchased quality</a:t>
-            </a:r>
-          </a:p>
-          <a:p>
-            <a:r>
-              <a:rPr lang="en-GB" dirty="0"/>
-              <a:t>Can status be subjective?</a:t>
-            </a:r>
-          </a:p>
-          <a:p>
-            <a:r>
-              <a:rPr lang="en-GB" dirty="0"/>
-              <a:t>Is status the cause or effect of status consumption?</a:t>
             </a:r>
           </a:p>
           <a:p>
@@ -21193,7 +23900,7 @@
               <a:pPr>
                 <a:defRPr/>
               </a:pPr>
-              <a:t>6</a:t>
+              <a:t>7</a:t>
             </a:fld>
             <a:endParaRPr lang="en-GB" altLang="en-US" dirty="0"/>
           </a:p>
@@ -21215,7 +23922,7 @@
 </p:sld>
 </file>
 
-<file path=ppt/slides/slide7.xml><?xml version="1.0" encoding="utf-8"?>
+<file path=ppt/slides/slide8.xml><?xml version="1.0" encoding="utf-8"?>
 <p:sld xmlns:a="http://schemas.openxmlformats.org/drawingml/2006/main" xmlns:r="http://schemas.openxmlformats.org/officeDocument/2006/relationships" xmlns:p="http://schemas.openxmlformats.org/presentationml/2006/main">
   <p:cSld>
     <p:spTree>
@@ -21255,7 +23962,7 @@
           <a:p>
             <a:r>
               <a:rPr lang="en-GB" dirty="0"/>
-              <a:t>What influences purchase of assets?</a:t>
+              <a:t>How does wealth affect consumption?</a:t>
             </a:r>
           </a:p>
         </p:txBody>
@@ -21276,27 +23983,37 @@
             <p:ph idx="1"/>
           </p:nvPr>
         </p:nvSpPr>
-        <p:spPr/>
+        <p:spPr>
+          <a:xfrm>
+            <a:off x="628650" y="1370012"/>
+            <a:ext cx="4095750" cy="3563937"/>
+          </a:xfrm>
+        </p:spPr>
         <p:txBody>
-          <a:bodyPr/>
+          <a:bodyPr>
+            <a:normAutofit fontScale="92500" lnSpcReduction="10000"/>
+          </a:bodyPr>
           <a:lstStyle/>
           <a:p>
             <a:r>
               <a:rPr lang="en-GB" dirty="0"/>
-              <a:t>In deciding whether to purchase assets or quality, does it matter how much wealth (or long term stability of income) the consumer has?</a:t>
+              <a:t>There is enough evidence to show that as an endowment, wealth would influence wealth –related risk-seeking (consider framing and loss aversion in prospect theory)</a:t>
             </a:r>
           </a:p>
           <a:p>
             <a:r>
               <a:rPr lang="en-GB" dirty="0"/>
-              <a:t>There is ample evidence of endowment effect in the literature on consumer research </a:t>
+              <a:t>To motivate a model, consider three players – an academic, a sportsman and an investor in a game to double their wealth with the same starting wealth. Their expectations may look like in the table.</a:t>
             </a:r>
           </a:p>
           <a:p>
             <a:r>
               <a:rPr lang="en-GB" dirty="0"/>
-              <a:t>The behavioural economics literature often explains the effect of wealth on consumer choice with theories of framing and loss aversion</a:t>
-            </a:r>
+              <a:t>These expectations are subjective (both short-term and long-term) but should drive their consumption</a:t>
+            </a:r>
+          </a:p>
+          <a:p>
+            <a:endParaRPr lang="en-GB" dirty="0"/>
           </a:p>
           <a:p>
             <a:endParaRPr lang="en-GB" dirty="0"/>
@@ -21332,214 +24049,316 @@
               <a:pPr>
                 <a:defRPr/>
               </a:pPr>
-              <a:t>7</a:t>
+              <a:t>8</a:t>
             </a:fld>
             <a:endParaRPr lang="en-GB" altLang="en-US" dirty="0"/>
           </a:p>
         </p:txBody>
       </p:sp>
+      <p:graphicFrame>
+        <p:nvGraphicFramePr>
+          <p:cNvPr id="7" name="Table 7">
+            <a:extLst>
+              <a:ext uri="{FF2B5EF4-FFF2-40B4-BE49-F238E27FC236}">
+                <a16:creationId xmlns:a16="http://schemas.microsoft.com/office/drawing/2014/main" id="{C609086B-0DF1-4B2E-A40E-D529AF6E5F2C}"/>
+              </a:ext>
+            </a:extLst>
+          </p:cNvPr>
+          <p:cNvGraphicFramePr>
+            <a:graphicFrameLocks noGrp="1"/>
+          </p:cNvGraphicFramePr>
+          <p:nvPr>
+            <p:extLst>
+              <p:ext uri="{D42A27DB-BD31-4B8C-83A1-F6EECF244321}">
+                <p14:modId xmlns:p14="http://schemas.microsoft.com/office/powerpoint/2010/main" val="3093412699"/>
+              </p:ext>
+            </p:extLst>
+          </p:nvPr>
+        </p:nvGraphicFramePr>
+        <p:xfrm>
+          <a:off x="4876800" y="1581150"/>
+          <a:ext cx="4095752" cy="2720340"/>
+        </p:xfrm>
+        <a:graphic>
+          <a:graphicData uri="http://schemas.openxmlformats.org/drawingml/2006/table">
+            <a:tbl>
+              <a:tblPr firstRow="1" bandRow="1">
+                <a:tableStyleId>{6E25E649-3F16-4E02-A733-19D2CDBF48F0}</a:tableStyleId>
+              </a:tblPr>
+              <a:tblGrid>
+                <a:gridCol w="1023938">
+                  <a:extLst>
+                    <a:ext uri="{9D8B030D-6E8A-4147-A177-3AD203B41FA5}">
+                      <a16:colId xmlns:a16="http://schemas.microsoft.com/office/drawing/2014/main" val="3019344676"/>
+                    </a:ext>
+                  </a:extLst>
+                </a:gridCol>
+                <a:gridCol w="1023938">
+                  <a:extLst>
+                    <a:ext uri="{9D8B030D-6E8A-4147-A177-3AD203B41FA5}">
+                      <a16:colId xmlns:a16="http://schemas.microsoft.com/office/drawing/2014/main" val="4234529950"/>
+                    </a:ext>
+                  </a:extLst>
+                </a:gridCol>
+                <a:gridCol w="1023938">
+                  <a:extLst>
+                    <a:ext uri="{9D8B030D-6E8A-4147-A177-3AD203B41FA5}">
+                      <a16:colId xmlns:a16="http://schemas.microsoft.com/office/drawing/2014/main" val="836410542"/>
+                    </a:ext>
+                  </a:extLst>
+                </a:gridCol>
+                <a:gridCol w="1023938">
+                  <a:extLst>
+                    <a:ext uri="{9D8B030D-6E8A-4147-A177-3AD203B41FA5}">
+                      <a16:colId xmlns:a16="http://schemas.microsoft.com/office/drawing/2014/main" val="3066453241"/>
+                    </a:ext>
+                  </a:extLst>
+                </a:gridCol>
+              </a:tblGrid>
+              <a:tr h="586740">
+                <a:tc>
+                  <a:txBody>
+                    <a:bodyPr/>
+                    <a:lstStyle/>
+                    <a:p>
+                      <a:r>
+                        <a:rPr lang="en-GB" dirty="0"/>
+                        <a:t>Likelihood of doubling the starting wealth</a:t>
+                      </a:r>
+                    </a:p>
+                  </a:txBody>
+                  <a:tcPr/>
+                </a:tc>
+                <a:tc>
+                  <a:txBody>
+                    <a:bodyPr/>
+                    <a:lstStyle/>
+                    <a:p>
+                      <a:r>
+                        <a:rPr lang="en-GB" dirty="0"/>
+                        <a:t>5y</a:t>
+                      </a:r>
+                    </a:p>
+                  </a:txBody>
+                  <a:tcPr/>
+                </a:tc>
+                <a:tc>
+                  <a:txBody>
+                    <a:bodyPr/>
+                    <a:lstStyle/>
+                    <a:p>
+                      <a:r>
+                        <a:rPr lang="en-GB" dirty="0"/>
+                        <a:t>15y</a:t>
+                      </a:r>
+                    </a:p>
+                  </a:txBody>
+                  <a:tcPr/>
+                </a:tc>
+                <a:tc>
+                  <a:txBody>
+                    <a:bodyPr/>
+                    <a:lstStyle/>
+                    <a:p>
+                      <a:r>
+                        <a:rPr lang="en-GB" dirty="0"/>
+                        <a:t>30y</a:t>
+                      </a:r>
+                    </a:p>
+                  </a:txBody>
+                  <a:tcPr/>
+                </a:tc>
+                <a:extLst>
+                  <a:ext uri="{0D108BD9-81ED-4DB2-BD59-A6C34878D82A}">
+                    <a16:rowId xmlns:a16="http://schemas.microsoft.com/office/drawing/2014/main" val="1468795186"/>
+                  </a:ext>
+                </a:extLst>
+              </a:tr>
+              <a:tr h="632460">
+                <a:tc>
+                  <a:txBody>
+                    <a:bodyPr/>
+                    <a:lstStyle/>
+                    <a:p>
+                      <a:r>
+                        <a:rPr lang="en-GB" dirty="0"/>
+                        <a:t>Academic</a:t>
+                      </a:r>
+                    </a:p>
+                  </a:txBody>
+                  <a:tcPr/>
+                </a:tc>
+                <a:tc>
+                  <a:txBody>
+                    <a:bodyPr/>
+                    <a:lstStyle/>
+                    <a:p>
+                      <a:r>
+                        <a:rPr lang="en-GB" dirty="0"/>
+                        <a:t>Low</a:t>
+                      </a:r>
+                    </a:p>
+                  </a:txBody>
+                  <a:tcPr/>
+                </a:tc>
+                <a:tc>
+                  <a:txBody>
+                    <a:bodyPr/>
+                    <a:lstStyle/>
+                    <a:p>
+                      <a:r>
+                        <a:rPr lang="en-GB" dirty="0"/>
+                        <a:t>Med</a:t>
+                      </a:r>
+                    </a:p>
+                  </a:txBody>
+                  <a:tcPr/>
+                </a:tc>
+                <a:tc>
+                  <a:txBody>
+                    <a:bodyPr/>
+                    <a:lstStyle/>
+                    <a:p>
+                      <a:r>
+                        <a:rPr lang="en-GB" dirty="0"/>
+                        <a:t>Med</a:t>
+                      </a:r>
+                    </a:p>
+                  </a:txBody>
+                  <a:tcPr/>
+                </a:tc>
+                <a:extLst>
+                  <a:ext uri="{0D108BD9-81ED-4DB2-BD59-A6C34878D82A}">
+                    <a16:rowId xmlns:a16="http://schemas.microsoft.com/office/drawing/2014/main" val="1741381568"/>
+                  </a:ext>
+                </a:extLst>
+              </a:tr>
+              <a:tr h="586740">
+                <a:tc>
+                  <a:txBody>
+                    <a:bodyPr/>
+                    <a:lstStyle/>
+                    <a:p>
+                      <a:r>
+                        <a:rPr lang="en-GB" dirty="0"/>
+                        <a:t>Sportsman</a:t>
+                      </a:r>
+                    </a:p>
+                  </a:txBody>
+                  <a:tcPr/>
+                </a:tc>
+                <a:tc>
+                  <a:txBody>
+                    <a:bodyPr/>
+                    <a:lstStyle/>
+                    <a:p>
+                      <a:r>
+                        <a:rPr lang="en-GB" dirty="0"/>
+                        <a:t>Med</a:t>
+                      </a:r>
+                    </a:p>
+                  </a:txBody>
+                  <a:tcPr/>
+                </a:tc>
+                <a:tc>
+                  <a:txBody>
+                    <a:bodyPr/>
+                    <a:lstStyle/>
+                    <a:p>
+                      <a:r>
+                        <a:rPr lang="en-GB" dirty="0"/>
+                        <a:t>High</a:t>
+                      </a:r>
+                    </a:p>
+                  </a:txBody>
+                  <a:tcPr/>
+                </a:tc>
+                <a:tc>
+                  <a:txBody>
+                    <a:bodyPr/>
+                    <a:lstStyle/>
+                    <a:p>
+                      <a:r>
+                        <a:rPr lang="en-GB" dirty="0"/>
+                        <a:t>Low</a:t>
+                      </a:r>
+                    </a:p>
+                  </a:txBody>
+                  <a:tcPr/>
+                </a:tc>
+                <a:extLst>
+                  <a:ext uri="{0D108BD9-81ED-4DB2-BD59-A6C34878D82A}">
+                    <a16:rowId xmlns:a16="http://schemas.microsoft.com/office/drawing/2014/main" val="4022235588"/>
+                  </a:ext>
+                </a:extLst>
+              </a:tr>
+              <a:tr h="586740">
+                <a:tc>
+                  <a:txBody>
+                    <a:bodyPr/>
+                    <a:lstStyle/>
+                    <a:p>
+                      <a:r>
+                        <a:rPr lang="en-GB" dirty="0"/>
+                        <a:t>Investor</a:t>
+                      </a:r>
+                    </a:p>
+                  </a:txBody>
+                  <a:tcPr/>
+                </a:tc>
+                <a:tc>
+                  <a:txBody>
+                    <a:bodyPr/>
+                    <a:lstStyle/>
+                    <a:p>
+                      <a:r>
+                        <a:rPr lang="en-GB" dirty="0"/>
+                        <a:t>Med</a:t>
+                      </a:r>
+                    </a:p>
+                  </a:txBody>
+                  <a:tcPr/>
+                </a:tc>
+                <a:tc>
+                  <a:txBody>
+                    <a:bodyPr/>
+                    <a:lstStyle/>
+                    <a:p>
+                      <a:r>
+                        <a:rPr lang="en-GB" dirty="0"/>
+                        <a:t>High</a:t>
+                      </a:r>
+                    </a:p>
+                  </a:txBody>
+                  <a:tcPr/>
+                </a:tc>
+                <a:tc>
+                  <a:txBody>
+                    <a:bodyPr/>
+                    <a:lstStyle/>
+                    <a:p>
+                      <a:r>
+                        <a:rPr lang="en-GB" dirty="0"/>
+                        <a:t>High</a:t>
+                      </a:r>
+                    </a:p>
+                  </a:txBody>
+                  <a:tcPr/>
+                </a:tc>
+                <a:extLst>
+                  <a:ext uri="{0D108BD9-81ED-4DB2-BD59-A6C34878D82A}">
+                    <a16:rowId xmlns:a16="http://schemas.microsoft.com/office/drawing/2014/main" val="3922436835"/>
+                  </a:ext>
+                </a:extLst>
+              </a:tr>
+            </a:tbl>
+          </a:graphicData>
+        </a:graphic>
+      </p:graphicFrame>
     </p:spTree>
     <p:extLst>
       <p:ext uri="{BB962C8B-B14F-4D97-AF65-F5344CB8AC3E}">
         <p14:creationId xmlns:p14="http://schemas.microsoft.com/office/powerpoint/2010/main" val="913010064"/>
-      </p:ext>
-    </p:extLst>
-  </p:cSld>
-  <p:clrMapOvr>
-    <a:masterClrMapping/>
-  </p:clrMapOvr>
-  <p:transition>
-    <p:fade/>
-  </p:transition>
-</p:sld>
-</file>
-
-<file path=ppt/slides/slide8.xml><?xml version="1.0" encoding="utf-8"?>
-<p:sld xmlns:a="http://schemas.openxmlformats.org/drawingml/2006/main" xmlns:r="http://schemas.openxmlformats.org/officeDocument/2006/relationships" xmlns:p="http://schemas.openxmlformats.org/presentationml/2006/main">
-  <p:cSld>
-    <p:spTree>
-      <p:nvGrpSpPr>
-        <p:cNvPr id="1" name=""/>
-        <p:cNvGrpSpPr/>
-        <p:nvPr/>
-      </p:nvGrpSpPr>
-      <p:grpSpPr>
-        <a:xfrm>
-          <a:off x="0" y="0"/>
-          <a:ext cx="0" cy="0"/>
-          <a:chOff x="0" y="0"/>
-          <a:chExt cx="0" cy="0"/>
-        </a:xfrm>
-      </p:grpSpPr>
-      <p:sp>
-        <p:nvSpPr>
-          <p:cNvPr id="2" name="Title 1">
-            <a:extLst>
-              <a:ext uri="{FF2B5EF4-FFF2-40B4-BE49-F238E27FC236}">
-                <a16:creationId xmlns:a16="http://schemas.microsoft.com/office/drawing/2014/main" id="{F4EA49FF-94AB-43BE-955A-70AC549908A8}"/>
-              </a:ext>
-            </a:extLst>
-          </p:cNvPr>
-          <p:cNvSpPr>
-            <a:spLocks noGrp="1"/>
-          </p:cNvSpPr>
-          <p:nvPr>
-            <p:ph type="title"/>
-          </p:nvPr>
-        </p:nvSpPr>
-        <p:spPr/>
-        <p:txBody>
-          <a:bodyPr/>
-          <a:lstStyle/>
-          <a:p>
-            <a:r>
-              <a:rPr lang="en-GB" dirty="0"/>
-              <a:t>Intertemporal substitution</a:t>
-            </a:r>
-          </a:p>
-        </p:txBody>
-      </p:sp>
-      <p:sp>
-        <p:nvSpPr>
-          <p:cNvPr id="3" name="Content Placeholder 2">
-            <a:extLst>
-              <a:ext uri="{FF2B5EF4-FFF2-40B4-BE49-F238E27FC236}">
-                <a16:creationId xmlns:a16="http://schemas.microsoft.com/office/drawing/2014/main" id="{0FEC4E67-8473-48DA-B844-1CF82984ECA1}"/>
-              </a:ext>
-            </a:extLst>
-          </p:cNvPr>
-          <p:cNvSpPr>
-            <a:spLocks noGrp="1"/>
-          </p:cNvSpPr>
-          <p:nvPr>
-            <p:ph idx="1"/>
-          </p:nvPr>
-        </p:nvSpPr>
-        <p:spPr/>
-        <p:txBody>
-          <a:bodyPr>
-            <a:normAutofit fontScale="70000" lnSpcReduction="20000"/>
-          </a:bodyPr>
-          <a:lstStyle/>
-          <a:p>
-            <a:r>
-              <a:rPr lang="en-GB" dirty="0"/>
-              <a:t>The poor and the rich may consider different factors for purchasing assets</a:t>
-            </a:r>
-          </a:p>
-          <a:p>
-            <a:pPr marL="685800" lvl="1" indent="-342900">
-              <a:buFont typeface="+mj-lt"/>
-              <a:buAutoNum type="arabicPeriod"/>
-            </a:pPr>
-            <a:r>
-              <a:rPr lang="en-GB" dirty="0"/>
-              <a:t>The poor would need confidence (or credit) that the income and savings would rise to the price of the desired asset</a:t>
-            </a:r>
-          </a:p>
-          <a:p>
-            <a:pPr marL="685800" lvl="1" indent="-342900">
-              <a:buFont typeface="+mj-lt"/>
-              <a:buAutoNum type="arabicPeriod"/>
-            </a:pPr>
-            <a:r>
-              <a:rPr lang="en-GB" dirty="0"/>
-              <a:t>The rich would need confidence that their wealth would be unaffected by a successive asset purchase</a:t>
-            </a:r>
-          </a:p>
-          <a:p>
-            <a:pPr marL="685800" lvl="1" indent="-342900">
-              <a:buFont typeface="+mj-lt"/>
-              <a:buAutoNum type="arabicPeriod"/>
-            </a:pPr>
-            <a:endParaRPr lang="en-GB" dirty="0"/>
-          </a:p>
-          <a:p>
-            <a:r>
-              <a:rPr lang="en-GB" dirty="0"/>
-              <a:t>The permanent income approach relies on smoothening of income. Those with volatile incomes tend to limit (lower permanent income). But PIH only looks at monetary risks – while status encompasses other risks</a:t>
-            </a:r>
-          </a:p>
-          <a:p>
-            <a:r>
-              <a:rPr lang="en-GB" dirty="0"/>
-              <a:t>Consumer confidence is thus subject to how the consumers perceive the respective risks. While  PIH may be generally true, it is possible that consumers go against the usual direction:</a:t>
-            </a:r>
-          </a:p>
-          <a:p>
-            <a:pPr lvl="1"/>
-            <a:r>
-              <a:rPr lang="en-GB" dirty="0"/>
-              <a:t>Sb with less income stability may believe in possibility of a windfall </a:t>
-            </a:r>
-          </a:p>
-          <a:p>
-            <a:pPr lvl="1"/>
-            <a:r>
-              <a:rPr lang="en-GB" dirty="0"/>
-              <a:t>Sb with high income stability may be fearful of a downturn</a:t>
-            </a:r>
-          </a:p>
-          <a:p>
-            <a:pPr lvl="1"/>
-            <a:endParaRPr lang="en-GB" dirty="0"/>
-          </a:p>
-          <a:p>
-            <a:r>
-              <a:rPr lang="en-GB" dirty="0"/>
-              <a:t>A probabilistic model for status – which allows the consumer to overspend on short-term quality - should allow the behaviours in both directions</a:t>
-            </a:r>
-          </a:p>
-          <a:p>
-            <a:r>
-              <a:rPr lang="en-GB" dirty="0"/>
-              <a:t>Can this fit into the intertemporal substitution framework?</a:t>
-            </a:r>
-          </a:p>
-          <a:p>
-            <a:endParaRPr lang="en-GB" dirty="0"/>
-          </a:p>
-        </p:txBody>
-      </p:sp>
-      <p:sp>
-        <p:nvSpPr>
-          <p:cNvPr id="4" name="Slide Number Placeholder 3">
-            <a:extLst>
-              <a:ext uri="{FF2B5EF4-FFF2-40B4-BE49-F238E27FC236}">
-                <a16:creationId xmlns:a16="http://schemas.microsoft.com/office/drawing/2014/main" id="{0011EE81-FFB1-444B-B700-32CA442F0549}"/>
-              </a:ext>
-            </a:extLst>
-          </p:cNvPr>
-          <p:cNvSpPr>
-            <a:spLocks noGrp="1"/>
-          </p:cNvSpPr>
-          <p:nvPr>
-            <p:ph type="sldNum" sz="quarter" idx="12"/>
-          </p:nvPr>
-        </p:nvSpPr>
-        <p:spPr/>
-        <p:txBody>
-          <a:bodyPr/>
-          <a:lstStyle/>
-          <a:p>
-            <a:pPr>
-              <a:defRPr/>
-            </a:pPr>
-            <a:fld id="{8E35B453-7314-4BBD-9303-11C6BECC4B0D}" type="slidenum">
-              <a:rPr lang="en-GB" altLang="en-US" smtClean="0"/>
-              <a:pPr>
-                <a:defRPr/>
-              </a:pPr>
-              <a:t>8</a:t>
-            </a:fld>
-            <a:endParaRPr lang="en-GB" altLang="en-US" dirty="0"/>
-          </a:p>
-        </p:txBody>
-      </p:sp>
-    </p:spTree>
-    <p:extLst>
-      <p:ext uri="{BB962C8B-B14F-4D97-AF65-F5344CB8AC3E}">
-        <p14:creationId xmlns:p14="http://schemas.microsoft.com/office/powerpoint/2010/main" val="3951174204"/>
       </p:ext>
     </p:extLst>
   </p:cSld>
@@ -21574,7 +24393,7 @@
           <p:cNvPr id="2" name="Title 1">
             <a:extLst>
               <a:ext uri="{FF2B5EF4-FFF2-40B4-BE49-F238E27FC236}">
-                <a16:creationId xmlns:a16="http://schemas.microsoft.com/office/drawing/2014/main" id="{B238D6EA-A658-4479-A37B-FE625FD139E9}"/>
+                <a16:creationId xmlns:a16="http://schemas.microsoft.com/office/drawing/2014/main" id="{9A9C3CDF-42EB-4159-85AF-04E406FD511F}"/>
               </a:ext>
             </a:extLst>
           </p:cNvPr>
@@ -21592,7 +24411,7 @@
           <a:p>
             <a:r>
               <a:rPr lang="en-GB" dirty="0"/>
-              <a:t>Recap: Intertemporal substitution</a:t>
+              <a:t>Where does status fit in?</a:t>
             </a:r>
           </a:p>
         </p:txBody>
@@ -21602,7 +24421,7 @@
           <p:cNvPr id="3" name="Content Placeholder 2">
             <a:extLst>
               <a:ext uri="{FF2B5EF4-FFF2-40B4-BE49-F238E27FC236}">
-                <a16:creationId xmlns:a16="http://schemas.microsoft.com/office/drawing/2014/main" id="{DDC6CB51-E049-4B31-96C0-5896D9AB9B7E}"/>
+                <a16:creationId xmlns:a16="http://schemas.microsoft.com/office/drawing/2014/main" id="{12ACA305-4662-4E70-8B58-1DE02FD84E67}"/>
               </a:ext>
             </a:extLst>
           </p:cNvPr>
@@ -21613,31 +24432,51 @@
             <p:ph idx="1"/>
           </p:nvPr>
         </p:nvSpPr>
-        <p:spPr/>
+        <p:spPr>
+          <a:xfrm>
+            <a:off x="628650" y="1123950"/>
+            <a:ext cx="7886700" cy="3262312"/>
+          </a:xfrm>
+        </p:spPr>
         <p:txBody>
-          <a:bodyPr/>
+          <a:bodyPr>
+            <a:normAutofit fontScale="92500"/>
+          </a:bodyPr>
           <a:lstStyle/>
           <a:p>
             <a:r>
               <a:rPr lang="en-GB" dirty="0"/>
-              <a:t>Recall that Intertemporal substitution setting is one where the consumer can either choose to consume now or accumulate in the future</a:t>
-            </a:r>
-          </a:p>
-          <a:p>
-            <a:pPr lvl="1"/>
+              <a:t>A higher status for the three players may be achieved with fulfilment of different financial goals – but their long-term decisions are likely to be driven by just the material wealth</a:t>
+            </a:r>
+          </a:p>
+          <a:p>
             <a:r>
               <a:rPr lang="en-GB" dirty="0"/>
-              <a:t>The framework is often applied on data from savings, interest rate and consumption. The Euler Equations used in the model allow for testing assumptions such as the life-cycle, Permanent Income or random-walk hypothesis (see Deaton)</a:t>
-            </a:r>
-          </a:p>
-          <a:p>
-            <a:pPr lvl="1"/>
+              <a:t>Whereas the perceived status – i.e. the subjective view of the material status (under uncertainty) is more likely to influence their consumption</a:t>
+            </a:r>
+          </a:p>
+          <a:p>
             <a:r>
               <a:rPr lang="en-GB" dirty="0"/>
-              <a:t>We seek the intertemporal model with the effects of non-monetary wealth</a:t>
-            </a:r>
-          </a:p>
-          <a:p>
+              <a:t>Status is thus constituted in this subjective probability</a:t>
+            </a:r>
+          </a:p>
+          <a:p>
+            <a:r>
+              <a:rPr lang="en-GB" dirty="0"/>
+              <a:t>A utility function that formalises the preferences of the three professionals, would allow them to interpret the probability of wealth gain differently</a:t>
+            </a:r>
+          </a:p>
+          <a:p>
+            <a:r>
+              <a:rPr lang="en-GB" dirty="0"/>
+              <a:t>In the behavioural economics literature, the effect of status and durable goods is often modelled with varied discounting rates [4]</a:t>
+            </a:r>
+          </a:p>
+          <a:p>
+            <a:pPr marL="0" indent="0">
+              <a:buNone/>
+            </a:pPr>
             <a:endParaRPr lang="en-GB" dirty="0"/>
           </a:p>
         </p:txBody>
@@ -21647,7 +24486,7 @@
           <p:cNvPr id="4" name="Slide Number Placeholder 3">
             <a:extLst>
               <a:ext uri="{FF2B5EF4-FFF2-40B4-BE49-F238E27FC236}">
-                <a16:creationId xmlns:a16="http://schemas.microsoft.com/office/drawing/2014/main" id="{BCC62E85-D1E5-48B1-967D-204D65DC685B}"/>
+                <a16:creationId xmlns:a16="http://schemas.microsoft.com/office/drawing/2014/main" id="{7A99688F-80A2-4F60-A3D1-E064E4DB8076}"/>
               </a:ext>
             </a:extLst>
           </p:cNvPr>
@@ -21680,7 +24519,7 @@
     </p:spTree>
     <p:extLst>
       <p:ext uri="{BB962C8B-B14F-4D97-AF65-F5344CB8AC3E}">
-        <p14:creationId xmlns:p14="http://schemas.microsoft.com/office/powerpoint/2010/main" val="3116225782"/>
+        <p14:creationId xmlns:p14="http://schemas.microsoft.com/office/powerpoint/2010/main" val="37525767"/>
       </p:ext>
     </p:extLst>
   </p:cSld>

</xml_diff>

<commit_message>
Adding presentation for Feb 13, 2020.
</commit_message>
<xml_diff>
--- a/consumption/presentationFeb2020.pptx
+++ b/consumption/presentationFeb2020.pptx
@@ -18,11 +18,11 @@
     <p:sldId id="315" r:id="rId6"/>
     <p:sldId id="316" r:id="rId7"/>
     <p:sldId id="317" r:id="rId8"/>
-    <p:sldId id="330" r:id="rId9"/>
+    <p:sldId id="333" r:id="rId9"/>
     <p:sldId id="326" r:id="rId10"/>
     <p:sldId id="322" r:id="rId11"/>
-    <p:sldId id="319" r:id="rId12"/>
-    <p:sldId id="327" r:id="rId13"/>
+    <p:sldId id="327" r:id="rId12"/>
+    <p:sldId id="319" r:id="rId13"/>
     <p:sldId id="324" r:id="rId14"/>
     <p:sldId id="331" r:id="rId15"/>
     <p:sldId id="328" r:id="rId16"/>
@@ -7490,7 +7490,7 @@
               <a:pPr>
                 <a:defRPr/>
               </a:pPr>
-              <a:t>2/12/2020</a:t>
+              <a:t>2/13/2020</a:t>
             </a:fld>
             <a:endParaRPr lang="en-US" altLang="en-US"/>
           </a:p>
@@ -7931,7 +7931,7 @@
               <a:pPr>
                 <a:defRPr/>
               </a:pPr>
-              <a:t>2/12/2020</a:t>
+              <a:t>2/13/2020</a:t>
             </a:fld>
             <a:endParaRPr lang="en-US" altLang="en-US"/>
           </a:p>
@@ -8162,7 +8162,7 @@
               <a:pPr>
                 <a:defRPr/>
               </a:pPr>
-              <a:t>2/12/2020</a:t>
+              <a:t>2/13/2020</a:t>
             </a:fld>
             <a:endParaRPr lang="en-US" altLang="en-US"/>
           </a:p>
@@ -8361,7 +8361,7 @@
               <a:pPr>
                 <a:defRPr/>
               </a:pPr>
-              <a:t>2/12/2020</a:t>
+              <a:t>2/13/2020</a:t>
             </a:fld>
             <a:endParaRPr lang="en-US"/>
           </a:p>
@@ -8636,7 +8636,7 @@
               <a:pPr>
                 <a:defRPr/>
               </a:pPr>
-              <a:t>2/12/2020</a:t>
+              <a:t>2/13/2020</a:t>
             </a:fld>
             <a:endParaRPr lang="en-US"/>
           </a:p>
@@ -8896,7 +8896,7 @@
               <a:pPr>
                 <a:defRPr/>
               </a:pPr>
-              <a:t>2/12/2020</a:t>
+              <a:t>2/13/2020</a:t>
             </a:fld>
             <a:endParaRPr lang="en-US" altLang="en-US"/>
           </a:p>
@@ -9291,7 +9291,7 @@
               <a:pPr>
                 <a:defRPr/>
               </a:pPr>
-              <a:t>2/12/2020</a:t>
+              <a:t>2/13/2020</a:t>
             </a:fld>
             <a:endParaRPr lang="en-US"/>
           </a:p>
@@ -9439,7 +9439,7 @@
               <a:pPr>
                 <a:defRPr/>
               </a:pPr>
-              <a:t>2/12/2020</a:t>
+              <a:t>2/13/2020</a:t>
             </a:fld>
             <a:endParaRPr lang="en-US"/>
           </a:p>
@@ -9565,7 +9565,7 @@
               <a:pPr>
                 <a:defRPr/>
               </a:pPr>
-              <a:t>2/12/2020</a:t>
+              <a:t>2/13/2020</a:t>
             </a:fld>
             <a:endParaRPr lang="en-US"/>
           </a:p>
@@ -9871,7 +9871,7 @@
               <a:pPr>
                 <a:defRPr/>
               </a:pPr>
-              <a:t>2/12/2020</a:t>
+              <a:t>2/13/2020</a:t>
             </a:fld>
             <a:endParaRPr lang="en-US"/>
           </a:p>
@@ -10155,7 +10155,7 @@
               <a:pPr>
                 <a:defRPr/>
               </a:pPr>
-              <a:t>2/12/2020</a:t>
+              <a:t>2/13/2020</a:t>
             </a:fld>
             <a:endParaRPr lang="en-US"/>
           </a:p>
@@ -11593,7 +11593,7 @@
               <a:pPr>
                 <a:defRPr/>
               </a:pPr>
-              <a:t>2/12/2020</a:t>
+              <a:t>2/13/2020</a:t>
             </a:fld>
             <a:endParaRPr lang="en-US"/>
           </a:p>
@@ -11802,7 +11802,7 @@
               <a:pPr>
                 <a:defRPr/>
               </a:pPr>
-              <a:t>2/12/2020</a:t>
+              <a:t>2/13/2020</a:t>
             </a:fld>
             <a:endParaRPr lang="en-US"/>
           </a:p>
@@ -16203,7 +16203,7 @@
               <a:pPr>
                 <a:defRPr/>
               </a:pPr>
-              <a:t>2/12/2020</a:t>
+              <a:t>2/13/2020</a:t>
             </a:fld>
             <a:endParaRPr lang="en-US"/>
           </a:p>
@@ -17038,183 +17038,6 @@
           <p:cNvPr id="2" name="Title 1">
             <a:extLst>
               <a:ext uri="{FF2B5EF4-FFF2-40B4-BE49-F238E27FC236}">
-                <a16:creationId xmlns:a16="http://schemas.microsoft.com/office/drawing/2014/main" id="{F4EA49FF-94AB-43BE-955A-70AC549908A8}"/>
-              </a:ext>
-            </a:extLst>
-          </p:cNvPr>
-          <p:cNvSpPr>
-            <a:spLocks noGrp="1"/>
-          </p:cNvSpPr>
-          <p:nvPr>
-            <p:ph type="title"/>
-          </p:nvPr>
-        </p:nvSpPr>
-        <p:spPr/>
-        <p:txBody>
-          <a:bodyPr/>
-          <a:lstStyle/>
-          <a:p>
-            <a:r>
-              <a:rPr lang="en-GB" dirty="0"/>
-              <a:t>Intertemporal substitution</a:t>
-            </a:r>
-          </a:p>
-        </p:txBody>
-      </p:sp>
-      <p:sp>
-        <p:nvSpPr>
-          <p:cNvPr id="3" name="Content Placeholder 2">
-            <a:extLst>
-              <a:ext uri="{FF2B5EF4-FFF2-40B4-BE49-F238E27FC236}">
-                <a16:creationId xmlns:a16="http://schemas.microsoft.com/office/drawing/2014/main" id="{0FEC4E67-8473-48DA-B844-1CF82984ECA1}"/>
-              </a:ext>
-            </a:extLst>
-          </p:cNvPr>
-          <p:cNvSpPr>
-            <a:spLocks noGrp="1"/>
-          </p:cNvSpPr>
-          <p:nvPr>
-            <p:ph idx="1"/>
-          </p:nvPr>
-        </p:nvSpPr>
-        <p:spPr>
-          <a:xfrm>
-            <a:off x="533400" y="1047750"/>
-            <a:ext cx="7886700" cy="3660775"/>
-          </a:xfrm>
-        </p:spPr>
-        <p:txBody>
-          <a:bodyPr>
-            <a:normAutofit fontScale="92500"/>
-          </a:bodyPr>
-          <a:lstStyle/>
-          <a:p>
-            <a:r>
-              <a:rPr lang="en-GB" dirty="0"/>
-              <a:t>PIH relies on smoothening of income i.e. those with volatile incomes tend to limit (lower permanent income). </a:t>
-            </a:r>
-          </a:p>
-          <a:p>
-            <a:r>
-              <a:rPr lang="en-GB" dirty="0"/>
-              <a:t>However, PIH looks only at monetary risks – while status encompasses other risks. Consumer confidence is subject to other risks – so while PIH may generally be true, it is possible that consumers go against the usual direction</a:t>
-            </a:r>
-          </a:p>
-          <a:p>
-            <a:pPr lvl="1"/>
-            <a:r>
-              <a:rPr lang="en-GB" dirty="0"/>
-              <a:t>Sb with less income stability may believe in a possibility (unrealistic) of a windfall </a:t>
-            </a:r>
-          </a:p>
-          <a:p>
-            <a:pPr lvl="1"/>
-            <a:r>
-              <a:rPr lang="en-GB" dirty="0"/>
-              <a:t>Sb with high income stability may be fearful of a downturn (unrealistic)</a:t>
-            </a:r>
-          </a:p>
-          <a:p>
-            <a:r>
-              <a:rPr lang="en-GB" dirty="0"/>
-              <a:t>A probabilistic model for status – which allows the consumer to overspend on short-term quality - should allow the behaviours in both directions</a:t>
-            </a:r>
-          </a:p>
-          <a:p>
-            <a:r>
-              <a:rPr lang="en-GB" dirty="0"/>
-              <a:t>Questions: </a:t>
-            </a:r>
-          </a:p>
-          <a:p>
-            <a:pPr lvl="1"/>
-            <a:r>
-              <a:rPr lang="en-GB" dirty="0"/>
-              <a:t>Can this fit into the intertemporal substitution framework? </a:t>
-            </a:r>
-          </a:p>
-          <a:p>
-            <a:pPr lvl="1"/>
-            <a:r>
-              <a:rPr lang="en-GB" dirty="0"/>
-              <a:t>How can one model the effects of non-monetary wealth?</a:t>
-            </a:r>
-          </a:p>
-        </p:txBody>
-      </p:sp>
-      <p:sp>
-        <p:nvSpPr>
-          <p:cNvPr id="4" name="Slide Number Placeholder 3">
-            <a:extLst>
-              <a:ext uri="{FF2B5EF4-FFF2-40B4-BE49-F238E27FC236}">
-                <a16:creationId xmlns:a16="http://schemas.microsoft.com/office/drawing/2014/main" id="{0011EE81-FFB1-444B-B700-32CA442F0549}"/>
-              </a:ext>
-            </a:extLst>
-          </p:cNvPr>
-          <p:cNvSpPr>
-            <a:spLocks noGrp="1"/>
-          </p:cNvSpPr>
-          <p:nvPr>
-            <p:ph type="sldNum" sz="quarter" idx="12"/>
-          </p:nvPr>
-        </p:nvSpPr>
-        <p:spPr/>
-        <p:txBody>
-          <a:bodyPr/>
-          <a:lstStyle/>
-          <a:p>
-            <a:pPr>
-              <a:defRPr/>
-            </a:pPr>
-            <a:fld id="{8E35B453-7314-4BBD-9303-11C6BECC4B0D}" type="slidenum">
-              <a:rPr lang="en-GB" altLang="en-US" smtClean="0"/>
-              <a:pPr>
-                <a:defRPr/>
-              </a:pPr>
-              <a:t>10</a:t>
-            </a:fld>
-            <a:endParaRPr lang="en-GB" altLang="en-US" dirty="0"/>
-          </a:p>
-        </p:txBody>
-      </p:sp>
-    </p:spTree>
-    <p:extLst>
-      <p:ext uri="{BB962C8B-B14F-4D97-AF65-F5344CB8AC3E}">
-        <p14:creationId xmlns:p14="http://schemas.microsoft.com/office/powerpoint/2010/main" val="3951174204"/>
-      </p:ext>
-    </p:extLst>
-  </p:cSld>
-  <p:clrMapOvr>
-    <a:masterClrMapping/>
-  </p:clrMapOvr>
-  <p:transition>
-    <p:fade/>
-  </p:transition>
-</p:sld>
-</file>
-
-<file path=ppt/slides/slide11.xml><?xml version="1.0" encoding="utf-8"?>
-<p:sld xmlns:a="http://schemas.openxmlformats.org/drawingml/2006/main" xmlns:r="http://schemas.openxmlformats.org/officeDocument/2006/relationships" xmlns:p="http://schemas.openxmlformats.org/presentationml/2006/main">
-  <p:cSld>
-    <p:spTree>
-      <p:nvGrpSpPr>
-        <p:cNvPr id="1" name=""/>
-        <p:cNvGrpSpPr/>
-        <p:nvPr/>
-      </p:nvGrpSpPr>
-      <p:grpSpPr>
-        <a:xfrm>
-          <a:off x="0" y="0"/>
-          <a:ext cx="0" cy="0"/>
-          <a:chOff x="0" y="0"/>
-          <a:chExt cx="0" cy="0"/>
-        </a:xfrm>
-      </p:grpSpPr>
-      <p:sp>
-        <p:nvSpPr>
-          <p:cNvPr id="2" name="Title 1">
-            <a:extLst>
-              <a:ext uri="{FF2B5EF4-FFF2-40B4-BE49-F238E27FC236}">
                 <a16:creationId xmlns:a16="http://schemas.microsoft.com/office/drawing/2014/main" id="{B238D6EA-A658-4479-A37B-FE625FD139E9}"/>
               </a:ext>
             </a:extLst>
@@ -17233,64 +17056,134 @@
           <a:p>
             <a:r>
               <a:rPr lang="en-GB" dirty="0"/>
-              <a:t>Intertemporal substitution and discounting</a:t>
+              <a:t>Discounting of net worth</a:t>
             </a:r>
           </a:p>
         </p:txBody>
       </p:sp>
-      <p:sp>
-        <p:nvSpPr>
-          <p:cNvPr id="3" name="Content Placeholder 2">
-            <a:extLst>
-              <a:ext uri="{FF2B5EF4-FFF2-40B4-BE49-F238E27FC236}">
-                <a16:creationId xmlns:a16="http://schemas.microsoft.com/office/drawing/2014/main" id="{DDC6CB51-E049-4B31-96C0-5896D9AB9B7E}"/>
-              </a:ext>
-            </a:extLst>
-          </p:cNvPr>
-          <p:cNvSpPr>
-            <a:spLocks noGrp="1"/>
-          </p:cNvSpPr>
-          <p:nvPr>
-            <p:ph idx="1"/>
-          </p:nvPr>
-        </p:nvSpPr>
-        <p:spPr>
-          <a:xfrm>
-            <a:off x="628650" y="1370013"/>
-            <a:ext cx="3867150" cy="3262312"/>
-          </a:xfrm>
-        </p:spPr>
-        <p:txBody>
-          <a:bodyPr>
-            <a:normAutofit fontScale="77500" lnSpcReduction="20000"/>
-          </a:bodyPr>
-          <a:lstStyle/>
-          <a:p>
-            <a:r>
-              <a:rPr lang="en-GB" dirty="0"/>
-              <a:t>Recall that Intertemporal substitution setting is one where the consumer can either choose to consume now or accumulate in the future</a:t>
-            </a:r>
-          </a:p>
-          <a:p>
-            <a:r>
-              <a:rPr lang="en-GB" dirty="0"/>
-              <a:t>The framework is often applied on data from savings, interest rate and consumption. The Euler Equations used in the model can be used to test hypotheses such as the random walk or PIH (see Deaton[1])</a:t>
-            </a:r>
-          </a:p>
-          <a:p>
-            <a:r>
-              <a:rPr lang="en-GB" dirty="0"/>
-              <a:t>The diagram shows how the players in our game would evaluate their subjective net worth based on evaluation of a prospect - which is the doubling of wealth (more generally the target wealth or asset level)</a:t>
-            </a:r>
-          </a:p>
-          <a:p>
-            <a:endParaRPr lang="en-GB" dirty="0"/>
-          </a:p>
-          <a:p>
-            <a:endParaRPr lang="en-GB" dirty="0"/>
-          </a:p>
-        </p:txBody>
-      </p:sp>
+      <mc:AlternateContent xmlns:mc="http://schemas.openxmlformats.org/markup-compatibility/2006" xmlns:a14="http://schemas.microsoft.com/office/drawing/2010/main">
+        <mc:Choice Requires="a14">
+          <p:sp>
+            <p:nvSpPr>
+              <p:cNvPr id="3" name="Content Placeholder 2">
+                <a:extLst>
+                  <a:ext uri="{FF2B5EF4-FFF2-40B4-BE49-F238E27FC236}">
+                    <a16:creationId xmlns:a16="http://schemas.microsoft.com/office/drawing/2014/main" id="{DDC6CB51-E049-4B31-96C0-5896D9AB9B7E}"/>
+                  </a:ext>
+                </a:extLst>
+              </p:cNvPr>
+              <p:cNvSpPr>
+                <a:spLocks noGrp="1"/>
+              </p:cNvSpPr>
+              <p:nvPr>
+                <p:ph idx="1"/>
+              </p:nvPr>
+            </p:nvSpPr>
+            <p:spPr>
+              <a:xfrm>
+                <a:off x="628649" y="1370013"/>
+                <a:ext cx="4411759" cy="3262312"/>
+              </a:xfrm>
+            </p:spPr>
+            <p:txBody>
+              <a:bodyPr>
+                <a:normAutofit fontScale="77500" lnSpcReduction="20000"/>
+              </a:bodyPr>
+              <a:lstStyle/>
+              <a:p>
+                <a:r>
+                  <a:rPr lang="en-GB" dirty="0"/>
+                  <a:t>Recall that Intertemporal substitution setting is one where the consumer can either choose to consume now or accumulate in the future</a:t>
+                </a:r>
+              </a:p>
+              <a:p>
+                <a:r>
+                  <a:rPr lang="en-GB" dirty="0"/>
+                  <a:t>The framework is often applied on data from savings, interest rate and consumption. The Euler Equations used in the model can be used to test hypotheses such as the random walk or PIH (see Deaton[1])</a:t>
+                </a:r>
+              </a:p>
+              <a:p>
+                <a:r>
+                  <a:rPr lang="en-GB" dirty="0"/>
+                  <a:t>The diagram shows how the players in our game may evaluate their subjective net worth based on evaluation of a prospect (i.e. achievement of the target wealth) -  assigning a different probability at every stage </a:t>
+                </a:r>
+                <a14:m>
+                  <m:oMath xmlns:m="http://schemas.openxmlformats.org/officeDocument/2006/math">
+                    <m:r>
+                      <a:rPr lang="en-GB" sz="2400" i="1">
+                        <a:latin typeface="Cambria Math" panose="02040503050406030204" pitchFamily="18" charset="0"/>
+                      </a:rPr>
+                      <m:t>𝑡</m:t>
+                    </m:r>
+                  </m:oMath>
+                </a14:m>
+                <a:r>
+                  <a:rPr lang="en-GB" dirty="0"/>
+                  <a:t> – thus having a subjective net worth at all times</a:t>
+                </a:r>
+              </a:p>
+              <a:p>
+                <a:r>
+                  <a:rPr lang="en-GB" dirty="0"/>
+                  <a:t>How does such risk-seeking or risk-averse behaviour relate to non-durable consumption?</a:t>
+                </a:r>
+              </a:p>
+              <a:p>
+                <a:endParaRPr lang="en-GB" dirty="0"/>
+              </a:p>
+              <a:p>
+                <a:endParaRPr lang="en-GB" dirty="0"/>
+              </a:p>
+              <a:p>
+                <a:endParaRPr lang="en-GB" dirty="0"/>
+              </a:p>
+            </p:txBody>
+          </p:sp>
+        </mc:Choice>
+        <mc:Fallback xmlns="">
+          <p:sp>
+            <p:nvSpPr>
+              <p:cNvPr id="3" name="Content Placeholder 2">
+                <a:extLst>
+                  <a:ext uri="{FF2B5EF4-FFF2-40B4-BE49-F238E27FC236}">
+                    <a16:creationId xmlns:a16="http://schemas.microsoft.com/office/drawing/2014/main" id="{DDC6CB51-E049-4B31-96C0-5896D9AB9B7E}"/>
+                  </a:ext>
+                </a:extLst>
+              </p:cNvPr>
+              <p:cNvSpPr>
+                <a:spLocks noGrp="1" noRot="1" noChangeAspect="1" noMove="1" noResize="1" noEditPoints="1" noAdjustHandles="1" noChangeArrowheads="1" noChangeShapeType="1" noTextEdit="1"/>
+              </p:cNvSpPr>
+              <p:nvPr>
+                <p:ph idx="1"/>
+              </p:nvPr>
+            </p:nvSpPr>
+            <p:spPr>
+              <a:xfrm>
+                <a:off x="628649" y="1370013"/>
+                <a:ext cx="4411759" cy="3262312"/>
+              </a:xfrm>
+              <a:blipFill>
+                <a:blip r:embed="rId2"/>
+                <a:stretch>
+                  <a:fillRect l="-552" t="-2430" r="-1796"/>
+                </a:stretch>
+              </a:blipFill>
+            </p:spPr>
+            <p:txBody>
+              <a:bodyPr/>
+              <a:lstStyle/>
+              <a:p>
+                <a:r>
+                  <a:rPr lang="en-GB">
+                    <a:noFill/>
+                  </a:rPr>
+                  <a:t> </a:t>
+                </a:r>
+              </a:p>
+            </p:txBody>
+          </p:sp>
+        </mc:Fallback>
+      </mc:AlternateContent>
       <p:sp>
         <p:nvSpPr>
           <p:cNvPr id="4" name="Slide Number Placeholder 3">
@@ -17320,14 +17213,14 @@
               <a:pPr>
                 <a:defRPr/>
               </a:pPr>
-              <a:t>11</a:t>
+              <a:t>10</a:t>
             </a:fld>
             <a:endParaRPr lang="en-GB" altLang="en-US" dirty="0"/>
           </a:p>
         </p:txBody>
       </p:sp>
-      <mc:AlternateContent xmlns:mc="http://schemas.openxmlformats.org/markup-compatibility/2006">
-        <mc:Choice xmlns:a14="http://schemas.microsoft.com/office/drawing/2010/main" Requires="a14">
+      <mc:AlternateContent xmlns:mc="http://schemas.openxmlformats.org/markup-compatibility/2006" xmlns:a14="http://schemas.microsoft.com/office/drawing/2010/main">
+        <mc:Choice Requires="a14">
           <p:sp>
             <p:nvSpPr>
               <p:cNvPr id="5" name="Oval 4">
@@ -17407,7 +17300,7 @@
             </p:txBody>
           </p:sp>
         </mc:Choice>
-        <mc:Fallback>
+        <mc:Fallback xmlns="">
           <p:sp>
             <p:nvSpPr>
               <p:cNvPr id="5" name="Oval 4">
@@ -17431,7 +17324,7 @@
                 <a:avLst/>
               </a:prstGeom>
               <a:blipFill>
-                <a:blip r:embed="rId2"/>
+                <a:blip r:embed="rId3"/>
                 <a:stretch>
                   <a:fillRect b="-13559"/>
                 </a:stretch>
@@ -17452,8 +17345,8 @@
           </p:sp>
         </mc:Fallback>
       </mc:AlternateContent>
-      <mc:AlternateContent xmlns:mc="http://schemas.openxmlformats.org/markup-compatibility/2006">
-        <mc:Choice xmlns:a14="http://schemas.microsoft.com/office/drawing/2010/main" Requires="a14">
+      <mc:AlternateContent xmlns:mc="http://schemas.openxmlformats.org/markup-compatibility/2006" xmlns:a14="http://schemas.microsoft.com/office/drawing/2010/main">
+        <mc:Choice Requires="a14">
           <p:sp>
             <p:nvSpPr>
               <p:cNvPr id="7" name="Oval 6">
@@ -17514,7 +17407,7 @@
             </p:txBody>
           </p:sp>
         </mc:Choice>
-        <mc:Fallback>
+        <mc:Fallback xmlns="">
           <p:sp>
             <p:nvSpPr>
               <p:cNvPr id="7" name="Oval 6">
@@ -17538,7 +17431,7 @@
                 <a:avLst/>
               </a:prstGeom>
               <a:blipFill>
-                <a:blip r:embed="rId3"/>
+                <a:blip r:embed="rId4"/>
                 <a:stretch>
                   <a:fillRect/>
                 </a:stretch>
@@ -17559,8 +17452,8 @@
           </p:sp>
         </mc:Fallback>
       </mc:AlternateContent>
-      <mc:AlternateContent xmlns:mc="http://schemas.openxmlformats.org/markup-compatibility/2006">
-        <mc:Choice xmlns:a14="http://schemas.microsoft.com/office/drawing/2010/main" Requires="a14">
+      <mc:AlternateContent xmlns:mc="http://schemas.openxmlformats.org/markup-compatibility/2006" xmlns:a14="http://schemas.microsoft.com/office/drawing/2010/main">
+        <mc:Choice Requires="a14">
           <p:sp>
             <p:nvSpPr>
               <p:cNvPr id="8" name="Oval 7">
@@ -17621,7 +17514,7 @@
             </p:txBody>
           </p:sp>
         </mc:Choice>
-        <mc:Fallback>
+        <mc:Fallback xmlns="">
           <p:sp>
             <p:nvSpPr>
               <p:cNvPr id="8" name="Oval 7">
@@ -17645,7 +17538,7 @@
                 <a:avLst/>
               </a:prstGeom>
               <a:blipFill>
-                <a:blip r:embed="rId3"/>
+                <a:blip r:embed="rId4"/>
                 <a:stretch>
                   <a:fillRect/>
                 </a:stretch>
@@ -17666,8 +17559,8 @@
           </p:sp>
         </mc:Fallback>
       </mc:AlternateContent>
-      <mc:AlternateContent xmlns:mc="http://schemas.openxmlformats.org/markup-compatibility/2006">
-        <mc:Choice xmlns:a14="http://schemas.microsoft.com/office/drawing/2010/main" Requires="a14">
+      <mc:AlternateContent xmlns:mc="http://schemas.openxmlformats.org/markup-compatibility/2006" xmlns:a14="http://schemas.microsoft.com/office/drawing/2010/main">
+        <mc:Choice Requires="a14">
           <p:sp>
             <p:nvSpPr>
               <p:cNvPr id="9" name="Oval 8">
@@ -17728,7 +17621,7 @@
             </p:txBody>
           </p:sp>
         </mc:Choice>
-        <mc:Fallback>
+        <mc:Fallback xmlns="">
           <p:sp>
             <p:nvSpPr>
               <p:cNvPr id="9" name="Oval 8">
@@ -17752,7 +17645,7 @@
                 <a:avLst/>
               </a:prstGeom>
               <a:blipFill>
-                <a:blip r:embed="rId4"/>
+                <a:blip r:embed="rId5"/>
                 <a:stretch>
                   <a:fillRect/>
                 </a:stretch>
@@ -17773,8 +17666,8 @@
           </p:sp>
         </mc:Fallback>
       </mc:AlternateContent>
-      <mc:AlternateContent xmlns:mc="http://schemas.openxmlformats.org/markup-compatibility/2006">
-        <mc:Choice xmlns:a14="http://schemas.microsoft.com/office/drawing/2010/main" Requires="a14">
+      <mc:AlternateContent xmlns:mc="http://schemas.openxmlformats.org/markup-compatibility/2006" xmlns:a14="http://schemas.microsoft.com/office/drawing/2010/main">
+        <mc:Choice Requires="a14">
           <p:sp>
             <p:nvSpPr>
               <p:cNvPr id="11" name="Oval 10">
@@ -17835,7 +17728,7 @@
             </p:txBody>
           </p:sp>
         </mc:Choice>
-        <mc:Fallback>
+        <mc:Fallback xmlns="">
           <p:sp>
             <p:nvSpPr>
               <p:cNvPr id="11" name="Oval 10">
@@ -17859,7 +17752,7 @@
                 <a:avLst/>
               </a:prstGeom>
               <a:blipFill>
-                <a:blip r:embed="rId5"/>
+                <a:blip r:embed="rId6"/>
                 <a:stretch>
                   <a:fillRect/>
                 </a:stretch>
@@ -17880,8 +17773,8 @@
           </p:sp>
         </mc:Fallback>
       </mc:AlternateContent>
-      <mc:AlternateContent xmlns:mc="http://schemas.openxmlformats.org/markup-compatibility/2006">
-        <mc:Choice xmlns:a14="http://schemas.microsoft.com/office/drawing/2010/main" Requires="a14">
+      <mc:AlternateContent xmlns:mc="http://schemas.openxmlformats.org/markup-compatibility/2006" xmlns:a14="http://schemas.microsoft.com/office/drawing/2010/main">
+        <mc:Choice Requires="a14">
           <p:sp>
             <p:nvSpPr>
               <p:cNvPr id="12" name="Oval 11">
@@ -17942,7 +17835,7 @@
             </p:txBody>
           </p:sp>
         </mc:Choice>
-        <mc:Fallback>
+        <mc:Fallback xmlns="">
           <p:sp>
             <p:nvSpPr>
               <p:cNvPr id="12" name="Oval 11">
@@ -17966,7 +17859,7 @@
                 <a:avLst/>
               </a:prstGeom>
               <a:blipFill>
-                <a:blip r:embed="rId5"/>
+                <a:blip r:embed="rId6"/>
                 <a:stretch>
                   <a:fillRect/>
                 </a:stretch>
@@ -17987,8 +17880,8 @@
           </p:sp>
         </mc:Fallback>
       </mc:AlternateContent>
-      <mc:AlternateContent xmlns:mc="http://schemas.openxmlformats.org/markup-compatibility/2006">
-        <mc:Choice xmlns:a14="http://schemas.microsoft.com/office/drawing/2010/main" Requires="a14">
+      <mc:AlternateContent xmlns:mc="http://schemas.openxmlformats.org/markup-compatibility/2006" xmlns:a14="http://schemas.microsoft.com/office/drawing/2010/main">
+        <mc:Choice Requires="a14">
           <p:sp>
             <p:nvSpPr>
               <p:cNvPr id="13" name="Oval 12">
@@ -18049,7 +17942,7 @@
             </p:txBody>
           </p:sp>
         </mc:Choice>
-        <mc:Fallback>
+        <mc:Fallback xmlns="">
           <p:sp>
             <p:nvSpPr>
               <p:cNvPr id="13" name="Oval 12">
@@ -18073,7 +17966,7 @@
                 <a:avLst/>
               </a:prstGeom>
               <a:blipFill>
-                <a:blip r:embed="rId6"/>
+                <a:blip r:embed="rId7"/>
                 <a:stretch>
                   <a:fillRect/>
                 </a:stretch>
@@ -18600,8 +18493,8 @@
           </a:fontRef>
         </p:style>
       </p:cxnSp>
-      <mc:AlternateContent xmlns:mc="http://schemas.openxmlformats.org/markup-compatibility/2006">
-        <mc:Choice xmlns:a14="http://schemas.microsoft.com/office/drawing/2010/main" Requires="a14">
+      <mc:AlternateContent xmlns:mc="http://schemas.openxmlformats.org/markup-compatibility/2006" xmlns:a14="http://schemas.microsoft.com/office/drawing/2010/main">
+        <mc:Choice Requires="a14">
           <p:sp>
             <p:nvSpPr>
               <p:cNvPr id="62" name="Oval 61">
@@ -18681,7 +18574,7 @@
             </p:txBody>
           </p:sp>
         </mc:Choice>
-        <mc:Fallback>
+        <mc:Fallback xmlns="">
           <p:sp>
             <p:nvSpPr>
               <p:cNvPr id="62" name="Oval 61">
@@ -18705,7 +18598,7 @@
                 <a:avLst/>
               </a:prstGeom>
               <a:blipFill>
-                <a:blip r:embed="rId7"/>
+                <a:blip r:embed="rId8"/>
                 <a:stretch>
                   <a:fillRect t="-1695" b="-11864"/>
                 </a:stretch>
@@ -18726,8 +18619,8 @@
           </p:sp>
         </mc:Fallback>
       </mc:AlternateContent>
-      <mc:AlternateContent xmlns:mc="http://schemas.openxmlformats.org/markup-compatibility/2006">
-        <mc:Choice xmlns:a14="http://schemas.microsoft.com/office/drawing/2010/main" Requires="a14">
+      <mc:AlternateContent xmlns:mc="http://schemas.openxmlformats.org/markup-compatibility/2006" xmlns:a14="http://schemas.microsoft.com/office/drawing/2010/main">
+        <mc:Choice Requires="a14">
           <p:sp>
             <p:nvSpPr>
               <p:cNvPr id="63" name="Oval 62">
@@ -18807,7 +18700,7 @@
             </p:txBody>
           </p:sp>
         </mc:Choice>
-        <mc:Fallback>
+        <mc:Fallback xmlns="">
           <p:sp>
             <p:nvSpPr>
               <p:cNvPr id="63" name="Oval 62">
@@ -18831,7 +18724,7 @@
                 <a:avLst/>
               </a:prstGeom>
               <a:blipFill>
-                <a:blip r:embed="rId8"/>
+                <a:blip r:embed="rId9"/>
                 <a:stretch>
                   <a:fillRect b="-11864"/>
                 </a:stretch>
@@ -18852,8 +18745,8 @@
           </p:sp>
         </mc:Fallback>
       </mc:AlternateContent>
-      <mc:AlternateContent xmlns:mc="http://schemas.openxmlformats.org/markup-compatibility/2006">
-        <mc:Choice xmlns:a14="http://schemas.microsoft.com/office/drawing/2010/main" Requires="a14">
+      <mc:AlternateContent xmlns:mc="http://schemas.openxmlformats.org/markup-compatibility/2006" xmlns:a14="http://schemas.microsoft.com/office/drawing/2010/main">
+        <mc:Choice Requires="a14">
           <p:sp>
             <p:nvSpPr>
               <p:cNvPr id="64" name="Oval 63">
@@ -18933,7 +18826,7 @@
             </p:txBody>
           </p:sp>
         </mc:Choice>
-        <mc:Fallback>
+        <mc:Fallback xmlns="">
           <p:sp>
             <p:nvSpPr>
               <p:cNvPr id="64" name="Oval 63">
@@ -18957,7 +18850,7 @@
                 <a:avLst/>
               </a:prstGeom>
               <a:blipFill>
-                <a:blip r:embed="rId9"/>
+                <a:blip r:embed="rId10"/>
                 <a:stretch>
                   <a:fillRect t="-1724" b="-13793"/>
                 </a:stretch>
@@ -18978,8 +18871,8 @@
           </p:sp>
         </mc:Fallback>
       </mc:AlternateContent>
-      <mc:AlternateContent xmlns:mc="http://schemas.openxmlformats.org/markup-compatibility/2006">
-        <mc:Choice xmlns:a14="http://schemas.microsoft.com/office/drawing/2010/main" Requires="a14">
+      <mc:AlternateContent xmlns:mc="http://schemas.openxmlformats.org/markup-compatibility/2006" xmlns:a14="http://schemas.microsoft.com/office/drawing/2010/main">
+        <mc:Choice Requires="a14">
           <p:sp>
             <p:nvSpPr>
               <p:cNvPr id="66" name="TextBox 65">
@@ -19008,6 +18901,7 @@
               </a:bodyPr>
               <a:lstStyle/>
               <a:p>
+                <a:pPr/>
                 <a14:m>
                   <m:oMathPara xmlns:m="http://schemas.openxmlformats.org/officeDocument/2006/math">
                     <m:oMathParaPr>
@@ -19034,7 +18928,7 @@
             </p:txBody>
           </p:sp>
         </mc:Choice>
-        <mc:Fallback>
+        <mc:Fallback xmlns="">
           <p:sp>
             <p:nvSpPr>
               <p:cNvPr id="66" name="TextBox 65">
@@ -19058,7 +18952,7 @@
                 <a:avLst/>
               </a:prstGeom>
               <a:blipFill>
-                <a:blip r:embed="rId10"/>
+                <a:blip r:embed="rId11"/>
                 <a:stretch>
                   <a:fillRect/>
                 </a:stretch>
@@ -19079,8 +18973,8 @@
           </p:sp>
         </mc:Fallback>
       </mc:AlternateContent>
-      <mc:AlternateContent xmlns:mc="http://schemas.openxmlformats.org/markup-compatibility/2006">
-        <mc:Choice xmlns:a14="http://schemas.microsoft.com/office/drawing/2010/main" Requires="a14">
+      <mc:AlternateContent xmlns:mc="http://schemas.openxmlformats.org/markup-compatibility/2006" xmlns:a14="http://schemas.microsoft.com/office/drawing/2010/main">
+        <mc:Choice Requires="a14">
           <p:sp>
             <p:nvSpPr>
               <p:cNvPr id="67" name="TextBox 66">
@@ -19109,6 +19003,7 @@
               </a:bodyPr>
               <a:lstStyle/>
               <a:p>
+                <a:pPr/>
                 <a14:m>
                   <m:oMathPara xmlns:m="http://schemas.openxmlformats.org/officeDocument/2006/math">
                     <m:oMathParaPr>
@@ -19135,7 +19030,7 @@
             </p:txBody>
           </p:sp>
         </mc:Choice>
-        <mc:Fallback>
+        <mc:Fallback xmlns="">
           <p:sp>
             <p:nvSpPr>
               <p:cNvPr id="67" name="TextBox 66">
@@ -19159,7 +19054,7 @@
                 <a:avLst/>
               </a:prstGeom>
               <a:blipFill>
-                <a:blip r:embed="rId11"/>
+                <a:blip r:embed="rId12"/>
                 <a:stretch>
                   <a:fillRect/>
                 </a:stretch>
@@ -19180,8 +19075,8 @@
           </p:sp>
         </mc:Fallback>
       </mc:AlternateContent>
-      <mc:AlternateContent xmlns:mc="http://schemas.openxmlformats.org/markup-compatibility/2006">
-        <mc:Choice xmlns:a14="http://schemas.microsoft.com/office/drawing/2010/main" Requires="a14">
+      <mc:AlternateContent xmlns:mc="http://schemas.openxmlformats.org/markup-compatibility/2006" xmlns:a14="http://schemas.microsoft.com/office/drawing/2010/main">
+        <mc:Choice Requires="a14">
           <p:sp>
             <p:nvSpPr>
               <p:cNvPr id="68" name="TextBox 67">
@@ -19210,6 +19105,7 @@
               </a:bodyPr>
               <a:lstStyle/>
               <a:p>
+                <a:pPr/>
                 <a14:m>
                   <m:oMathPara xmlns:m="http://schemas.openxmlformats.org/officeDocument/2006/math">
                     <m:oMathParaPr>
@@ -19236,7 +19132,7 @@
             </p:txBody>
           </p:sp>
         </mc:Choice>
-        <mc:Fallback>
+        <mc:Fallback xmlns="">
           <p:sp>
             <p:nvSpPr>
               <p:cNvPr id="68" name="TextBox 67">
@@ -19260,7 +19156,7 @@
                 <a:avLst/>
               </a:prstGeom>
               <a:blipFill>
-                <a:blip r:embed="rId12"/>
+                <a:blip r:embed="rId13"/>
                 <a:stretch>
                   <a:fillRect/>
                 </a:stretch>
@@ -19281,8 +19177,8 @@
           </p:sp>
         </mc:Fallback>
       </mc:AlternateContent>
-      <mc:AlternateContent xmlns:mc="http://schemas.openxmlformats.org/markup-compatibility/2006">
-        <mc:Choice xmlns:a14="http://schemas.microsoft.com/office/drawing/2010/main" Requires="a14">
+      <mc:AlternateContent xmlns:mc="http://schemas.openxmlformats.org/markup-compatibility/2006" xmlns:a14="http://schemas.microsoft.com/office/drawing/2010/main">
+        <mc:Choice Requires="a14">
           <p:sp>
             <p:nvSpPr>
               <p:cNvPr id="69" name="TextBox 68">
@@ -19311,6 +19207,7 @@
               </a:bodyPr>
               <a:lstStyle/>
               <a:p>
+                <a:pPr/>
                 <a14:m>
                   <m:oMathPara xmlns:m="http://schemas.openxmlformats.org/officeDocument/2006/math">
                     <m:oMathParaPr>
@@ -19337,7 +19234,7 @@
             </p:txBody>
           </p:sp>
         </mc:Choice>
-        <mc:Fallback>
+        <mc:Fallback xmlns="">
           <p:sp>
             <p:nvSpPr>
               <p:cNvPr id="69" name="TextBox 68">
@@ -19361,7 +19258,7 @@
                 <a:avLst/>
               </a:prstGeom>
               <a:blipFill>
-                <a:blip r:embed="rId13"/>
+                <a:blip r:embed="rId14"/>
                 <a:stretch>
                   <a:fillRect/>
                 </a:stretch>
@@ -19386,6 +19283,173 @@
     <p:extLst>
       <p:ext uri="{BB962C8B-B14F-4D97-AF65-F5344CB8AC3E}">
         <p14:creationId xmlns:p14="http://schemas.microsoft.com/office/powerpoint/2010/main" val="3282679911"/>
+      </p:ext>
+    </p:extLst>
+  </p:cSld>
+  <p:clrMapOvr>
+    <a:masterClrMapping/>
+  </p:clrMapOvr>
+  <p:transition>
+    <p:fade/>
+  </p:transition>
+</p:sld>
+</file>
+
+<file path=ppt/slides/slide11.xml><?xml version="1.0" encoding="utf-8"?>
+<p:sld xmlns:a="http://schemas.openxmlformats.org/drawingml/2006/main" xmlns:r="http://schemas.openxmlformats.org/officeDocument/2006/relationships" xmlns:p="http://schemas.openxmlformats.org/presentationml/2006/main">
+  <p:cSld>
+    <p:spTree>
+      <p:nvGrpSpPr>
+        <p:cNvPr id="1" name=""/>
+        <p:cNvGrpSpPr/>
+        <p:nvPr/>
+      </p:nvGrpSpPr>
+      <p:grpSpPr>
+        <a:xfrm>
+          <a:off x="0" y="0"/>
+          <a:ext cx="0" cy="0"/>
+          <a:chOff x="0" y="0"/>
+          <a:chExt cx="0" cy="0"/>
+        </a:xfrm>
+      </p:grpSpPr>
+      <p:sp>
+        <p:nvSpPr>
+          <p:cNvPr id="2" name="Title 1">
+            <a:extLst>
+              <a:ext uri="{FF2B5EF4-FFF2-40B4-BE49-F238E27FC236}">
+                <a16:creationId xmlns:a16="http://schemas.microsoft.com/office/drawing/2014/main" id="{F4EA49FF-94AB-43BE-955A-70AC549908A8}"/>
+              </a:ext>
+            </a:extLst>
+          </p:cNvPr>
+          <p:cNvSpPr>
+            <a:spLocks noGrp="1"/>
+          </p:cNvSpPr>
+          <p:nvPr>
+            <p:ph type="title"/>
+          </p:nvPr>
+        </p:nvSpPr>
+        <p:spPr/>
+        <p:txBody>
+          <a:bodyPr/>
+          <a:lstStyle/>
+          <a:p>
+            <a:r>
+              <a:rPr lang="en-GB" dirty="0"/>
+              <a:t>Intertemporal substitution</a:t>
+            </a:r>
+          </a:p>
+        </p:txBody>
+      </p:sp>
+      <p:sp>
+        <p:nvSpPr>
+          <p:cNvPr id="3" name="Content Placeholder 2">
+            <a:extLst>
+              <a:ext uri="{FF2B5EF4-FFF2-40B4-BE49-F238E27FC236}">
+                <a16:creationId xmlns:a16="http://schemas.microsoft.com/office/drawing/2014/main" id="{0FEC4E67-8473-48DA-B844-1CF82984ECA1}"/>
+              </a:ext>
+            </a:extLst>
+          </p:cNvPr>
+          <p:cNvSpPr>
+            <a:spLocks noGrp="1"/>
+          </p:cNvSpPr>
+          <p:nvPr>
+            <p:ph idx="1"/>
+          </p:nvPr>
+        </p:nvSpPr>
+        <p:spPr>
+          <a:xfrm>
+            <a:off x="533400" y="1047750"/>
+            <a:ext cx="7886700" cy="3660775"/>
+          </a:xfrm>
+        </p:spPr>
+        <p:txBody>
+          <a:bodyPr>
+            <a:normAutofit fontScale="92500" lnSpcReduction="20000"/>
+          </a:bodyPr>
+          <a:lstStyle/>
+          <a:p>
+            <a:r>
+              <a:rPr lang="en-GB" b="1" dirty="0"/>
+              <a:t>Permanent Income view </a:t>
+            </a:r>
+            <a:r>
+              <a:rPr lang="en-GB" dirty="0"/>
+              <a:t>: PIH relies on smoothening of income i.e. those with volatile incomes tend to limit (lower permanent income) and consumption is always proportional to the PI</a:t>
+            </a:r>
+          </a:p>
+          <a:p>
+            <a:r>
+              <a:rPr lang="en-GB" dirty="0"/>
+              <a:t>However, PIH explicitly ignores non-monetary risks – while status encompasses other risks. PIH may generally be true, but it is possible that consumers go against the usual direction of smoothening i.e.</a:t>
+            </a:r>
+          </a:p>
+          <a:p>
+            <a:pPr lvl="1"/>
+            <a:r>
+              <a:rPr lang="en-GB" dirty="0"/>
+              <a:t>Sb with less income stability may believe in a possibility (unrealistic) of a windfall </a:t>
+            </a:r>
+          </a:p>
+          <a:p>
+            <a:pPr lvl="1"/>
+            <a:r>
+              <a:rPr lang="en-GB" dirty="0"/>
+              <a:t>Sb with high income stability may be fearful of a downturn (unrealistic)</a:t>
+            </a:r>
+          </a:p>
+          <a:p>
+            <a:r>
+              <a:rPr lang="en-GB" dirty="0"/>
+              <a:t>A probabilistic model for status – which allows the consumer to overspend on short-term quality - should allow the behaviours in both directions</a:t>
+            </a:r>
+          </a:p>
+          <a:p>
+            <a:r>
+              <a:rPr lang="en-GB" dirty="0"/>
+              <a:t>With our model description - an additive utility with assets and quality would imply that more assets discourage quality. On the other hand, if a consumer matches quality to her subjective net-worth, she may increase quality</a:t>
+            </a:r>
+          </a:p>
+        </p:txBody>
+      </p:sp>
+      <p:sp>
+        <p:nvSpPr>
+          <p:cNvPr id="4" name="Slide Number Placeholder 3">
+            <a:extLst>
+              <a:ext uri="{FF2B5EF4-FFF2-40B4-BE49-F238E27FC236}">
+                <a16:creationId xmlns:a16="http://schemas.microsoft.com/office/drawing/2014/main" id="{0011EE81-FFB1-444B-B700-32CA442F0549}"/>
+              </a:ext>
+            </a:extLst>
+          </p:cNvPr>
+          <p:cNvSpPr>
+            <a:spLocks noGrp="1"/>
+          </p:cNvSpPr>
+          <p:nvPr>
+            <p:ph type="sldNum" sz="quarter" idx="12"/>
+          </p:nvPr>
+        </p:nvSpPr>
+        <p:spPr/>
+        <p:txBody>
+          <a:bodyPr/>
+          <a:lstStyle/>
+          <a:p>
+            <a:pPr>
+              <a:defRPr/>
+            </a:pPr>
+            <a:fld id="{8E35B453-7314-4BBD-9303-11C6BECC4B0D}" type="slidenum">
+              <a:rPr lang="en-GB" altLang="en-US" smtClean="0"/>
+              <a:pPr>
+                <a:defRPr/>
+              </a:pPr>
+              <a:t>11</a:t>
+            </a:fld>
+            <a:endParaRPr lang="en-GB" altLang="en-US" dirty="0"/>
+          </a:p>
+        </p:txBody>
+      </p:sp>
+    </p:spTree>
+    <p:extLst>
+      <p:ext uri="{BB962C8B-B14F-4D97-AF65-F5344CB8AC3E}">
+        <p14:creationId xmlns:p14="http://schemas.microsoft.com/office/powerpoint/2010/main" val="3951174204"/>
       </p:ext>
     </p:extLst>
   </p:cSld>
@@ -19438,7 +19502,7 @@
           <a:p>
             <a:r>
               <a:rPr lang="en-GB" dirty="0"/>
-              <a:t>Towards a model</a:t>
+              <a:t>Observed variables in the model</a:t>
             </a:r>
           </a:p>
         </p:txBody>
@@ -19464,13 +19528,24 @@
             <p:spPr/>
             <p:txBody>
               <a:bodyPr>
-                <a:normAutofit fontScale="77500" lnSpcReduction="20000"/>
+                <a:normAutofit fontScale="92500" lnSpcReduction="20000"/>
               </a:bodyPr>
               <a:lstStyle/>
               <a:p>
                 <a:r>
                   <a:rPr lang="en-GB" dirty="0"/>
-                  <a:t>Consider the assets </a:t>
+                  <a:t>Our goal is to be able to comment on which </a:t>
+                </a:r>
+                <a:r>
+                  <a:rPr lang="en-GB"/>
+                  <a:t>tendency dominates</a:t>
+                </a:r>
+                <a:endParaRPr lang="en-GB" dirty="0"/>
+              </a:p>
+              <a:p>
+                <a:r>
+                  <a:rPr lang="en-GB" dirty="0"/>
+                  <a:t>We observe the assets </a:t>
                 </a:r>
                 <a14:m>
                   <m:oMath xmlns:m="http://schemas.openxmlformats.org/officeDocument/2006/math">
@@ -19517,13 +19592,13 @@
                 </a14:m>
                 <a:r>
                   <a:rPr lang="en-GB" dirty="0"/>
-                  <a:t> (education, occupation, class etc.) that may influence consumer decision (through discounting or otherwise)</a:t>
+                  <a:t> (education, occupation, class etc.) that may influence consumer decision (through discounted worth)</a:t>
                 </a:r>
               </a:p>
               <a:p>
                 <a:r>
                   <a:rPr lang="en-GB" dirty="0"/>
-                  <a:t>To bring the life-cycle factors, consider a function </a:t>
+                  <a:t>To bring the life-cycle scheme, consider a function </a:t>
                 </a:r>
                 <a14:m>
                   <m:oMath xmlns:m="http://schemas.openxmlformats.org/officeDocument/2006/math">
@@ -19726,7 +19801,7 @@
                 </a14:m>
                 <a:r>
                   <a:rPr lang="en-GB" dirty="0"/>
-                  <a:t> </a:t>
+                  <a:t>. This serves as a measure of quality.</a:t>
                 </a:r>
               </a:p>
               <a:p>
@@ -19779,7 +19854,7 @@
                 </a14:m>
                 <a:r>
                   <a:rPr lang="en-GB" dirty="0"/>
-                  <a:t> and savings a portion of income </a:t>
+                  <a:t> and saving a portion of income </a:t>
                 </a:r>
                 <a14:m>
                   <m:oMath xmlns:m="http://schemas.openxmlformats.org/officeDocument/2006/math">
@@ -19921,48 +19996,8 @@
                 </a14:m>
                 <a:r>
                   <a:rPr lang="en-GB" dirty="0"/>
-                  <a:t>) for wealth</a:t>
+                  <a:t>) for wealth – or what constitutes the subjective view of status</a:t>
                 </a:r>
-              </a:p>
-              <a:p>
-                <a:r>
-                  <a:rPr lang="en-GB" dirty="0"/>
-                  <a:t>Remember that savings require a long time commitment depending on </a:t>
-                </a:r>
-                <a14:m>
-                  <m:oMath xmlns:m="http://schemas.openxmlformats.org/officeDocument/2006/math">
-                    <m:r>
-                      <a:rPr lang="en-GB" i="1">
-                        <a:latin typeface="Cambria Math" panose="02040503050406030204" pitchFamily="18" charset="0"/>
-                      </a:rPr>
-                      <m:t>𝜎</m:t>
-                    </m:r>
-                  </m:oMath>
-                </a14:m>
-                <a:r>
-                  <a:rPr lang="en-GB" dirty="0"/>
-                  <a:t> but consumption is influenced by other risks that determine </a:t>
-                </a:r>
-                <a14:m>
-                  <m:oMath xmlns:m="http://schemas.openxmlformats.org/officeDocument/2006/math">
-                    <m:r>
-                      <m:rPr>
-                        <m:sty m:val="p"/>
-                      </m:rPr>
-                      <a:rPr lang="en-GB">
-                        <a:latin typeface="Cambria Math" panose="02040503050406030204" pitchFamily="18" charset="0"/>
-                      </a:rPr>
-                      <m:t>Γ</m:t>
-                    </m:r>
-                  </m:oMath>
-                </a14:m>
-                <a:r>
-                  <a:rPr lang="en-GB" dirty="0"/>
-                  <a:t> (e.g. perceptions of wealth)</a:t>
-                </a:r>
-              </a:p>
-              <a:p>
-                <a:endParaRPr lang="en-GB" dirty="0"/>
               </a:p>
             </p:txBody>
           </p:sp>
@@ -19988,7 +20023,7 @@
               <a:blipFill>
                 <a:blip r:embed="rId2"/>
                 <a:stretch>
-                  <a:fillRect l="-309" t="-2430" r="-155"/>
+                  <a:fillRect l="-541" t="-3178" r="-1314" b="-2804"/>
                 </a:stretch>
               </a:blipFill>
             </p:spPr>
@@ -20103,8 +20138,8 @@
           </a:p>
         </p:txBody>
       </p:sp>
-      <mc:AlternateContent xmlns:mc="http://schemas.openxmlformats.org/markup-compatibility/2006">
-        <mc:Choice xmlns:a14="http://schemas.microsoft.com/office/drawing/2010/main" Requires="a14">
+      <mc:AlternateContent xmlns:mc="http://schemas.openxmlformats.org/markup-compatibility/2006" xmlns:a14="http://schemas.microsoft.com/office/drawing/2010/main">
+        <mc:Choice Requires="a14">
           <p:sp>
             <p:nvSpPr>
               <p:cNvPr id="3" name="Content Placeholder 2">
@@ -20124,9 +20159,46 @@
             <p:spPr/>
             <p:txBody>
               <a:bodyPr>
-                <a:normAutofit/>
+                <a:normAutofit fontScale="92500"/>
               </a:bodyPr>
               <a:lstStyle/>
+              <a:p>
+                <a:r>
+                  <a:rPr lang="en-GB" dirty="0"/>
+                  <a:t>Savings require a long time commitment depending on </a:t>
+                </a:r>
+                <a14:m>
+                  <m:oMath xmlns:m="http://schemas.openxmlformats.org/officeDocument/2006/math">
+                    <m:r>
+                      <a:rPr lang="en-GB" i="1">
+                        <a:latin typeface="Cambria Math" panose="02040503050406030204" pitchFamily="18" charset="0"/>
+                      </a:rPr>
+                      <m:t>𝜎</m:t>
+                    </m:r>
+                  </m:oMath>
+                </a14:m>
+                <a:r>
+                  <a:rPr lang="en-GB" dirty="0"/>
+                  <a:t> but consumption is influenced by other risks that determine </a:t>
+                </a:r>
+                <a14:m>
+                  <m:oMath xmlns:m="http://schemas.openxmlformats.org/officeDocument/2006/math">
+                    <m:r>
+                      <m:rPr>
+                        <m:sty m:val="p"/>
+                      </m:rPr>
+                      <a:rPr lang="en-GB">
+                        <a:latin typeface="Cambria Math" panose="02040503050406030204" pitchFamily="18" charset="0"/>
+                      </a:rPr>
+                      <m:t>Γ</m:t>
+                    </m:r>
+                  </m:oMath>
+                </a14:m>
+                <a:r>
+                  <a:rPr lang="en-GB" dirty="0"/>
+                  <a:t> (e.g. perceptions of wealth). In other words, consumption is myopic while savings are cumulative</a:t>
+                </a:r>
+              </a:p>
               <a:p>
                 <a:r>
                   <a:rPr lang="en-GB" dirty="0"/>
@@ -20216,8 +20288,11 @@
                 </a14:m>
                 <a:r>
                   <a:rPr lang="en-GB" dirty="0"/>
-                  <a:t> in her lifetime – which is not influenced by subjective probability as much as consumption is. Note that this relies on the use of a stochastic (risk-based) approach</a:t>
+                  <a:t> in her lifetime – which is not influenced by subjective probability as much as consumption is. Note that our discounting approach only makes sense with a stochastic (risk-based) model</a:t>
                 </a:r>
+              </a:p>
+              <a:p>
+                <a:endParaRPr lang="en-GB" dirty="0"/>
               </a:p>
               <a:p>
                 <a:endParaRPr lang="en-GB" dirty="0"/>
@@ -20225,7 +20300,7 @@
             </p:txBody>
           </p:sp>
         </mc:Choice>
-        <mc:Fallback>
+        <mc:Fallback xmlns="">
           <p:sp>
             <p:nvSpPr>
               <p:cNvPr id="3" name="Content Placeholder 2">
@@ -20246,7 +20321,7 @@
               <a:blipFill>
                 <a:blip r:embed="rId2"/>
                 <a:stretch>
-                  <a:fillRect l="-773" t="-2243"/>
+                  <a:fillRect l="-541" t="-1869" r="-1005"/>
                 </a:stretch>
               </a:blipFill>
             </p:spPr>
@@ -20361,8 +20436,8 @@
           </a:p>
         </p:txBody>
       </p:sp>
-      <mc:AlternateContent xmlns:mc="http://schemas.openxmlformats.org/markup-compatibility/2006">
-        <mc:Choice xmlns:a14="http://schemas.microsoft.com/office/drawing/2010/main" Requires="a14">
+      <mc:AlternateContent xmlns:mc="http://schemas.openxmlformats.org/markup-compatibility/2006" xmlns:a14="http://schemas.microsoft.com/office/drawing/2010/main">
+        <mc:Choice Requires="a14">
           <p:sp>
             <p:nvSpPr>
               <p:cNvPr id="3" name="Content Placeholder 2">
@@ -20382,7 +20457,7 @@
             <p:spPr/>
             <p:txBody>
               <a:bodyPr>
-                <a:normAutofit fontScale="55000" lnSpcReduction="20000"/>
+                <a:normAutofit fontScale="62500" lnSpcReduction="20000"/>
               </a:bodyPr>
               <a:lstStyle/>
               <a:p>
@@ -20466,14 +20541,6 @@
                   </m:oMathPara>
                 </a14:m>
                 <a:endParaRPr lang="en-GB" dirty="0"/>
-              </a:p>
-              <a:p>
-                <a:pPr marL="0" indent="0">
-                  <a:buNone/>
-                </a:pPr>
-                <a:endParaRPr lang="en-GB" b="0" i="1" dirty="0">
-                  <a:latin typeface="Cambria Math" panose="02040503050406030204" pitchFamily="18" charset="0"/>
-                </a:endParaRPr>
               </a:p>
               <a:p>
                 <a:pPr marL="0" indent="0">
@@ -20636,12 +20703,6 @@
                 <a:pPr marL="0" indent="0">
                   <a:buNone/>
                 </a:pPr>
-                <a:endParaRPr lang="en-GB" dirty="0"/>
-              </a:p>
-              <a:p>
-                <a:pPr marL="0" indent="0">
-                  <a:buNone/>
-                </a:pPr>
                 <a14:m>
                   <m:oMathPara xmlns:m="http://schemas.openxmlformats.org/officeDocument/2006/math">
                     <m:oMathParaPr>
@@ -20762,12 +20823,6 @@
                 <a:pPr marL="0" indent="0">
                   <a:buNone/>
                 </a:pPr>
-                <a:endParaRPr lang="en-GB" dirty="0"/>
-              </a:p>
-              <a:p>
-                <a:pPr marL="0" indent="0">
-                  <a:buNone/>
-                </a:pPr>
                 <a14:m>
                   <m:oMathPara xmlns:m="http://schemas.openxmlformats.org/officeDocument/2006/math">
                     <m:oMathParaPr>
@@ -20868,7 +20923,7 @@
                         <a:rPr lang="en-GB" b="0" i="1" smtClean="0">
                           <a:latin typeface="Cambria Math" panose="02040503050406030204" pitchFamily="18" charset="0"/>
                         </a:rPr>
-                        <m:t>𝑔</m:t>
+                        <m:t>𝜈</m:t>
                       </m:r>
                       <m:d>
                         <m:dPr>
@@ -20893,12 +20948,6 @@
                     </m:oMath>
                   </m:oMathPara>
                 </a14:m>
-                <a:endParaRPr lang="en-GB" b="0" dirty="0"/>
-              </a:p>
-              <a:p>
-                <a:pPr marL="0" indent="0">
-                  <a:buNone/>
-                </a:pPr>
                 <a:endParaRPr lang="en-GB" b="0" dirty="0"/>
               </a:p>
               <a:p>
@@ -20932,71 +20981,211 @@
                         </a:rPr>
                         <m:t>𝑟</m:t>
                       </m:r>
+                      <m:d>
+                        <m:dPr>
+                          <m:ctrlPr>
+                            <a:rPr lang="en-GB" b="0" i="1" smtClean="0">
+                              <a:latin typeface="Cambria Math" panose="02040503050406030204" pitchFamily="18" charset="0"/>
+                            </a:rPr>
+                          </m:ctrlPr>
+                        </m:dPr>
+                        <m:e>
+                          <m:r>
+                            <a:rPr lang="en-GB" b="0" i="1" smtClean="0">
+                              <a:latin typeface="Cambria Math" panose="02040503050406030204" pitchFamily="18" charset="0"/>
+                            </a:rPr>
+                            <m:t>𝜎</m:t>
+                          </m:r>
+                          <m:r>
+                            <a:rPr lang="en-GB" b="0" i="1" smtClean="0">
+                              <a:latin typeface="Cambria Math" panose="02040503050406030204" pitchFamily="18" charset="0"/>
+                            </a:rPr>
+                            <m:t>,</m:t>
+                          </m:r>
+                          <m:r>
+                            <a:rPr lang="en-GB" b="0" i="1" smtClean="0">
+                              <a:latin typeface="Cambria Math" panose="02040503050406030204" pitchFamily="18" charset="0"/>
+                            </a:rPr>
+                            <m:t>𝜌</m:t>
+                          </m:r>
+                          <m:r>
+                            <a:rPr lang="en-GB" b="0" i="1" smtClean="0">
+                              <a:latin typeface="Cambria Math" panose="02040503050406030204" pitchFamily="18" charset="0"/>
+                            </a:rPr>
+                            <m:t>,</m:t>
+                          </m:r>
+                          <m:sSub>
+                            <m:sSubPr>
+                              <m:ctrlPr>
+                                <a:rPr lang="en-GB" b="0" i="1" smtClean="0">
+                                  <a:latin typeface="Cambria Math" panose="02040503050406030204" pitchFamily="18" charset="0"/>
+                                </a:rPr>
+                              </m:ctrlPr>
+                            </m:sSubPr>
+                            <m:e>
+                              <m:r>
+                                <a:rPr lang="en-GB" b="0" i="1" smtClean="0">
+                                  <a:latin typeface="Cambria Math" panose="02040503050406030204" pitchFamily="18" charset="0"/>
+                                </a:rPr>
+                                <m:t>𝐴</m:t>
+                              </m:r>
+                            </m:e>
+                            <m:sub>
+                              <m:r>
+                                <a:rPr lang="en-GB" b="0" i="1" smtClean="0">
+                                  <a:latin typeface="Cambria Math" panose="02040503050406030204" pitchFamily="18" charset="0"/>
+                                </a:rPr>
+                                <m:t>𝑡</m:t>
+                              </m:r>
+                            </m:sub>
+                          </m:sSub>
+                        </m:e>
+                      </m:d>
+                    </m:oMath>
+                  </m:oMathPara>
+                </a14:m>
+                <a:endParaRPr lang="en-GB" b="0" dirty="0"/>
+              </a:p>
+              <a:p>
+                <a:pPr marL="0" indent="0">
+                  <a:buNone/>
+                </a:pPr>
+                <a14:m>
+                  <m:oMathPara xmlns:m="http://schemas.openxmlformats.org/officeDocument/2006/math">
+                    <m:oMathParaPr>
+                      <m:jc m:val="centerGroup"/>
+                    </m:oMathParaPr>
+                    <m:oMath xmlns:m="http://schemas.openxmlformats.org/officeDocument/2006/math">
                       <m:r>
                         <a:rPr lang="en-GB" b="0" i="1" smtClean="0">
                           <a:latin typeface="Cambria Math" panose="02040503050406030204" pitchFamily="18" charset="0"/>
                         </a:rPr>
-                        <m:t>(</m:t>
+                        <m:t>𝑈</m:t>
                       </m:r>
                       <m:r>
                         <a:rPr lang="en-GB" b="0" i="1" smtClean="0">
                           <a:latin typeface="Cambria Math" panose="02040503050406030204" pitchFamily="18" charset="0"/>
                         </a:rPr>
-                        <m:t>𝜎</m:t>
+                        <m:t>=</m:t>
                       </m:r>
-                      <m:r>
-                        <a:rPr lang="en-GB" b="0" i="1" smtClean="0">
-                          <a:latin typeface="Cambria Math" panose="02040503050406030204" pitchFamily="18" charset="0"/>
-                        </a:rPr>
-                        <m:t>,</m:t>
-                      </m:r>
-                      <m:r>
-                        <a:rPr lang="en-GB" b="0" i="1" smtClean="0">
-                          <a:latin typeface="Cambria Math" panose="02040503050406030204" pitchFamily="18" charset="0"/>
-                        </a:rPr>
-                        <m:t>𝜌</m:t>
-                      </m:r>
-                      <m:r>
-                        <a:rPr lang="en-GB" b="0" i="1" smtClean="0">
-                          <a:latin typeface="Cambria Math" panose="02040503050406030204" pitchFamily="18" charset="0"/>
-                        </a:rPr>
-                        <m:t>,</m:t>
-                      </m:r>
-                      <m:sSub>
-                        <m:sSubPr>
+                      <m:nary>
+                        <m:naryPr>
+                          <m:chr m:val="∑"/>
+                          <m:supHide m:val="on"/>
                           <m:ctrlPr>
-                            <a:rPr lang="en-GB" b="0" i="1" smtClean="0">
+                            <a:rPr lang="en-GB" i="1">
                               <a:latin typeface="Cambria Math" panose="02040503050406030204" pitchFamily="18" charset="0"/>
                             </a:rPr>
                           </m:ctrlPr>
-                        </m:sSubPr>
+                        </m:naryPr>
+                        <m:sub>
+                          <m:r>
+                            <a:rPr lang="en-GB" i="1">
+                              <a:latin typeface="Cambria Math" panose="02040503050406030204" pitchFamily="18" charset="0"/>
+                            </a:rPr>
+                            <m:t>𝑖</m:t>
+                          </m:r>
+                          <m:r>
+                            <a:rPr lang="en-GB" i="1">
+                              <a:latin typeface="Cambria Math" panose="02040503050406030204" pitchFamily="18" charset="0"/>
+                            </a:rPr>
+                            <m:t>=0</m:t>
+                          </m:r>
+                        </m:sub>
+                        <m:sup/>
                         <m:e>
                           <m:r>
-                            <a:rPr lang="en-GB" b="0" i="1" smtClean="0">
+                            <a:rPr lang="en-GB" i="1">
                               <a:latin typeface="Cambria Math" panose="02040503050406030204" pitchFamily="18" charset="0"/>
                             </a:rPr>
-                            <m:t>𝐴</m:t>
+                            <m:t>𝑢</m:t>
+                          </m:r>
+                          <m:r>
+                            <a:rPr lang="en-GB" i="1">
+                              <a:latin typeface="Cambria Math" panose="02040503050406030204" pitchFamily="18" charset="0"/>
+                            </a:rPr>
+                            <m:t>(</m:t>
+                          </m:r>
+                          <m:sSub>
+                            <m:sSubPr>
+                              <m:ctrlPr>
+                                <a:rPr lang="en-GB" i="1">
+                                  <a:latin typeface="Cambria Math" panose="02040503050406030204" pitchFamily="18" charset="0"/>
+                                </a:rPr>
+                              </m:ctrlPr>
+                            </m:sSubPr>
+                            <m:e>
+                              <m:r>
+                                <a:rPr lang="en-GB" i="1">
+                                  <a:latin typeface="Cambria Math" panose="02040503050406030204" pitchFamily="18" charset="0"/>
+                                </a:rPr>
+                                <m:t>𝐴</m:t>
+                              </m:r>
+                            </m:e>
+                            <m:sub>
+                              <m:r>
+                                <a:rPr lang="en-GB" i="1">
+                                  <a:latin typeface="Cambria Math" panose="02040503050406030204" pitchFamily="18" charset="0"/>
+                                </a:rPr>
+                                <m:t>𝑖</m:t>
+                              </m:r>
+                            </m:sub>
+                          </m:sSub>
+                          <m:r>
+                            <a:rPr lang="en-GB" i="1">
+                              <a:latin typeface="Cambria Math" panose="02040503050406030204" pitchFamily="18" charset="0"/>
+                            </a:rPr>
+                            <m:t>,</m:t>
+                          </m:r>
+                          <m:r>
+                            <a:rPr lang="en-GB" i="1">
+                              <a:latin typeface="Cambria Math" panose="02040503050406030204" pitchFamily="18" charset="0"/>
+                            </a:rPr>
+                            <m:t>𝜌</m:t>
+                          </m:r>
+                          <m:r>
+                            <a:rPr lang="en-GB" i="1">
+                              <a:latin typeface="Cambria Math" panose="02040503050406030204" pitchFamily="18" charset="0"/>
+                            </a:rPr>
+                            <m:t>,</m:t>
+                          </m:r>
+                          <m:sSub>
+                            <m:sSubPr>
+                              <m:ctrlPr>
+                                <a:rPr lang="en-GB" i="1">
+                                  <a:latin typeface="Cambria Math" panose="02040503050406030204" pitchFamily="18" charset="0"/>
+                                </a:rPr>
+                              </m:ctrlPr>
+                            </m:sSubPr>
+                            <m:e>
+                              <m:r>
+                                <a:rPr lang="en-GB" i="1">
+                                  <a:latin typeface="Cambria Math" panose="02040503050406030204" pitchFamily="18" charset="0"/>
+                                </a:rPr>
+                                <m:t>𝜈</m:t>
+                              </m:r>
+                            </m:e>
+                            <m:sub>
+                              <m:r>
+                                <a:rPr lang="en-GB" i="1">
+                                  <a:latin typeface="Cambria Math" panose="02040503050406030204" pitchFamily="18" charset="0"/>
+                                </a:rPr>
+                                <m:t>𝑖</m:t>
+                              </m:r>
+                            </m:sub>
+                          </m:sSub>
+                          <m:r>
+                            <a:rPr lang="en-GB" i="1">
+                              <a:latin typeface="Cambria Math" panose="02040503050406030204" pitchFamily="18" charset="0"/>
+                            </a:rPr>
+                            <m:t>)</m:t>
                           </m:r>
                         </m:e>
-                        <m:sub>
-                          <m:r>
-                            <a:rPr lang="en-GB" b="0" i="1" smtClean="0">
-                              <a:latin typeface="Cambria Math" panose="02040503050406030204" pitchFamily="18" charset="0"/>
-                            </a:rPr>
-                            <m:t>𝑡</m:t>
-                          </m:r>
-                        </m:sub>
-                      </m:sSub>
-                      <m:r>
-                        <a:rPr lang="en-GB" b="0" i="1" smtClean="0">
-                          <a:latin typeface="Cambria Math" panose="02040503050406030204" pitchFamily="18" charset="0"/>
-                        </a:rPr>
-                        <m:t>)</m:t>
-                      </m:r>
+                      </m:nary>
                     </m:oMath>
                   </m:oMathPara>
                 </a14:m>
-                <a:endParaRPr lang="en-GB" dirty="0"/>
+                <a:endParaRPr lang="en-GB" b="0" dirty="0"/>
               </a:p>
               <a:p>
                 <a:pPr marL="0" indent="0">
@@ -21168,7 +21357,7 @@
                 </a14:m>
                 <a:r>
                   <a:rPr lang="en-GB" dirty="0"/>
-                  <a:t>, a consumer would solve the </a:t>
+                  <a:t>, a consumer would solve the expected value of </a:t>
                 </a:r>
                 <a14:m>
                   <m:oMath xmlns:m="http://schemas.openxmlformats.org/officeDocument/2006/math">
@@ -21290,47 +21479,13 @@
                 </a14:m>
                 <a:r>
                   <a:rPr lang="en-GB" dirty="0"/>
-                  <a:t>.  This would result in a stochastic dynamic optimisation problem – which is often solved through simulations. Log-linear approaches are discouraged.</a:t>
+                  <a:t>.  This would result in a stochastic dynamic optimisation problem – which is often solved through simulations. Log-linear approaches are discouraged</a:t>
                 </a:r>
               </a:p>
               <a:p>
                 <a:r>
                   <a:rPr lang="en-GB" dirty="0"/>
-                  <a:t>Notice that we associate consumption both with quality </a:t>
-                </a:r>
-                <a14:m>
-                  <m:oMath xmlns:m="http://schemas.openxmlformats.org/officeDocument/2006/math">
-                    <m:r>
-                      <a:rPr lang="en-GB" i="1">
-                        <a:latin typeface="Cambria Math" panose="02040503050406030204" pitchFamily="18" charset="0"/>
-                      </a:rPr>
-                      <m:t>𝑔</m:t>
-                    </m:r>
-                    <m:d>
-                      <m:dPr>
-                        <m:ctrlPr>
-                          <a:rPr lang="en-GB" i="1">
-                            <a:latin typeface="Cambria Math" panose="02040503050406030204" pitchFamily="18" charset="0"/>
-                          </a:rPr>
-                        </m:ctrlPr>
-                      </m:dPr>
-                      <m:e>
-                        <m:r>
-                          <m:rPr>
-                            <m:sty m:val="p"/>
-                          </m:rPr>
-                          <a:rPr lang="en-GB">
-                            <a:latin typeface="Cambria Math" panose="02040503050406030204" pitchFamily="18" charset="0"/>
-                          </a:rPr>
-                          <m:t>Γ</m:t>
-                        </m:r>
-                      </m:e>
-                    </m:d>
-                  </m:oMath>
-                </a14:m>
-                <a:r>
-                  <a:rPr lang="en-GB" dirty="0"/>
-                  <a:t> and needs/</a:t>
+                  <a:t>Notice that on one hand, someone with a high material net-worth does not need to expend on quality to compete with others but on the other, she also matches her consumption with her expected net worth based on a subjective probability</a:t>
                 </a:r>
               </a:p>
               <a:p>
@@ -21342,7 +21497,7 @@
             </p:txBody>
           </p:sp>
         </mc:Choice>
-        <mc:Fallback>
+        <mc:Fallback xmlns="">
           <p:sp>
             <p:nvSpPr>
               <p:cNvPr id="3" name="Content Placeholder 2">
@@ -21363,7 +21518,7 @@
               <a:blipFill>
                 <a:blip r:embed="rId2"/>
                 <a:stretch>
-                  <a:fillRect r="-232"/>
+                  <a:fillRect r="-618"/>
                 </a:stretch>
               </a:blipFill>
             </p:spPr>
@@ -21478,8 +21633,8 @@
           </a:p>
         </p:txBody>
       </p:sp>
-      <mc:AlternateContent xmlns:mc="http://schemas.openxmlformats.org/markup-compatibility/2006">
-        <mc:Choice xmlns:a14="http://schemas.microsoft.com/office/drawing/2010/main" Requires="a14">
+      <mc:AlternateContent xmlns:mc="http://schemas.openxmlformats.org/markup-compatibility/2006" xmlns:a14="http://schemas.microsoft.com/office/drawing/2010/main">
+        <mc:Choice Requires="a14">
           <p:sp>
             <p:nvSpPr>
               <p:cNvPr id="3" name="Content Placeholder 2">
@@ -21499,7 +21654,7 @@
             <p:spPr/>
             <p:txBody>
               <a:bodyPr>
-                <a:normAutofit fontScale="85000" lnSpcReduction="20000"/>
+                <a:normAutofit fontScale="77500" lnSpcReduction="20000"/>
               </a:bodyPr>
               <a:lstStyle/>
               <a:p>
@@ -22089,62 +22244,9 @@
                 <a:endParaRPr lang="en-GB" dirty="0"/>
               </a:p>
               <a:p>
-                <a:pPr marL="0" indent="0">
-                  <a:buNone/>
-                </a:pPr>
                 <a:r>
                   <a:rPr lang="en-GB" dirty="0"/>
-                  <a:t>To show the role of </a:t>
-                </a:r>
-                <a14:m>
-                  <m:oMath xmlns:m="http://schemas.openxmlformats.org/officeDocument/2006/math">
-                    <m:r>
-                      <a:rPr lang="en-GB" i="1">
-                        <a:latin typeface="Cambria Math" panose="02040503050406030204" pitchFamily="18" charset="0"/>
-                      </a:rPr>
-                      <m:t>𝑝</m:t>
-                    </m:r>
-                    <m:d>
-                      <m:dPr>
-                        <m:ctrlPr>
-                          <a:rPr lang="en-GB" i="1">
-                            <a:latin typeface="Cambria Math" panose="02040503050406030204" pitchFamily="18" charset="0"/>
-                          </a:rPr>
-                        </m:ctrlPr>
-                      </m:dPr>
-                      <m:e>
-                        <m:sSub>
-                          <m:sSubPr>
-                            <m:ctrlPr>
-                              <a:rPr lang="en-GB" i="1">
-                                <a:latin typeface="Cambria Math" panose="02040503050406030204" pitchFamily="18" charset="0"/>
-                              </a:rPr>
-                            </m:ctrlPr>
-                          </m:sSubPr>
-                          <m:e>
-                            <m:r>
-                              <a:rPr lang="en-GB" i="1">
-                                <a:latin typeface="Cambria Math" panose="02040503050406030204" pitchFamily="18" charset="0"/>
-                              </a:rPr>
-                              <m:t>𝐴</m:t>
-                            </m:r>
-                          </m:e>
-                          <m:sub>
-                            <m:r>
-                              <a:rPr lang="en-GB" i="1">
-                                <a:latin typeface="Cambria Math" panose="02040503050406030204" pitchFamily="18" charset="0"/>
-                              </a:rPr>
-                              <m:t>𝑡</m:t>
-                            </m:r>
-                          </m:sub>
-                        </m:sSub>
-                      </m:e>
-                    </m:d>
-                  </m:oMath>
-                </a14:m>
-                <a:r>
-                  <a:rPr lang="en-GB" dirty="0"/>
-                  <a:t> in a non-stochastic model, consider </a:t>
+                  <a:t>To view a particular solution, consider </a:t>
                 </a:r>
                 <a14:m>
                   <m:oMath xmlns:m="http://schemas.openxmlformats.org/officeDocument/2006/math">
@@ -22577,7 +22679,13 @@
                 </a14:m>
                 <a:r>
                   <a:rPr lang="en-GB" dirty="0"/>
-                  <a:t> is brought about by ownership of assets. This non-stochastic replaces </a:t>
+                  <a:t> is brought about by ownership of assets</a:t>
+                </a:r>
+              </a:p>
+              <a:p>
+                <a:r>
+                  <a:rPr lang="en-GB" dirty="0"/>
+                  <a:t>This non-stochastic model replaces </a:t>
                 </a:r>
                 <a14:m>
                   <m:oMath xmlns:m="http://schemas.openxmlformats.org/officeDocument/2006/math">
@@ -22591,7 +22699,7 @@
                 </a14:m>
                 <a:r>
                   <a:rPr lang="en-GB" dirty="0"/>
-                  <a:t>-discounting with cost.</a:t>
+                  <a:t>-based discounting with a cost</a:t>
                 </a:r>
               </a:p>
               <a:p>
@@ -22600,7 +22708,7 @@
             </p:txBody>
           </p:sp>
         </mc:Choice>
-        <mc:Fallback>
+        <mc:Fallback xmlns="">
           <p:sp>
             <p:nvSpPr>
               <p:cNvPr id="3" name="Content Placeholder 2">
@@ -22621,7 +22729,7 @@
               <a:blipFill>
                 <a:blip r:embed="rId2"/>
                 <a:stretch>
-                  <a:fillRect l="-618"/>
+                  <a:fillRect l="-309"/>
                 </a:stretch>
               </a:blipFill>
             </p:spPr>
@@ -22759,13 +22867,13 @@
           <a:p>
             <a:r>
               <a:rPr lang="en-GB" dirty="0"/>
+              <a:t>Quality is defined with total costs on commodity (many interpretations of quality exist in the literature)</a:t>
+            </a:r>
+          </a:p>
+          <a:p>
+            <a:r>
+              <a:rPr lang="en-GB" dirty="0"/>
               <a:t>It is easy to determine which characteristics can be passed down to generations in the empirical data</a:t>
-            </a:r>
-          </a:p>
-          <a:p>
-            <a:r>
-              <a:rPr lang="en-GB" dirty="0"/>
-              <a:t>Quality is defined with total costs on commodity (many interpretations of quality exist in the literature)</a:t>
             </a:r>
           </a:p>
           <a:p>
@@ -22896,7 +23004,9 @@
         </p:nvSpPr>
         <p:spPr/>
         <p:txBody>
-          <a:bodyPr/>
+          <a:bodyPr>
+            <a:normAutofit fontScale="92500"/>
+          </a:bodyPr>
           <a:lstStyle/>
           <a:p>
             <a:pPr marL="457200" indent="-457200">
@@ -22984,6 +23094,32 @@
             <a:r>
               <a:rPr lang="en-GB" dirty="0"/>
               <a:t>, 107 (2) (May, 1992), pp. 573-597</a:t>
+            </a:r>
+          </a:p>
+          <a:p>
+            <a:pPr marL="457200" indent="-457200" fontAlgn="ctr">
+              <a:buFont typeface="+mj-lt"/>
+              <a:buAutoNum type="arabicPeriod"/>
+            </a:pPr>
+            <a:r>
+              <a:rPr lang="en-GB" dirty="0"/>
+              <a:t>G </a:t>
+            </a:r>
+            <a:r>
+              <a:rPr lang="en-GB" dirty="0" err="1"/>
+              <a:t>Corneo</a:t>
+            </a:r>
+            <a:r>
+              <a:rPr lang="en-GB" dirty="0"/>
+              <a:t> and O Jeanne, “Conspicuous consumption, snobbism and conformism,” </a:t>
+            </a:r>
+            <a:r>
+              <a:rPr lang="en-GB" i="1" dirty="0"/>
+              <a:t>Journal of Public Economics</a:t>
+            </a:r>
+            <a:r>
+              <a:rPr lang="en-GB" dirty="0"/>
+              <a:t>, vol. 66, pp. 55–71, 1997</a:t>
             </a:r>
           </a:p>
           <a:p>
@@ -23069,7 +23205,12 @@
             <p:ph type="title"/>
           </p:nvPr>
         </p:nvSpPr>
-        <p:spPr/>
+        <p:spPr>
+          <a:xfrm>
+            <a:off x="590114" y="452438"/>
+            <a:ext cx="7886700" cy="993775"/>
+          </a:xfrm>
+        </p:spPr>
         <p:txBody>
           <a:bodyPr/>
           <a:lstStyle/>
@@ -23218,7 +23359,7 @@
           <a:p>
             <a:r>
               <a:rPr lang="en-GB" dirty="0"/>
-              <a:t>On the other extreme, there is the view that “needs” should be decided by a benign central committee</a:t>
+              <a:t>On the other extreme, there is the view that “needs” should be decided by a benign central authority</a:t>
             </a:r>
           </a:p>
           <a:p>
@@ -23324,7 +23465,7 @@
           <a:p>
             <a:r>
               <a:rPr lang="en-GB" dirty="0"/>
-              <a:t>Is conspicuous consumption universal?</a:t>
+              <a:t>Is status demand a universal “need”?</a:t>
             </a:r>
           </a:p>
         </p:txBody>
@@ -23352,14 +23493,14 @@
           <a:p>
             <a:r>
               <a:rPr lang="en-GB" dirty="0"/>
-              <a:t>The public discourse often represents it as something that only serves the rich (consider the recent description of Ecclestone’s home). How true is this?</a:t>
+              <a:t>The public discourse often represents status consumption as something that only serves the rich (consider the recent description of Ecclestone’s home). But:</a:t>
             </a:r>
           </a:p>
           <a:p>
             <a:pPr lvl="1"/>
             <a:r>
               <a:rPr lang="en-GB" dirty="0"/>
-              <a:t>Do the rich wealthy really need status-related consumption (more than the non-rich)?</a:t>
+              <a:t>Do the wealthy really need status-related consumption (more than the non-rich)?</a:t>
             </a:r>
           </a:p>
           <a:p>
@@ -23467,7 +23608,7 @@
           <a:p>
             <a:r>
               <a:rPr lang="en-GB" dirty="0"/>
-              <a:t>Key Assumptions</a:t>
+              <a:t>Some Assumptions</a:t>
             </a:r>
           </a:p>
         </p:txBody>
@@ -23505,7 +23646,7 @@
             </a:r>
             <a:r>
               <a:rPr lang="en-GB" i="1" dirty="0"/>
-              <a:t>Rational Benefit </a:t>
+              <a:t>Rational Benefit from status </a:t>
             </a:r>
             <a:r>
               <a:rPr lang="en-GB" dirty="0"/>
@@ -23519,11 +23660,11 @@
             </a:r>
             <a:r>
               <a:rPr lang="en-GB" i="1" dirty="0"/>
-              <a:t>Assets can be held for long - </a:t>
+              <a:t>Assets held longer than a lifetime - </a:t>
             </a:r>
             <a:r>
               <a:rPr lang="en-GB" dirty="0"/>
-              <a:t>Status-related consumption that is not considered “wealth” (i.e. most of non-durable status-related consumption) cannot be inherited (bequeathed) but all else can</a:t>
+              <a:t>Status-related consumption that is not considered “wealth” (i.e. most of non-durable status-related consumption) cannot be inherited (bequeathed) but all else can be.</a:t>
             </a:r>
           </a:p>
           <a:p>
@@ -23622,7 +23763,7 @@
           <a:p>
             <a:r>
               <a:rPr lang="en-GB" dirty="0"/>
-              <a:t>Model for Consumer Demand</a:t>
+              <a:t>Towards Model for Status Demand</a:t>
             </a:r>
           </a:p>
         </p:txBody>
@@ -23658,7 +23799,7 @@
           <a:p>
             <a:r>
               <a:rPr lang="en-GB" dirty="0"/>
-              <a:t>A2 separates long-term consumption from short-term consumption while considering the differences in start wealth of consumers</a:t>
+              <a:t>A2 separates long-term consumption from short-term consumption while considering the differences in starting wealth of consumers</a:t>
             </a:r>
           </a:p>
           <a:p>
@@ -23671,14 +23812,30 @@
             <a:pPr lvl="1"/>
             <a:r>
               <a:rPr lang="en-GB" dirty="0"/>
-              <a:t>Claim 1: Status can come from either quality in non-durable consumption or wealth (which is durable consumption plus other long-term characteristics)</a:t>
+              <a:t>Claim 1: Status utility can be achieved both by </a:t>
+            </a:r>
+            <a:r>
+              <a:rPr lang="en-GB" u="sng" dirty="0"/>
+              <a:t>quality in non-durable consumption</a:t>
+            </a:r>
+            <a:r>
+              <a:rPr lang="en-GB" dirty="0"/>
+              <a:t> and </a:t>
+            </a:r>
+            <a:r>
+              <a:rPr lang="en-GB" u="sng" dirty="0"/>
+              <a:t>inheritable wealth </a:t>
+            </a:r>
+            <a:r>
+              <a:rPr lang="en-GB" dirty="0"/>
+              <a:t>(which includes durable consumption and other long-term characteristics such as education, social identity)</a:t>
             </a:r>
           </a:p>
           <a:p>
             <a:pPr lvl="1"/>
             <a:r>
               <a:rPr lang="en-GB" dirty="0"/>
-              <a:t>Claim 2: Assets are more expensive but a more certain provider of status</a:t>
+              <a:t>Claim 2: Assets are more expensive but a more stable provider of status than non-durable consumption</a:t>
             </a:r>
           </a:p>
           <a:p>
@@ -23686,12 +23843,6 @@
             <a:r>
               <a:rPr lang="en-GB" dirty="0"/>
               <a:t>Claim 3: Fulfilment of minimum needs carries no status-advantage</a:t>
-            </a:r>
-          </a:p>
-          <a:p>
-            <a:r>
-              <a:rPr lang="en-GB" dirty="0"/>
-              <a:t>Question: Would wealth or assets influence status consumption?</a:t>
             </a:r>
           </a:p>
           <a:p>
@@ -23778,7 +23929,7 @@
           <p:cNvPr id="2" name="Title 1">
             <a:extLst>
               <a:ext uri="{FF2B5EF4-FFF2-40B4-BE49-F238E27FC236}">
-                <a16:creationId xmlns:a16="http://schemas.microsoft.com/office/drawing/2014/main" id="{7A231F04-3175-4B5A-BF0C-80182312FA4A}"/>
+                <a16:creationId xmlns:a16="http://schemas.microsoft.com/office/drawing/2014/main" id="{8234A580-D3A9-4CC4-A4CB-CCA47D7840B4}"/>
               </a:ext>
             </a:extLst>
           </p:cNvPr>
@@ -23796,7 +23947,7 @@
           <a:p>
             <a:r>
               <a:rPr lang="en-GB" dirty="0"/>
-              <a:t>Status as Utility</a:t>
+              <a:t>Status consumption in the literature</a:t>
             </a:r>
           </a:p>
         </p:txBody>
@@ -23806,7 +23957,7 @@
           <p:cNvPr id="3" name="Content Placeholder 2">
             <a:extLst>
               <a:ext uri="{FF2B5EF4-FFF2-40B4-BE49-F238E27FC236}">
-                <a16:creationId xmlns:a16="http://schemas.microsoft.com/office/drawing/2014/main" id="{02F26935-3F15-42BA-B561-43D6954D1AEB}"/>
+                <a16:creationId xmlns:a16="http://schemas.microsoft.com/office/drawing/2014/main" id="{1093E417-6231-46A9-B4E3-9E1AE243872C}"/>
               </a:ext>
             </a:extLst>
           </p:cNvPr>
@@ -23819,51 +23970,40 @@
         </p:nvSpPr>
         <p:spPr/>
         <p:txBody>
-          <a:bodyPr>
-            <a:normAutofit lnSpcReduction="10000"/>
-          </a:bodyPr>
+          <a:bodyPr/>
           <a:lstStyle/>
           <a:p>
             <a:r>
               <a:rPr lang="en-GB" dirty="0"/>
-              <a:t>Endowment effects and status-quo effects have been known to exist for a long time. Questions:</a:t>
-            </a:r>
-          </a:p>
-          <a:p>
-            <a:pPr lvl="1"/>
-            <a:r>
-              <a:rPr lang="en-GB" dirty="0"/>
-              <a:t>How does include them in a model for demand?</a:t>
-            </a:r>
-          </a:p>
-          <a:p>
-            <a:pPr lvl="1"/>
-            <a:r>
-              <a:rPr lang="en-GB" dirty="0"/>
-              <a:t>Can status be subjective?</a:t>
-            </a:r>
-          </a:p>
-          <a:p>
-            <a:pPr lvl="1"/>
-            <a:r>
-              <a:rPr lang="en-GB" dirty="0"/>
-              <a:t>Is status the cause or effect of status-related consumption? </a:t>
-            </a:r>
-          </a:p>
-          <a:p>
+              <a:t>A game-theoretic ranking model – where consumers participate with income and status goods – has been explored in the literature – often focusing on the additional utility derived from visible consumption (see Ireland[2] model and the </a:t>
+            </a:r>
             <a:r>
               <a:rPr lang="en-GB" dirty="0" err="1"/>
               <a:t>Corneo</a:t>
             </a:r>
             <a:r>
               <a:rPr lang="en-GB" dirty="0"/>
-              <a:t> et al consider a game-theoretic ranking model – where consumers participate with income and status goods. The literature on status consumption focuses on additional utility derived from visible consumption (see Ireland[2] model) </a:t>
+              <a:t> model[5]) </a:t>
             </a:r>
           </a:p>
           <a:p>
             <a:r>
               <a:rPr lang="en-GB" dirty="0"/>
-              <a:t>We consider status a combination of wealth (education, occupation, and long-term assets) and purchased quality</a:t>
+              <a:t>Questions: </a:t>
+            </a:r>
+          </a:p>
+          <a:p>
+            <a:pPr lvl="1"/>
+            <a:r>
+              <a:rPr lang="en-GB" dirty="0"/>
+              <a:t>Is status cause or the effect of status-related consumption?</a:t>
+            </a:r>
+          </a:p>
+          <a:p>
+            <a:pPr lvl="1"/>
+            <a:r>
+              <a:rPr lang="en-GB" dirty="0"/>
+              <a:t>Would wealth or assets influence non-durable status consumption? If so, how?</a:t>
             </a:r>
           </a:p>
           <a:p>
@@ -23876,7 +24016,7 @@
           <p:cNvPr id="4" name="Slide Number Placeholder 3">
             <a:extLst>
               <a:ext uri="{FF2B5EF4-FFF2-40B4-BE49-F238E27FC236}">
-                <a16:creationId xmlns:a16="http://schemas.microsoft.com/office/drawing/2014/main" id="{C54EB51B-7E50-4913-99B2-28938EA79579}"/>
+                <a16:creationId xmlns:a16="http://schemas.microsoft.com/office/drawing/2014/main" id="{D851FA49-7966-48F7-816E-B8F99D6141E3}"/>
               </a:ext>
             </a:extLst>
           </p:cNvPr>
@@ -23909,7 +24049,7 @@
     </p:spTree>
     <p:extLst>
       <p:ext uri="{BB962C8B-B14F-4D97-AF65-F5344CB8AC3E}">
-        <p14:creationId xmlns:p14="http://schemas.microsoft.com/office/powerpoint/2010/main" val="1636049205"/>
+        <p14:creationId xmlns:p14="http://schemas.microsoft.com/office/powerpoint/2010/main" val="2637705389"/>
       </p:ext>
     </p:extLst>
   </p:cSld>
@@ -23997,23 +24137,20 @@
           <a:p>
             <a:r>
               <a:rPr lang="en-GB" dirty="0"/>
-              <a:t>There is enough evidence to show that as an endowment, wealth would influence wealth –related risk-seeking (consider framing and loss aversion in prospect theory)</a:t>
+              <a:t>There is enough evidence to show that endowments cause risk-aversion (consider framing and loss aversion in prospect theory)</a:t>
             </a:r>
           </a:p>
           <a:p>
             <a:r>
               <a:rPr lang="en-GB" dirty="0"/>
-              <a:t>To motivate a model, consider three players – an academic, a sportsman and an investor in a game to double their wealth with the same starting wealth. Their expectations may look like in the table.</a:t>
+              <a:t>To motivate a consumption-model, consider three players – an academic, a sportsman and an investor in a game to double their wealth with the same starting wealth. Their expectations may look like in the table.</a:t>
             </a:r>
           </a:p>
           <a:p>
             <a:r>
               <a:rPr lang="en-GB" dirty="0"/>
-              <a:t>These expectations are subjective (both short-term and long-term) but should drive their consumption</a:t>
-            </a:r>
-          </a:p>
-          <a:p>
-            <a:endParaRPr lang="en-GB" dirty="0"/>
+              <a:t>These expectations are subjective (both short-term and long-term)</a:t>
+            </a:r>
           </a:p>
           <a:p>
             <a:endParaRPr lang="en-GB" dirty="0"/>
@@ -24070,14 +24207,14 @@
           <p:nvPr>
             <p:extLst>
               <p:ext uri="{D42A27DB-BD31-4B8C-83A1-F6EECF244321}">
-                <p14:modId xmlns:p14="http://schemas.microsoft.com/office/powerpoint/2010/main" val="3093412699"/>
+                <p14:modId xmlns:p14="http://schemas.microsoft.com/office/powerpoint/2010/main" val="1105815182"/>
               </p:ext>
             </p:extLst>
           </p:nvPr>
         </p:nvGraphicFramePr>
         <p:xfrm>
           <a:off x="4876800" y="1581150"/>
-          <a:ext cx="4095752" cy="2720340"/>
+          <a:ext cx="4191000" cy="3048002"/>
         </p:xfrm>
         <a:graphic>
           <a:graphicData uri="http://schemas.openxmlformats.org/drawingml/2006/table">
@@ -24086,28 +24223,28 @@
                 <a:tableStyleId>{6E25E649-3F16-4E02-A733-19D2CDBF48F0}</a:tableStyleId>
               </a:tblPr>
               <a:tblGrid>
-                <a:gridCol w="1023938">
+                <a:gridCol w="1047750">
                   <a:extLst>
                     <a:ext uri="{9D8B030D-6E8A-4147-A177-3AD203B41FA5}">
                       <a16:colId xmlns:a16="http://schemas.microsoft.com/office/drawing/2014/main" val="3019344676"/>
                     </a:ext>
                   </a:extLst>
                 </a:gridCol>
-                <a:gridCol w="1023938">
+                <a:gridCol w="1047750">
                   <a:extLst>
                     <a:ext uri="{9D8B030D-6E8A-4147-A177-3AD203B41FA5}">
                       <a16:colId xmlns:a16="http://schemas.microsoft.com/office/drawing/2014/main" val="4234529950"/>
                     </a:ext>
                   </a:extLst>
                 </a:gridCol>
-                <a:gridCol w="1023938">
+                <a:gridCol w="1047750">
                   <a:extLst>
                     <a:ext uri="{9D8B030D-6E8A-4147-A177-3AD203B41FA5}">
                       <a16:colId xmlns:a16="http://schemas.microsoft.com/office/drawing/2014/main" val="836410542"/>
                     </a:ext>
                   </a:extLst>
                 </a:gridCol>
-                <a:gridCol w="1023938">
+                <a:gridCol w="1047750">
                   <a:extLst>
                     <a:ext uri="{9D8B030D-6E8A-4147-A177-3AD203B41FA5}">
                       <a16:colId xmlns:a16="http://schemas.microsoft.com/office/drawing/2014/main" val="3066453241"/>
@@ -24115,7 +24252,7 @@
                   </a:extLst>
                 </a:gridCol>
               </a:tblGrid>
-              <a:tr h="586740">
+              <a:tr h="1166813">
                 <a:tc>
                   <a:txBody>
                     <a:bodyPr/>
@@ -24123,7 +24260,7 @@
                     <a:p>
                       <a:r>
                         <a:rPr lang="en-GB" dirty="0"/>
-                        <a:t>Likelihood of doubling the starting wealth</a:t>
+                        <a:t>Likelihood of doubling the starting wealth at ages</a:t>
                       </a:r>
                     </a:p>
                   </a:txBody>
@@ -24136,7 +24273,7 @@
                     <a:p>
                       <a:r>
                         <a:rPr lang="en-GB" dirty="0"/>
-                        <a:t>5y</a:t>
+                        <a:t>25y</a:t>
                       </a:r>
                     </a:p>
                   </a:txBody>
@@ -24149,7 +24286,7 @@
                     <a:p>
                       <a:r>
                         <a:rPr lang="en-GB" dirty="0"/>
-                        <a:t>15y</a:t>
+                        <a:t>35y</a:t>
                       </a:r>
                     </a:p>
                   </a:txBody>
@@ -24162,7 +24299,7 @@
                     <a:p>
                       <a:r>
                         <a:rPr lang="en-GB" dirty="0"/>
-                        <a:t>30y</a:t>
+                        <a:t>65y</a:t>
                       </a:r>
                     </a:p>
                   </a:txBody>
@@ -24174,7 +24311,7 @@
                   </a:ext>
                 </a:extLst>
               </a:tr>
-              <a:tr h="632460">
+              <a:tr h="658813">
                 <a:tc>
                   <a:txBody>
                     <a:bodyPr/>
@@ -24233,7 +24370,7 @@
                   </a:ext>
                 </a:extLst>
               </a:tr>
-              <a:tr h="586740">
+              <a:tr h="611188">
                 <a:tc>
                   <a:txBody>
                     <a:bodyPr/>
@@ -24292,7 +24429,7 @@
                   </a:ext>
                 </a:extLst>
               </a:tr>
-              <a:tr h="586740">
+              <a:tr h="611188">
                 <a:tc>
                   <a:txBody>
                     <a:bodyPr/>
@@ -24411,7 +24548,14 @@
           <a:p>
             <a:r>
               <a:rPr lang="en-GB" dirty="0"/>
-              <a:t>Where does status fit in?</a:t>
+              <a:t>How does wealth influence non-durable</a:t>
+            </a:r>
+            <a:br>
+              <a:rPr lang="en-GB" dirty="0"/>
+            </a:br>
+            <a:r>
+              <a:rPr lang="en-GB" dirty="0"/>
+              <a:t>consumption?</a:t>
             </a:r>
           </a:p>
         </p:txBody>
@@ -24434,37 +24578,37 @@
         </p:nvSpPr>
         <p:spPr>
           <a:xfrm>
-            <a:off x="628650" y="1123950"/>
+            <a:off x="628650" y="1268413"/>
             <a:ext cx="7886700" cy="3262312"/>
           </a:xfrm>
         </p:spPr>
         <p:txBody>
           <a:bodyPr>
-            <a:normAutofit fontScale="92500"/>
+            <a:normAutofit fontScale="92500" lnSpcReduction="20000"/>
           </a:bodyPr>
           <a:lstStyle/>
           <a:p>
             <a:r>
               <a:rPr lang="en-GB" dirty="0"/>
-              <a:t>A higher status for the three players may be achieved with fulfilment of different financial goals – but their long-term decisions are likely to be driven by just the material wealth</a:t>
+              <a:t>The three players may achieve a fulfilment of their status goals with varied states of material wealth– but their “material wealth” is independent of their subjective view of status</a:t>
             </a:r>
           </a:p>
           <a:p>
             <a:r>
               <a:rPr lang="en-GB" dirty="0"/>
-              <a:t>Whereas the perceived status – i.e. the subjective view of the material status (under uncertainty) is more likely to influence their consumption</a:t>
+              <a:t>The perceived status can be interpreted as a view of this material status (under uncertainty) based on the subjective probability of every player</a:t>
             </a:r>
           </a:p>
           <a:p>
             <a:r>
               <a:rPr lang="en-GB" dirty="0"/>
-              <a:t>Status is thus constituted in this subjective probability</a:t>
+              <a:t>We have thus associated risk-seeking or risk-averse behaviours to the players. Hence a utility function that formalises the preferences of the three professionals should allow them to interpret the probability of wealth gain differently.</a:t>
             </a:r>
           </a:p>
           <a:p>
             <a:r>
               <a:rPr lang="en-GB" dirty="0"/>
-              <a:t>A utility function that formalises the preferences of the three professionals, would allow them to interpret the probability of wealth gain differently</a:t>
+              <a:t>Status is constituted both in this subjective probability and material status</a:t>
             </a:r>
           </a:p>
           <a:p>

</xml_diff>